<commit_message>
Update home page illustrations based upon feedback
</commit_message>
<xml_diff>
--- a/images/runtimes/OW-Runtimes.pptx
+++ b/images/runtimes/OW-Runtimes.pptx
@@ -2,7 +2,7 @@
 <file path=ppt/presentation.xml><?xml version="1.0" encoding="utf-8"?>
 <p:presentation xmlns:a="http://schemas.openxmlformats.org/drawingml/2006/main" xmlns:r="http://schemas.openxmlformats.org/officeDocument/2006/relationships" xmlns:p="http://schemas.openxmlformats.org/presentationml/2006/main" saveSubsetFonts="1" autoCompressPictures="0">
   <p:sldMasterIdLst>
-    <p:sldMasterId id="2147483667" r:id="rId1"/>
+    <p:sldMasterId id="2147483747" r:id="rId1"/>
   </p:sldMasterIdLst>
   <p:notesMasterIdLst>
     <p:notesMasterId r:id="rId3"/>
@@ -10,14 +10,14 @@
   <p:sldIdLst>
     <p:sldId id="309" r:id="rId2"/>
   </p:sldIdLst>
-  <p:sldSz cx="12192000" cy="6858000"/>
+  <p:sldSz cx="4389438" cy="2286000"/>
   <p:notesSz cx="6858000" cy="9144000"/>
   <p:defaultTextStyle>
     <a:defPPr>
       <a:defRPr lang="en-US"/>
     </a:defPPr>
-    <a:lvl1pPr marL="0" algn="l" defTabSz="457200" rtl="0" eaLnBrk="1" latinLnBrk="0" hangingPunct="1">
-      <a:defRPr sz="1800" kern="1200">
+    <a:lvl1pPr marL="0" algn="l" defTabSz="263347" rtl="0" eaLnBrk="1" latinLnBrk="0" hangingPunct="1">
+      <a:defRPr sz="1037" kern="1200">
         <a:solidFill>
           <a:schemeClr val="tx1"/>
         </a:solidFill>
@@ -26,8 +26,8 @@
         <a:cs typeface="+mn-cs"/>
       </a:defRPr>
     </a:lvl1pPr>
-    <a:lvl2pPr marL="457200" algn="l" defTabSz="457200" rtl="0" eaLnBrk="1" latinLnBrk="0" hangingPunct="1">
-      <a:defRPr sz="1800" kern="1200">
+    <a:lvl2pPr marL="263347" algn="l" defTabSz="263347" rtl="0" eaLnBrk="1" latinLnBrk="0" hangingPunct="1">
+      <a:defRPr sz="1037" kern="1200">
         <a:solidFill>
           <a:schemeClr val="tx1"/>
         </a:solidFill>
@@ -36,8 +36,8 @@
         <a:cs typeface="+mn-cs"/>
       </a:defRPr>
     </a:lvl2pPr>
-    <a:lvl3pPr marL="914400" algn="l" defTabSz="457200" rtl="0" eaLnBrk="1" latinLnBrk="0" hangingPunct="1">
-      <a:defRPr sz="1800" kern="1200">
+    <a:lvl3pPr marL="526694" algn="l" defTabSz="263347" rtl="0" eaLnBrk="1" latinLnBrk="0" hangingPunct="1">
+      <a:defRPr sz="1037" kern="1200">
         <a:solidFill>
           <a:schemeClr val="tx1"/>
         </a:solidFill>
@@ -46,8 +46,8 @@
         <a:cs typeface="+mn-cs"/>
       </a:defRPr>
     </a:lvl3pPr>
-    <a:lvl4pPr marL="1371600" algn="l" defTabSz="457200" rtl="0" eaLnBrk="1" latinLnBrk="0" hangingPunct="1">
-      <a:defRPr sz="1800" kern="1200">
+    <a:lvl4pPr marL="790042" algn="l" defTabSz="263347" rtl="0" eaLnBrk="1" latinLnBrk="0" hangingPunct="1">
+      <a:defRPr sz="1037" kern="1200">
         <a:solidFill>
           <a:schemeClr val="tx1"/>
         </a:solidFill>
@@ -56,8 +56,8 @@
         <a:cs typeface="+mn-cs"/>
       </a:defRPr>
     </a:lvl4pPr>
-    <a:lvl5pPr marL="1828800" algn="l" defTabSz="457200" rtl="0" eaLnBrk="1" latinLnBrk="0" hangingPunct="1">
-      <a:defRPr sz="1800" kern="1200">
+    <a:lvl5pPr marL="1053389" algn="l" defTabSz="263347" rtl="0" eaLnBrk="1" latinLnBrk="0" hangingPunct="1">
+      <a:defRPr sz="1037" kern="1200">
         <a:solidFill>
           <a:schemeClr val="tx1"/>
         </a:solidFill>
@@ -66,8 +66,8 @@
         <a:cs typeface="+mn-cs"/>
       </a:defRPr>
     </a:lvl5pPr>
-    <a:lvl6pPr marL="2286000" algn="l" defTabSz="457200" rtl="0" eaLnBrk="1" latinLnBrk="0" hangingPunct="1">
-      <a:defRPr sz="1800" kern="1200">
+    <a:lvl6pPr marL="1316736" algn="l" defTabSz="263347" rtl="0" eaLnBrk="1" latinLnBrk="0" hangingPunct="1">
+      <a:defRPr sz="1037" kern="1200">
         <a:solidFill>
           <a:schemeClr val="tx1"/>
         </a:solidFill>
@@ -76,8 +76,8 @@
         <a:cs typeface="+mn-cs"/>
       </a:defRPr>
     </a:lvl6pPr>
-    <a:lvl7pPr marL="2743200" algn="l" defTabSz="457200" rtl="0" eaLnBrk="1" latinLnBrk="0" hangingPunct="1">
-      <a:defRPr sz="1800" kern="1200">
+    <a:lvl7pPr marL="1580083" algn="l" defTabSz="263347" rtl="0" eaLnBrk="1" latinLnBrk="0" hangingPunct="1">
+      <a:defRPr sz="1037" kern="1200">
         <a:solidFill>
           <a:schemeClr val="tx1"/>
         </a:solidFill>
@@ -86,8 +86,8 @@
         <a:cs typeface="+mn-cs"/>
       </a:defRPr>
     </a:lvl7pPr>
-    <a:lvl8pPr marL="3200400" algn="l" defTabSz="457200" rtl="0" eaLnBrk="1" latinLnBrk="0" hangingPunct="1">
-      <a:defRPr sz="1800" kern="1200">
+    <a:lvl8pPr marL="1843430" algn="l" defTabSz="263347" rtl="0" eaLnBrk="1" latinLnBrk="0" hangingPunct="1">
+      <a:defRPr sz="1037" kern="1200">
         <a:solidFill>
           <a:schemeClr val="tx1"/>
         </a:solidFill>
@@ -96,8 +96,8 @@
         <a:cs typeface="+mn-cs"/>
       </a:defRPr>
     </a:lvl8pPr>
-    <a:lvl9pPr marL="3657600" algn="l" defTabSz="457200" rtl="0" eaLnBrk="1" latinLnBrk="0" hangingPunct="1">
-      <a:defRPr sz="1800" kern="1200">
+    <a:lvl9pPr marL="2106778" algn="l" defTabSz="263347" rtl="0" eaLnBrk="1" latinLnBrk="0" hangingPunct="1">
+      <a:defRPr sz="1037" kern="1200">
         <a:solidFill>
           <a:schemeClr val="tx1"/>
         </a:solidFill>
@@ -197,7 +197,7 @@
           <a:p>
             <a:fld id="{B7E7AA13-03CD-450D-9E48-9B034CD4C43D}" type="datetimeFigureOut">
               <a:rPr lang="en-US" smtClean="0"/>
-              <a:t>7/13/18</a:t>
+              <a:t>8/10/18</a:t>
             </a:fld>
             <a:endParaRPr lang="en-US"/>
           </a:p>
@@ -215,8 +215,8 @@
         </p:nvSpPr>
         <p:spPr>
           <a:xfrm>
-            <a:off x="685800" y="1143000"/>
-            <a:ext cx="5486400" cy="3086100"/>
+            <a:off x="466725" y="1143000"/>
+            <a:ext cx="5924550" cy="3086100"/>
           </a:xfrm>
           <a:prstGeom prst="rect">
             <a:avLst/>
@@ -370,8 +370,8 @@
   </p:cSld>
   <p:clrMap bg1="lt1" tx1="dk1" bg2="lt2" tx2="dk2" accent1="accent1" accent2="accent2" accent3="accent3" accent4="accent4" accent5="accent5" accent6="accent6" hlink="hlink" folHlink="folHlink"/>
   <p:notesStyle>
-    <a:lvl1pPr marL="0" algn="l" defTabSz="914400" rtl="0" eaLnBrk="1" latinLnBrk="0" hangingPunct="1">
-      <a:defRPr sz="1200" kern="1200">
+    <a:lvl1pPr marL="0" algn="l" defTabSz="526694" rtl="0" eaLnBrk="1" latinLnBrk="0" hangingPunct="1">
+      <a:defRPr sz="691" kern="1200">
         <a:solidFill>
           <a:schemeClr val="tx1"/>
         </a:solidFill>
@@ -380,8 +380,8 @@
         <a:cs typeface="+mn-cs"/>
       </a:defRPr>
     </a:lvl1pPr>
-    <a:lvl2pPr marL="457200" algn="l" defTabSz="914400" rtl="0" eaLnBrk="1" latinLnBrk="0" hangingPunct="1">
-      <a:defRPr sz="1200" kern="1200">
+    <a:lvl2pPr marL="263347" algn="l" defTabSz="526694" rtl="0" eaLnBrk="1" latinLnBrk="0" hangingPunct="1">
+      <a:defRPr sz="691" kern="1200">
         <a:solidFill>
           <a:schemeClr val="tx1"/>
         </a:solidFill>
@@ -390,8 +390,8 @@
         <a:cs typeface="+mn-cs"/>
       </a:defRPr>
     </a:lvl2pPr>
-    <a:lvl3pPr marL="914400" algn="l" defTabSz="914400" rtl="0" eaLnBrk="1" latinLnBrk="0" hangingPunct="1">
-      <a:defRPr sz="1200" kern="1200">
+    <a:lvl3pPr marL="526694" algn="l" defTabSz="526694" rtl="0" eaLnBrk="1" latinLnBrk="0" hangingPunct="1">
+      <a:defRPr sz="691" kern="1200">
         <a:solidFill>
           <a:schemeClr val="tx1"/>
         </a:solidFill>
@@ -400,8 +400,8 @@
         <a:cs typeface="+mn-cs"/>
       </a:defRPr>
     </a:lvl3pPr>
-    <a:lvl4pPr marL="1371600" algn="l" defTabSz="914400" rtl="0" eaLnBrk="1" latinLnBrk="0" hangingPunct="1">
-      <a:defRPr sz="1200" kern="1200">
+    <a:lvl4pPr marL="790042" algn="l" defTabSz="526694" rtl="0" eaLnBrk="1" latinLnBrk="0" hangingPunct="1">
+      <a:defRPr sz="691" kern="1200">
         <a:solidFill>
           <a:schemeClr val="tx1"/>
         </a:solidFill>
@@ -410,8 +410,8 @@
         <a:cs typeface="+mn-cs"/>
       </a:defRPr>
     </a:lvl4pPr>
-    <a:lvl5pPr marL="1828800" algn="l" defTabSz="914400" rtl="0" eaLnBrk="1" latinLnBrk="0" hangingPunct="1">
-      <a:defRPr sz="1200" kern="1200">
+    <a:lvl5pPr marL="1053389" algn="l" defTabSz="526694" rtl="0" eaLnBrk="1" latinLnBrk="0" hangingPunct="1">
+      <a:defRPr sz="691" kern="1200">
         <a:solidFill>
           <a:schemeClr val="tx1"/>
         </a:solidFill>
@@ -420,8 +420,8 @@
         <a:cs typeface="+mn-cs"/>
       </a:defRPr>
     </a:lvl5pPr>
-    <a:lvl6pPr marL="2286000" algn="l" defTabSz="914400" rtl="0" eaLnBrk="1" latinLnBrk="0" hangingPunct="1">
-      <a:defRPr sz="1200" kern="1200">
+    <a:lvl6pPr marL="1316736" algn="l" defTabSz="526694" rtl="0" eaLnBrk="1" latinLnBrk="0" hangingPunct="1">
+      <a:defRPr sz="691" kern="1200">
         <a:solidFill>
           <a:schemeClr val="tx1"/>
         </a:solidFill>
@@ -430,8 +430,8 @@
         <a:cs typeface="+mn-cs"/>
       </a:defRPr>
     </a:lvl6pPr>
-    <a:lvl7pPr marL="2743200" algn="l" defTabSz="914400" rtl="0" eaLnBrk="1" latinLnBrk="0" hangingPunct="1">
-      <a:defRPr sz="1200" kern="1200">
+    <a:lvl7pPr marL="1580083" algn="l" defTabSz="526694" rtl="0" eaLnBrk="1" latinLnBrk="0" hangingPunct="1">
+      <a:defRPr sz="691" kern="1200">
         <a:solidFill>
           <a:schemeClr val="tx1"/>
         </a:solidFill>
@@ -440,8 +440,8 @@
         <a:cs typeface="+mn-cs"/>
       </a:defRPr>
     </a:lvl7pPr>
-    <a:lvl8pPr marL="3200400" algn="l" defTabSz="914400" rtl="0" eaLnBrk="1" latinLnBrk="0" hangingPunct="1">
-      <a:defRPr sz="1200" kern="1200">
+    <a:lvl8pPr marL="1843430" algn="l" defTabSz="526694" rtl="0" eaLnBrk="1" latinLnBrk="0" hangingPunct="1">
+      <a:defRPr sz="691" kern="1200">
         <a:solidFill>
           <a:schemeClr val="tx1"/>
         </a:solidFill>
@@ -450,8 +450,8 @@
         <a:cs typeface="+mn-cs"/>
       </a:defRPr>
     </a:lvl8pPr>
-    <a:lvl9pPr marL="3657600" algn="l" defTabSz="914400" rtl="0" eaLnBrk="1" latinLnBrk="0" hangingPunct="1">
-      <a:defRPr sz="1200" kern="1200">
+    <a:lvl9pPr marL="2106778" algn="l" defTabSz="526694" rtl="0" eaLnBrk="1" latinLnBrk="0" hangingPunct="1">
+      <a:defRPr sz="691" kern="1200">
         <a:solidFill>
           <a:schemeClr val="tx1"/>
         </a:solidFill>
@@ -465,8 +465,8 @@
 </file>
 
 <file path=ppt/slideLayouts/slideLayout1.xml><?xml version="1.0" encoding="utf-8"?>
-<p:sldLayout xmlns:a="http://schemas.openxmlformats.org/drawingml/2006/main" xmlns:r="http://schemas.openxmlformats.org/officeDocument/2006/relationships" xmlns:p="http://schemas.openxmlformats.org/presentationml/2006/main" preserve="1" userDrawn="1">
-  <p:cSld name="Blank">
+<p:sldLayout xmlns:a="http://schemas.openxmlformats.org/drawingml/2006/main" xmlns:r="http://schemas.openxmlformats.org/officeDocument/2006/relationships" xmlns:p="http://schemas.openxmlformats.org/presentationml/2006/main" type="title" preserve="1">
+  <p:cSld name="Title Slide">
     <p:spTree>
       <p:nvGrpSpPr>
         <p:cNvPr id="1" name=""/>
@@ -483,6 +483,551 @@
       </p:grpSpPr>
       <p:sp>
         <p:nvSpPr>
+          <p:cNvPr id="2" name="Title 1"/>
+          <p:cNvSpPr>
+            <a:spLocks noGrp="1"/>
+          </p:cNvSpPr>
+          <p:nvPr>
+            <p:ph type="ctrTitle"/>
+          </p:nvPr>
+        </p:nvSpPr>
+        <p:spPr>
+          <a:xfrm>
+            <a:off x="548680" y="374121"/>
+            <a:ext cx="3292079" cy="795867"/>
+          </a:xfrm>
+        </p:spPr>
+        <p:txBody>
+          <a:bodyPr anchor="b"/>
+          <a:lstStyle>
+            <a:lvl1pPr algn="ctr">
+              <a:defRPr sz="2000"/>
+            </a:lvl1pPr>
+          </a:lstStyle>
+          <a:p>
+            <a:r>
+              <a:rPr lang="en-US" smtClean="0"/>
+              <a:t>Click to edit Master title style</a:t>
+            </a:r>
+            <a:endParaRPr lang="en-US" dirty="0"/>
+          </a:p>
+        </p:txBody>
+      </p:sp>
+      <p:sp>
+        <p:nvSpPr>
+          <p:cNvPr id="3" name="Subtitle 2"/>
+          <p:cNvSpPr>
+            <a:spLocks noGrp="1"/>
+          </p:cNvSpPr>
+          <p:nvPr>
+            <p:ph type="subTitle" idx="1"/>
+          </p:nvPr>
+        </p:nvSpPr>
+        <p:spPr>
+          <a:xfrm>
+            <a:off x="548680" y="1200679"/>
+            <a:ext cx="3292079" cy="551921"/>
+          </a:xfrm>
+        </p:spPr>
+        <p:txBody>
+          <a:bodyPr/>
+          <a:lstStyle>
+            <a:lvl1pPr marL="0" indent="0" algn="ctr">
+              <a:buNone/>
+              <a:defRPr sz="800"/>
+            </a:lvl1pPr>
+            <a:lvl2pPr marL="152385" indent="0" algn="ctr">
+              <a:buNone/>
+              <a:defRPr sz="667"/>
+            </a:lvl2pPr>
+            <a:lvl3pPr marL="304770" indent="0" algn="ctr">
+              <a:buNone/>
+              <a:defRPr sz="600"/>
+            </a:lvl3pPr>
+            <a:lvl4pPr marL="457154" indent="0" algn="ctr">
+              <a:buNone/>
+              <a:defRPr sz="533"/>
+            </a:lvl4pPr>
+            <a:lvl5pPr marL="609539" indent="0" algn="ctr">
+              <a:buNone/>
+              <a:defRPr sz="533"/>
+            </a:lvl5pPr>
+            <a:lvl6pPr marL="761924" indent="0" algn="ctr">
+              <a:buNone/>
+              <a:defRPr sz="533"/>
+            </a:lvl6pPr>
+            <a:lvl7pPr marL="914309" indent="0" algn="ctr">
+              <a:buNone/>
+              <a:defRPr sz="533"/>
+            </a:lvl7pPr>
+            <a:lvl8pPr marL="1066693" indent="0" algn="ctr">
+              <a:buNone/>
+              <a:defRPr sz="533"/>
+            </a:lvl8pPr>
+            <a:lvl9pPr marL="1219078" indent="0" algn="ctr">
+              <a:buNone/>
+              <a:defRPr sz="533"/>
+            </a:lvl9pPr>
+          </a:lstStyle>
+          <a:p>
+            <a:r>
+              <a:rPr lang="en-US" smtClean="0"/>
+              <a:t>Click to edit Master subtitle style</a:t>
+            </a:r>
+            <a:endParaRPr lang="en-US" dirty="0"/>
+          </a:p>
+        </p:txBody>
+      </p:sp>
+      <p:sp>
+        <p:nvSpPr>
+          <p:cNvPr id="4" name="Date Placeholder 3"/>
+          <p:cNvSpPr>
+            <a:spLocks noGrp="1"/>
+          </p:cNvSpPr>
+          <p:nvPr>
+            <p:ph type="dt" sz="half" idx="10"/>
+          </p:nvPr>
+        </p:nvSpPr>
+        <p:spPr/>
+        <p:txBody>
+          <a:bodyPr/>
+          <a:lstStyle/>
+          <a:p>
+            <a:fld id="{C764DE79-268F-4C1A-8933-263129D2AF90}" type="datetimeFigureOut">
+              <a:rPr lang="en-US" smtClean="0"/>
+              <a:t>8/10/18</a:t>
+            </a:fld>
+            <a:endParaRPr lang="en-US" dirty="0"/>
+          </a:p>
+        </p:txBody>
+      </p:sp>
+      <p:sp>
+        <p:nvSpPr>
+          <p:cNvPr id="5" name="Footer Placeholder 4"/>
+          <p:cNvSpPr>
+            <a:spLocks noGrp="1"/>
+          </p:cNvSpPr>
+          <p:nvPr>
+            <p:ph type="ftr" sz="quarter" idx="11"/>
+          </p:nvPr>
+        </p:nvSpPr>
+        <p:spPr/>
+        <p:txBody>
+          <a:bodyPr/>
+          <a:lstStyle/>
+          <a:p>
+            <a:endParaRPr lang="en-US" dirty="0"/>
+          </a:p>
+        </p:txBody>
+      </p:sp>
+      <p:sp>
+        <p:nvSpPr>
+          <p:cNvPr id="6" name="Slide Number Placeholder 5"/>
+          <p:cNvSpPr>
+            <a:spLocks noGrp="1"/>
+          </p:cNvSpPr>
+          <p:nvPr>
+            <p:ph type="sldNum" sz="quarter" idx="12"/>
+          </p:nvPr>
+        </p:nvSpPr>
+        <p:spPr/>
+        <p:txBody>
+          <a:bodyPr/>
+          <a:lstStyle/>
+          <a:p>
+            <a:fld id="{48F63A3B-78C7-47BE-AE5E-E10140E04643}" type="slidenum">
+              <a:rPr lang="en-US" smtClean="0"/>
+              <a:t>‹#›</a:t>
+            </a:fld>
+            <a:endParaRPr lang="en-US" dirty="0"/>
+          </a:p>
+        </p:txBody>
+      </p:sp>
+    </p:spTree>
+    <p:extLst>
+      <p:ext uri="{BB962C8B-B14F-4D97-AF65-F5344CB8AC3E}">
+        <p14:creationId xmlns:p14="http://schemas.microsoft.com/office/powerpoint/2010/main" val="1926362576"/>
+      </p:ext>
+    </p:extLst>
+  </p:cSld>
+  <p:clrMapOvr>
+    <a:masterClrMapping/>
+  </p:clrMapOvr>
+  <p:hf hdr="0" ftr="0" dt="0"/>
+</p:sldLayout>
+</file>
+
+<file path=ppt/slideLayouts/slideLayout10.xml><?xml version="1.0" encoding="utf-8"?>
+<p:sldLayout xmlns:a="http://schemas.openxmlformats.org/drawingml/2006/main" xmlns:r="http://schemas.openxmlformats.org/officeDocument/2006/relationships" xmlns:p="http://schemas.openxmlformats.org/presentationml/2006/main" type="vertTx" preserve="1">
+  <p:cSld name="Title and Vertical Text">
+    <p:spTree>
+      <p:nvGrpSpPr>
+        <p:cNvPr id="1" name=""/>
+        <p:cNvGrpSpPr/>
+        <p:nvPr/>
+      </p:nvGrpSpPr>
+      <p:grpSpPr>
+        <a:xfrm>
+          <a:off x="0" y="0"/>
+          <a:ext cx="0" cy="0"/>
+          <a:chOff x="0" y="0"/>
+          <a:chExt cx="0" cy="0"/>
+        </a:xfrm>
+      </p:grpSpPr>
+      <p:sp>
+        <p:nvSpPr>
+          <p:cNvPr id="2" name="Title 1"/>
+          <p:cNvSpPr>
+            <a:spLocks noGrp="1"/>
+          </p:cNvSpPr>
+          <p:nvPr>
+            <p:ph type="title"/>
+          </p:nvPr>
+        </p:nvSpPr>
+        <p:spPr/>
+        <p:txBody>
+          <a:bodyPr/>
+          <a:lstStyle/>
+          <a:p>
+            <a:r>
+              <a:rPr lang="en-US" smtClean="0"/>
+              <a:t>Click to edit Master title style</a:t>
+            </a:r>
+            <a:endParaRPr lang="en-US" dirty="0"/>
+          </a:p>
+        </p:txBody>
+      </p:sp>
+      <p:sp>
+        <p:nvSpPr>
+          <p:cNvPr id="3" name="Vertical Text Placeholder 2"/>
+          <p:cNvSpPr>
+            <a:spLocks noGrp="1"/>
+          </p:cNvSpPr>
+          <p:nvPr>
+            <p:ph type="body" orient="vert" idx="1"/>
+          </p:nvPr>
+        </p:nvSpPr>
+        <p:spPr/>
+        <p:txBody>
+          <a:bodyPr vert="eaVert"/>
+          <a:lstStyle/>
+          <a:p>
+            <a:pPr lvl="0"/>
+            <a:r>
+              <a:rPr lang="en-US" smtClean="0"/>
+              <a:t>Click to edit Master text styles</a:t>
+            </a:r>
+          </a:p>
+          <a:p>
+            <a:pPr lvl="1"/>
+            <a:r>
+              <a:rPr lang="en-US" smtClean="0"/>
+              <a:t>Second level</a:t>
+            </a:r>
+          </a:p>
+          <a:p>
+            <a:pPr lvl="2"/>
+            <a:r>
+              <a:rPr lang="en-US" smtClean="0"/>
+              <a:t>Third level</a:t>
+            </a:r>
+          </a:p>
+          <a:p>
+            <a:pPr lvl="3"/>
+            <a:r>
+              <a:rPr lang="en-US" smtClean="0"/>
+              <a:t>Fourth level</a:t>
+            </a:r>
+          </a:p>
+          <a:p>
+            <a:pPr lvl="4"/>
+            <a:r>
+              <a:rPr lang="en-US" smtClean="0"/>
+              <a:t>Fifth level</a:t>
+            </a:r>
+            <a:endParaRPr lang="en-US" dirty="0"/>
+          </a:p>
+        </p:txBody>
+      </p:sp>
+      <p:sp>
+        <p:nvSpPr>
+          <p:cNvPr id="4" name="Date Placeholder 3"/>
+          <p:cNvSpPr>
+            <a:spLocks noGrp="1"/>
+          </p:cNvSpPr>
+          <p:nvPr>
+            <p:ph type="dt" sz="half" idx="10"/>
+          </p:nvPr>
+        </p:nvSpPr>
+        <p:spPr/>
+        <p:txBody>
+          <a:bodyPr/>
+          <a:lstStyle/>
+          <a:p>
+            <a:fld id="{C764DE79-268F-4C1A-8933-263129D2AF90}" type="datetimeFigureOut">
+              <a:rPr lang="en-US" smtClean="0"/>
+              <a:t>8/10/18</a:t>
+            </a:fld>
+            <a:endParaRPr lang="en-US" dirty="0"/>
+          </a:p>
+        </p:txBody>
+      </p:sp>
+      <p:sp>
+        <p:nvSpPr>
+          <p:cNvPr id="5" name="Footer Placeholder 4"/>
+          <p:cNvSpPr>
+            <a:spLocks noGrp="1"/>
+          </p:cNvSpPr>
+          <p:nvPr>
+            <p:ph type="ftr" sz="quarter" idx="11"/>
+          </p:nvPr>
+        </p:nvSpPr>
+        <p:spPr/>
+        <p:txBody>
+          <a:bodyPr/>
+          <a:lstStyle/>
+          <a:p>
+            <a:endParaRPr lang="en-US" dirty="0"/>
+          </a:p>
+        </p:txBody>
+      </p:sp>
+      <p:sp>
+        <p:nvSpPr>
+          <p:cNvPr id="6" name="Slide Number Placeholder 5"/>
+          <p:cNvSpPr>
+            <a:spLocks noGrp="1"/>
+          </p:cNvSpPr>
+          <p:nvPr>
+            <p:ph type="sldNum" sz="quarter" idx="12"/>
+          </p:nvPr>
+        </p:nvSpPr>
+        <p:spPr/>
+        <p:txBody>
+          <a:bodyPr/>
+          <a:lstStyle/>
+          <a:p>
+            <a:fld id="{48F63A3B-78C7-47BE-AE5E-E10140E04643}" type="slidenum">
+              <a:rPr lang="en-US" smtClean="0"/>
+              <a:t>‹#›</a:t>
+            </a:fld>
+            <a:endParaRPr lang="en-US" dirty="0"/>
+          </a:p>
+        </p:txBody>
+      </p:sp>
+    </p:spTree>
+    <p:extLst>
+      <p:ext uri="{BB962C8B-B14F-4D97-AF65-F5344CB8AC3E}">
+        <p14:creationId xmlns:p14="http://schemas.microsoft.com/office/powerpoint/2010/main" val="461618070"/>
+      </p:ext>
+    </p:extLst>
+  </p:cSld>
+  <p:clrMapOvr>
+    <a:masterClrMapping/>
+  </p:clrMapOvr>
+  <p:hf hdr="0" ftr="0" dt="0"/>
+</p:sldLayout>
+</file>
+
+<file path=ppt/slideLayouts/slideLayout11.xml><?xml version="1.0" encoding="utf-8"?>
+<p:sldLayout xmlns:a="http://schemas.openxmlformats.org/drawingml/2006/main" xmlns:r="http://schemas.openxmlformats.org/officeDocument/2006/relationships" xmlns:p="http://schemas.openxmlformats.org/presentationml/2006/main" type="vertTitleAndTx" preserve="1">
+  <p:cSld name="Vertical Title and Text">
+    <p:spTree>
+      <p:nvGrpSpPr>
+        <p:cNvPr id="1" name=""/>
+        <p:cNvGrpSpPr/>
+        <p:nvPr/>
+      </p:nvGrpSpPr>
+      <p:grpSpPr>
+        <a:xfrm>
+          <a:off x="0" y="0"/>
+          <a:ext cx="0" cy="0"/>
+          <a:chOff x="0" y="0"/>
+          <a:chExt cx="0" cy="0"/>
+        </a:xfrm>
+      </p:grpSpPr>
+      <p:sp>
+        <p:nvSpPr>
+          <p:cNvPr id="2" name="Vertical Title 1"/>
+          <p:cNvSpPr>
+            <a:spLocks noGrp="1"/>
+          </p:cNvSpPr>
+          <p:nvPr>
+            <p:ph type="title" orient="vert"/>
+          </p:nvPr>
+        </p:nvSpPr>
+        <p:spPr>
+          <a:xfrm>
+            <a:off x="3141191" y="121709"/>
+            <a:ext cx="946473" cy="1937279"/>
+          </a:xfrm>
+        </p:spPr>
+        <p:txBody>
+          <a:bodyPr vert="eaVert"/>
+          <a:lstStyle/>
+          <a:p>
+            <a:r>
+              <a:rPr lang="en-US" smtClean="0"/>
+              <a:t>Click to edit Master title style</a:t>
+            </a:r>
+            <a:endParaRPr lang="en-US" dirty="0"/>
+          </a:p>
+        </p:txBody>
+      </p:sp>
+      <p:sp>
+        <p:nvSpPr>
+          <p:cNvPr id="3" name="Vertical Text Placeholder 2"/>
+          <p:cNvSpPr>
+            <a:spLocks noGrp="1"/>
+          </p:cNvSpPr>
+          <p:nvPr>
+            <p:ph type="body" orient="vert" idx="1"/>
+          </p:nvPr>
+        </p:nvSpPr>
+        <p:spPr>
+          <a:xfrm>
+            <a:off x="301774" y="121709"/>
+            <a:ext cx="2784550" cy="1937279"/>
+          </a:xfrm>
+        </p:spPr>
+        <p:txBody>
+          <a:bodyPr vert="eaVert"/>
+          <a:lstStyle/>
+          <a:p>
+            <a:pPr lvl="0"/>
+            <a:r>
+              <a:rPr lang="en-US" smtClean="0"/>
+              <a:t>Click to edit Master text styles</a:t>
+            </a:r>
+          </a:p>
+          <a:p>
+            <a:pPr lvl="1"/>
+            <a:r>
+              <a:rPr lang="en-US" smtClean="0"/>
+              <a:t>Second level</a:t>
+            </a:r>
+          </a:p>
+          <a:p>
+            <a:pPr lvl="2"/>
+            <a:r>
+              <a:rPr lang="en-US" smtClean="0"/>
+              <a:t>Third level</a:t>
+            </a:r>
+          </a:p>
+          <a:p>
+            <a:pPr lvl="3"/>
+            <a:r>
+              <a:rPr lang="en-US" smtClean="0"/>
+              <a:t>Fourth level</a:t>
+            </a:r>
+          </a:p>
+          <a:p>
+            <a:pPr lvl="4"/>
+            <a:r>
+              <a:rPr lang="en-US" smtClean="0"/>
+              <a:t>Fifth level</a:t>
+            </a:r>
+            <a:endParaRPr lang="en-US" dirty="0"/>
+          </a:p>
+        </p:txBody>
+      </p:sp>
+      <p:sp>
+        <p:nvSpPr>
+          <p:cNvPr id="4" name="Date Placeholder 3"/>
+          <p:cNvSpPr>
+            <a:spLocks noGrp="1"/>
+          </p:cNvSpPr>
+          <p:nvPr>
+            <p:ph type="dt" sz="half" idx="10"/>
+          </p:nvPr>
+        </p:nvSpPr>
+        <p:spPr/>
+        <p:txBody>
+          <a:bodyPr/>
+          <a:lstStyle/>
+          <a:p>
+            <a:fld id="{C764DE79-268F-4C1A-8933-263129D2AF90}" type="datetimeFigureOut">
+              <a:rPr lang="en-US" smtClean="0"/>
+              <a:t>8/10/18</a:t>
+            </a:fld>
+            <a:endParaRPr lang="en-US" dirty="0"/>
+          </a:p>
+        </p:txBody>
+      </p:sp>
+      <p:sp>
+        <p:nvSpPr>
+          <p:cNvPr id="5" name="Footer Placeholder 4"/>
+          <p:cNvSpPr>
+            <a:spLocks noGrp="1"/>
+          </p:cNvSpPr>
+          <p:nvPr>
+            <p:ph type="ftr" sz="quarter" idx="11"/>
+          </p:nvPr>
+        </p:nvSpPr>
+        <p:spPr/>
+        <p:txBody>
+          <a:bodyPr/>
+          <a:lstStyle/>
+          <a:p>
+            <a:endParaRPr lang="en-US" dirty="0"/>
+          </a:p>
+        </p:txBody>
+      </p:sp>
+      <p:sp>
+        <p:nvSpPr>
+          <p:cNvPr id="6" name="Slide Number Placeholder 5"/>
+          <p:cNvSpPr>
+            <a:spLocks noGrp="1"/>
+          </p:cNvSpPr>
+          <p:nvPr>
+            <p:ph type="sldNum" sz="quarter" idx="12"/>
+          </p:nvPr>
+        </p:nvSpPr>
+        <p:spPr/>
+        <p:txBody>
+          <a:bodyPr/>
+          <a:lstStyle/>
+          <a:p>
+            <a:fld id="{48F63A3B-78C7-47BE-AE5E-E10140E04643}" type="slidenum">
+              <a:rPr lang="en-US" smtClean="0"/>
+              <a:t>‹#›</a:t>
+            </a:fld>
+            <a:endParaRPr lang="en-US" dirty="0"/>
+          </a:p>
+        </p:txBody>
+      </p:sp>
+    </p:spTree>
+    <p:extLst>
+      <p:ext uri="{BB962C8B-B14F-4D97-AF65-F5344CB8AC3E}">
+        <p14:creationId xmlns:p14="http://schemas.microsoft.com/office/powerpoint/2010/main" val="1703969526"/>
+      </p:ext>
+    </p:extLst>
+  </p:cSld>
+  <p:clrMapOvr>
+    <a:masterClrMapping/>
+  </p:clrMapOvr>
+  <p:hf hdr="0" ftr="0" dt="0"/>
+</p:sldLayout>
+</file>
+
+<file path=ppt/slideLayouts/slideLayout12.xml><?xml version="1.0" encoding="utf-8"?>
+<p:sldLayout xmlns:a="http://schemas.openxmlformats.org/drawingml/2006/main" xmlns:r="http://schemas.openxmlformats.org/officeDocument/2006/relationships" xmlns:p="http://schemas.openxmlformats.org/presentationml/2006/main" preserve="1" userDrawn="1">
+  <p:cSld name="1_Blank">
+    <p:spTree>
+      <p:nvGrpSpPr>
+        <p:cNvPr id="1" name=""/>
+        <p:cNvGrpSpPr/>
+        <p:nvPr/>
+      </p:nvGrpSpPr>
+      <p:grpSpPr>
+        <a:xfrm>
+          <a:off x="0" y="0"/>
+          <a:ext cx="0" cy="0"/>
+          <a:chOff x="0" y="0"/>
+          <a:chExt cx="0" cy="0"/>
+        </a:xfrm>
+      </p:grpSpPr>
+      <p:sp>
+        <p:nvSpPr>
           <p:cNvPr id="4" name="Slide Number Placeholder 5"/>
           <p:cNvSpPr>
             <a:spLocks noGrp="1"/>
@@ -493,8 +1038,8 @@
         </p:nvSpPr>
         <p:spPr>
           <a:xfrm>
-            <a:off x="9342120" y="6583680"/>
-            <a:ext cx="2743200" cy="274320"/>
+            <a:off x="3363407" y="2194561"/>
+            <a:ext cx="987624" cy="91440"/>
           </a:xfrm>
           <a:prstGeom prst="rect">
             <a:avLst/>
@@ -536,8 +1081,8 @@
         </p:nvSpPr>
         <p:spPr>
           <a:xfrm>
-            <a:off x="161109" y="6538277"/>
-            <a:ext cx="4114800" cy="365125"/>
+            <a:off x="58004" y="2179427"/>
+            <a:ext cx="1481435" cy="121708"/>
           </a:xfrm>
           <a:prstGeom prst="rect">
             <a:avLst/>
@@ -575,7 +1120,7 @@
 </p:sldLayout>
 </file>
 
-<file path=ppt/slideLayouts/slideLayout2.xml><?xml version="1.0" encoding="utf-8"?>
+<file path=ppt/slideLayouts/slideLayout13.xml><?xml version="1.0" encoding="utf-8"?>
 <p:sldLayout xmlns:a="http://schemas.openxmlformats.org/drawingml/2006/main" xmlns:r="http://schemas.openxmlformats.org/officeDocument/2006/relationships" xmlns:p="http://schemas.openxmlformats.org/presentationml/2006/main" preserve="1" userDrawn="1">
   <p:cSld name="Simple_Developer">
     <p:spTree>
@@ -604,8 +1149,8 @@
         </p:nvSpPr>
         <p:spPr>
           <a:xfrm>
-            <a:off x="9342120" y="6583680"/>
-            <a:ext cx="2743200" cy="274320"/>
+            <a:off x="3363407" y="2194561"/>
+            <a:ext cx="987624" cy="91440"/>
           </a:xfrm>
           <a:prstGeom prst="rect">
             <a:avLst/>
@@ -642,8 +1187,8 @@
         </p:nvSpPr>
         <p:spPr>
           <a:xfrm>
-            <a:off x="9342120" y="6583680"/>
-            <a:ext cx="2743200" cy="274320"/>
+            <a:off x="3363407" y="2194561"/>
+            <a:ext cx="987624" cy="91440"/>
           </a:xfrm>
           <a:prstGeom prst="rect">
             <a:avLst/>
@@ -748,11 +1293,11 @@
           </a:lstStyle>
           <a:p>
             <a:fld id="{FFF8894C-962F-4043-BDE4-6CA2ABEDD0B4}" type="slidenum">
-              <a:rPr lang="en-US" smtClean="0"/>
+              <a:rPr lang="en-US" sz="1200" smtClean="0"/>
               <a:pPr/>
               <a:t>‹#›</a:t>
             </a:fld>
-            <a:endParaRPr lang="en-US" dirty="0"/>
+            <a:endParaRPr lang="en-US" sz="1200" dirty="0"/>
           </a:p>
         </p:txBody>
       </p:sp>
@@ -778,8 +1323,8 @@
         </p:blipFill>
         <p:spPr>
           <a:xfrm>
-            <a:off x="0" y="0"/>
-            <a:ext cx="12192000" cy="6858000"/>
+            <a:off x="0" y="1"/>
+            <a:ext cx="4389438" cy="2286000"/>
           </a:xfrm>
           <a:prstGeom prst="rect">
             <a:avLst/>
@@ -799,7 +1344,7 @@
 </p:sldLayout>
 </file>
 
-<file path=ppt/slideLayouts/slideLayout3.xml><?xml version="1.0" encoding="utf-8"?>
+<file path=ppt/slideLayouts/slideLayout14.xml><?xml version="1.0" encoding="utf-8"?>
 <p:sldLayout xmlns:a="http://schemas.openxmlformats.org/drawingml/2006/main" xmlns:r="http://schemas.openxmlformats.org/officeDocument/2006/relationships" xmlns:p="http://schemas.openxmlformats.org/presentationml/2006/main" preserve="1" userDrawn="1">
   <p:cSld name="Simple_Hackathon">
     <p:spTree>
@@ -828,8 +1373,8 @@
         </p:nvSpPr>
         <p:spPr>
           <a:xfrm>
-            <a:off x="9342120" y="6583680"/>
-            <a:ext cx="2743200" cy="274320"/>
+            <a:off x="3363407" y="2194561"/>
+            <a:ext cx="987624" cy="91440"/>
           </a:xfrm>
           <a:prstGeom prst="rect">
             <a:avLst/>
@@ -866,8 +1411,8 @@
         </p:nvSpPr>
         <p:spPr>
           <a:xfrm>
-            <a:off x="9342120" y="6583680"/>
-            <a:ext cx="2743200" cy="274320"/>
+            <a:off x="3363407" y="2194561"/>
+            <a:ext cx="987624" cy="91440"/>
           </a:xfrm>
           <a:prstGeom prst="rect">
             <a:avLst/>
@@ -972,11 +1517,11 @@
           </a:lstStyle>
           <a:p>
             <a:fld id="{FFF8894C-962F-4043-BDE4-6CA2ABEDD0B4}" type="slidenum">
-              <a:rPr lang="en-US" smtClean="0"/>
+              <a:rPr lang="en-US" sz="1200" smtClean="0"/>
               <a:pPr/>
               <a:t>‹#›</a:t>
             </a:fld>
-            <a:endParaRPr lang="en-US" dirty="0"/>
+            <a:endParaRPr lang="en-US" sz="1200" dirty="0"/>
           </a:p>
         </p:txBody>
       </p:sp>
@@ -1002,8 +1547,8 @@
         </p:blipFill>
         <p:spPr>
           <a:xfrm>
-            <a:off x="0" y="0"/>
-            <a:ext cx="12192000" cy="6858000"/>
+            <a:off x="0" y="1"/>
+            <a:ext cx="4389438" cy="2286000"/>
           </a:xfrm>
           <a:prstGeom prst="rect">
             <a:avLst/>
@@ -1023,7 +1568,7 @@
 </p:sldLayout>
 </file>
 
-<file path=ppt/slideLayouts/slideLayout4.xml><?xml version="1.0" encoding="utf-8"?>
+<file path=ppt/slideLayouts/slideLayout15.xml><?xml version="1.0" encoding="utf-8"?>
 <p:sldLayout xmlns:a="http://schemas.openxmlformats.org/drawingml/2006/main" xmlns:r="http://schemas.openxmlformats.org/officeDocument/2006/relationships" xmlns:p="http://schemas.openxmlformats.org/presentationml/2006/main" preserve="1" userDrawn="1">
   <p:cSld name="Custom Layout">
     <p:spTree>
@@ -1045,7 +1590,7 @@
           <p:cNvPr id="3" name="Picture 2">
             <a:extLst>
               <a:ext uri="{FF2B5EF4-FFF2-40B4-BE49-F238E27FC236}">
-                <a16:creationId xmlns:a16="http://schemas.microsoft.com/office/drawing/2014/main" xmlns="" id="{4FD8317D-E5DC-48AE-B946-799BE935985E}"/>
+                <a16:creationId xmlns="" xmlns:a16="http://schemas.microsoft.com/office/drawing/2014/main" id="{4FD8317D-E5DC-48AE-B946-799BE935985E}"/>
               </a:ext>
             </a:extLst>
           </p:cNvPr>
@@ -1068,8 +1613,8 @@
         </p:blipFill>
         <p:spPr>
           <a:xfrm>
-            <a:off x="0" y="0"/>
-            <a:ext cx="12192000" cy="6858000"/>
+            <a:off x="0" y="1"/>
+            <a:ext cx="4389438" cy="2286000"/>
           </a:xfrm>
           <a:prstGeom prst="rect">
             <a:avLst/>
@@ -1081,7 +1626,7 @@
           <p:cNvPr id="5" name="Rectangle 4">
             <a:extLst>
               <a:ext uri="{FF2B5EF4-FFF2-40B4-BE49-F238E27FC236}">
-                <a16:creationId xmlns:a16="http://schemas.microsoft.com/office/drawing/2014/main" xmlns="" id="{C250DED9-2375-4F1F-B1BB-FFBC67D08FEA}"/>
+                <a16:creationId xmlns="" xmlns:a16="http://schemas.microsoft.com/office/drawing/2014/main" id="{C250DED9-2375-4F1F-B1BB-FFBC67D08FEA}"/>
               </a:ext>
             </a:extLst>
           </p:cNvPr>
@@ -1090,8 +1635,8 @@
         </p:nvSpPr>
         <p:spPr>
           <a:xfrm>
-            <a:off x="0" y="0"/>
-            <a:ext cx="12191999" cy="6857999"/>
+            <a:off x="0" y="2"/>
+            <a:ext cx="4389438" cy="2285999"/>
           </a:xfrm>
           <a:prstGeom prst="rect">
             <a:avLst/>
@@ -1126,7 +1671,7 @@
           <a:lstStyle/>
           <a:p>
             <a:pPr algn="ctr"/>
-            <a:endParaRPr lang="en-US"/>
+            <a:endParaRPr lang="en-US" sz="1037"/>
           </a:p>
         </p:txBody>
       </p:sp>
@@ -1143,7 +1688,7 @@
 </p:sldLayout>
 </file>
 
-<file path=ppt/slideLayouts/slideLayout5.xml><?xml version="1.0" encoding="utf-8"?>
+<file path=ppt/slideLayouts/slideLayout16.xml><?xml version="1.0" encoding="utf-8"?>
 <p:sldLayout xmlns:a="http://schemas.openxmlformats.org/drawingml/2006/main" xmlns:r="http://schemas.openxmlformats.org/officeDocument/2006/relationships" xmlns:p="http://schemas.openxmlformats.org/presentationml/2006/main" preserve="1" userDrawn="1">
   <p:cSld name="Simple_Design">
     <p:spTree>
@@ -1172,8 +1717,8 @@
         </p:nvSpPr>
         <p:spPr>
           <a:xfrm>
-            <a:off x="9342120" y="6583680"/>
-            <a:ext cx="2743200" cy="274320"/>
+            <a:off x="3363407" y="2194561"/>
+            <a:ext cx="987624" cy="91440"/>
           </a:xfrm>
           <a:prstGeom prst="rect">
             <a:avLst/>
@@ -1210,8 +1755,8 @@
         </p:nvSpPr>
         <p:spPr>
           <a:xfrm>
-            <a:off x="9342120" y="6583680"/>
-            <a:ext cx="2743200" cy="274320"/>
+            <a:off x="3363407" y="2194561"/>
+            <a:ext cx="987624" cy="91440"/>
           </a:xfrm>
           <a:prstGeom prst="rect">
             <a:avLst/>
@@ -1316,11 +1861,11 @@
           </a:lstStyle>
           <a:p>
             <a:fld id="{FFF8894C-962F-4043-BDE4-6CA2ABEDD0B4}" type="slidenum">
-              <a:rPr lang="en-US" smtClean="0"/>
+              <a:rPr lang="en-US" sz="1200" smtClean="0"/>
               <a:pPr/>
               <a:t>‹#›</a:t>
             </a:fld>
-            <a:endParaRPr lang="en-US" dirty="0"/>
+            <a:endParaRPr lang="en-US" sz="1200" dirty="0"/>
           </a:p>
         </p:txBody>
       </p:sp>
@@ -1346,8 +1891,8 @@
         </p:blipFill>
         <p:spPr>
           <a:xfrm>
-            <a:off x="0" y="0"/>
-            <a:ext cx="12192000" cy="6858000"/>
+            <a:off x="0" y="1"/>
+            <a:ext cx="4389438" cy="2286000"/>
           </a:xfrm>
           <a:prstGeom prst="rect">
             <a:avLst/>
@@ -1364,6 +1909,1776 @@
   <p:clrMapOvr>
     <a:masterClrMapping/>
   </p:clrMapOvr>
+</p:sldLayout>
+</file>
+
+<file path=ppt/slideLayouts/slideLayout2.xml><?xml version="1.0" encoding="utf-8"?>
+<p:sldLayout xmlns:a="http://schemas.openxmlformats.org/drawingml/2006/main" xmlns:r="http://schemas.openxmlformats.org/officeDocument/2006/relationships" xmlns:p="http://schemas.openxmlformats.org/presentationml/2006/main" type="obj" preserve="1">
+  <p:cSld name="Title and Content">
+    <p:spTree>
+      <p:nvGrpSpPr>
+        <p:cNvPr id="1" name=""/>
+        <p:cNvGrpSpPr/>
+        <p:nvPr/>
+      </p:nvGrpSpPr>
+      <p:grpSpPr>
+        <a:xfrm>
+          <a:off x="0" y="0"/>
+          <a:ext cx="0" cy="0"/>
+          <a:chOff x="0" y="0"/>
+          <a:chExt cx="0" cy="0"/>
+        </a:xfrm>
+      </p:grpSpPr>
+      <p:sp>
+        <p:nvSpPr>
+          <p:cNvPr id="2" name="Title 1"/>
+          <p:cNvSpPr>
+            <a:spLocks noGrp="1"/>
+          </p:cNvSpPr>
+          <p:nvPr>
+            <p:ph type="title"/>
+          </p:nvPr>
+        </p:nvSpPr>
+        <p:spPr/>
+        <p:txBody>
+          <a:bodyPr/>
+          <a:lstStyle/>
+          <a:p>
+            <a:r>
+              <a:rPr lang="en-US" smtClean="0"/>
+              <a:t>Click to edit Master title style</a:t>
+            </a:r>
+            <a:endParaRPr lang="en-US" dirty="0"/>
+          </a:p>
+        </p:txBody>
+      </p:sp>
+      <p:sp>
+        <p:nvSpPr>
+          <p:cNvPr id="3" name="Content Placeholder 2"/>
+          <p:cNvSpPr>
+            <a:spLocks noGrp="1"/>
+          </p:cNvSpPr>
+          <p:nvPr>
+            <p:ph idx="1"/>
+          </p:nvPr>
+        </p:nvSpPr>
+        <p:spPr/>
+        <p:txBody>
+          <a:bodyPr/>
+          <a:lstStyle/>
+          <a:p>
+            <a:pPr lvl="0"/>
+            <a:r>
+              <a:rPr lang="en-US" smtClean="0"/>
+              <a:t>Click to edit Master text styles</a:t>
+            </a:r>
+          </a:p>
+          <a:p>
+            <a:pPr lvl="1"/>
+            <a:r>
+              <a:rPr lang="en-US" smtClean="0"/>
+              <a:t>Second level</a:t>
+            </a:r>
+          </a:p>
+          <a:p>
+            <a:pPr lvl="2"/>
+            <a:r>
+              <a:rPr lang="en-US" smtClean="0"/>
+              <a:t>Third level</a:t>
+            </a:r>
+          </a:p>
+          <a:p>
+            <a:pPr lvl="3"/>
+            <a:r>
+              <a:rPr lang="en-US" smtClean="0"/>
+              <a:t>Fourth level</a:t>
+            </a:r>
+          </a:p>
+          <a:p>
+            <a:pPr lvl="4"/>
+            <a:r>
+              <a:rPr lang="en-US" smtClean="0"/>
+              <a:t>Fifth level</a:t>
+            </a:r>
+            <a:endParaRPr lang="en-US" dirty="0"/>
+          </a:p>
+        </p:txBody>
+      </p:sp>
+      <p:sp>
+        <p:nvSpPr>
+          <p:cNvPr id="4" name="Date Placeholder 3"/>
+          <p:cNvSpPr>
+            <a:spLocks noGrp="1"/>
+          </p:cNvSpPr>
+          <p:nvPr>
+            <p:ph type="dt" sz="half" idx="10"/>
+          </p:nvPr>
+        </p:nvSpPr>
+        <p:spPr/>
+        <p:txBody>
+          <a:bodyPr/>
+          <a:lstStyle/>
+          <a:p>
+            <a:fld id="{C764DE79-268F-4C1A-8933-263129D2AF90}" type="datetimeFigureOut">
+              <a:rPr lang="en-US" smtClean="0"/>
+              <a:t>8/10/18</a:t>
+            </a:fld>
+            <a:endParaRPr lang="en-US" dirty="0"/>
+          </a:p>
+        </p:txBody>
+      </p:sp>
+      <p:sp>
+        <p:nvSpPr>
+          <p:cNvPr id="5" name="Footer Placeholder 4"/>
+          <p:cNvSpPr>
+            <a:spLocks noGrp="1"/>
+          </p:cNvSpPr>
+          <p:nvPr>
+            <p:ph type="ftr" sz="quarter" idx="11"/>
+          </p:nvPr>
+        </p:nvSpPr>
+        <p:spPr/>
+        <p:txBody>
+          <a:bodyPr/>
+          <a:lstStyle/>
+          <a:p>
+            <a:endParaRPr lang="en-US" dirty="0"/>
+          </a:p>
+        </p:txBody>
+      </p:sp>
+      <p:sp>
+        <p:nvSpPr>
+          <p:cNvPr id="6" name="Slide Number Placeholder 5"/>
+          <p:cNvSpPr>
+            <a:spLocks noGrp="1"/>
+          </p:cNvSpPr>
+          <p:nvPr>
+            <p:ph type="sldNum" sz="quarter" idx="12"/>
+          </p:nvPr>
+        </p:nvSpPr>
+        <p:spPr/>
+        <p:txBody>
+          <a:bodyPr/>
+          <a:lstStyle/>
+          <a:p>
+            <a:fld id="{48F63A3B-78C7-47BE-AE5E-E10140E04643}" type="slidenum">
+              <a:rPr lang="en-US" smtClean="0"/>
+              <a:t>‹#›</a:t>
+            </a:fld>
+            <a:endParaRPr lang="en-US" dirty="0"/>
+          </a:p>
+        </p:txBody>
+      </p:sp>
+    </p:spTree>
+    <p:extLst>
+      <p:ext uri="{BB962C8B-B14F-4D97-AF65-F5344CB8AC3E}">
+        <p14:creationId xmlns:p14="http://schemas.microsoft.com/office/powerpoint/2010/main" val="912352660"/>
+      </p:ext>
+    </p:extLst>
+  </p:cSld>
+  <p:clrMapOvr>
+    <a:masterClrMapping/>
+  </p:clrMapOvr>
+  <p:hf hdr="0" ftr="0" dt="0"/>
+</p:sldLayout>
+</file>
+
+<file path=ppt/slideLayouts/slideLayout3.xml><?xml version="1.0" encoding="utf-8"?>
+<p:sldLayout xmlns:a="http://schemas.openxmlformats.org/drawingml/2006/main" xmlns:r="http://schemas.openxmlformats.org/officeDocument/2006/relationships" xmlns:p="http://schemas.openxmlformats.org/presentationml/2006/main" type="secHead" preserve="1">
+  <p:cSld name="Section Header">
+    <p:spTree>
+      <p:nvGrpSpPr>
+        <p:cNvPr id="1" name=""/>
+        <p:cNvGrpSpPr/>
+        <p:nvPr/>
+      </p:nvGrpSpPr>
+      <p:grpSpPr>
+        <a:xfrm>
+          <a:off x="0" y="0"/>
+          <a:ext cx="0" cy="0"/>
+          <a:chOff x="0" y="0"/>
+          <a:chExt cx="0" cy="0"/>
+        </a:xfrm>
+      </p:grpSpPr>
+      <p:sp>
+        <p:nvSpPr>
+          <p:cNvPr id="2" name="Title 1"/>
+          <p:cNvSpPr>
+            <a:spLocks noGrp="1"/>
+          </p:cNvSpPr>
+          <p:nvPr>
+            <p:ph type="title"/>
+          </p:nvPr>
+        </p:nvSpPr>
+        <p:spPr>
+          <a:xfrm>
+            <a:off x="299488" y="569913"/>
+            <a:ext cx="3785890" cy="950912"/>
+          </a:xfrm>
+        </p:spPr>
+        <p:txBody>
+          <a:bodyPr anchor="b"/>
+          <a:lstStyle>
+            <a:lvl1pPr>
+              <a:defRPr sz="2000"/>
+            </a:lvl1pPr>
+          </a:lstStyle>
+          <a:p>
+            <a:r>
+              <a:rPr lang="en-US" smtClean="0"/>
+              <a:t>Click to edit Master title style</a:t>
+            </a:r>
+            <a:endParaRPr lang="en-US" dirty="0"/>
+          </a:p>
+        </p:txBody>
+      </p:sp>
+      <p:sp>
+        <p:nvSpPr>
+          <p:cNvPr id="3" name="Text Placeholder 2"/>
+          <p:cNvSpPr>
+            <a:spLocks noGrp="1"/>
+          </p:cNvSpPr>
+          <p:nvPr>
+            <p:ph type="body" idx="1"/>
+          </p:nvPr>
+        </p:nvSpPr>
+        <p:spPr>
+          <a:xfrm>
+            <a:off x="299488" y="1529821"/>
+            <a:ext cx="3785890" cy="500062"/>
+          </a:xfrm>
+        </p:spPr>
+        <p:txBody>
+          <a:bodyPr/>
+          <a:lstStyle>
+            <a:lvl1pPr marL="0" indent="0">
+              <a:buNone/>
+              <a:defRPr sz="800">
+                <a:solidFill>
+                  <a:schemeClr val="tx1">
+                    <a:tint val="75000"/>
+                  </a:schemeClr>
+                </a:solidFill>
+              </a:defRPr>
+            </a:lvl1pPr>
+            <a:lvl2pPr marL="152385" indent="0">
+              <a:buNone/>
+              <a:defRPr sz="667">
+                <a:solidFill>
+                  <a:schemeClr val="tx1">
+                    <a:tint val="75000"/>
+                  </a:schemeClr>
+                </a:solidFill>
+              </a:defRPr>
+            </a:lvl2pPr>
+            <a:lvl3pPr marL="304770" indent="0">
+              <a:buNone/>
+              <a:defRPr sz="600">
+                <a:solidFill>
+                  <a:schemeClr val="tx1">
+                    <a:tint val="75000"/>
+                  </a:schemeClr>
+                </a:solidFill>
+              </a:defRPr>
+            </a:lvl3pPr>
+            <a:lvl4pPr marL="457154" indent="0">
+              <a:buNone/>
+              <a:defRPr sz="533">
+                <a:solidFill>
+                  <a:schemeClr val="tx1">
+                    <a:tint val="75000"/>
+                  </a:schemeClr>
+                </a:solidFill>
+              </a:defRPr>
+            </a:lvl4pPr>
+            <a:lvl5pPr marL="609539" indent="0">
+              <a:buNone/>
+              <a:defRPr sz="533">
+                <a:solidFill>
+                  <a:schemeClr val="tx1">
+                    <a:tint val="75000"/>
+                  </a:schemeClr>
+                </a:solidFill>
+              </a:defRPr>
+            </a:lvl5pPr>
+            <a:lvl6pPr marL="761924" indent="0">
+              <a:buNone/>
+              <a:defRPr sz="533">
+                <a:solidFill>
+                  <a:schemeClr val="tx1">
+                    <a:tint val="75000"/>
+                  </a:schemeClr>
+                </a:solidFill>
+              </a:defRPr>
+            </a:lvl6pPr>
+            <a:lvl7pPr marL="914309" indent="0">
+              <a:buNone/>
+              <a:defRPr sz="533">
+                <a:solidFill>
+                  <a:schemeClr val="tx1">
+                    <a:tint val="75000"/>
+                  </a:schemeClr>
+                </a:solidFill>
+              </a:defRPr>
+            </a:lvl7pPr>
+            <a:lvl8pPr marL="1066693" indent="0">
+              <a:buNone/>
+              <a:defRPr sz="533">
+                <a:solidFill>
+                  <a:schemeClr val="tx1">
+                    <a:tint val="75000"/>
+                  </a:schemeClr>
+                </a:solidFill>
+              </a:defRPr>
+            </a:lvl8pPr>
+            <a:lvl9pPr marL="1219078" indent="0">
+              <a:buNone/>
+              <a:defRPr sz="533">
+                <a:solidFill>
+                  <a:schemeClr val="tx1">
+                    <a:tint val="75000"/>
+                  </a:schemeClr>
+                </a:solidFill>
+              </a:defRPr>
+            </a:lvl9pPr>
+          </a:lstStyle>
+          <a:p>
+            <a:pPr lvl="0"/>
+            <a:r>
+              <a:rPr lang="en-US" smtClean="0"/>
+              <a:t>Click to edit Master text styles</a:t>
+            </a:r>
+          </a:p>
+        </p:txBody>
+      </p:sp>
+      <p:sp>
+        <p:nvSpPr>
+          <p:cNvPr id="4" name="Date Placeholder 3"/>
+          <p:cNvSpPr>
+            <a:spLocks noGrp="1"/>
+          </p:cNvSpPr>
+          <p:nvPr>
+            <p:ph type="dt" sz="half" idx="10"/>
+          </p:nvPr>
+        </p:nvSpPr>
+        <p:spPr/>
+        <p:txBody>
+          <a:bodyPr/>
+          <a:lstStyle/>
+          <a:p>
+            <a:fld id="{C764DE79-268F-4C1A-8933-263129D2AF90}" type="datetimeFigureOut">
+              <a:rPr lang="en-US" smtClean="0"/>
+              <a:t>8/10/18</a:t>
+            </a:fld>
+            <a:endParaRPr lang="en-US" dirty="0"/>
+          </a:p>
+        </p:txBody>
+      </p:sp>
+      <p:sp>
+        <p:nvSpPr>
+          <p:cNvPr id="5" name="Footer Placeholder 4"/>
+          <p:cNvSpPr>
+            <a:spLocks noGrp="1"/>
+          </p:cNvSpPr>
+          <p:nvPr>
+            <p:ph type="ftr" sz="quarter" idx="11"/>
+          </p:nvPr>
+        </p:nvSpPr>
+        <p:spPr/>
+        <p:txBody>
+          <a:bodyPr/>
+          <a:lstStyle/>
+          <a:p>
+            <a:endParaRPr lang="en-US" dirty="0"/>
+          </a:p>
+        </p:txBody>
+      </p:sp>
+      <p:sp>
+        <p:nvSpPr>
+          <p:cNvPr id="6" name="Slide Number Placeholder 5"/>
+          <p:cNvSpPr>
+            <a:spLocks noGrp="1"/>
+          </p:cNvSpPr>
+          <p:nvPr>
+            <p:ph type="sldNum" sz="quarter" idx="12"/>
+          </p:nvPr>
+        </p:nvSpPr>
+        <p:spPr/>
+        <p:txBody>
+          <a:bodyPr/>
+          <a:lstStyle/>
+          <a:p>
+            <a:fld id="{48F63A3B-78C7-47BE-AE5E-E10140E04643}" type="slidenum">
+              <a:rPr lang="en-US" smtClean="0"/>
+              <a:t>‹#›</a:t>
+            </a:fld>
+            <a:endParaRPr lang="en-US" dirty="0"/>
+          </a:p>
+        </p:txBody>
+      </p:sp>
+    </p:spTree>
+    <p:extLst>
+      <p:ext uri="{BB962C8B-B14F-4D97-AF65-F5344CB8AC3E}">
+        <p14:creationId xmlns:p14="http://schemas.microsoft.com/office/powerpoint/2010/main" val="877917040"/>
+      </p:ext>
+    </p:extLst>
+  </p:cSld>
+  <p:clrMapOvr>
+    <a:masterClrMapping/>
+  </p:clrMapOvr>
+  <p:hf hdr="0" ftr="0" dt="0"/>
+</p:sldLayout>
+</file>
+
+<file path=ppt/slideLayouts/slideLayout4.xml><?xml version="1.0" encoding="utf-8"?>
+<p:sldLayout xmlns:a="http://schemas.openxmlformats.org/drawingml/2006/main" xmlns:r="http://schemas.openxmlformats.org/officeDocument/2006/relationships" xmlns:p="http://schemas.openxmlformats.org/presentationml/2006/main" type="twoObj" preserve="1">
+  <p:cSld name="Two Content">
+    <p:spTree>
+      <p:nvGrpSpPr>
+        <p:cNvPr id="1" name=""/>
+        <p:cNvGrpSpPr/>
+        <p:nvPr/>
+      </p:nvGrpSpPr>
+      <p:grpSpPr>
+        <a:xfrm>
+          <a:off x="0" y="0"/>
+          <a:ext cx="0" cy="0"/>
+          <a:chOff x="0" y="0"/>
+          <a:chExt cx="0" cy="0"/>
+        </a:xfrm>
+      </p:grpSpPr>
+      <p:sp>
+        <p:nvSpPr>
+          <p:cNvPr id="2" name="Title 1"/>
+          <p:cNvSpPr>
+            <a:spLocks noGrp="1"/>
+          </p:cNvSpPr>
+          <p:nvPr>
+            <p:ph type="title"/>
+          </p:nvPr>
+        </p:nvSpPr>
+        <p:spPr/>
+        <p:txBody>
+          <a:bodyPr/>
+          <a:lstStyle/>
+          <a:p>
+            <a:r>
+              <a:rPr lang="en-US" smtClean="0"/>
+              <a:t>Click to edit Master title style</a:t>
+            </a:r>
+            <a:endParaRPr lang="en-US" dirty="0"/>
+          </a:p>
+        </p:txBody>
+      </p:sp>
+      <p:sp>
+        <p:nvSpPr>
+          <p:cNvPr id="3" name="Content Placeholder 2"/>
+          <p:cNvSpPr>
+            <a:spLocks noGrp="1"/>
+          </p:cNvSpPr>
+          <p:nvPr>
+            <p:ph sz="half" idx="1"/>
+          </p:nvPr>
+        </p:nvSpPr>
+        <p:spPr>
+          <a:xfrm>
+            <a:off x="301774" y="608542"/>
+            <a:ext cx="1865511" cy="1450446"/>
+          </a:xfrm>
+        </p:spPr>
+        <p:txBody>
+          <a:bodyPr/>
+          <a:lstStyle/>
+          <a:p>
+            <a:pPr lvl="0"/>
+            <a:r>
+              <a:rPr lang="en-US" smtClean="0"/>
+              <a:t>Click to edit Master text styles</a:t>
+            </a:r>
+          </a:p>
+          <a:p>
+            <a:pPr lvl="1"/>
+            <a:r>
+              <a:rPr lang="en-US" smtClean="0"/>
+              <a:t>Second level</a:t>
+            </a:r>
+          </a:p>
+          <a:p>
+            <a:pPr lvl="2"/>
+            <a:r>
+              <a:rPr lang="en-US" smtClean="0"/>
+              <a:t>Third level</a:t>
+            </a:r>
+          </a:p>
+          <a:p>
+            <a:pPr lvl="3"/>
+            <a:r>
+              <a:rPr lang="en-US" smtClean="0"/>
+              <a:t>Fourth level</a:t>
+            </a:r>
+          </a:p>
+          <a:p>
+            <a:pPr lvl="4"/>
+            <a:r>
+              <a:rPr lang="en-US" smtClean="0"/>
+              <a:t>Fifth level</a:t>
+            </a:r>
+            <a:endParaRPr lang="en-US" dirty="0"/>
+          </a:p>
+        </p:txBody>
+      </p:sp>
+      <p:sp>
+        <p:nvSpPr>
+          <p:cNvPr id="4" name="Content Placeholder 3"/>
+          <p:cNvSpPr>
+            <a:spLocks noGrp="1"/>
+          </p:cNvSpPr>
+          <p:nvPr>
+            <p:ph sz="half" idx="2"/>
+          </p:nvPr>
+        </p:nvSpPr>
+        <p:spPr>
+          <a:xfrm>
+            <a:off x="2222153" y="608542"/>
+            <a:ext cx="1865511" cy="1450446"/>
+          </a:xfrm>
+        </p:spPr>
+        <p:txBody>
+          <a:bodyPr/>
+          <a:lstStyle/>
+          <a:p>
+            <a:pPr lvl="0"/>
+            <a:r>
+              <a:rPr lang="en-US" smtClean="0"/>
+              <a:t>Click to edit Master text styles</a:t>
+            </a:r>
+          </a:p>
+          <a:p>
+            <a:pPr lvl="1"/>
+            <a:r>
+              <a:rPr lang="en-US" smtClean="0"/>
+              <a:t>Second level</a:t>
+            </a:r>
+          </a:p>
+          <a:p>
+            <a:pPr lvl="2"/>
+            <a:r>
+              <a:rPr lang="en-US" smtClean="0"/>
+              <a:t>Third level</a:t>
+            </a:r>
+          </a:p>
+          <a:p>
+            <a:pPr lvl="3"/>
+            <a:r>
+              <a:rPr lang="en-US" smtClean="0"/>
+              <a:t>Fourth level</a:t>
+            </a:r>
+          </a:p>
+          <a:p>
+            <a:pPr lvl="4"/>
+            <a:r>
+              <a:rPr lang="en-US" smtClean="0"/>
+              <a:t>Fifth level</a:t>
+            </a:r>
+            <a:endParaRPr lang="en-US" dirty="0"/>
+          </a:p>
+        </p:txBody>
+      </p:sp>
+      <p:sp>
+        <p:nvSpPr>
+          <p:cNvPr id="5" name="Date Placeholder 4"/>
+          <p:cNvSpPr>
+            <a:spLocks noGrp="1"/>
+          </p:cNvSpPr>
+          <p:nvPr>
+            <p:ph type="dt" sz="half" idx="10"/>
+          </p:nvPr>
+        </p:nvSpPr>
+        <p:spPr/>
+        <p:txBody>
+          <a:bodyPr/>
+          <a:lstStyle/>
+          <a:p>
+            <a:fld id="{C764DE79-268F-4C1A-8933-263129D2AF90}" type="datetimeFigureOut">
+              <a:rPr lang="en-US" smtClean="0"/>
+              <a:t>8/10/18</a:t>
+            </a:fld>
+            <a:endParaRPr lang="en-US" dirty="0"/>
+          </a:p>
+        </p:txBody>
+      </p:sp>
+      <p:sp>
+        <p:nvSpPr>
+          <p:cNvPr id="6" name="Footer Placeholder 5"/>
+          <p:cNvSpPr>
+            <a:spLocks noGrp="1"/>
+          </p:cNvSpPr>
+          <p:nvPr>
+            <p:ph type="ftr" sz="quarter" idx="11"/>
+          </p:nvPr>
+        </p:nvSpPr>
+        <p:spPr/>
+        <p:txBody>
+          <a:bodyPr/>
+          <a:lstStyle/>
+          <a:p>
+            <a:endParaRPr lang="en-US" dirty="0"/>
+          </a:p>
+        </p:txBody>
+      </p:sp>
+      <p:sp>
+        <p:nvSpPr>
+          <p:cNvPr id="7" name="Slide Number Placeholder 6"/>
+          <p:cNvSpPr>
+            <a:spLocks noGrp="1"/>
+          </p:cNvSpPr>
+          <p:nvPr>
+            <p:ph type="sldNum" sz="quarter" idx="12"/>
+          </p:nvPr>
+        </p:nvSpPr>
+        <p:spPr/>
+        <p:txBody>
+          <a:bodyPr/>
+          <a:lstStyle/>
+          <a:p>
+            <a:fld id="{48F63A3B-78C7-47BE-AE5E-E10140E04643}" type="slidenum">
+              <a:rPr lang="en-US" smtClean="0"/>
+              <a:t>‹#›</a:t>
+            </a:fld>
+            <a:endParaRPr lang="en-US" dirty="0"/>
+          </a:p>
+        </p:txBody>
+      </p:sp>
+    </p:spTree>
+    <p:extLst>
+      <p:ext uri="{BB962C8B-B14F-4D97-AF65-F5344CB8AC3E}">
+        <p14:creationId xmlns:p14="http://schemas.microsoft.com/office/powerpoint/2010/main" val="1939036390"/>
+      </p:ext>
+    </p:extLst>
+  </p:cSld>
+  <p:clrMapOvr>
+    <a:masterClrMapping/>
+  </p:clrMapOvr>
+  <p:hf hdr="0" ftr="0" dt="0"/>
+</p:sldLayout>
+</file>
+
+<file path=ppt/slideLayouts/slideLayout5.xml><?xml version="1.0" encoding="utf-8"?>
+<p:sldLayout xmlns:a="http://schemas.openxmlformats.org/drawingml/2006/main" xmlns:r="http://schemas.openxmlformats.org/officeDocument/2006/relationships" xmlns:p="http://schemas.openxmlformats.org/presentationml/2006/main" type="twoTxTwoObj" preserve="1">
+  <p:cSld name="Comparison">
+    <p:spTree>
+      <p:nvGrpSpPr>
+        <p:cNvPr id="1" name=""/>
+        <p:cNvGrpSpPr/>
+        <p:nvPr/>
+      </p:nvGrpSpPr>
+      <p:grpSpPr>
+        <a:xfrm>
+          <a:off x="0" y="0"/>
+          <a:ext cx="0" cy="0"/>
+          <a:chOff x="0" y="0"/>
+          <a:chExt cx="0" cy="0"/>
+        </a:xfrm>
+      </p:grpSpPr>
+      <p:sp>
+        <p:nvSpPr>
+          <p:cNvPr id="2" name="Title 1"/>
+          <p:cNvSpPr>
+            <a:spLocks noGrp="1"/>
+          </p:cNvSpPr>
+          <p:nvPr>
+            <p:ph type="title"/>
+          </p:nvPr>
+        </p:nvSpPr>
+        <p:spPr>
+          <a:xfrm>
+            <a:off x="302346" y="121709"/>
+            <a:ext cx="3785890" cy="441854"/>
+          </a:xfrm>
+        </p:spPr>
+        <p:txBody>
+          <a:bodyPr/>
+          <a:lstStyle/>
+          <a:p>
+            <a:r>
+              <a:rPr lang="en-US" smtClean="0"/>
+              <a:t>Click to edit Master title style</a:t>
+            </a:r>
+            <a:endParaRPr lang="en-US" dirty="0"/>
+          </a:p>
+        </p:txBody>
+      </p:sp>
+      <p:sp>
+        <p:nvSpPr>
+          <p:cNvPr id="3" name="Text Placeholder 2"/>
+          <p:cNvSpPr>
+            <a:spLocks noGrp="1"/>
+          </p:cNvSpPr>
+          <p:nvPr>
+            <p:ph type="body" idx="1"/>
+          </p:nvPr>
+        </p:nvSpPr>
+        <p:spPr>
+          <a:xfrm>
+            <a:off x="302346" y="560388"/>
+            <a:ext cx="1856938" cy="274637"/>
+          </a:xfrm>
+        </p:spPr>
+        <p:txBody>
+          <a:bodyPr anchor="b"/>
+          <a:lstStyle>
+            <a:lvl1pPr marL="0" indent="0">
+              <a:buNone/>
+              <a:defRPr sz="800" b="1"/>
+            </a:lvl1pPr>
+            <a:lvl2pPr marL="152385" indent="0">
+              <a:buNone/>
+              <a:defRPr sz="667" b="1"/>
+            </a:lvl2pPr>
+            <a:lvl3pPr marL="304770" indent="0">
+              <a:buNone/>
+              <a:defRPr sz="600" b="1"/>
+            </a:lvl3pPr>
+            <a:lvl4pPr marL="457154" indent="0">
+              <a:buNone/>
+              <a:defRPr sz="533" b="1"/>
+            </a:lvl4pPr>
+            <a:lvl5pPr marL="609539" indent="0">
+              <a:buNone/>
+              <a:defRPr sz="533" b="1"/>
+            </a:lvl5pPr>
+            <a:lvl6pPr marL="761924" indent="0">
+              <a:buNone/>
+              <a:defRPr sz="533" b="1"/>
+            </a:lvl6pPr>
+            <a:lvl7pPr marL="914309" indent="0">
+              <a:buNone/>
+              <a:defRPr sz="533" b="1"/>
+            </a:lvl7pPr>
+            <a:lvl8pPr marL="1066693" indent="0">
+              <a:buNone/>
+              <a:defRPr sz="533" b="1"/>
+            </a:lvl8pPr>
+            <a:lvl9pPr marL="1219078" indent="0">
+              <a:buNone/>
+              <a:defRPr sz="533" b="1"/>
+            </a:lvl9pPr>
+          </a:lstStyle>
+          <a:p>
+            <a:pPr lvl="0"/>
+            <a:r>
+              <a:rPr lang="en-US" smtClean="0"/>
+              <a:t>Click to edit Master text styles</a:t>
+            </a:r>
+          </a:p>
+        </p:txBody>
+      </p:sp>
+      <p:sp>
+        <p:nvSpPr>
+          <p:cNvPr id="4" name="Content Placeholder 3"/>
+          <p:cNvSpPr>
+            <a:spLocks noGrp="1"/>
+          </p:cNvSpPr>
+          <p:nvPr>
+            <p:ph sz="half" idx="2"/>
+          </p:nvPr>
+        </p:nvSpPr>
+        <p:spPr>
+          <a:xfrm>
+            <a:off x="302346" y="835025"/>
+            <a:ext cx="1856938" cy="1228196"/>
+          </a:xfrm>
+        </p:spPr>
+        <p:txBody>
+          <a:bodyPr/>
+          <a:lstStyle/>
+          <a:p>
+            <a:pPr lvl="0"/>
+            <a:r>
+              <a:rPr lang="en-US" smtClean="0"/>
+              <a:t>Click to edit Master text styles</a:t>
+            </a:r>
+          </a:p>
+          <a:p>
+            <a:pPr lvl="1"/>
+            <a:r>
+              <a:rPr lang="en-US" smtClean="0"/>
+              <a:t>Second level</a:t>
+            </a:r>
+          </a:p>
+          <a:p>
+            <a:pPr lvl="2"/>
+            <a:r>
+              <a:rPr lang="en-US" smtClean="0"/>
+              <a:t>Third level</a:t>
+            </a:r>
+          </a:p>
+          <a:p>
+            <a:pPr lvl="3"/>
+            <a:r>
+              <a:rPr lang="en-US" smtClean="0"/>
+              <a:t>Fourth level</a:t>
+            </a:r>
+          </a:p>
+          <a:p>
+            <a:pPr lvl="4"/>
+            <a:r>
+              <a:rPr lang="en-US" smtClean="0"/>
+              <a:t>Fifth level</a:t>
+            </a:r>
+            <a:endParaRPr lang="en-US" dirty="0"/>
+          </a:p>
+        </p:txBody>
+      </p:sp>
+      <p:sp>
+        <p:nvSpPr>
+          <p:cNvPr id="5" name="Text Placeholder 4"/>
+          <p:cNvSpPr>
+            <a:spLocks noGrp="1"/>
+          </p:cNvSpPr>
+          <p:nvPr>
+            <p:ph type="body" sz="quarter" idx="3"/>
+          </p:nvPr>
+        </p:nvSpPr>
+        <p:spPr>
+          <a:xfrm>
+            <a:off x="2222153" y="560388"/>
+            <a:ext cx="1866083" cy="274637"/>
+          </a:xfrm>
+        </p:spPr>
+        <p:txBody>
+          <a:bodyPr anchor="b"/>
+          <a:lstStyle>
+            <a:lvl1pPr marL="0" indent="0">
+              <a:buNone/>
+              <a:defRPr sz="800" b="1"/>
+            </a:lvl1pPr>
+            <a:lvl2pPr marL="152385" indent="0">
+              <a:buNone/>
+              <a:defRPr sz="667" b="1"/>
+            </a:lvl2pPr>
+            <a:lvl3pPr marL="304770" indent="0">
+              <a:buNone/>
+              <a:defRPr sz="600" b="1"/>
+            </a:lvl3pPr>
+            <a:lvl4pPr marL="457154" indent="0">
+              <a:buNone/>
+              <a:defRPr sz="533" b="1"/>
+            </a:lvl4pPr>
+            <a:lvl5pPr marL="609539" indent="0">
+              <a:buNone/>
+              <a:defRPr sz="533" b="1"/>
+            </a:lvl5pPr>
+            <a:lvl6pPr marL="761924" indent="0">
+              <a:buNone/>
+              <a:defRPr sz="533" b="1"/>
+            </a:lvl6pPr>
+            <a:lvl7pPr marL="914309" indent="0">
+              <a:buNone/>
+              <a:defRPr sz="533" b="1"/>
+            </a:lvl7pPr>
+            <a:lvl8pPr marL="1066693" indent="0">
+              <a:buNone/>
+              <a:defRPr sz="533" b="1"/>
+            </a:lvl8pPr>
+            <a:lvl9pPr marL="1219078" indent="0">
+              <a:buNone/>
+              <a:defRPr sz="533" b="1"/>
+            </a:lvl9pPr>
+          </a:lstStyle>
+          <a:p>
+            <a:pPr lvl="0"/>
+            <a:r>
+              <a:rPr lang="en-US" smtClean="0"/>
+              <a:t>Click to edit Master text styles</a:t>
+            </a:r>
+          </a:p>
+        </p:txBody>
+      </p:sp>
+      <p:sp>
+        <p:nvSpPr>
+          <p:cNvPr id="6" name="Content Placeholder 5"/>
+          <p:cNvSpPr>
+            <a:spLocks noGrp="1"/>
+          </p:cNvSpPr>
+          <p:nvPr>
+            <p:ph sz="quarter" idx="4"/>
+          </p:nvPr>
+        </p:nvSpPr>
+        <p:spPr>
+          <a:xfrm>
+            <a:off x="2222153" y="835025"/>
+            <a:ext cx="1866083" cy="1228196"/>
+          </a:xfrm>
+        </p:spPr>
+        <p:txBody>
+          <a:bodyPr/>
+          <a:lstStyle/>
+          <a:p>
+            <a:pPr lvl="0"/>
+            <a:r>
+              <a:rPr lang="en-US" smtClean="0"/>
+              <a:t>Click to edit Master text styles</a:t>
+            </a:r>
+          </a:p>
+          <a:p>
+            <a:pPr lvl="1"/>
+            <a:r>
+              <a:rPr lang="en-US" smtClean="0"/>
+              <a:t>Second level</a:t>
+            </a:r>
+          </a:p>
+          <a:p>
+            <a:pPr lvl="2"/>
+            <a:r>
+              <a:rPr lang="en-US" smtClean="0"/>
+              <a:t>Third level</a:t>
+            </a:r>
+          </a:p>
+          <a:p>
+            <a:pPr lvl="3"/>
+            <a:r>
+              <a:rPr lang="en-US" smtClean="0"/>
+              <a:t>Fourth level</a:t>
+            </a:r>
+          </a:p>
+          <a:p>
+            <a:pPr lvl="4"/>
+            <a:r>
+              <a:rPr lang="en-US" smtClean="0"/>
+              <a:t>Fifth level</a:t>
+            </a:r>
+            <a:endParaRPr lang="en-US" dirty="0"/>
+          </a:p>
+        </p:txBody>
+      </p:sp>
+      <p:sp>
+        <p:nvSpPr>
+          <p:cNvPr id="7" name="Date Placeholder 6"/>
+          <p:cNvSpPr>
+            <a:spLocks noGrp="1"/>
+          </p:cNvSpPr>
+          <p:nvPr>
+            <p:ph type="dt" sz="half" idx="10"/>
+          </p:nvPr>
+        </p:nvSpPr>
+        <p:spPr/>
+        <p:txBody>
+          <a:bodyPr/>
+          <a:lstStyle/>
+          <a:p>
+            <a:fld id="{C764DE79-268F-4C1A-8933-263129D2AF90}" type="datetimeFigureOut">
+              <a:rPr lang="en-US" smtClean="0"/>
+              <a:t>8/10/18</a:t>
+            </a:fld>
+            <a:endParaRPr lang="en-US" dirty="0"/>
+          </a:p>
+        </p:txBody>
+      </p:sp>
+      <p:sp>
+        <p:nvSpPr>
+          <p:cNvPr id="8" name="Footer Placeholder 7"/>
+          <p:cNvSpPr>
+            <a:spLocks noGrp="1"/>
+          </p:cNvSpPr>
+          <p:nvPr>
+            <p:ph type="ftr" sz="quarter" idx="11"/>
+          </p:nvPr>
+        </p:nvSpPr>
+        <p:spPr/>
+        <p:txBody>
+          <a:bodyPr/>
+          <a:lstStyle/>
+          <a:p>
+            <a:endParaRPr lang="en-US" dirty="0"/>
+          </a:p>
+        </p:txBody>
+      </p:sp>
+      <p:sp>
+        <p:nvSpPr>
+          <p:cNvPr id="9" name="Slide Number Placeholder 8"/>
+          <p:cNvSpPr>
+            <a:spLocks noGrp="1"/>
+          </p:cNvSpPr>
+          <p:nvPr>
+            <p:ph type="sldNum" sz="quarter" idx="12"/>
+          </p:nvPr>
+        </p:nvSpPr>
+        <p:spPr/>
+        <p:txBody>
+          <a:bodyPr/>
+          <a:lstStyle/>
+          <a:p>
+            <a:fld id="{48F63A3B-78C7-47BE-AE5E-E10140E04643}" type="slidenum">
+              <a:rPr lang="en-US" smtClean="0"/>
+              <a:t>‹#›</a:t>
+            </a:fld>
+            <a:endParaRPr lang="en-US" dirty="0"/>
+          </a:p>
+        </p:txBody>
+      </p:sp>
+    </p:spTree>
+    <p:extLst>
+      <p:ext uri="{BB962C8B-B14F-4D97-AF65-F5344CB8AC3E}">
+        <p14:creationId xmlns:p14="http://schemas.microsoft.com/office/powerpoint/2010/main" val="1320263505"/>
+      </p:ext>
+    </p:extLst>
+  </p:cSld>
+  <p:clrMapOvr>
+    <a:masterClrMapping/>
+  </p:clrMapOvr>
+  <p:hf hdr="0" ftr="0" dt="0"/>
+</p:sldLayout>
+</file>
+
+<file path=ppt/slideLayouts/slideLayout6.xml><?xml version="1.0" encoding="utf-8"?>
+<p:sldLayout xmlns:a="http://schemas.openxmlformats.org/drawingml/2006/main" xmlns:r="http://schemas.openxmlformats.org/officeDocument/2006/relationships" xmlns:p="http://schemas.openxmlformats.org/presentationml/2006/main" type="titleOnly" preserve="1">
+  <p:cSld name="Title Only">
+    <p:spTree>
+      <p:nvGrpSpPr>
+        <p:cNvPr id="1" name=""/>
+        <p:cNvGrpSpPr/>
+        <p:nvPr/>
+      </p:nvGrpSpPr>
+      <p:grpSpPr>
+        <a:xfrm>
+          <a:off x="0" y="0"/>
+          <a:ext cx="0" cy="0"/>
+          <a:chOff x="0" y="0"/>
+          <a:chExt cx="0" cy="0"/>
+        </a:xfrm>
+      </p:grpSpPr>
+      <p:sp>
+        <p:nvSpPr>
+          <p:cNvPr id="2" name="Title 1"/>
+          <p:cNvSpPr>
+            <a:spLocks noGrp="1"/>
+          </p:cNvSpPr>
+          <p:nvPr>
+            <p:ph type="title"/>
+          </p:nvPr>
+        </p:nvSpPr>
+        <p:spPr/>
+        <p:txBody>
+          <a:bodyPr/>
+          <a:lstStyle/>
+          <a:p>
+            <a:r>
+              <a:rPr lang="en-US" smtClean="0"/>
+              <a:t>Click to edit Master title style</a:t>
+            </a:r>
+            <a:endParaRPr lang="en-US" dirty="0"/>
+          </a:p>
+        </p:txBody>
+      </p:sp>
+      <p:sp>
+        <p:nvSpPr>
+          <p:cNvPr id="3" name="Date Placeholder 2"/>
+          <p:cNvSpPr>
+            <a:spLocks noGrp="1"/>
+          </p:cNvSpPr>
+          <p:nvPr>
+            <p:ph type="dt" sz="half" idx="10"/>
+          </p:nvPr>
+        </p:nvSpPr>
+        <p:spPr/>
+        <p:txBody>
+          <a:bodyPr/>
+          <a:lstStyle/>
+          <a:p>
+            <a:fld id="{C764DE79-268F-4C1A-8933-263129D2AF90}" type="datetimeFigureOut">
+              <a:rPr lang="en-US" smtClean="0"/>
+              <a:t>8/10/18</a:t>
+            </a:fld>
+            <a:endParaRPr lang="en-US" dirty="0"/>
+          </a:p>
+        </p:txBody>
+      </p:sp>
+      <p:sp>
+        <p:nvSpPr>
+          <p:cNvPr id="4" name="Footer Placeholder 3"/>
+          <p:cNvSpPr>
+            <a:spLocks noGrp="1"/>
+          </p:cNvSpPr>
+          <p:nvPr>
+            <p:ph type="ftr" sz="quarter" idx="11"/>
+          </p:nvPr>
+        </p:nvSpPr>
+        <p:spPr/>
+        <p:txBody>
+          <a:bodyPr/>
+          <a:lstStyle/>
+          <a:p>
+            <a:endParaRPr lang="en-US" dirty="0"/>
+          </a:p>
+        </p:txBody>
+      </p:sp>
+      <p:sp>
+        <p:nvSpPr>
+          <p:cNvPr id="5" name="Slide Number Placeholder 4"/>
+          <p:cNvSpPr>
+            <a:spLocks noGrp="1"/>
+          </p:cNvSpPr>
+          <p:nvPr>
+            <p:ph type="sldNum" sz="quarter" idx="12"/>
+          </p:nvPr>
+        </p:nvSpPr>
+        <p:spPr/>
+        <p:txBody>
+          <a:bodyPr/>
+          <a:lstStyle/>
+          <a:p>
+            <a:fld id="{48F63A3B-78C7-47BE-AE5E-E10140E04643}" type="slidenum">
+              <a:rPr lang="en-US" smtClean="0"/>
+              <a:t>‹#›</a:t>
+            </a:fld>
+            <a:endParaRPr lang="en-US" dirty="0"/>
+          </a:p>
+        </p:txBody>
+      </p:sp>
+    </p:spTree>
+    <p:extLst>
+      <p:ext uri="{BB962C8B-B14F-4D97-AF65-F5344CB8AC3E}">
+        <p14:creationId xmlns:p14="http://schemas.microsoft.com/office/powerpoint/2010/main" val="1867687731"/>
+      </p:ext>
+    </p:extLst>
+  </p:cSld>
+  <p:clrMapOvr>
+    <a:masterClrMapping/>
+  </p:clrMapOvr>
+  <p:hf hdr="0" ftr="0" dt="0"/>
+</p:sldLayout>
+</file>
+
+<file path=ppt/slideLayouts/slideLayout7.xml><?xml version="1.0" encoding="utf-8"?>
+<p:sldLayout xmlns:a="http://schemas.openxmlformats.org/drawingml/2006/main" xmlns:r="http://schemas.openxmlformats.org/officeDocument/2006/relationships" xmlns:p="http://schemas.openxmlformats.org/presentationml/2006/main" type="blank" preserve="1">
+  <p:cSld name="Blank">
+    <p:spTree>
+      <p:nvGrpSpPr>
+        <p:cNvPr id="1" name=""/>
+        <p:cNvGrpSpPr/>
+        <p:nvPr/>
+      </p:nvGrpSpPr>
+      <p:grpSpPr>
+        <a:xfrm>
+          <a:off x="0" y="0"/>
+          <a:ext cx="0" cy="0"/>
+          <a:chOff x="0" y="0"/>
+          <a:chExt cx="0" cy="0"/>
+        </a:xfrm>
+      </p:grpSpPr>
+      <p:sp>
+        <p:nvSpPr>
+          <p:cNvPr id="2" name="Date Placeholder 1"/>
+          <p:cNvSpPr>
+            <a:spLocks noGrp="1"/>
+          </p:cNvSpPr>
+          <p:nvPr>
+            <p:ph type="dt" sz="half" idx="10"/>
+          </p:nvPr>
+        </p:nvSpPr>
+        <p:spPr/>
+        <p:txBody>
+          <a:bodyPr/>
+          <a:lstStyle/>
+          <a:p>
+            <a:fld id="{C764DE79-268F-4C1A-8933-263129D2AF90}" type="datetimeFigureOut">
+              <a:rPr lang="en-US" smtClean="0"/>
+              <a:t>8/10/18</a:t>
+            </a:fld>
+            <a:endParaRPr lang="en-US" dirty="0"/>
+          </a:p>
+        </p:txBody>
+      </p:sp>
+      <p:sp>
+        <p:nvSpPr>
+          <p:cNvPr id="3" name="Footer Placeholder 2"/>
+          <p:cNvSpPr>
+            <a:spLocks noGrp="1"/>
+          </p:cNvSpPr>
+          <p:nvPr>
+            <p:ph type="ftr" sz="quarter" idx="11"/>
+          </p:nvPr>
+        </p:nvSpPr>
+        <p:spPr/>
+        <p:txBody>
+          <a:bodyPr/>
+          <a:lstStyle/>
+          <a:p>
+            <a:endParaRPr lang="en-US" dirty="0"/>
+          </a:p>
+        </p:txBody>
+      </p:sp>
+      <p:sp>
+        <p:nvSpPr>
+          <p:cNvPr id="4" name="Slide Number Placeholder 3"/>
+          <p:cNvSpPr>
+            <a:spLocks noGrp="1"/>
+          </p:cNvSpPr>
+          <p:nvPr>
+            <p:ph type="sldNum" sz="quarter" idx="12"/>
+          </p:nvPr>
+        </p:nvSpPr>
+        <p:spPr/>
+        <p:txBody>
+          <a:bodyPr/>
+          <a:lstStyle/>
+          <a:p>
+            <a:fld id="{FFF8894C-962F-4043-BDE4-6CA2ABEDD0B4}" type="slidenum">
+              <a:rPr lang="en-US" smtClean="0"/>
+              <a:pPr/>
+              <a:t>‹#›</a:t>
+            </a:fld>
+            <a:endParaRPr lang="en-US" dirty="0"/>
+          </a:p>
+        </p:txBody>
+      </p:sp>
+    </p:spTree>
+    <p:extLst>
+      <p:ext uri="{BB962C8B-B14F-4D97-AF65-F5344CB8AC3E}">
+        <p14:creationId xmlns:p14="http://schemas.microsoft.com/office/powerpoint/2010/main" val="459226718"/>
+      </p:ext>
+    </p:extLst>
+  </p:cSld>
+  <p:clrMapOvr>
+    <a:masterClrMapping/>
+  </p:clrMapOvr>
+</p:sldLayout>
+</file>
+
+<file path=ppt/slideLayouts/slideLayout8.xml><?xml version="1.0" encoding="utf-8"?>
+<p:sldLayout xmlns:a="http://schemas.openxmlformats.org/drawingml/2006/main" xmlns:r="http://schemas.openxmlformats.org/officeDocument/2006/relationships" xmlns:p="http://schemas.openxmlformats.org/presentationml/2006/main" type="objTx" preserve="1">
+  <p:cSld name="Content with Caption">
+    <p:spTree>
+      <p:nvGrpSpPr>
+        <p:cNvPr id="1" name=""/>
+        <p:cNvGrpSpPr/>
+        <p:nvPr/>
+      </p:nvGrpSpPr>
+      <p:grpSpPr>
+        <a:xfrm>
+          <a:off x="0" y="0"/>
+          <a:ext cx="0" cy="0"/>
+          <a:chOff x="0" y="0"/>
+          <a:chExt cx="0" cy="0"/>
+        </a:xfrm>
+      </p:grpSpPr>
+      <p:sp>
+        <p:nvSpPr>
+          <p:cNvPr id="2" name="Title 1"/>
+          <p:cNvSpPr>
+            <a:spLocks noGrp="1"/>
+          </p:cNvSpPr>
+          <p:nvPr>
+            <p:ph type="title"/>
+          </p:nvPr>
+        </p:nvSpPr>
+        <p:spPr>
+          <a:xfrm>
+            <a:off x="302346" y="152400"/>
+            <a:ext cx="1415708" cy="533400"/>
+          </a:xfrm>
+        </p:spPr>
+        <p:txBody>
+          <a:bodyPr anchor="b"/>
+          <a:lstStyle>
+            <a:lvl1pPr>
+              <a:defRPr sz="1067"/>
+            </a:lvl1pPr>
+          </a:lstStyle>
+          <a:p>
+            <a:r>
+              <a:rPr lang="en-US" smtClean="0"/>
+              <a:t>Click to edit Master title style</a:t>
+            </a:r>
+            <a:endParaRPr lang="en-US" dirty="0"/>
+          </a:p>
+        </p:txBody>
+      </p:sp>
+      <p:sp>
+        <p:nvSpPr>
+          <p:cNvPr id="3" name="Content Placeholder 2"/>
+          <p:cNvSpPr>
+            <a:spLocks noGrp="1"/>
+          </p:cNvSpPr>
+          <p:nvPr>
+            <p:ph idx="1"/>
+          </p:nvPr>
+        </p:nvSpPr>
+        <p:spPr>
+          <a:xfrm>
+            <a:off x="1866083" y="329142"/>
+            <a:ext cx="2222153" cy="1624542"/>
+          </a:xfrm>
+        </p:spPr>
+        <p:txBody>
+          <a:bodyPr/>
+          <a:lstStyle>
+            <a:lvl1pPr>
+              <a:defRPr sz="1067"/>
+            </a:lvl1pPr>
+            <a:lvl2pPr>
+              <a:defRPr sz="933"/>
+            </a:lvl2pPr>
+            <a:lvl3pPr>
+              <a:defRPr sz="800"/>
+            </a:lvl3pPr>
+            <a:lvl4pPr>
+              <a:defRPr sz="667"/>
+            </a:lvl4pPr>
+            <a:lvl5pPr>
+              <a:defRPr sz="667"/>
+            </a:lvl5pPr>
+            <a:lvl6pPr>
+              <a:defRPr sz="667"/>
+            </a:lvl6pPr>
+            <a:lvl7pPr>
+              <a:defRPr sz="667"/>
+            </a:lvl7pPr>
+            <a:lvl8pPr>
+              <a:defRPr sz="667"/>
+            </a:lvl8pPr>
+            <a:lvl9pPr>
+              <a:defRPr sz="667"/>
+            </a:lvl9pPr>
+          </a:lstStyle>
+          <a:p>
+            <a:pPr lvl="0"/>
+            <a:r>
+              <a:rPr lang="en-US" smtClean="0"/>
+              <a:t>Click to edit Master text styles</a:t>
+            </a:r>
+          </a:p>
+          <a:p>
+            <a:pPr lvl="1"/>
+            <a:r>
+              <a:rPr lang="en-US" smtClean="0"/>
+              <a:t>Second level</a:t>
+            </a:r>
+          </a:p>
+          <a:p>
+            <a:pPr lvl="2"/>
+            <a:r>
+              <a:rPr lang="en-US" smtClean="0"/>
+              <a:t>Third level</a:t>
+            </a:r>
+          </a:p>
+          <a:p>
+            <a:pPr lvl="3"/>
+            <a:r>
+              <a:rPr lang="en-US" smtClean="0"/>
+              <a:t>Fourth level</a:t>
+            </a:r>
+          </a:p>
+          <a:p>
+            <a:pPr lvl="4"/>
+            <a:r>
+              <a:rPr lang="en-US" smtClean="0"/>
+              <a:t>Fifth level</a:t>
+            </a:r>
+            <a:endParaRPr lang="en-US" dirty="0"/>
+          </a:p>
+        </p:txBody>
+      </p:sp>
+      <p:sp>
+        <p:nvSpPr>
+          <p:cNvPr id="4" name="Text Placeholder 3"/>
+          <p:cNvSpPr>
+            <a:spLocks noGrp="1"/>
+          </p:cNvSpPr>
+          <p:nvPr>
+            <p:ph type="body" sz="half" idx="2"/>
+          </p:nvPr>
+        </p:nvSpPr>
+        <p:spPr>
+          <a:xfrm>
+            <a:off x="302346" y="685800"/>
+            <a:ext cx="1415708" cy="1270529"/>
+          </a:xfrm>
+        </p:spPr>
+        <p:txBody>
+          <a:bodyPr/>
+          <a:lstStyle>
+            <a:lvl1pPr marL="0" indent="0">
+              <a:buNone/>
+              <a:defRPr sz="533"/>
+            </a:lvl1pPr>
+            <a:lvl2pPr marL="152385" indent="0">
+              <a:buNone/>
+              <a:defRPr sz="467"/>
+            </a:lvl2pPr>
+            <a:lvl3pPr marL="304770" indent="0">
+              <a:buNone/>
+              <a:defRPr sz="400"/>
+            </a:lvl3pPr>
+            <a:lvl4pPr marL="457154" indent="0">
+              <a:buNone/>
+              <a:defRPr sz="333"/>
+            </a:lvl4pPr>
+            <a:lvl5pPr marL="609539" indent="0">
+              <a:buNone/>
+              <a:defRPr sz="333"/>
+            </a:lvl5pPr>
+            <a:lvl6pPr marL="761924" indent="0">
+              <a:buNone/>
+              <a:defRPr sz="333"/>
+            </a:lvl6pPr>
+            <a:lvl7pPr marL="914309" indent="0">
+              <a:buNone/>
+              <a:defRPr sz="333"/>
+            </a:lvl7pPr>
+            <a:lvl8pPr marL="1066693" indent="0">
+              <a:buNone/>
+              <a:defRPr sz="333"/>
+            </a:lvl8pPr>
+            <a:lvl9pPr marL="1219078" indent="0">
+              <a:buNone/>
+              <a:defRPr sz="333"/>
+            </a:lvl9pPr>
+          </a:lstStyle>
+          <a:p>
+            <a:pPr lvl="0"/>
+            <a:r>
+              <a:rPr lang="en-US" smtClean="0"/>
+              <a:t>Click to edit Master text styles</a:t>
+            </a:r>
+          </a:p>
+        </p:txBody>
+      </p:sp>
+      <p:sp>
+        <p:nvSpPr>
+          <p:cNvPr id="5" name="Date Placeholder 4"/>
+          <p:cNvSpPr>
+            <a:spLocks noGrp="1"/>
+          </p:cNvSpPr>
+          <p:nvPr>
+            <p:ph type="dt" sz="half" idx="10"/>
+          </p:nvPr>
+        </p:nvSpPr>
+        <p:spPr/>
+        <p:txBody>
+          <a:bodyPr/>
+          <a:lstStyle/>
+          <a:p>
+            <a:fld id="{C764DE79-268F-4C1A-8933-263129D2AF90}" type="datetimeFigureOut">
+              <a:rPr lang="en-US" smtClean="0"/>
+              <a:t>8/10/18</a:t>
+            </a:fld>
+            <a:endParaRPr lang="en-US" dirty="0"/>
+          </a:p>
+        </p:txBody>
+      </p:sp>
+      <p:sp>
+        <p:nvSpPr>
+          <p:cNvPr id="6" name="Footer Placeholder 5"/>
+          <p:cNvSpPr>
+            <a:spLocks noGrp="1"/>
+          </p:cNvSpPr>
+          <p:nvPr>
+            <p:ph type="ftr" sz="quarter" idx="11"/>
+          </p:nvPr>
+        </p:nvSpPr>
+        <p:spPr/>
+        <p:txBody>
+          <a:bodyPr/>
+          <a:lstStyle/>
+          <a:p>
+            <a:endParaRPr lang="en-US" dirty="0"/>
+          </a:p>
+        </p:txBody>
+      </p:sp>
+      <p:sp>
+        <p:nvSpPr>
+          <p:cNvPr id="7" name="Slide Number Placeholder 6"/>
+          <p:cNvSpPr>
+            <a:spLocks noGrp="1"/>
+          </p:cNvSpPr>
+          <p:nvPr>
+            <p:ph type="sldNum" sz="quarter" idx="12"/>
+          </p:nvPr>
+        </p:nvSpPr>
+        <p:spPr/>
+        <p:txBody>
+          <a:bodyPr/>
+          <a:lstStyle/>
+          <a:p>
+            <a:fld id="{48F63A3B-78C7-47BE-AE5E-E10140E04643}" type="slidenum">
+              <a:rPr lang="en-US" smtClean="0"/>
+              <a:t>‹#›</a:t>
+            </a:fld>
+            <a:endParaRPr lang="en-US" dirty="0"/>
+          </a:p>
+        </p:txBody>
+      </p:sp>
+    </p:spTree>
+    <p:extLst>
+      <p:ext uri="{BB962C8B-B14F-4D97-AF65-F5344CB8AC3E}">
+        <p14:creationId xmlns:p14="http://schemas.microsoft.com/office/powerpoint/2010/main" val="167222108"/>
+      </p:ext>
+    </p:extLst>
+  </p:cSld>
+  <p:clrMapOvr>
+    <a:masterClrMapping/>
+  </p:clrMapOvr>
+  <p:hf hdr="0" ftr="0" dt="0"/>
+</p:sldLayout>
+</file>
+
+<file path=ppt/slideLayouts/slideLayout9.xml><?xml version="1.0" encoding="utf-8"?>
+<p:sldLayout xmlns:a="http://schemas.openxmlformats.org/drawingml/2006/main" xmlns:r="http://schemas.openxmlformats.org/officeDocument/2006/relationships" xmlns:p="http://schemas.openxmlformats.org/presentationml/2006/main" type="picTx" preserve="1">
+  <p:cSld name="Picture with Caption">
+    <p:spTree>
+      <p:nvGrpSpPr>
+        <p:cNvPr id="1" name=""/>
+        <p:cNvGrpSpPr/>
+        <p:nvPr/>
+      </p:nvGrpSpPr>
+      <p:grpSpPr>
+        <a:xfrm>
+          <a:off x="0" y="0"/>
+          <a:ext cx="0" cy="0"/>
+          <a:chOff x="0" y="0"/>
+          <a:chExt cx="0" cy="0"/>
+        </a:xfrm>
+      </p:grpSpPr>
+      <p:sp>
+        <p:nvSpPr>
+          <p:cNvPr id="2" name="Title 1"/>
+          <p:cNvSpPr>
+            <a:spLocks noGrp="1"/>
+          </p:cNvSpPr>
+          <p:nvPr>
+            <p:ph type="title"/>
+          </p:nvPr>
+        </p:nvSpPr>
+        <p:spPr>
+          <a:xfrm>
+            <a:off x="302346" y="152400"/>
+            <a:ext cx="1415708" cy="533400"/>
+          </a:xfrm>
+        </p:spPr>
+        <p:txBody>
+          <a:bodyPr anchor="b"/>
+          <a:lstStyle>
+            <a:lvl1pPr>
+              <a:defRPr sz="1067"/>
+            </a:lvl1pPr>
+          </a:lstStyle>
+          <a:p>
+            <a:r>
+              <a:rPr lang="en-US" smtClean="0"/>
+              <a:t>Click to edit Master title style</a:t>
+            </a:r>
+            <a:endParaRPr lang="en-US" dirty="0"/>
+          </a:p>
+        </p:txBody>
+      </p:sp>
+      <p:sp>
+        <p:nvSpPr>
+          <p:cNvPr id="3" name="Picture Placeholder 2"/>
+          <p:cNvSpPr>
+            <a:spLocks noGrp="1" noChangeAspect="1"/>
+          </p:cNvSpPr>
+          <p:nvPr>
+            <p:ph type="pic" idx="1"/>
+          </p:nvPr>
+        </p:nvSpPr>
+        <p:spPr>
+          <a:xfrm>
+            <a:off x="1866083" y="329142"/>
+            <a:ext cx="2222153" cy="1624542"/>
+          </a:xfrm>
+        </p:spPr>
+        <p:txBody>
+          <a:bodyPr anchor="t"/>
+          <a:lstStyle>
+            <a:lvl1pPr marL="0" indent="0">
+              <a:buNone/>
+              <a:defRPr sz="1067"/>
+            </a:lvl1pPr>
+            <a:lvl2pPr marL="152385" indent="0">
+              <a:buNone/>
+              <a:defRPr sz="933"/>
+            </a:lvl2pPr>
+            <a:lvl3pPr marL="304770" indent="0">
+              <a:buNone/>
+              <a:defRPr sz="800"/>
+            </a:lvl3pPr>
+            <a:lvl4pPr marL="457154" indent="0">
+              <a:buNone/>
+              <a:defRPr sz="667"/>
+            </a:lvl4pPr>
+            <a:lvl5pPr marL="609539" indent="0">
+              <a:buNone/>
+              <a:defRPr sz="667"/>
+            </a:lvl5pPr>
+            <a:lvl6pPr marL="761924" indent="0">
+              <a:buNone/>
+              <a:defRPr sz="667"/>
+            </a:lvl6pPr>
+            <a:lvl7pPr marL="914309" indent="0">
+              <a:buNone/>
+              <a:defRPr sz="667"/>
+            </a:lvl7pPr>
+            <a:lvl8pPr marL="1066693" indent="0">
+              <a:buNone/>
+              <a:defRPr sz="667"/>
+            </a:lvl8pPr>
+            <a:lvl9pPr marL="1219078" indent="0">
+              <a:buNone/>
+              <a:defRPr sz="667"/>
+            </a:lvl9pPr>
+          </a:lstStyle>
+          <a:p>
+            <a:r>
+              <a:rPr lang="en-US" smtClean="0"/>
+              <a:t>Drag picture to placeholder or click icon to add</a:t>
+            </a:r>
+            <a:endParaRPr lang="en-US" dirty="0"/>
+          </a:p>
+        </p:txBody>
+      </p:sp>
+      <p:sp>
+        <p:nvSpPr>
+          <p:cNvPr id="4" name="Text Placeholder 3"/>
+          <p:cNvSpPr>
+            <a:spLocks noGrp="1"/>
+          </p:cNvSpPr>
+          <p:nvPr>
+            <p:ph type="body" sz="half" idx="2"/>
+          </p:nvPr>
+        </p:nvSpPr>
+        <p:spPr>
+          <a:xfrm>
+            <a:off x="302346" y="685800"/>
+            <a:ext cx="1415708" cy="1270529"/>
+          </a:xfrm>
+        </p:spPr>
+        <p:txBody>
+          <a:bodyPr/>
+          <a:lstStyle>
+            <a:lvl1pPr marL="0" indent="0">
+              <a:buNone/>
+              <a:defRPr sz="533"/>
+            </a:lvl1pPr>
+            <a:lvl2pPr marL="152385" indent="0">
+              <a:buNone/>
+              <a:defRPr sz="467"/>
+            </a:lvl2pPr>
+            <a:lvl3pPr marL="304770" indent="0">
+              <a:buNone/>
+              <a:defRPr sz="400"/>
+            </a:lvl3pPr>
+            <a:lvl4pPr marL="457154" indent="0">
+              <a:buNone/>
+              <a:defRPr sz="333"/>
+            </a:lvl4pPr>
+            <a:lvl5pPr marL="609539" indent="0">
+              <a:buNone/>
+              <a:defRPr sz="333"/>
+            </a:lvl5pPr>
+            <a:lvl6pPr marL="761924" indent="0">
+              <a:buNone/>
+              <a:defRPr sz="333"/>
+            </a:lvl6pPr>
+            <a:lvl7pPr marL="914309" indent="0">
+              <a:buNone/>
+              <a:defRPr sz="333"/>
+            </a:lvl7pPr>
+            <a:lvl8pPr marL="1066693" indent="0">
+              <a:buNone/>
+              <a:defRPr sz="333"/>
+            </a:lvl8pPr>
+            <a:lvl9pPr marL="1219078" indent="0">
+              <a:buNone/>
+              <a:defRPr sz="333"/>
+            </a:lvl9pPr>
+          </a:lstStyle>
+          <a:p>
+            <a:pPr lvl="0"/>
+            <a:r>
+              <a:rPr lang="en-US" smtClean="0"/>
+              <a:t>Click to edit Master text styles</a:t>
+            </a:r>
+          </a:p>
+        </p:txBody>
+      </p:sp>
+      <p:sp>
+        <p:nvSpPr>
+          <p:cNvPr id="5" name="Date Placeholder 4"/>
+          <p:cNvSpPr>
+            <a:spLocks noGrp="1"/>
+          </p:cNvSpPr>
+          <p:nvPr>
+            <p:ph type="dt" sz="half" idx="10"/>
+          </p:nvPr>
+        </p:nvSpPr>
+        <p:spPr/>
+        <p:txBody>
+          <a:bodyPr/>
+          <a:lstStyle/>
+          <a:p>
+            <a:fld id="{C764DE79-268F-4C1A-8933-263129D2AF90}" type="datetimeFigureOut">
+              <a:rPr lang="en-US" smtClean="0"/>
+              <a:t>8/10/18</a:t>
+            </a:fld>
+            <a:endParaRPr lang="en-US" dirty="0"/>
+          </a:p>
+        </p:txBody>
+      </p:sp>
+      <p:sp>
+        <p:nvSpPr>
+          <p:cNvPr id="6" name="Footer Placeholder 5"/>
+          <p:cNvSpPr>
+            <a:spLocks noGrp="1"/>
+          </p:cNvSpPr>
+          <p:nvPr>
+            <p:ph type="ftr" sz="quarter" idx="11"/>
+          </p:nvPr>
+        </p:nvSpPr>
+        <p:spPr/>
+        <p:txBody>
+          <a:bodyPr/>
+          <a:lstStyle/>
+          <a:p>
+            <a:endParaRPr lang="en-US" dirty="0"/>
+          </a:p>
+        </p:txBody>
+      </p:sp>
+      <p:sp>
+        <p:nvSpPr>
+          <p:cNvPr id="7" name="Slide Number Placeholder 6"/>
+          <p:cNvSpPr>
+            <a:spLocks noGrp="1"/>
+          </p:cNvSpPr>
+          <p:nvPr>
+            <p:ph type="sldNum" sz="quarter" idx="12"/>
+          </p:nvPr>
+        </p:nvSpPr>
+        <p:spPr/>
+        <p:txBody>
+          <a:bodyPr/>
+          <a:lstStyle/>
+          <a:p>
+            <a:fld id="{48F63A3B-78C7-47BE-AE5E-E10140E04643}" type="slidenum">
+              <a:rPr lang="en-US" smtClean="0"/>
+              <a:t>‹#›</a:t>
+            </a:fld>
+            <a:endParaRPr lang="en-US" dirty="0"/>
+          </a:p>
+        </p:txBody>
+      </p:sp>
+    </p:spTree>
+    <p:extLst>
+      <p:ext uri="{BB962C8B-B14F-4D97-AF65-F5344CB8AC3E}">
+        <p14:creationId xmlns:p14="http://schemas.microsoft.com/office/powerpoint/2010/main" val="1593358880"/>
+      </p:ext>
+    </p:extLst>
+  </p:cSld>
+  <p:clrMapOvr>
+    <a:masterClrMapping/>
+  </p:clrMapOvr>
+  <p:hf hdr="0" ftr="0" dt="0"/>
 </p:sldLayout>
 </file>
 
@@ -1389,25 +3704,250 @@
           <a:chExt cx="0" cy="0"/>
         </a:xfrm>
       </p:grpSpPr>
+      <p:sp>
+        <p:nvSpPr>
+          <p:cNvPr id="2" name="Title Placeholder 1"/>
+          <p:cNvSpPr>
+            <a:spLocks noGrp="1"/>
+          </p:cNvSpPr>
+          <p:nvPr>
+            <p:ph type="title"/>
+          </p:nvPr>
+        </p:nvSpPr>
+        <p:spPr>
+          <a:xfrm>
+            <a:off x="301774" y="121709"/>
+            <a:ext cx="3785890" cy="441854"/>
+          </a:xfrm>
+          <a:prstGeom prst="rect">
+            <a:avLst/>
+          </a:prstGeom>
+        </p:spPr>
+        <p:txBody>
+          <a:bodyPr vert="horz" lIns="91440" tIns="45720" rIns="91440" bIns="45720" rtlCol="0" anchor="ctr">
+            <a:normAutofit/>
+          </a:bodyPr>
+          <a:lstStyle/>
+          <a:p>
+            <a:r>
+              <a:rPr lang="en-US" smtClean="0"/>
+              <a:t>Click to edit Master title style</a:t>
+            </a:r>
+            <a:endParaRPr lang="en-US" dirty="0"/>
+          </a:p>
+        </p:txBody>
+      </p:sp>
+      <p:sp>
+        <p:nvSpPr>
+          <p:cNvPr id="3" name="Text Placeholder 2"/>
+          <p:cNvSpPr>
+            <a:spLocks noGrp="1"/>
+          </p:cNvSpPr>
+          <p:nvPr>
+            <p:ph type="body" idx="1"/>
+          </p:nvPr>
+        </p:nvSpPr>
+        <p:spPr>
+          <a:xfrm>
+            <a:off x="301774" y="608542"/>
+            <a:ext cx="3785890" cy="1450446"/>
+          </a:xfrm>
+          <a:prstGeom prst="rect">
+            <a:avLst/>
+          </a:prstGeom>
+        </p:spPr>
+        <p:txBody>
+          <a:bodyPr vert="horz" lIns="91440" tIns="45720" rIns="91440" bIns="45720" rtlCol="0">
+            <a:normAutofit/>
+          </a:bodyPr>
+          <a:lstStyle/>
+          <a:p>
+            <a:pPr lvl="0"/>
+            <a:r>
+              <a:rPr lang="en-US" smtClean="0"/>
+              <a:t>Click to edit Master text styles</a:t>
+            </a:r>
+          </a:p>
+          <a:p>
+            <a:pPr lvl="1"/>
+            <a:r>
+              <a:rPr lang="en-US" smtClean="0"/>
+              <a:t>Second level</a:t>
+            </a:r>
+          </a:p>
+          <a:p>
+            <a:pPr lvl="2"/>
+            <a:r>
+              <a:rPr lang="en-US" smtClean="0"/>
+              <a:t>Third level</a:t>
+            </a:r>
+          </a:p>
+          <a:p>
+            <a:pPr lvl="3"/>
+            <a:r>
+              <a:rPr lang="en-US" smtClean="0"/>
+              <a:t>Fourth level</a:t>
+            </a:r>
+          </a:p>
+          <a:p>
+            <a:pPr lvl="4"/>
+            <a:r>
+              <a:rPr lang="en-US" smtClean="0"/>
+              <a:t>Fifth level</a:t>
+            </a:r>
+            <a:endParaRPr lang="en-US" dirty="0"/>
+          </a:p>
+        </p:txBody>
+      </p:sp>
+      <p:sp>
+        <p:nvSpPr>
+          <p:cNvPr id="4" name="Date Placeholder 3"/>
+          <p:cNvSpPr>
+            <a:spLocks noGrp="1"/>
+          </p:cNvSpPr>
+          <p:nvPr>
+            <p:ph type="dt" sz="half" idx="2"/>
+          </p:nvPr>
+        </p:nvSpPr>
+        <p:spPr>
+          <a:xfrm>
+            <a:off x="301774" y="2118784"/>
+            <a:ext cx="987624" cy="121708"/>
+          </a:xfrm>
+          <a:prstGeom prst="rect">
+            <a:avLst/>
+          </a:prstGeom>
+        </p:spPr>
+        <p:txBody>
+          <a:bodyPr vert="horz" lIns="91440" tIns="45720" rIns="91440" bIns="45720" rtlCol="0" anchor="ctr"/>
+          <a:lstStyle>
+            <a:lvl1pPr algn="l">
+              <a:defRPr sz="400">
+                <a:solidFill>
+                  <a:schemeClr val="tx1">
+                    <a:tint val="75000"/>
+                  </a:schemeClr>
+                </a:solidFill>
+              </a:defRPr>
+            </a:lvl1pPr>
+          </a:lstStyle>
+          <a:p>
+            <a:fld id="{C764DE79-268F-4C1A-8933-263129D2AF90}" type="datetimeFigureOut">
+              <a:rPr lang="en-US" smtClean="0"/>
+              <a:t>8/10/18</a:t>
+            </a:fld>
+            <a:endParaRPr lang="en-US" dirty="0"/>
+          </a:p>
+        </p:txBody>
+      </p:sp>
+      <p:sp>
+        <p:nvSpPr>
+          <p:cNvPr id="5" name="Footer Placeholder 4"/>
+          <p:cNvSpPr>
+            <a:spLocks noGrp="1"/>
+          </p:cNvSpPr>
+          <p:nvPr>
+            <p:ph type="ftr" sz="quarter" idx="3"/>
+          </p:nvPr>
+        </p:nvSpPr>
+        <p:spPr>
+          <a:xfrm>
+            <a:off x="1454002" y="2118784"/>
+            <a:ext cx="1481435" cy="121708"/>
+          </a:xfrm>
+          <a:prstGeom prst="rect">
+            <a:avLst/>
+          </a:prstGeom>
+        </p:spPr>
+        <p:txBody>
+          <a:bodyPr vert="horz" lIns="91440" tIns="45720" rIns="91440" bIns="45720" rtlCol="0" anchor="ctr"/>
+          <a:lstStyle>
+            <a:lvl1pPr algn="ctr">
+              <a:defRPr sz="400">
+                <a:solidFill>
+                  <a:schemeClr val="tx1">
+                    <a:tint val="75000"/>
+                  </a:schemeClr>
+                </a:solidFill>
+              </a:defRPr>
+            </a:lvl1pPr>
+          </a:lstStyle>
+          <a:p>
+            <a:endParaRPr lang="en-US" dirty="0"/>
+          </a:p>
+        </p:txBody>
+      </p:sp>
+      <p:sp>
+        <p:nvSpPr>
+          <p:cNvPr id="6" name="Slide Number Placeholder 5"/>
+          <p:cNvSpPr>
+            <a:spLocks noGrp="1"/>
+          </p:cNvSpPr>
+          <p:nvPr>
+            <p:ph type="sldNum" sz="quarter" idx="4"/>
+          </p:nvPr>
+        </p:nvSpPr>
+        <p:spPr>
+          <a:xfrm>
+            <a:off x="3100040" y="2118784"/>
+            <a:ext cx="987624" cy="121708"/>
+          </a:xfrm>
+          <a:prstGeom prst="rect">
+            <a:avLst/>
+          </a:prstGeom>
+        </p:spPr>
+        <p:txBody>
+          <a:bodyPr vert="horz" lIns="91440" tIns="45720" rIns="91440" bIns="45720" rtlCol="0" anchor="ctr"/>
+          <a:lstStyle>
+            <a:lvl1pPr algn="r">
+              <a:defRPr sz="400">
+                <a:solidFill>
+                  <a:schemeClr val="tx1">
+                    <a:tint val="75000"/>
+                  </a:schemeClr>
+                </a:solidFill>
+              </a:defRPr>
+            </a:lvl1pPr>
+          </a:lstStyle>
+          <a:p>
+            <a:fld id="{48F63A3B-78C7-47BE-AE5E-E10140E04643}" type="slidenum">
+              <a:rPr lang="en-US" smtClean="0"/>
+              <a:t>‹#›</a:t>
+            </a:fld>
+            <a:endParaRPr lang="en-US" dirty="0"/>
+          </a:p>
+        </p:txBody>
+      </p:sp>
     </p:spTree>
     <p:extLst>
       <p:ext uri="{BB962C8B-B14F-4D97-AF65-F5344CB8AC3E}">
-        <p14:creationId xmlns:p14="http://schemas.microsoft.com/office/powerpoint/2010/main" val="1064020481"/>
+        <p14:creationId xmlns:p14="http://schemas.microsoft.com/office/powerpoint/2010/main" val="1417119058"/>
       </p:ext>
     </p:extLst>
   </p:cSld>
   <p:clrMap bg1="lt1" tx1="dk1" bg2="lt2" tx2="dk2" accent1="accent1" accent2="accent2" accent3="accent3" accent4="accent4" accent5="accent5" accent6="accent6" hlink="hlink" folHlink="folHlink"/>
   <p:sldLayoutIdLst>
-    <p:sldLayoutId id="2147483681" r:id="rId1"/>
-    <p:sldLayoutId id="2147483682" r:id="rId2"/>
-    <p:sldLayoutId id="2147483683" r:id="rId3"/>
-    <p:sldLayoutId id="2147483686" r:id="rId4"/>
-    <p:sldLayoutId id="2147483684" r:id="rId5"/>
+    <p:sldLayoutId id="2147483748" r:id="rId1"/>
+    <p:sldLayoutId id="2147483749" r:id="rId2"/>
+    <p:sldLayoutId id="2147483750" r:id="rId3"/>
+    <p:sldLayoutId id="2147483751" r:id="rId4"/>
+    <p:sldLayoutId id="2147483752" r:id="rId5"/>
+    <p:sldLayoutId id="2147483753" r:id="rId6"/>
+    <p:sldLayoutId id="2147483754" r:id="rId7"/>
+    <p:sldLayoutId id="2147483755" r:id="rId8"/>
+    <p:sldLayoutId id="2147483756" r:id="rId9"/>
+    <p:sldLayoutId id="2147483757" r:id="rId10"/>
+    <p:sldLayoutId id="2147483758" r:id="rId11"/>
+    <p:sldLayoutId id="2147483681" r:id="rId12"/>
+    <p:sldLayoutId id="2147483682" r:id="rId13"/>
+    <p:sldLayoutId id="2147483683" r:id="rId14"/>
+    <p:sldLayoutId id="2147483686" r:id="rId15"/>
+    <p:sldLayoutId id="2147483684" r:id="rId16"/>
   </p:sldLayoutIdLst>
   <p:hf hdr="0" ftr="0" dt="0"/>
   <p:txStyles>
     <p:titleStyle>
-      <a:lvl1pPr algn="l" defTabSz="914400" rtl="0" eaLnBrk="1" latinLnBrk="0" hangingPunct="1">
+      <a:lvl1pPr algn="l" defTabSz="304770" rtl="0" eaLnBrk="1" latinLnBrk="0" hangingPunct="1">
         <a:lnSpc>
           <a:spcPct val="90000"/>
         </a:lnSpc>
@@ -1415,7 +3955,7 @@
           <a:spcPct val="0"/>
         </a:spcBef>
         <a:buNone/>
-        <a:defRPr sz="4400" kern="1200">
+        <a:defRPr sz="1467" kern="1200">
           <a:solidFill>
             <a:schemeClr val="tx1"/>
           </a:solidFill>
@@ -1426,16 +3966,16 @@
       </a:lvl1pPr>
     </p:titleStyle>
     <p:bodyStyle>
-      <a:lvl1pPr marL="228600" indent="-228600" algn="l" defTabSz="914400" rtl="0" eaLnBrk="1" latinLnBrk="0" hangingPunct="1">
+      <a:lvl1pPr marL="76192" indent="-76192" algn="l" defTabSz="304770" rtl="0" eaLnBrk="1" latinLnBrk="0" hangingPunct="1">
         <a:lnSpc>
           <a:spcPct val="90000"/>
         </a:lnSpc>
         <a:spcBef>
-          <a:spcPts val="1000"/>
+          <a:spcPts val="333"/>
         </a:spcBef>
-        <a:buFont typeface="Arial"/>
+        <a:buFont typeface="Arial" panose="020B0604020202020204" pitchFamily="34" charset="0"/>
         <a:buChar char="•"/>
-        <a:defRPr sz="2800" kern="1200">
+        <a:defRPr sz="933" kern="1200">
           <a:solidFill>
             <a:schemeClr val="tx1"/>
           </a:solidFill>
@@ -1444,16 +3984,16 @@
           <a:cs typeface="+mn-cs"/>
         </a:defRPr>
       </a:lvl1pPr>
-      <a:lvl2pPr marL="685800" indent="-228600" algn="l" defTabSz="914400" rtl="0" eaLnBrk="1" latinLnBrk="0" hangingPunct="1">
+      <a:lvl2pPr marL="228577" indent="-76192" algn="l" defTabSz="304770" rtl="0" eaLnBrk="1" latinLnBrk="0" hangingPunct="1">
         <a:lnSpc>
           <a:spcPct val="90000"/>
         </a:lnSpc>
         <a:spcBef>
-          <a:spcPts val="500"/>
+          <a:spcPts val="167"/>
         </a:spcBef>
-        <a:buFont typeface="Arial"/>
+        <a:buFont typeface="Arial" panose="020B0604020202020204" pitchFamily="34" charset="0"/>
         <a:buChar char="•"/>
-        <a:defRPr sz="2400" kern="1200">
+        <a:defRPr sz="800" kern="1200">
           <a:solidFill>
             <a:schemeClr val="tx1"/>
           </a:solidFill>
@@ -1462,16 +4002,16 @@
           <a:cs typeface="+mn-cs"/>
         </a:defRPr>
       </a:lvl2pPr>
-      <a:lvl3pPr marL="1143000" indent="-228600" algn="l" defTabSz="914400" rtl="0" eaLnBrk="1" latinLnBrk="0" hangingPunct="1">
+      <a:lvl3pPr marL="380962" indent="-76192" algn="l" defTabSz="304770" rtl="0" eaLnBrk="1" latinLnBrk="0" hangingPunct="1">
         <a:lnSpc>
           <a:spcPct val="90000"/>
         </a:lnSpc>
         <a:spcBef>
-          <a:spcPts val="500"/>
+          <a:spcPts val="167"/>
         </a:spcBef>
-        <a:buFont typeface="Arial"/>
+        <a:buFont typeface="Arial" panose="020B0604020202020204" pitchFamily="34" charset="0"/>
         <a:buChar char="•"/>
-        <a:defRPr sz="2000" kern="1200">
+        <a:defRPr sz="667" kern="1200">
           <a:solidFill>
             <a:schemeClr val="tx1"/>
           </a:solidFill>
@@ -1480,16 +4020,16 @@
           <a:cs typeface="+mn-cs"/>
         </a:defRPr>
       </a:lvl3pPr>
-      <a:lvl4pPr marL="1600200" indent="-228600" algn="l" defTabSz="914400" rtl="0" eaLnBrk="1" latinLnBrk="0" hangingPunct="1">
+      <a:lvl4pPr marL="533347" indent="-76192" algn="l" defTabSz="304770" rtl="0" eaLnBrk="1" latinLnBrk="0" hangingPunct="1">
         <a:lnSpc>
           <a:spcPct val="90000"/>
         </a:lnSpc>
         <a:spcBef>
-          <a:spcPts val="500"/>
+          <a:spcPts val="167"/>
         </a:spcBef>
-        <a:buFont typeface="Arial"/>
+        <a:buFont typeface="Arial" panose="020B0604020202020204" pitchFamily="34" charset="0"/>
         <a:buChar char="•"/>
-        <a:defRPr sz="1800" kern="1200">
+        <a:defRPr sz="600" kern="1200">
           <a:solidFill>
             <a:schemeClr val="tx1"/>
           </a:solidFill>
@@ -1498,16 +4038,16 @@
           <a:cs typeface="+mn-cs"/>
         </a:defRPr>
       </a:lvl4pPr>
-      <a:lvl5pPr marL="2057400" indent="-228600" algn="l" defTabSz="914400" rtl="0" eaLnBrk="1" latinLnBrk="0" hangingPunct="1">
+      <a:lvl5pPr marL="685731" indent="-76192" algn="l" defTabSz="304770" rtl="0" eaLnBrk="1" latinLnBrk="0" hangingPunct="1">
         <a:lnSpc>
           <a:spcPct val="90000"/>
         </a:lnSpc>
         <a:spcBef>
-          <a:spcPts val="500"/>
+          <a:spcPts val="167"/>
         </a:spcBef>
-        <a:buFont typeface="Arial"/>
+        <a:buFont typeface="Arial" panose="020B0604020202020204" pitchFamily="34" charset="0"/>
         <a:buChar char="•"/>
-        <a:defRPr sz="1800" kern="1200">
+        <a:defRPr sz="600" kern="1200">
           <a:solidFill>
             <a:schemeClr val="tx1"/>
           </a:solidFill>
@@ -1516,16 +4056,16 @@
           <a:cs typeface="+mn-cs"/>
         </a:defRPr>
       </a:lvl5pPr>
-      <a:lvl6pPr marL="2514600" indent="-228600" algn="l" defTabSz="914400" rtl="0" eaLnBrk="1" latinLnBrk="0" hangingPunct="1">
+      <a:lvl6pPr marL="838116" indent="-76192" algn="l" defTabSz="304770" rtl="0" eaLnBrk="1" latinLnBrk="0" hangingPunct="1">
         <a:lnSpc>
           <a:spcPct val="90000"/>
         </a:lnSpc>
         <a:spcBef>
-          <a:spcPts val="500"/>
+          <a:spcPts val="167"/>
         </a:spcBef>
-        <a:buFont typeface="Arial"/>
+        <a:buFont typeface="Arial" panose="020B0604020202020204" pitchFamily="34" charset="0"/>
         <a:buChar char="•"/>
-        <a:defRPr sz="1800" kern="1200">
+        <a:defRPr sz="600" kern="1200">
           <a:solidFill>
             <a:schemeClr val="tx1"/>
           </a:solidFill>
@@ -1534,16 +4074,16 @@
           <a:cs typeface="+mn-cs"/>
         </a:defRPr>
       </a:lvl6pPr>
-      <a:lvl7pPr marL="2971800" indent="-228600" algn="l" defTabSz="914400" rtl="0" eaLnBrk="1" latinLnBrk="0" hangingPunct="1">
+      <a:lvl7pPr marL="990501" indent="-76192" algn="l" defTabSz="304770" rtl="0" eaLnBrk="1" latinLnBrk="0" hangingPunct="1">
         <a:lnSpc>
           <a:spcPct val="90000"/>
         </a:lnSpc>
         <a:spcBef>
-          <a:spcPts val="500"/>
+          <a:spcPts val="167"/>
         </a:spcBef>
-        <a:buFont typeface="Arial"/>
+        <a:buFont typeface="Arial" panose="020B0604020202020204" pitchFamily="34" charset="0"/>
         <a:buChar char="•"/>
-        <a:defRPr sz="1800" kern="1200">
+        <a:defRPr sz="600" kern="1200">
           <a:solidFill>
             <a:schemeClr val="tx1"/>
           </a:solidFill>
@@ -1552,16 +4092,16 @@
           <a:cs typeface="+mn-cs"/>
         </a:defRPr>
       </a:lvl7pPr>
-      <a:lvl8pPr marL="3429000" indent="-228600" algn="l" defTabSz="914400" rtl="0" eaLnBrk="1" latinLnBrk="0" hangingPunct="1">
+      <a:lvl8pPr marL="1142886" indent="-76192" algn="l" defTabSz="304770" rtl="0" eaLnBrk="1" latinLnBrk="0" hangingPunct="1">
         <a:lnSpc>
           <a:spcPct val="90000"/>
         </a:lnSpc>
         <a:spcBef>
-          <a:spcPts val="500"/>
+          <a:spcPts val="167"/>
         </a:spcBef>
-        <a:buFont typeface="Arial"/>
+        <a:buFont typeface="Arial" panose="020B0604020202020204" pitchFamily="34" charset="0"/>
         <a:buChar char="•"/>
-        <a:defRPr sz="1800" kern="1200">
+        <a:defRPr sz="600" kern="1200">
           <a:solidFill>
             <a:schemeClr val="tx1"/>
           </a:solidFill>
@@ -1570,16 +4110,16 @@
           <a:cs typeface="+mn-cs"/>
         </a:defRPr>
       </a:lvl8pPr>
-      <a:lvl9pPr marL="3886200" indent="-228600" algn="l" defTabSz="914400" rtl="0" eaLnBrk="1" latinLnBrk="0" hangingPunct="1">
+      <a:lvl9pPr marL="1295270" indent="-76192" algn="l" defTabSz="304770" rtl="0" eaLnBrk="1" latinLnBrk="0" hangingPunct="1">
         <a:lnSpc>
           <a:spcPct val="90000"/>
         </a:lnSpc>
         <a:spcBef>
-          <a:spcPts val="500"/>
+          <a:spcPts val="167"/>
         </a:spcBef>
-        <a:buFont typeface="Arial"/>
+        <a:buFont typeface="Arial" panose="020B0604020202020204" pitchFamily="34" charset="0"/>
         <a:buChar char="•"/>
-        <a:defRPr sz="1800" kern="1200">
+        <a:defRPr sz="600" kern="1200">
           <a:solidFill>
             <a:schemeClr val="tx1"/>
           </a:solidFill>
@@ -1593,8 +4133,8 @@
       <a:defPPr>
         <a:defRPr lang="en-US"/>
       </a:defPPr>
-      <a:lvl1pPr marL="0" algn="l" defTabSz="914400" rtl="0" eaLnBrk="1" latinLnBrk="0" hangingPunct="1">
-        <a:defRPr sz="1800" kern="1200">
+      <a:lvl1pPr marL="0" algn="l" defTabSz="304770" rtl="0" eaLnBrk="1" latinLnBrk="0" hangingPunct="1">
+        <a:defRPr sz="600" kern="1200">
           <a:solidFill>
             <a:schemeClr val="tx1"/>
           </a:solidFill>
@@ -1603,8 +4143,8 @@
           <a:cs typeface="+mn-cs"/>
         </a:defRPr>
       </a:lvl1pPr>
-      <a:lvl2pPr marL="457200" algn="l" defTabSz="914400" rtl="0" eaLnBrk="1" latinLnBrk="0" hangingPunct="1">
-        <a:defRPr sz="1800" kern="1200">
+      <a:lvl2pPr marL="152385" algn="l" defTabSz="304770" rtl="0" eaLnBrk="1" latinLnBrk="0" hangingPunct="1">
+        <a:defRPr sz="600" kern="1200">
           <a:solidFill>
             <a:schemeClr val="tx1"/>
           </a:solidFill>
@@ -1613,8 +4153,8 @@
           <a:cs typeface="+mn-cs"/>
         </a:defRPr>
       </a:lvl2pPr>
-      <a:lvl3pPr marL="914400" algn="l" defTabSz="914400" rtl="0" eaLnBrk="1" latinLnBrk="0" hangingPunct="1">
-        <a:defRPr sz="1800" kern="1200">
+      <a:lvl3pPr marL="304770" algn="l" defTabSz="304770" rtl="0" eaLnBrk="1" latinLnBrk="0" hangingPunct="1">
+        <a:defRPr sz="600" kern="1200">
           <a:solidFill>
             <a:schemeClr val="tx1"/>
           </a:solidFill>
@@ -1623,8 +4163,8 @@
           <a:cs typeface="+mn-cs"/>
         </a:defRPr>
       </a:lvl3pPr>
-      <a:lvl4pPr marL="1371600" algn="l" defTabSz="914400" rtl="0" eaLnBrk="1" latinLnBrk="0" hangingPunct="1">
-        <a:defRPr sz="1800" kern="1200">
+      <a:lvl4pPr marL="457154" algn="l" defTabSz="304770" rtl="0" eaLnBrk="1" latinLnBrk="0" hangingPunct="1">
+        <a:defRPr sz="600" kern="1200">
           <a:solidFill>
             <a:schemeClr val="tx1"/>
           </a:solidFill>
@@ -1633,8 +4173,8 @@
           <a:cs typeface="+mn-cs"/>
         </a:defRPr>
       </a:lvl4pPr>
-      <a:lvl5pPr marL="1828800" algn="l" defTabSz="914400" rtl="0" eaLnBrk="1" latinLnBrk="0" hangingPunct="1">
-        <a:defRPr sz="1800" kern="1200">
+      <a:lvl5pPr marL="609539" algn="l" defTabSz="304770" rtl="0" eaLnBrk="1" latinLnBrk="0" hangingPunct="1">
+        <a:defRPr sz="600" kern="1200">
           <a:solidFill>
             <a:schemeClr val="tx1"/>
           </a:solidFill>
@@ -1643,8 +4183,8 @@
           <a:cs typeface="+mn-cs"/>
         </a:defRPr>
       </a:lvl5pPr>
-      <a:lvl6pPr marL="2286000" algn="l" defTabSz="914400" rtl="0" eaLnBrk="1" latinLnBrk="0" hangingPunct="1">
-        <a:defRPr sz="1800" kern="1200">
+      <a:lvl6pPr marL="761924" algn="l" defTabSz="304770" rtl="0" eaLnBrk="1" latinLnBrk="0" hangingPunct="1">
+        <a:defRPr sz="600" kern="1200">
           <a:solidFill>
             <a:schemeClr val="tx1"/>
           </a:solidFill>
@@ -1653,8 +4193,8 @@
           <a:cs typeface="+mn-cs"/>
         </a:defRPr>
       </a:lvl6pPr>
-      <a:lvl7pPr marL="2743200" algn="l" defTabSz="914400" rtl="0" eaLnBrk="1" latinLnBrk="0" hangingPunct="1">
-        <a:defRPr sz="1800" kern="1200">
+      <a:lvl7pPr marL="914309" algn="l" defTabSz="304770" rtl="0" eaLnBrk="1" latinLnBrk="0" hangingPunct="1">
+        <a:defRPr sz="600" kern="1200">
           <a:solidFill>
             <a:schemeClr val="tx1"/>
           </a:solidFill>
@@ -1663,8 +4203,8 @@
           <a:cs typeface="+mn-cs"/>
         </a:defRPr>
       </a:lvl7pPr>
-      <a:lvl8pPr marL="3200400" algn="l" defTabSz="914400" rtl="0" eaLnBrk="1" latinLnBrk="0" hangingPunct="1">
-        <a:defRPr sz="1800" kern="1200">
+      <a:lvl8pPr marL="1066693" algn="l" defTabSz="304770" rtl="0" eaLnBrk="1" latinLnBrk="0" hangingPunct="1">
+        <a:defRPr sz="600" kern="1200">
           <a:solidFill>
             <a:schemeClr val="tx1"/>
           </a:solidFill>
@@ -1673,8 +4213,8 @@
           <a:cs typeface="+mn-cs"/>
         </a:defRPr>
       </a:lvl8pPr>
-      <a:lvl9pPr marL="3657600" algn="l" defTabSz="914400" rtl="0" eaLnBrk="1" latinLnBrk="0" hangingPunct="1">
-        <a:defRPr sz="1800" kern="1200">
+      <a:lvl9pPr marL="1219078" algn="l" defTabSz="304770" rtl="0" eaLnBrk="1" latinLnBrk="0" hangingPunct="1">
+        <a:defRPr sz="600" kern="1200">
           <a:solidFill>
             <a:schemeClr val="tx1"/>
           </a:solidFill>
@@ -1689,7 +4229,7 @@
 </file>
 
 <file path=ppt/slides/slide1.xml><?xml version="1.0" encoding="utf-8"?>
-<p:sld xmlns:a="http://schemas.openxmlformats.org/drawingml/2006/main" xmlns:r="http://schemas.openxmlformats.org/officeDocument/2006/relationships" xmlns:p="http://schemas.openxmlformats.org/presentationml/2006/main">
+<p:sld xmlns:a="http://schemas.openxmlformats.org/drawingml/2006/main" xmlns:r="http://schemas.openxmlformats.org/officeDocument/2006/relationships" xmlns:p="http://schemas.openxmlformats.org/presentationml/2006/main" showMasterSp="0">
   <p:cSld>
     <p:spTree>
       <p:nvGrpSpPr>
@@ -1713,7 +4253,7 @@
         </p:nvSpPr>
         <p:spPr>
           <a:xfrm>
-            <a:off x="4184031" y="2971800"/>
+            <a:off x="466198" y="152400"/>
             <a:ext cx="3893169" cy="1981200"/>
           </a:xfrm>
           <a:prstGeom prst="rect">
@@ -1755,7 +4295,7 @@
           <a:lstStyle/>
           <a:p>
             <a:pPr algn="ctr"/>
-            <a:endParaRPr lang="en-US" sz="1400" smtClean="0">
+            <a:endParaRPr lang="en-US" sz="1400">
               <a:solidFill>
                 <a:schemeClr val="tx1">
                   <a:lumMod val="85000"/>
@@ -1763,30 +4303,6 @@
                 </a:schemeClr>
               </a:solidFill>
             </a:endParaRPr>
-          </a:p>
-        </p:txBody>
-      </p:sp>
-      <p:sp>
-        <p:nvSpPr>
-          <p:cNvPr id="2" name="Slide Number Placeholder 1"/>
-          <p:cNvSpPr>
-            <a:spLocks noGrp="1"/>
-          </p:cNvSpPr>
-          <p:nvPr>
-            <p:ph type="sldNum" sz="quarter" idx="12"/>
-          </p:nvPr>
-        </p:nvSpPr>
-        <p:spPr/>
-        <p:txBody>
-          <a:bodyPr/>
-          <a:lstStyle/>
-          <a:p>
-            <a:fld id="{FFF8894C-962F-4043-BDE4-6CA2ABEDD0B4}" type="slidenum">
-              <a:rPr lang="en-US" smtClean="0"/>
-              <a:pPr/>
-              <a:t>1</a:t>
-            </a:fld>
-            <a:endParaRPr lang="en-US" dirty="0"/>
           </a:p>
         </p:txBody>
       </p:sp>
@@ -1812,7 +4328,7 @@
         </p:blipFill>
         <p:spPr>
           <a:xfrm>
-            <a:off x="4579155" y="4277586"/>
+            <a:off x="861322" y="1458186"/>
             <a:ext cx="963357" cy="519102"/>
           </a:xfrm>
           <a:prstGeom prst="rect">
@@ -1842,7 +4358,7 @@
         </p:blipFill>
         <p:spPr>
           <a:xfrm>
-            <a:off x="4937627" y="3067816"/>
+            <a:off x="1219794" y="248421"/>
             <a:ext cx="944549" cy="578619"/>
           </a:xfrm>
           <a:prstGeom prst="rect">
@@ -1872,7 +4388,7 @@
         </p:blipFill>
         <p:spPr>
           <a:xfrm>
-            <a:off x="5007241" y="3759499"/>
+            <a:off x="1289408" y="940105"/>
             <a:ext cx="1170819" cy="491745"/>
           </a:xfrm>
           <a:prstGeom prst="rect">
@@ -1902,7 +4418,7 @@
         </p:blipFill>
         <p:spPr>
           <a:xfrm>
-            <a:off x="6974323" y="4390242"/>
+            <a:off x="3256490" y="1570848"/>
             <a:ext cx="722657" cy="380859"/>
           </a:xfrm>
           <a:prstGeom prst="rect">
@@ -1932,7 +4448,7 @@
         </p:blipFill>
         <p:spPr>
           <a:xfrm>
-            <a:off x="6042689" y="3411375"/>
+            <a:off x="2324850" y="591975"/>
             <a:ext cx="1027738" cy="359708"/>
           </a:xfrm>
           <a:prstGeom prst="rect">
@@ -1942,7 +4458,7 @@
       </p:pic>
       <p:pic>
         <p:nvPicPr>
-          <p:cNvPr id="12" name="Picture 11"/>
+          <p:cNvPr id="20" name="pasted-image.pdf" descr="pasted-image.pdf"/>
           <p:cNvPicPr>
             <a:picLocks noChangeAspect="1"/>
           </p:cNvPicPr>
@@ -1950,6 +4466,53 @@
         </p:nvPicPr>
         <p:blipFill>
           <a:blip r:embed="rId7">
+            <a:extLst>
+              <a:ext uri="{BEBA8EAE-BF5A-486C-A8C5-ECC9F3942E4B}">
+                <a14:imgProps xmlns:a14="http://schemas.microsoft.com/office/drawing/2010/main">
+                  <a14:imgLayer r:embed="rId8">
+                    <a14:imgEffect>
+                      <a14:colorTemperature colorTemp="5093"/>
+                    </a14:imgEffect>
+                  </a14:imgLayer>
+                </a14:imgProps>
+              </a:ext>
+            </a:extLst>
+          </a:blip>
+          <a:stretch>
+            <a:fillRect/>
+          </a:stretch>
+        </p:blipFill>
+        <p:spPr>
+          <a:xfrm>
+            <a:off x="30272" y="286200"/>
+            <a:ext cx="1089099" cy="1120396"/>
+          </a:xfrm>
+          <a:prstGeom prst="rect">
+            <a:avLst/>
+          </a:prstGeom>
+          <a:ln w="12700" cap="flat">
+            <a:noFill/>
+            <a:miter lim="400000"/>
+          </a:ln>
+          <a:effectLst>
+            <a:outerShdw blurRad="25400" dist="25400" dir="2700000" algn="tl" rotWithShape="0">
+              <a:prstClr val="black">
+                <a:alpha val="40000"/>
+              </a:prstClr>
+            </a:outerShdw>
+          </a:effectLst>
+        </p:spPr>
+      </p:pic>
+      <p:pic>
+        <p:nvPicPr>
+          <p:cNvPr id="35" name="Picture 34"/>
+          <p:cNvPicPr>
+            <a:picLocks noChangeAspect="1"/>
+          </p:cNvPicPr>
+          <p:nvPr/>
+        </p:nvPicPr>
+        <p:blipFill>
+          <a:blip r:embed="rId9">
             <a:extLst>
               <a:ext uri="{28A0092B-C50C-407E-A947-70E740481C1C}">
                 <a14:useLocalDpi xmlns:a14="http://schemas.microsoft.com/office/drawing/2010/main" val="0"/>
@@ -1962,173 +4525,17 @@
         </p:blipFill>
         <p:spPr>
           <a:xfrm>
-            <a:off x="6867545" y="3130617"/>
-            <a:ext cx="936212" cy="349182"/>
+            <a:off x="2174782" y="1431844"/>
+            <a:ext cx="889956" cy="416054"/>
           </a:xfrm>
           <a:prstGeom prst="rect">
             <a:avLst/>
           </a:prstGeom>
         </p:spPr>
       </p:pic>
-      <p:grpSp>
-        <p:nvGrpSpPr>
-          <p:cNvPr id="34" name="Group 33"/>
-          <p:cNvGrpSpPr/>
-          <p:nvPr/>
-        </p:nvGrpSpPr>
-        <p:grpSpPr>
-          <a:xfrm>
-            <a:off x="3630956" y="3251795"/>
-            <a:ext cx="1190730" cy="1277292"/>
-            <a:chOff x="3394677" y="1826131"/>
-            <a:chExt cx="1290821" cy="1384659"/>
-          </a:xfrm>
-        </p:grpSpPr>
-        <p:pic>
-          <p:nvPicPr>
-            <p:cNvPr id="19" name="pasted-image.pdf" descr="pasted-image.pdf"/>
-            <p:cNvPicPr>
-              <a:picLocks noChangeAspect="1"/>
-            </p:cNvPicPr>
-            <p:nvPr/>
-          </p:nvPicPr>
-          <p:blipFill>
-            <a:blip r:embed="rId8">
-              <a:extLst>
-                <a:ext uri="{BEBA8EAE-BF5A-486C-A8C5-ECC9F3942E4B}">
-                  <a14:imgProps xmlns:a14="http://schemas.microsoft.com/office/drawing/2010/main">
-                    <a14:imgLayer r:embed="rId9">
-                      <a14:imgEffect>
-                        <a14:colorTemperature colorTemp="5093"/>
-                      </a14:imgEffect>
-                    </a14:imgLayer>
-                  </a14:imgProps>
-                </a:ext>
-              </a:extLst>
-            </a:blip>
-            <a:stretch>
-              <a:fillRect/>
-            </a:stretch>
-          </p:blipFill>
-          <p:spPr>
-            <a:xfrm>
-              <a:off x="3614704" y="1826131"/>
-              <a:ext cx="1070794" cy="1101565"/>
-            </a:xfrm>
-            <a:prstGeom prst="rect">
-              <a:avLst/>
-            </a:prstGeom>
-            <a:ln w="12700" cap="flat">
-              <a:noFill/>
-              <a:miter lim="400000"/>
-            </a:ln>
-            <a:effectLst>
-              <a:outerShdw blurRad="25400" dist="25400" dir="2700000" algn="tl" rotWithShape="0">
-                <a:prstClr val="black">
-                  <a:alpha val="40000"/>
-                </a:prstClr>
-              </a:outerShdw>
-            </a:effectLst>
-          </p:spPr>
-        </p:pic>
-        <p:pic>
-          <p:nvPicPr>
-            <p:cNvPr id="20" name="pasted-image.pdf" descr="pasted-image.pdf"/>
-            <p:cNvPicPr>
-              <a:picLocks noChangeAspect="1"/>
-            </p:cNvPicPr>
-            <p:nvPr/>
-          </p:nvPicPr>
-          <p:blipFill>
-            <a:blip r:embed="rId8">
-              <a:extLst>
-                <a:ext uri="{BEBA8EAE-BF5A-486C-A8C5-ECC9F3942E4B}">
-                  <a14:imgProps xmlns:a14="http://schemas.microsoft.com/office/drawing/2010/main">
-                    <a14:imgLayer r:embed="rId9">
-                      <a14:imgEffect>
-                        <a14:colorTemperature colorTemp="5093"/>
-                      </a14:imgEffect>
-                    </a14:imgLayer>
-                  </a14:imgProps>
-                </a:ext>
-              </a:extLst>
-            </a:blip>
-            <a:stretch>
-              <a:fillRect/>
-            </a:stretch>
-          </p:blipFill>
-          <p:spPr>
-            <a:xfrm>
-              <a:off x="3494416" y="1978783"/>
-              <a:ext cx="1070794" cy="1101565"/>
-            </a:xfrm>
-            <a:prstGeom prst="rect">
-              <a:avLst/>
-            </a:prstGeom>
-            <a:ln w="12700" cap="flat">
-              <a:noFill/>
-              <a:miter lim="400000"/>
-            </a:ln>
-            <a:effectLst>
-              <a:outerShdw blurRad="25400" dist="25400" dir="2700000" algn="tl" rotWithShape="0">
-                <a:prstClr val="black">
-                  <a:alpha val="40000"/>
-                </a:prstClr>
-              </a:outerShdw>
-            </a:effectLst>
-          </p:spPr>
-        </p:pic>
-        <p:pic>
-          <p:nvPicPr>
-            <p:cNvPr id="21" name="pasted-image.pdf" descr="pasted-image.pdf"/>
-            <p:cNvPicPr>
-              <a:picLocks noChangeAspect="1"/>
-            </p:cNvPicPr>
-            <p:nvPr/>
-          </p:nvPicPr>
-          <p:blipFill>
-            <a:blip r:embed="rId8">
-              <a:extLst>
-                <a:ext uri="{BEBA8EAE-BF5A-486C-A8C5-ECC9F3942E4B}">
-                  <a14:imgProps xmlns:a14="http://schemas.microsoft.com/office/drawing/2010/main">
-                    <a14:imgLayer r:embed="rId9">
-                      <a14:imgEffect>
-                        <a14:colorTemperature colorTemp="5093"/>
-                      </a14:imgEffect>
-                    </a14:imgLayer>
-                  </a14:imgProps>
-                </a:ext>
-              </a:extLst>
-            </a:blip>
-            <a:stretch>
-              <a:fillRect/>
-            </a:stretch>
-          </p:blipFill>
-          <p:spPr>
-            <a:xfrm>
-              <a:off x="3394677" y="2109225"/>
-              <a:ext cx="1070794" cy="1101565"/>
-            </a:xfrm>
-            <a:prstGeom prst="rect">
-              <a:avLst/>
-            </a:prstGeom>
-            <a:ln w="12700" cap="flat">
-              <a:noFill/>
-              <a:miter lim="400000"/>
-            </a:ln>
-            <a:effectLst>
-              <a:outerShdw blurRad="25400" dist="25400" dir="2700000" algn="tl" rotWithShape="0">
-                <a:prstClr val="black">
-                  <a:alpha val="40000"/>
-                </a:prstClr>
-              </a:outerShdw>
-            </a:effectLst>
-          </p:spPr>
-        </p:pic>
-      </p:grpSp>
       <p:pic>
         <p:nvPicPr>
-          <p:cNvPr id="35" name="Picture 34"/>
+          <p:cNvPr id="37" name="Picture 36"/>
           <p:cNvPicPr>
             <a:picLocks noChangeAspect="1"/>
           </p:cNvPicPr>
@@ -2148,8 +4555,8 @@
         </p:blipFill>
         <p:spPr>
           <a:xfrm>
-            <a:off x="5892621" y="4251244"/>
-            <a:ext cx="889956" cy="416054"/>
+            <a:off x="2800300" y="1031725"/>
+            <a:ext cx="1363881" cy="324591"/>
           </a:xfrm>
           <a:prstGeom prst="rect">
             <a:avLst/>
@@ -2158,7 +4565,7 @@
       </p:pic>
       <p:pic>
         <p:nvPicPr>
-          <p:cNvPr id="37" name="Picture 36"/>
+          <p:cNvPr id="16" name="Picture 15"/>
           <p:cNvPicPr>
             <a:picLocks noChangeAspect="1"/>
           </p:cNvPicPr>
@@ -2178,12 +4585,19 @@
         </p:blipFill>
         <p:spPr>
           <a:xfrm>
-            <a:off x="6518133" y="3851119"/>
-            <a:ext cx="1363881" cy="324591"/>
+            <a:off x="3283614" y="297443"/>
+            <a:ext cx="838177" cy="428992"/>
           </a:xfrm>
           <a:prstGeom prst="rect">
             <a:avLst/>
           </a:prstGeom>
+          <a:effectLst>
+            <a:outerShdw dist="12700" dir="2700000" algn="tl" rotWithShape="0">
+              <a:schemeClr val="bg1">
+                <a:alpha val="40000"/>
+              </a:schemeClr>
+            </a:outerShdw>
+          </a:effectLst>
         </p:spPr>
       </p:pic>
     </p:spTree>
@@ -2202,7 +4616,7 @@
 <file path=ppt/theme/theme1.xml><?xml version="1.0" encoding="utf-8"?>
 <a:theme xmlns:a="http://schemas.openxmlformats.org/drawingml/2006/main" name="Office Theme">
   <a:themeElements>
-    <a:clrScheme name="Custom 7">
+    <a:clrScheme name="Office Theme">
       <a:dk1>
         <a:sysClr val="windowText" lastClr="000000"/>
       </a:dk1>
@@ -2210,52 +4624,52 @@
         <a:sysClr val="window" lastClr="FFFFFF"/>
       </a:lt1>
       <a:dk2>
-        <a:srgbClr val="455F51"/>
+        <a:srgbClr val="44546A"/>
       </a:dk2>
       <a:lt2>
-        <a:srgbClr val="E2DFCC"/>
+        <a:srgbClr val="E7E6E6"/>
       </a:lt2>
       <a:accent1>
-        <a:srgbClr val="99CB38"/>
+        <a:srgbClr val="5B9BD5"/>
       </a:accent1>
       <a:accent2>
-        <a:srgbClr val="63A537"/>
+        <a:srgbClr val="ED7D31"/>
       </a:accent2>
       <a:accent3>
-        <a:srgbClr val="37A76F"/>
+        <a:srgbClr val="A5A5A5"/>
       </a:accent3>
       <a:accent4>
-        <a:srgbClr val="44C1A3"/>
+        <a:srgbClr val="FFC000"/>
       </a:accent4>
       <a:accent5>
-        <a:srgbClr val="4EB3CF"/>
+        <a:srgbClr val="4472C4"/>
       </a:accent5>
       <a:accent6>
-        <a:srgbClr val="51C3F9"/>
+        <a:srgbClr val="70AD47"/>
       </a:accent6>
       <a:hlink>
-        <a:srgbClr val="455F51"/>
+        <a:srgbClr val="0563C1"/>
       </a:hlink>
       <a:folHlink>
-        <a:srgbClr val="977B2D"/>
+        <a:srgbClr val="954F72"/>
       </a:folHlink>
     </a:clrScheme>
-    <a:fontScheme name="Arial">
+    <a:fontScheme name="Office Theme">
       <a:majorFont>
-        <a:latin typeface="Arial" panose="020B0604020202020204"/>
+        <a:latin typeface="Calibri Light" panose="020F0302020204030204"/>
         <a:ea typeface=""/>
         <a:cs typeface=""/>
         <a:font script="Jpan" typeface="ＭＳ Ｐゴシック"/>
-        <a:font script="Hang" typeface="굴림"/>
-        <a:font script="Hans" typeface="黑体"/>
-        <a:font script="Hant" typeface="微軟正黑體"/>
-        <a:font script="Arab" typeface="Arial"/>
-        <a:font script="Hebr" typeface="Arial"/>
-        <a:font script="Thai" typeface="Cordia New"/>
+        <a:font script="Hang" typeface="맑은 고딕"/>
+        <a:font script="Hans" typeface="宋体"/>
+        <a:font script="Hant" typeface="新細明體"/>
+        <a:font script="Arab" typeface="Times New Roman"/>
+        <a:font script="Hebr" typeface="Times New Roman"/>
+        <a:font script="Thai" typeface="Angsana New"/>
         <a:font script="Ethi" typeface="Nyala"/>
         <a:font script="Beng" typeface="Vrinda"/>
         <a:font script="Gujr" typeface="Shruti"/>
-        <a:font script="Khmr" typeface="DaunPenh"/>
+        <a:font script="Khmr" typeface="MoolBoran"/>
         <a:font script="Knda" typeface="Tunga"/>
         <a:font script="Guru" typeface="Raavi"/>
         <a:font script="Cans" typeface="Euphemia"/>
@@ -2272,18 +4686,18 @@
         <a:font script="Laoo" typeface="DokChampa"/>
         <a:font script="Sinh" typeface="Iskoola Pota"/>
         <a:font script="Mong" typeface="Mongolian Baiti"/>
-        <a:font script="Viet" typeface="Arial"/>
+        <a:font script="Viet" typeface="Times New Roman"/>
         <a:font script="Uigh" typeface="Microsoft Uighur"/>
         <a:font script="Geor" typeface="Sylfaen"/>
       </a:majorFont>
       <a:minorFont>
-        <a:latin typeface="Arial" panose="020B0604020202020204"/>
+        <a:latin typeface="Calibri" panose="020F0502020204030204"/>
         <a:ea typeface=""/>
         <a:cs typeface=""/>
         <a:font script="Jpan" typeface="ＭＳ Ｐゴシック"/>
-        <a:font script="Hang" typeface="굴림"/>
-        <a:font script="Hans" typeface="黑体"/>
-        <a:font script="Hant" typeface="微軟正黑體"/>
+        <a:font script="Hang" typeface="맑은 고딕"/>
+        <a:font script="Hans" typeface="宋体"/>
+        <a:font script="Hant" typeface="新細明體"/>
         <a:font script="Arab" typeface="Arial"/>
         <a:font script="Hebr" typeface="Arial"/>
         <a:font script="Thai" typeface="Cordia New"/>
@@ -2312,7 +4726,7 @@
         <a:font script="Geor" typeface="Sylfaen"/>
       </a:minorFont>
     </a:fontScheme>
-    <a:fmtScheme name="Office">
+    <a:fmtScheme name="Office Theme">
       <a:fillStyleLst>
         <a:solidFill>
           <a:schemeClr val="phClr"/>
@@ -2450,52 +4864,7 @@
       </a:bgFillStyleLst>
     </a:fmtScheme>
   </a:themeElements>
-  <a:objectDefaults>
-    <a:spDef>
-      <a:spPr>
-        <a:solidFill>
-          <a:schemeClr val="bg1"/>
-        </a:solidFill>
-        <a:ln>
-          <a:solidFill>
-            <a:schemeClr val="tx1">
-              <a:lumMod val="85000"/>
-              <a:lumOff val="15000"/>
-            </a:schemeClr>
-          </a:solidFill>
-        </a:ln>
-      </a:spPr>
-      <a:bodyPr wrap="none" rtlCol="0" anchor="ctr"/>
-      <a:lstStyle>
-        <a:defPPr algn="ctr">
-          <a:defRPr sz="1400" smtClean="0">
-            <a:solidFill>
-              <a:schemeClr val="tx1">
-                <a:lumMod val="85000"/>
-                <a:lumOff val="15000"/>
-              </a:schemeClr>
-            </a:solidFill>
-          </a:defRPr>
-        </a:defPPr>
-      </a:lstStyle>
-      <a:style>
-        <a:lnRef idx="2">
-          <a:schemeClr val="accent1">
-            <a:shade val="50000"/>
-          </a:schemeClr>
-        </a:lnRef>
-        <a:fillRef idx="1">
-          <a:schemeClr val="accent1"/>
-        </a:fillRef>
-        <a:effectRef idx="0">
-          <a:schemeClr val="accent1"/>
-        </a:effectRef>
-        <a:fontRef idx="minor">
-          <a:schemeClr val="lt1"/>
-        </a:fontRef>
-      </a:style>
-    </a:spDef>
-  </a:objectDefaults>
+  <a:objectDefaults/>
   <a:extraClrSchemeLst/>
   <a:extLst>
     <a:ext uri="{05A4C25C-085E-4340-85A3-A5531E510DB2}">

</xml_diff>

<commit_message>
Update home page illustrations based upon feedback (#297)
* Update home page illustrations based upon feedback

* Update home page illustrations based upon feedback

* Update home page illustrations based upon feedback
</commit_message>
<xml_diff>
--- a/images/runtimes/OW-Runtimes.pptx
+++ b/images/runtimes/OW-Runtimes.pptx
@@ -2,7 +2,7 @@
 <file path=ppt/presentation.xml><?xml version="1.0" encoding="utf-8"?>
 <p:presentation xmlns:a="http://schemas.openxmlformats.org/drawingml/2006/main" xmlns:r="http://schemas.openxmlformats.org/officeDocument/2006/relationships" xmlns:p="http://schemas.openxmlformats.org/presentationml/2006/main" saveSubsetFonts="1" autoCompressPictures="0">
   <p:sldMasterIdLst>
-    <p:sldMasterId id="2147483667" r:id="rId1"/>
+    <p:sldMasterId id="2147483747" r:id="rId1"/>
   </p:sldMasterIdLst>
   <p:notesMasterIdLst>
     <p:notesMasterId r:id="rId3"/>
@@ -10,14 +10,14 @@
   <p:sldIdLst>
     <p:sldId id="309" r:id="rId2"/>
   </p:sldIdLst>
-  <p:sldSz cx="12192000" cy="6858000"/>
+  <p:sldSz cx="4389438" cy="2286000"/>
   <p:notesSz cx="6858000" cy="9144000"/>
   <p:defaultTextStyle>
     <a:defPPr>
       <a:defRPr lang="en-US"/>
     </a:defPPr>
-    <a:lvl1pPr marL="0" algn="l" defTabSz="457200" rtl="0" eaLnBrk="1" latinLnBrk="0" hangingPunct="1">
-      <a:defRPr sz="1800" kern="1200">
+    <a:lvl1pPr marL="0" algn="l" defTabSz="263347" rtl="0" eaLnBrk="1" latinLnBrk="0" hangingPunct="1">
+      <a:defRPr sz="1037" kern="1200">
         <a:solidFill>
           <a:schemeClr val="tx1"/>
         </a:solidFill>
@@ -26,8 +26,8 @@
         <a:cs typeface="+mn-cs"/>
       </a:defRPr>
     </a:lvl1pPr>
-    <a:lvl2pPr marL="457200" algn="l" defTabSz="457200" rtl="0" eaLnBrk="1" latinLnBrk="0" hangingPunct="1">
-      <a:defRPr sz="1800" kern="1200">
+    <a:lvl2pPr marL="263347" algn="l" defTabSz="263347" rtl="0" eaLnBrk="1" latinLnBrk="0" hangingPunct="1">
+      <a:defRPr sz="1037" kern="1200">
         <a:solidFill>
           <a:schemeClr val="tx1"/>
         </a:solidFill>
@@ -36,8 +36,8 @@
         <a:cs typeface="+mn-cs"/>
       </a:defRPr>
     </a:lvl2pPr>
-    <a:lvl3pPr marL="914400" algn="l" defTabSz="457200" rtl="0" eaLnBrk="1" latinLnBrk="0" hangingPunct="1">
-      <a:defRPr sz="1800" kern="1200">
+    <a:lvl3pPr marL="526694" algn="l" defTabSz="263347" rtl="0" eaLnBrk="1" latinLnBrk="0" hangingPunct="1">
+      <a:defRPr sz="1037" kern="1200">
         <a:solidFill>
           <a:schemeClr val="tx1"/>
         </a:solidFill>
@@ -46,8 +46,8 @@
         <a:cs typeface="+mn-cs"/>
       </a:defRPr>
     </a:lvl3pPr>
-    <a:lvl4pPr marL="1371600" algn="l" defTabSz="457200" rtl="0" eaLnBrk="1" latinLnBrk="0" hangingPunct="1">
-      <a:defRPr sz="1800" kern="1200">
+    <a:lvl4pPr marL="790042" algn="l" defTabSz="263347" rtl="0" eaLnBrk="1" latinLnBrk="0" hangingPunct="1">
+      <a:defRPr sz="1037" kern="1200">
         <a:solidFill>
           <a:schemeClr val="tx1"/>
         </a:solidFill>
@@ -56,8 +56,8 @@
         <a:cs typeface="+mn-cs"/>
       </a:defRPr>
     </a:lvl4pPr>
-    <a:lvl5pPr marL="1828800" algn="l" defTabSz="457200" rtl="0" eaLnBrk="1" latinLnBrk="0" hangingPunct="1">
-      <a:defRPr sz="1800" kern="1200">
+    <a:lvl5pPr marL="1053389" algn="l" defTabSz="263347" rtl="0" eaLnBrk="1" latinLnBrk="0" hangingPunct="1">
+      <a:defRPr sz="1037" kern="1200">
         <a:solidFill>
           <a:schemeClr val="tx1"/>
         </a:solidFill>
@@ -66,8 +66,8 @@
         <a:cs typeface="+mn-cs"/>
       </a:defRPr>
     </a:lvl5pPr>
-    <a:lvl6pPr marL="2286000" algn="l" defTabSz="457200" rtl="0" eaLnBrk="1" latinLnBrk="0" hangingPunct="1">
-      <a:defRPr sz="1800" kern="1200">
+    <a:lvl6pPr marL="1316736" algn="l" defTabSz="263347" rtl="0" eaLnBrk="1" latinLnBrk="0" hangingPunct="1">
+      <a:defRPr sz="1037" kern="1200">
         <a:solidFill>
           <a:schemeClr val="tx1"/>
         </a:solidFill>
@@ -76,8 +76,8 @@
         <a:cs typeface="+mn-cs"/>
       </a:defRPr>
     </a:lvl6pPr>
-    <a:lvl7pPr marL="2743200" algn="l" defTabSz="457200" rtl="0" eaLnBrk="1" latinLnBrk="0" hangingPunct="1">
-      <a:defRPr sz="1800" kern="1200">
+    <a:lvl7pPr marL="1580083" algn="l" defTabSz="263347" rtl="0" eaLnBrk="1" latinLnBrk="0" hangingPunct="1">
+      <a:defRPr sz="1037" kern="1200">
         <a:solidFill>
           <a:schemeClr val="tx1"/>
         </a:solidFill>
@@ -86,8 +86,8 @@
         <a:cs typeface="+mn-cs"/>
       </a:defRPr>
     </a:lvl7pPr>
-    <a:lvl8pPr marL="3200400" algn="l" defTabSz="457200" rtl="0" eaLnBrk="1" latinLnBrk="0" hangingPunct="1">
-      <a:defRPr sz="1800" kern="1200">
+    <a:lvl8pPr marL="1843430" algn="l" defTabSz="263347" rtl="0" eaLnBrk="1" latinLnBrk="0" hangingPunct="1">
+      <a:defRPr sz="1037" kern="1200">
         <a:solidFill>
           <a:schemeClr val="tx1"/>
         </a:solidFill>
@@ -96,8 +96,8 @@
         <a:cs typeface="+mn-cs"/>
       </a:defRPr>
     </a:lvl8pPr>
-    <a:lvl9pPr marL="3657600" algn="l" defTabSz="457200" rtl="0" eaLnBrk="1" latinLnBrk="0" hangingPunct="1">
-      <a:defRPr sz="1800" kern="1200">
+    <a:lvl9pPr marL="2106778" algn="l" defTabSz="263347" rtl="0" eaLnBrk="1" latinLnBrk="0" hangingPunct="1">
+      <a:defRPr sz="1037" kern="1200">
         <a:solidFill>
           <a:schemeClr val="tx1"/>
         </a:solidFill>
@@ -197,7 +197,7 @@
           <a:p>
             <a:fld id="{B7E7AA13-03CD-450D-9E48-9B034CD4C43D}" type="datetimeFigureOut">
               <a:rPr lang="en-US" smtClean="0"/>
-              <a:t>7/13/18</a:t>
+              <a:t>8/10/18</a:t>
             </a:fld>
             <a:endParaRPr lang="en-US"/>
           </a:p>
@@ -215,8 +215,8 @@
         </p:nvSpPr>
         <p:spPr>
           <a:xfrm>
-            <a:off x="685800" y="1143000"/>
-            <a:ext cx="5486400" cy="3086100"/>
+            <a:off x="466725" y="1143000"/>
+            <a:ext cx="5924550" cy="3086100"/>
           </a:xfrm>
           <a:prstGeom prst="rect">
             <a:avLst/>
@@ -370,8 +370,8 @@
   </p:cSld>
   <p:clrMap bg1="lt1" tx1="dk1" bg2="lt2" tx2="dk2" accent1="accent1" accent2="accent2" accent3="accent3" accent4="accent4" accent5="accent5" accent6="accent6" hlink="hlink" folHlink="folHlink"/>
   <p:notesStyle>
-    <a:lvl1pPr marL="0" algn="l" defTabSz="914400" rtl="0" eaLnBrk="1" latinLnBrk="0" hangingPunct="1">
-      <a:defRPr sz="1200" kern="1200">
+    <a:lvl1pPr marL="0" algn="l" defTabSz="526694" rtl="0" eaLnBrk="1" latinLnBrk="0" hangingPunct="1">
+      <a:defRPr sz="691" kern="1200">
         <a:solidFill>
           <a:schemeClr val="tx1"/>
         </a:solidFill>
@@ -380,8 +380,8 @@
         <a:cs typeface="+mn-cs"/>
       </a:defRPr>
     </a:lvl1pPr>
-    <a:lvl2pPr marL="457200" algn="l" defTabSz="914400" rtl="0" eaLnBrk="1" latinLnBrk="0" hangingPunct="1">
-      <a:defRPr sz="1200" kern="1200">
+    <a:lvl2pPr marL="263347" algn="l" defTabSz="526694" rtl="0" eaLnBrk="1" latinLnBrk="0" hangingPunct="1">
+      <a:defRPr sz="691" kern="1200">
         <a:solidFill>
           <a:schemeClr val="tx1"/>
         </a:solidFill>
@@ -390,8 +390,8 @@
         <a:cs typeface="+mn-cs"/>
       </a:defRPr>
     </a:lvl2pPr>
-    <a:lvl3pPr marL="914400" algn="l" defTabSz="914400" rtl="0" eaLnBrk="1" latinLnBrk="0" hangingPunct="1">
-      <a:defRPr sz="1200" kern="1200">
+    <a:lvl3pPr marL="526694" algn="l" defTabSz="526694" rtl="0" eaLnBrk="1" latinLnBrk="0" hangingPunct="1">
+      <a:defRPr sz="691" kern="1200">
         <a:solidFill>
           <a:schemeClr val="tx1"/>
         </a:solidFill>
@@ -400,8 +400,8 @@
         <a:cs typeface="+mn-cs"/>
       </a:defRPr>
     </a:lvl3pPr>
-    <a:lvl4pPr marL="1371600" algn="l" defTabSz="914400" rtl="0" eaLnBrk="1" latinLnBrk="0" hangingPunct="1">
-      <a:defRPr sz="1200" kern="1200">
+    <a:lvl4pPr marL="790042" algn="l" defTabSz="526694" rtl="0" eaLnBrk="1" latinLnBrk="0" hangingPunct="1">
+      <a:defRPr sz="691" kern="1200">
         <a:solidFill>
           <a:schemeClr val="tx1"/>
         </a:solidFill>
@@ -410,8 +410,8 @@
         <a:cs typeface="+mn-cs"/>
       </a:defRPr>
     </a:lvl4pPr>
-    <a:lvl5pPr marL="1828800" algn="l" defTabSz="914400" rtl="0" eaLnBrk="1" latinLnBrk="0" hangingPunct="1">
-      <a:defRPr sz="1200" kern="1200">
+    <a:lvl5pPr marL="1053389" algn="l" defTabSz="526694" rtl="0" eaLnBrk="1" latinLnBrk="0" hangingPunct="1">
+      <a:defRPr sz="691" kern="1200">
         <a:solidFill>
           <a:schemeClr val="tx1"/>
         </a:solidFill>
@@ -420,8 +420,8 @@
         <a:cs typeface="+mn-cs"/>
       </a:defRPr>
     </a:lvl5pPr>
-    <a:lvl6pPr marL="2286000" algn="l" defTabSz="914400" rtl="0" eaLnBrk="1" latinLnBrk="0" hangingPunct="1">
-      <a:defRPr sz="1200" kern="1200">
+    <a:lvl6pPr marL="1316736" algn="l" defTabSz="526694" rtl="0" eaLnBrk="1" latinLnBrk="0" hangingPunct="1">
+      <a:defRPr sz="691" kern="1200">
         <a:solidFill>
           <a:schemeClr val="tx1"/>
         </a:solidFill>
@@ -430,8 +430,8 @@
         <a:cs typeface="+mn-cs"/>
       </a:defRPr>
     </a:lvl6pPr>
-    <a:lvl7pPr marL="2743200" algn="l" defTabSz="914400" rtl="0" eaLnBrk="1" latinLnBrk="0" hangingPunct="1">
-      <a:defRPr sz="1200" kern="1200">
+    <a:lvl7pPr marL="1580083" algn="l" defTabSz="526694" rtl="0" eaLnBrk="1" latinLnBrk="0" hangingPunct="1">
+      <a:defRPr sz="691" kern="1200">
         <a:solidFill>
           <a:schemeClr val="tx1"/>
         </a:solidFill>
@@ -440,8 +440,8 @@
         <a:cs typeface="+mn-cs"/>
       </a:defRPr>
     </a:lvl7pPr>
-    <a:lvl8pPr marL="3200400" algn="l" defTabSz="914400" rtl="0" eaLnBrk="1" latinLnBrk="0" hangingPunct="1">
-      <a:defRPr sz="1200" kern="1200">
+    <a:lvl8pPr marL="1843430" algn="l" defTabSz="526694" rtl="0" eaLnBrk="1" latinLnBrk="0" hangingPunct="1">
+      <a:defRPr sz="691" kern="1200">
         <a:solidFill>
           <a:schemeClr val="tx1"/>
         </a:solidFill>
@@ -450,8 +450,8 @@
         <a:cs typeface="+mn-cs"/>
       </a:defRPr>
     </a:lvl8pPr>
-    <a:lvl9pPr marL="3657600" algn="l" defTabSz="914400" rtl="0" eaLnBrk="1" latinLnBrk="0" hangingPunct="1">
-      <a:defRPr sz="1200" kern="1200">
+    <a:lvl9pPr marL="2106778" algn="l" defTabSz="526694" rtl="0" eaLnBrk="1" latinLnBrk="0" hangingPunct="1">
+      <a:defRPr sz="691" kern="1200">
         <a:solidFill>
           <a:schemeClr val="tx1"/>
         </a:solidFill>
@@ -465,8 +465,8 @@
 </file>
 
 <file path=ppt/slideLayouts/slideLayout1.xml><?xml version="1.0" encoding="utf-8"?>
-<p:sldLayout xmlns:a="http://schemas.openxmlformats.org/drawingml/2006/main" xmlns:r="http://schemas.openxmlformats.org/officeDocument/2006/relationships" xmlns:p="http://schemas.openxmlformats.org/presentationml/2006/main" preserve="1" userDrawn="1">
-  <p:cSld name="Blank">
+<p:sldLayout xmlns:a="http://schemas.openxmlformats.org/drawingml/2006/main" xmlns:r="http://schemas.openxmlformats.org/officeDocument/2006/relationships" xmlns:p="http://schemas.openxmlformats.org/presentationml/2006/main" type="title" preserve="1">
+  <p:cSld name="Title Slide">
     <p:spTree>
       <p:nvGrpSpPr>
         <p:cNvPr id="1" name=""/>
@@ -483,6 +483,551 @@
       </p:grpSpPr>
       <p:sp>
         <p:nvSpPr>
+          <p:cNvPr id="2" name="Title 1"/>
+          <p:cNvSpPr>
+            <a:spLocks noGrp="1"/>
+          </p:cNvSpPr>
+          <p:nvPr>
+            <p:ph type="ctrTitle"/>
+          </p:nvPr>
+        </p:nvSpPr>
+        <p:spPr>
+          <a:xfrm>
+            <a:off x="548680" y="374121"/>
+            <a:ext cx="3292079" cy="795867"/>
+          </a:xfrm>
+        </p:spPr>
+        <p:txBody>
+          <a:bodyPr anchor="b"/>
+          <a:lstStyle>
+            <a:lvl1pPr algn="ctr">
+              <a:defRPr sz="2000"/>
+            </a:lvl1pPr>
+          </a:lstStyle>
+          <a:p>
+            <a:r>
+              <a:rPr lang="en-US" smtClean="0"/>
+              <a:t>Click to edit Master title style</a:t>
+            </a:r>
+            <a:endParaRPr lang="en-US" dirty="0"/>
+          </a:p>
+        </p:txBody>
+      </p:sp>
+      <p:sp>
+        <p:nvSpPr>
+          <p:cNvPr id="3" name="Subtitle 2"/>
+          <p:cNvSpPr>
+            <a:spLocks noGrp="1"/>
+          </p:cNvSpPr>
+          <p:nvPr>
+            <p:ph type="subTitle" idx="1"/>
+          </p:nvPr>
+        </p:nvSpPr>
+        <p:spPr>
+          <a:xfrm>
+            <a:off x="548680" y="1200679"/>
+            <a:ext cx="3292079" cy="551921"/>
+          </a:xfrm>
+        </p:spPr>
+        <p:txBody>
+          <a:bodyPr/>
+          <a:lstStyle>
+            <a:lvl1pPr marL="0" indent="0" algn="ctr">
+              <a:buNone/>
+              <a:defRPr sz="800"/>
+            </a:lvl1pPr>
+            <a:lvl2pPr marL="152385" indent="0" algn="ctr">
+              <a:buNone/>
+              <a:defRPr sz="667"/>
+            </a:lvl2pPr>
+            <a:lvl3pPr marL="304770" indent="0" algn="ctr">
+              <a:buNone/>
+              <a:defRPr sz="600"/>
+            </a:lvl3pPr>
+            <a:lvl4pPr marL="457154" indent="0" algn="ctr">
+              <a:buNone/>
+              <a:defRPr sz="533"/>
+            </a:lvl4pPr>
+            <a:lvl5pPr marL="609539" indent="0" algn="ctr">
+              <a:buNone/>
+              <a:defRPr sz="533"/>
+            </a:lvl5pPr>
+            <a:lvl6pPr marL="761924" indent="0" algn="ctr">
+              <a:buNone/>
+              <a:defRPr sz="533"/>
+            </a:lvl6pPr>
+            <a:lvl7pPr marL="914309" indent="0" algn="ctr">
+              <a:buNone/>
+              <a:defRPr sz="533"/>
+            </a:lvl7pPr>
+            <a:lvl8pPr marL="1066693" indent="0" algn="ctr">
+              <a:buNone/>
+              <a:defRPr sz="533"/>
+            </a:lvl8pPr>
+            <a:lvl9pPr marL="1219078" indent="0" algn="ctr">
+              <a:buNone/>
+              <a:defRPr sz="533"/>
+            </a:lvl9pPr>
+          </a:lstStyle>
+          <a:p>
+            <a:r>
+              <a:rPr lang="en-US" smtClean="0"/>
+              <a:t>Click to edit Master subtitle style</a:t>
+            </a:r>
+            <a:endParaRPr lang="en-US" dirty="0"/>
+          </a:p>
+        </p:txBody>
+      </p:sp>
+      <p:sp>
+        <p:nvSpPr>
+          <p:cNvPr id="4" name="Date Placeholder 3"/>
+          <p:cNvSpPr>
+            <a:spLocks noGrp="1"/>
+          </p:cNvSpPr>
+          <p:nvPr>
+            <p:ph type="dt" sz="half" idx="10"/>
+          </p:nvPr>
+        </p:nvSpPr>
+        <p:spPr/>
+        <p:txBody>
+          <a:bodyPr/>
+          <a:lstStyle/>
+          <a:p>
+            <a:fld id="{C764DE79-268F-4C1A-8933-263129D2AF90}" type="datetimeFigureOut">
+              <a:rPr lang="en-US" smtClean="0"/>
+              <a:t>8/10/18</a:t>
+            </a:fld>
+            <a:endParaRPr lang="en-US" dirty="0"/>
+          </a:p>
+        </p:txBody>
+      </p:sp>
+      <p:sp>
+        <p:nvSpPr>
+          <p:cNvPr id="5" name="Footer Placeholder 4"/>
+          <p:cNvSpPr>
+            <a:spLocks noGrp="1"/>
+          </p:cNvSpPr>
+          <p:nvPr>
+            <p:ph type="ftr" sz="quarter" idx="11"/>
+          </p:nvPr>
+        </p:nvSpPr>
+        <p:spPr/>
+        <p:txBody>
+          <a:bodyPr/>
+          <a:lstStyle/>
+          <a:p>
+            <a:endParaRPr lang="en-US" dirty="0"/>
+          </a:p>
+        </p:txBody>
+      </p:sp>
+      <p:sp>
+        <p:nvSpPr>
+          <p:cNvPr id="6" name="Slide Number Placeholder 5"/>
+          <p:cNvSpPr>
+            <a:spLocks noGrp="1"/>
+          </p:cNvSpPr>
+          <p:nvPr>
+            <p:ph type="sldNum" sz="quarter" idx="12"/>
+          </p:nvPr>
+        </p:nvSpPr>
+        <p:spPr/>
+        <p:txBody>
+          <a:bodyPr/>
+          <a:lstStyle/>
+          <a:p>
+            <a:fld id="{48F63A3B-78C7-47BE-AE5E-E10140E04643}" type="slidenum">
+              <a:rPr lang="en-US" smtClean="0"/>
+              <a:t>‹#›</a:t>
+            </a:fld>
+            <a:endParaRPr lang="en-US" dirty="0"/>
+          </a:p>
+        </p:txBody>
+      </p:sp>
+    </p:spTree>
+    <p:extLst>
+      <p:ext uri="{BB962C8B-B14F-4D97-AF65-F5344CB8AC3E}">
+        <p14:creationId xmlns:p14="http://schemas.microsoft.com/office/powerpoint/2010/main" val="1926362576"/>
+      </p:ext>
+    </p:extLst>
+  </p:cSld>
+  <p:clrMapOvr>
+    <a:masterClrMapping/>
+  </p:clrMapOvr>
+  <p:hf hdr="0" ftr="0" dt="0"/>
+</p:sldLayout>
+</file>
+
+<file path=ppt/slideLayouts/slideLayout10.xml><?xml version="1.0" encoding="utf-8"?>
+<p:sldLayout xmlns:a="http://schemas.openxmlformats.org/drawingml/2006/main" xmlns:r="http://schemas.openxmlformats.org/officeDocument/2006/relationships" xmlns:p="http://schemas.openxmlformats.org/presentationml/2006/main" type="vertTx" preserve="1">
+  <p:cSld name="Title and Vertical Text">
+    <p:spTree>
+      <p:nvGrpSpPr>
+        <p:cNvPr id="1" name=""/>
+        <p:cNvGrpSpPr/>
+        <p:nvPr/>
+      </p:nvGrpSpPr>
+      <p:grpSpPr>
+        <a:xfrm>
+          <a:off x="0" y="0"/>
+          <a:ext cx="0" cy="0"/>
+          <a:chOff x="0" y="0"/>
+          <a:chExt cx="0" cy="0"/>
+        </a:xfrm>
+      </p:grpSpPr>
+      <p:sp>
+        <p:nvSpPr>
+          <p:cNvPr id="2" name="Title 1"/>
+          <p:cNvSpPr>
+            <a:spLocks noGrp="1"/>
+          </p:cNvSpPr>
+          <p:nvPr>
+            <p:ph type="title"/>
+          </p:nvPr>
+        </p:nvSpPr>
+        <p:spPr/>
+        <p:txBody>
+          <a:bodyPr/>
+          <a:lstStyle/>
+          <a:p>
+            <a:r>
+              <a:rPr lang="en-US" smtClean="0"/>
+              <a:t>Click to edit Master title style</a:t>
+            </a:r>
+            <a:endParaRPr lang="en-US" dirty="0"/>
+          </a:p>
+        </p:txBody>
+      </p:sp>
+      <p:sp>
+        <p:nvSpPr>
+          <p:cNvPr id="3" name="Vertical Text Placeholder 2"/>
+          <p:cNvSpPr>
+            <a:spLocks noGrp="1"/>
+          </p:cNvSpPr>
+          <p:nvPr>
+            <p:ph type="body" orient="vert" idx="1"/>
+          </p:nvPr>
+        </p:nvSpPr>
+        <p:spPr/>
+        <p:txBody>
+          <a:bodyPr vert="eaVert"/>
+          <a:lstStyle/>
+          <a:p>
+            <a:pPr lvl="0"/>
+            <a:r>
+              <a:rPr lang="en-US" smtClean="0"/>
+              <a:t>Click to edit Master text styles</a:t>
+            </a:r>
+          </a:p>
+          <a:p>
+            <a:pPr lvl="1"/>
+            <a:r>
+              <a:rPr lang="en-US" smtClean="0"/>
+              <a:t>Second level</a:t>
+            </a:r>
+          </a:p>
+          <a:p>
+            <a:pPr lvl="2"/>
+            <a:r>
+              <a:rPr lang="en-US" smtClean="0"/>
+              <a:t>Third level</a:t>
+            </a:r>
+          </a:p>
+          <a:p>
+            <a:pPr lvl="3"/>
+            <a:r>
+              <a:rPr lang="en-US" smtClean="0"/>
+              <a:t>Fourth level</a:t>
+            </a:r>
+          </a:p>
+          <a:p>
+            <a:pPr lvl="4"/>
+            <a:r>
+              <a:rPr lang="en-US" smtClean="0"/>
+              <a:t>Fifth level</a:t>
+            </a:r>
+            <a:endParaRPr lang="en-US" dirty="0"/>
+          </a:p>
+        </p:txBody>
+      </p:sp>
+      <p:sp>
+        <p:nvSpPr>
+          <p:cNvPr id="4" name="Date Placeholder 3"/>
+          <p:cNvSpPr>
+            <a:spLocks noGrp="1"/>
+          </p:cNvSpPr>
+          <p:nvPr>
+            <p:ph type="dt" sz="half" idx="10"/>
+          </p:nvPr>
+        </p:nvSpPr>
+        <p:spPr/>
+        <p:txBody>
+          <a:bodyPr/>
+          <a:lstStyle/>
+          <a:p>
+            <a:fld id="{C764DE79-268F-4C1A-8933-263129D2AF90}" type="datetimeFigureOut">
+              <a:rPr lang="en-US" smtClean="0"/>
+              <a:t>8/10/18</a:t>
+            </a:fld>
+            <a:endParaRPr lang="en-US" dirty="0"/>
+          </a:p>
+        </p:txBody>
+      </p:sp>
+      <p:sp>
+        <p:nvSpPr>
+          <p:cNvPr id="5" name="Footer Placeholder 4"/>
+          <p:cNvSpPr>
+            <a:spLocks noGrp="1"/>
+          </p:cNvSpPr>
+          <p:nvPr>
+            <p:ph type="ftr" sz="quarter" idx="11"/>
+          </p:nvPr>
+        </p:nvSpPr>
+        <p:spPr/>
+        <p:txBody>
+          <a:bodyPr/>
+          <a:lstStyle/>
+          <a:p>
+            <a:endParaRPr lang="en-US" dirty="0"/>
+          </a:p>
+        </p:txBody>
+      </p:sp>
+      <p:sp>
+        <p:nvSpPr>
+          <p:cNvPr id="6" name="Slide Number Placeholder 5"/>
+          <p:cNvSpPr>
+            <a:spLocks noGrp="1"/>
+          </p:cNvSpPr>
+          <p:nvPr>
+            <p:ph type="sldNum" sz="quarter" idx="12"/>
+          </p:nvPr>
+        </p:nvSpPr>
+        <p:spPr/>
+        <p:txBody>
+          <a:bodyPr/>
+          <a:lstStyle/>
+          <a:p>
+            <a:fld id="{48F63A3B-78C7-47BE-AE5E-E10140E04643}" type="slidenum">
+              <a:rPr lang="en-US" smtClean="0"/>
+              <a:t>‹#›</a:t>
+            </a:fld>
+            <a:endParaRPr lang="en-US" dirty="0"/>
+          </a:p>
+        </p:txBody>
+      </p:sp>
+    </p:spTree>
+    <p:extLst>
+      <p:ext uri="{BB962C8B-B14F-4D97-AF65-F5344CB8AC3E}">
+        <p14:creationId xmlns:p14="http://schemas.microsoft.com/office/powerpoint/2010/main" val="461618070"/>
+      </p:ext>
+    </p:extLst>
+  </p:cSld>
+  <p:clrMapOvr>
+    <a:masterClrMapping/>
+  </p:clrMapOvr>
+  <p:hf hdr="0" ftr="0" dt="0"/>
+</p:sldLayout>
+</file>
+
+<file path=ppt/slideLayouts/slideLayout11.xml><?xml version="1.0" encoding="utf-8"?>
+<p:sldLayout xmlns:a="http://schemas.openxmlformats.org/drawingml/2006/main" xmlns:r="http://schemas.openxmlformats.org/officeDocument/2006/relationships" xmlns:p="http://schemas.openxmlformats.org/presentationml/2006/main" type="vertTitleAndTx" preserve="1">
+  <p:cSld name="Vertical Title and Text">
+    <p:spTree>
+      <p:nvGrpSpPr>
+        <p:cNvPr id="1" name=""/>
+        <p:cNvGrpSpPr/>
+        <p:nvPr/>
+      </p:nvGrpSpPr>
+      <p:grpSpPr>
+        <a:xfrm>
+          <a:off x="0" y="0"/>
+          <a:ext cx="0" cy="0"/>
+          <a:chOff x="0" y="0"/>
+          <a:chExt cx="0" cy="0"/>
+        </a:xfrm>
+      </p:grpSpPr>
+      <p:sp>
+        <p:nvSpPr>
+          <p:cNvPr id="2" name="Vertical Title 1"/>
+          <p:cNvSpPr>
+            <a:spLocks noGrp="1"/>
+          </p:cNvSpPr>
+          <p:nvPr>
+            <p:ph type="title" orient="vert"/>
+          </p:nvPr>
+        </p:nvSpPr>
+        <p:spPr>
+          <a:xfrm>
+            <a:off x="3141191" y="121709"/>
+            <a:ext cx="946473" cy="1937279"/>
+          </a:xfrm>
+        </p:spPr>
+        <p:txBody>
+          <a:bodyPr vert="eaVert"/>
+          <a:lstStyle/>
+          <a:p>
+            <a:r>
+              <a:rPr lang="en-US" smtClean="0"/>
+              <a:t>Click to edit Master title style</a:t>
+            </a:r>
+            <a:endParaRPr lang="en-US" dirty="0"/>
+          </a:p>
+        </p:txBody>
+      </p:sp>
+      <p:sp>
+        <p:nvSpPr>
+          <p:cNvPr id="3" name="Vertical Text Placeholder 2"/>
+          <p:cNvSpPr>
+            <a:spLocks noGrp="1"/>
+          </p:cNvSpPr>
+          <p:nvPr>
+            <p:ph type="body" orient="vert" idx="1"/>
+          </p:nvPr>
+        </p:nvSpPr>
+        <p:spPr>
+          <a:xfrm>
+            <a:off x="301774" y="121709"/>
+            <a:ext cx="2784550" cy="1937279"/>
+          </a:xfrm>
+        </p:spPr>
+        <p:txBody>
+          <a:bodyPr vert="eaVert"/>
+          <a:lstStyle/>
+          <a:p>
+            <a:pPr lvl="0"/>
+            <a:r>
+              <a:rPr lang="en-US" smtClean="0"/>
+              <a:t>Click to edit Master text styles</a:t>
+            </a:r>
+          </a:p>
+          <a:p>
+            <a:pPr lvl="1"/>
+            <a:r>
+              <a:rPr lang="en-US" smtClean="0"/>
+              <a:t>Second level</a:t>
+            </a:r>
+          </a:p>
+          <a:p>
+            <a:pPr lvl="2"/>
+            <a:r>
+              <a:rPr lang="en-US" smtClean="0"/>
+              <a:t>Third level</a:t>
+            </a:r>
+          </a:p>
+          <a:p>
+            <a:pPr lvl="3"/>
+            <a:r>
+              <a:rPr lang="en-US" smtClean="0"/>
+              <a:t>Fourth level</a:t>
+            </a:r>
+          </a:p>
+          <a:p>
+            <a:pPr lvl="4"/>
+            <a:r>
+              <a:rPr lang="en-US" smtClean="0"/>
+              <a:t>Fifth level</a:t>
+            </a:r>
+            <a:endParaRPr lang="en-US" dirty="0"/>
+          </a:p>
+        </p:txBody>
+      </p:sp>
+      <p:sp>
+        <p:nvSpPr>
+          <p:cNvPr id="4" name="Date Placeholder 3"/>
+          <p:cNvSpPr>
+            <a:spLocks noGrp="1"/>
+          </p:cNvSpPr>
+          <p:nvPr>
+            <p:ph type="dt" sz="half" idx="10"/>
+          </p:nvPr>
+        </p:nvSpPr>
+        <p:spPr/>
+        <p:txBody>
+          <a:bodyPr/>
+          <a:lstStyle/>
+          <a:p>
+            <a:fld id="{C764DE79-268F-4C1A-8933-263129D2AF90}" type="datetimeFigureOut">
+              <a:rPr lang="en-US" smtClean="0"/>
+              <a:t>8/10/18</a:t>
+            </a:fld>
+            <a:endParaRPr lang="en-US" dirty="0"/>
+          </a:p>
+        </p:txBody>
+      </p:sp>
+      <p:sp>
+        <p:nvSpPr>
+          <p:cNvPr id="5" name="Footer Placeholder 4"/>
+          <p:cNvSpPr>
+            <a:spLocks noGrp="1"/>
+          </p:cNvSpPr>
+          <p:nvPr>
+            <p:ph type="ftr" sz="quarter" idx="11"/>
+          </p:nvPr>
+        </p:nvSpPr>
+        <p:spPr/>
+        <p:txBody>
+          <a:bodyPr/>
+          <a:lstStyle/>
+          <a:p>
+            <a:endParaRPr lang="en-US" dirty="0"/>
+          </a:p>
+        </p:txBody>
+      </p:sp>
+      <p:sp>
+        <p:nvSpPr>
+          <p:cNvPr id="6" name="Slide Number Placeholder 5"/>
+          <p:cNvSpPr>
+            <a:spLocks noGrp="1"/>
+          </p:cNvSpPr>
+          <p:nvPr>
+            <p:ph type="sldNum" sz="quarter" idx="12"/>
+          </p:nvPr>
+        </p:nvSpPr>
+        <p:spPr/>
+        <p:txBody>
+          <a:bodyPr/>
+          <a:lstStyle/>
+          <a:p>
+            <a:fld id="{48F63A3B-78C7-47BE-AE5E-E10140E04643}" type="slidenum">
+              <a:rPr lang="en-US" smtClean="0"/>
+              <a:t>‹#›</a:t>
+            </a:fld>
+            <a:endParaRPr lang="en-US" dirty="0"/>
+          </a:p>
+        </p:txBody>
+      </p:sp>
+    </p:spTree>
+    <p:extLst>
+      <p:ext uri="{BB962C8B-B14F-4D97-AF65-F5344CB8AC3E}">
+        <p14:creationId xmlns:p14="http://schemas.microsoft.com/office/powerpoint/2010/main" val="1703969526"/>
+      </p:ext>
+    </p:extLst>
+  </p:cSld>
+  <p:clrMapOvr>
+    <a:masterClrMapping/>
+  </p:clrMapOvr>
+  <p:hf hdr="0" ftr="0" dt="0"/>
+</p:sldLayout>
+</file>
+
+<file path=ppt/slideLayouts/slideLayout12.xml><?xml version="1.0" encoding="utf-8"?>
+<p:sldLayout xmlns:a="http://schemas.openxmlformats.org/drawingml/2006/main" xmlns:r="http://schemas.openxmlformats.org/officeDocument/2006/relationships" xmlns:p="http://schemas.openxmlformats.org/presentationml/2006/main" preserve="1" userDrawn="1">
+  <p:cSld name="1_Blank">
+    <p:spTree>
+      <p:nvGrpSpPr>
+        <p:cNvPr id="1" name=""/>
+        <p:cNvGrpSpPr/>
+        <p:nvPr/>
+      </p:nvGrpSpPr>
+      <p:grpSpPr>
+        <a:xfrm>
+          <a:off x="0" y="0"/>
+          <a:ext cx="0" cy="0"/>
+          <a:chOff x="0" y="0"/>
+          <a:chExt cx="0" cy="0"/>
+        </a:xfrm>
+      </p:grpSpPr>
+      <p:sp>
+        <p:nvSpPr>
           <p:cNvPr id="4" name="Slide Number Placeholder 5"/>
           <p:cNvSpPr>
             <a:spLocks noGrp="1"/>
@@ -493,8 +1038,8 @@
         </p:nvSpPr>
         <p:spPr>
           <a:xfrm>
-            <a:off x="9342120" y="6583680"/>
-            <a:ext cx="2743200" cy="274320"/>
+            <a:off x="3363407" y="2194561"/>
+            <a:ext cx="987624" cy="91440"/>
           </a:xfrm>
           <a:prstGeom prst="rect">
             <a:avLst/>
@@ -536,8 +1081,8 @@
         </p:nvSpPr>
         <p:spPr>
           <a:xfrm>
-            <a:off x="161109" y="6538277"/>
-            <a:ext cx="4114800" cy="365125"/>
+            <a:off x="58004" y="2179427"/>
+            <a:ext cx="1481435" cy="121708"/>
           </a:xfrm>
           <a:prstGeom prst="rect">
             <a:avLst/>
@@ -575,7 +1120,7 @@
 </p:sldLayout>
 </file>
 
-<file path=ppt/slideLayouts/slideLayout2.xml><?xml version="1.0" encoding="utf-8"?>
+<file path=ppt/slideLayouts/slideLayout13.xml><?xml version="1.0" encoding="utf-8"?>
 <p:sldLayout xmlns:a="http://schemas.openxmlformats.org/drawingml/2006/main" xmlns:r="http://schemas.openxmlformats.org/officeDocument/2006/relationships" xmlns:p="http://schemas.openxmlformats.org/presentationml/2006/main" preserve="1" userDrawn="1">
   <p:cSld name="Simple_Developer">
     <p:spTree>
@@ -604,8 +1149,8 @@
         </p:nvSpPr>
         <p:spPr>
           <a:xfrm>
-            <a:off x="9342120" y="6583680"/>
-            <a:ext cx="2743200" cy="274320"/>
+            <a:off x="3363407" y="2194561"/>
+            <a:ext cx="987624" cy="91440"/>
           </a:xfrm>
           <a:prstGeom prst="rect">
             <a:avLst/>
@@ -642,8 +1187,8 @@
         </p:nvSpPr>
         <p:spPr>
           <a:xfrm>
-            <a:off x="9342120" y="6583680"/>
-            <a:ext cx="2743200" cy="274320"/>
+            <a:off x="3363407" y="2194561"/>
+            <a:ext cx="987624" cy="91440"/>
           </a:xfrm>
           <a:prstGeom prst="rect">
             <a:avLst/>
@@ -748,11 +1293,11 @@
           </a:lstStyle>
           <a:p>
             <a:fld id="{FFF8894C-962F-4043-BDE4-6CA2ABEDD0B4}" type="slidenum">
-              <a:rPr lang="en-US" smtClean="0"/>
+              <a:rPr lang="en-US" sz="1200" smtClean="0"/>
               <a:pPr/>
               <a:t>‹#›</a:t>
             </a:fld>
-            <a:endParaRPr lang="en-US" dirty="0"/>
+            <a:endParaRPr lang="en-US" sz="1200" dirty="0"/>
           </a:p>
         </p:txBody>
       </p:sp>
@@ -778,8 +1323,8 @@
         </p:blipFill>
         <p:spPr>
           <a:xfrm>
-            <a:off x="0" y="0"/>
-            <a:ext cx="12192000" cy="6858000"/>
+            <a:off x="0" y="1"/>
+            <a:ext cx="4389438" cy="2286000"/>
           </a:xfrm>
           <a:prstGeom prst="rect">
             <a:avLst/>
@@ -799,7 +1344,7 @@
 </p:sldLayout>
 </file>
 
-<file path=ppt/slideLayouts/slideLayout3.xml><?xml version="1.0" encoding="utf-8"?>
+<file path=ppt/slideLayouts/slideLayout14.xml><?xml version="1.0" encoding="utf-8"?>
 <p:sldLayout xmlns:a="http://schemas.openxmlformats.org/drawingml/2006/main" xmlns:r="http://schemas.openxmlformats.org/officeDocument/2006/relationships" xmlns:p="http://schemas.openxmlformats.org/presentationml/2006/main" preserve="1" userDrawn="1">
   <p:cSld name="Simple_Hackathon">
     <p:spTree>
@@ -828,8 +1373,8 @@
         </p:nvSpPr>
         <p:spPr>
           <a:xfrm>
-            <a:off x="9342120" y="6583680"/>
-            <a:ext cx="2743200" cy="274320"/>
+            <a:off x="3363407" y="2194561"/>
+            <a:ext cx="987624" cy="91440"/>
           </a:xfrm>
           <a:prstGeom prst="rect">
             <a:avLst/>
@@ -866,8 +1411,8 @@
         </p:nvSpPr>
         <p:spPr>
           <a:xfrm>
-            <a:off x="9342120" y="6583680"/>
-            <a:ext cx="2743200" cy="274320"/>
+            <a:off x="3363407" y="2194561"/>
+            <a:ext cx="987624" cy="91440"/>
           </a:xfrm>
           <a:prstGeom prst="rect">
             <a:avLst/>
@@ -972,11 +1517,11 @@
           </a:lstStyle>
           <a:p>
             <a:fld id="{FFF8894C-962F-4043-BDE4-6CA2ABEDD0B4}" type="slidenum">
-              <a:rPr lang="en-US" smtClean="0"/>
+              <a:rPr lang="en-US" sz="1200" smtClean="0"/>
               <a:pPr/>
               <a:t>‹#›</a:t>
             </a:fld>
-            <a:endParaRPr lang="en-US" dirty="0"/>
+            <a:endParaRPr lang="en-US" sz="1200" dirty="0"/>
           </a:p>
         </p:txBody>
       </p:sp>
@@ -1002,8 +1547,8 @@
         </p:blipFill>
         <p:spPr>
           <a:xfrm>
-            <a:off x="0" y="0"/>
-            <a:ext cx="12192000" cy="6858000"/>
+            <a:off x="0" y="1"/>
+            <a:ext cx="4389438" cy="2286000"/>
           </a:xfrm>
           <a:prstGeom prst="rect">
             <a:avLst/>
@@ -1023,7 +1568,7 @@
 </p:sldLayout>
 </file>
 
-<file path=ppt/slideLayouts/slideLayout4.xml><?xml version="1.0" encoding="utf-8"?>
+<file path=ppt/slideLayouts/slideLayout15.xml><?xml version="1.0" encoding="utf-8"?>
 <p:sldLayout xmlns:a="http://schemas.openxmlformats.org/drawingml/2006/main" xmlns:r="http://schemas.openxmlformats.org/officeDocument/2006/relationships" xmlns:p="http://schemas.openxmlformats.org/presentationml/2006/main" preserve="1" userDrawn="1">
   <p:cSld name="Custom Layout">
     <p:spTree>
@@ -1045,7 +1590,7 @@
           <p:cNvPr id="3" name="Picture 2">
             <a:extLst>
               <a:ext uri="{FF2B5EF4-FFF2-40B4-BE49-F238E27FC236}">
-                <a16:creationId xmlns:a16="http://schemas.microsoft.com/office/drawing/2014/main" xmlns="" id="{4FD8317D-E5DC-48AE-B946-799BE935985E}"/>
+                <a16:creationId xmlns="" xmlns:a16="http://schemas.microsoft.com/office/drawing/2014/main" id="{4FD8317D-E5DC-48AE-B946-799BE935985E}"/>
               </a:ext>
             </a:extLst>
           </p:cNvPr>
@@ -1068,8 +1613,8 @@
         </p:blipFill>
         <p:spPr>
           <a:xfrm>
-            <a:off x="0" y="0"/>
-            <a:ext cx="12192000" cy="6858000"/>
+            <a:off x="0" y="1"/>
+            <a:ext cx="4389438" cy="2286000"/>
           </a:xfrm>
           <a:prstGeom prst="rect">
             <a:avLst/>
@@ -1081,7 +1626,7 @@
           <p:cNvPr id="5" name="Rectangle 4">
             <a:extLst>
               <a:ext uri="{FF2B5EF4-FFF2-40B4-BE49-F238E27FC236}">
-                <a16:creationId xmlns:a16="http://schemas.microsoft.com/office/drawing/2014/main" xmlns="" id="{C250DED9-2375-4F1F-B1BB-FFBC67D08FEA}"/>
+                <a16:creationId xmlns="" xmlns:a16="http://schemas.microsoft.com/office/drawing/2014/main" id="{C250DED9-2375-4F1F-B1BB-FFBC67D08FEA}"/>
               </a:ext>
             </a:extLst>
           </p:cNvPr>
@@ -1090,8 +1635,8 @@
         </p:nvSpPr>
         <p:spPr>
           <a:xfrm>
-            <a:off x="0" y="0"/>
-            <a:ext cx="12191999" cy="6857999"/>
+            <a:off x="0" y="2"/>
+            <a:ext cx="4389438" cy="2285999"/>
           </a:xfrm>
           <a:prstGeom prst="rect">
             <a:avLst/>
@@ -1126,7 +1671,7 @@
           <a:lstStyle/>
           <a:p>
             <a:pPr algn="ctr"/>
-            <a:endParaRPr lang="en-US"/>
+            <a:endParaRPr lang="en-US" sz="1037"/>
           </a:p>
         </p:txBody>
       </p:sp>
@@ -1143,7 +1688,7 @@
 </p:sldLayout>
 </file>
 
-<file path=ppt/slideLayouts/slideLayout5.xml><?xml version="1.0" encoding="utf-8"?>
+<file path=ppt/slideLayouts/slideLayout16.xml><?xml version="1.0" encoding="utf-8"?>
 <p:sldLayout xmlns:a="http://schemas.openxmlformats.org/drawingml/2006/main" xmlns:r="http://schemas.openxmlformats.org/officeDocument/2006/relationships" xmlns:p="http://schemas.openxmlformats.org/presentationml/2006/main" preserve="1" userDrawn="1">
   <p:cSld name="Simple_Design">
     <p:spTree>
@@ -1172,8 +1717,8 @@
         </p:nvSpPr>
         <p:spPr>
           <a:xfrm>
-            <a:off x="9342120" y="6583680"/>
-            <a:ext cx="2743200" cy="274320"/>
+            <a:off x="3363407" y="2194561"/>
+            <a:ext cx="987624" cy="91440"/>
           </a:xfrm>
           <a:prstGeom prst="rect">
             <a:avLst/>
@@ -1210,8 +1755,8 @@
         </p:nvSpPr>
         <p:spPr>
           <a:xfrm>
-            <a:off x="9342120" y="6583680"/>
-            <a:ext cx="2743200" cy="274320"/>
+            <a:off x="3363407" y="2194561"/>
+            <a:ext cx="987624" cy="91440"/>
           </a:xfrm>
           <a:prstGeom prst="rect">
             <a:avLst/>
@@ -1316,11 +1861,11 @@
           </a:lstStyle>
           <a:p>
             <a:fld id="{FFF8894C-962F-4043-BDE4-6CA2ABEDD0B4}" type="slidenum">
-              <a:rPr lang="en-US" smtClean="0"/>
+              <a:rPr lang="en-US" sz="1200" smtClean="0"/>
               <a:pPr/>
               <a:t>‹#›</a:t>
             </a:fld>
-            <a:endParaRPr lang="en-US" dirty="0"/>
+            <a:endParaRPr lang="en-US" sz="1200" dirty="0"/>
           </a:p>
         </p:txBody>
       </p:sp>
@@ -1346,8 +1891,8 @@
         </p:blipFill>
         <p:spPr>
           <a:xfrm>
-            <a:off x="0" y="0"/>
-            <a:ext cx="12192000" cy="6858000"/>
+            <a:off x="0" y="1"/>
+            <a:ext cx="4389438" cy="2286000"/>
           </a:xfrm>
           <a:prstGeom prst="rect">
             <a:avLst/>
@@ -1364,6 +1909,1776 @@
   <p:clrMapOvr>
     <a:masterClrMapping/>
   </p:clrMapOvr>
+</p:sldLayout>
+</file>
+
+<file path=ppt/slideLayouts/slideLayout2.xml><?xml version="1.0" encoding="utf-8"?>
+<p:sldLayout xmlns:a="http://schemas.openxmlformats.org/drawingml/2006/main" xmlns:r="http://schemas.openxmlformats.org/officeDocument/2006/relationships" xmlns:p="http://schemas.openxmlformats.org/presentationml/2006/main" type="obj" preserve="1">
+  <p:cSld name="Title and Content">
+    <p:spTree>
+      <p:nvGrpSpPr>
+        <p:cNvPr id="1" name=""/>
+        <p:cNvGrpSpPr/>
+        <p:nvPr/>
+      </p:nvGrpSpPr>
+      <p:grpSpPr>
+        <a:xfrm>
+          <a:off x="0" y="0"/>
+          <a:ext cx="0" cy="0"/>
+          <a:chOff x="0" y="0"/>
+          <a:chExt cx="0" cy="0"/>
+        </a:xfrm>
+      </p:grpSpPr>
+      <p:sp>
+        <p:nvSpPr>
+          <p:cNvPr id="2" name="Title 1"/>
+          <p:cNvSpPr>
+            <a:spLocks noGrp="1"/>
+          </p:cNvSpPr>
+          <p:nvPr>
+            <p:ph type="title"/>
+          </p:nvPr>
+        </p:nvSpPr>
+        <p:spPr/>
+        <p:txBody>
+          <a:bodyPr/>
+          <a:lstStyle/>
+          <a:p>
+            <a:r>
+              <a:rPr lang="en-US" smtClean="0"/>
+              <a:t>Click to edit Master title style</a:t>
+            </a:r>
+            <a:endParaRPr lang="en-US" dirty="0"/>
+          </a:p>
+        </p:txBody>
+      </p:sp>
+      <p:sp>
+        <p:nvSpPr>
+          <p:cNvPr id="3" name="Content Placeholder 2"/>
+          <p:cNvSpPr>
+            <a:spLocks noGrp="1"/>
+          </p:cNvSpPr>
+          <p:nvPr>
+            <p:ph idx="1"/>
+          </p:nvPr>
+        </p:nvSpPr>
+        <p:spPr/>
+        <p:txBody>
+          <a:bodyPr/>
+          <a:lstStyle/>
+          <a:p>
+            <a:pPr lvl="0"/>
+            <a:r>
+              <a:rPr lang="en-US" smtClean="0"/>
+              <a:t>Click to edit Master text styles</a:t>
+            </a:r>
+          </a:p>
+          <a:p>
+            <a:pPr lvl="1"/>
+            <a:r>
+              <a:rPr lang="en-US" smtClean="0"/>
+              <a:t>Second level</a:t>
+            </a:r>
+          </a:p>
+          <a:p>
+            <a:pPr lvl="2"/>
+            <a:r>
+              <a:rPr lang="en-US" smtClean="0"/>
+              <a:t>Third level</a:t>
+            </a:r>
+          </a:p>
+          <a:p>
+            <a:pPr lvl="3"/>
+            <a:r>
+              <a:rPr lang="en-US" smtClean="0"/>
+              <a:t>Fourth level</a:t>
+            </a:r>
+          </a:p>
+          <a:p>
+            <a:pPr lvl="4"/>
+            <a:r>
+              <a:rPr lang="en-US" smtClean="0"/>
+              <a:t>Fifth level</a:t>
+            </a:r>
+            <a:endParaRPr lang="en-US" dirty="0"/>
+          </a:p>
+        </p:txBody>
+      </p:sp>
+      <p:sp>
+        <p:nvSpPr>
+          <p:cNvPr id="4" name="Date Placeholder 3"/>
+          <p:cNvSpPr>
+            <a:spLocks noGrp="1"/>
+          </p:cNvSpPr>
+          <p:nvPr>
+            <p:ph type="dt" sz="half" idx="10"/>
+          </p:nvPr>
+        </p:nvSpPr>
+        <p:spPr/>
+        <p:txBody>
+          <a:bodyPr/>
+          <a:lstStyle/>
+          <a:p>
+            <a:fld id="{C764DE79-268F-4C1A-8933-263129D2AF90}" type="datetimeFigureOut">
+              <a:rPr lang="en-US" smtClean="0"/>
+              <a:t>8/10/18</a:t>
+            </a:fld>
+            <a:endParaRPr lang="en-US" dirty="0"/>
+          </a:p>
+        </p:txBody>
+      </p:sp>
+      <p:sp>
+        <p:nvSpPr>
+          <p:cNvPr id="5" name="Footer Placeholder 4"/>
+          <p:cNvSpPr>
+            <a:spLocks noGrp="1"/>
+          </p:cNvSpPr>
+          <p:nvPr>
+            <p:ph type="ftr" sz="quarter" idx="11"/>
+          </p:nvPr>
+        </p:nvSpPr>
+        <p:spPr/>
+        <p:txBody>
+          <a:bodyPr/>
+          <a:lstStyle/>
+          <a:p>
+            <a:endParaRPr lang="en-US" dirty="0"/>
+          </a:p>
+        </p:txBody>
+      </p:sp>
+      <p:sp>
+        <p:nvSpPr>
+          <p:cNvPr id="6" name="Slide Number Placeholder 5"/>
+          <p:cNvSpPr>
+            <a:spLocks noGrp="1"/>
+          </p:cNvSpPr>
+          <p:nvPr>
+            <p:ph type="sldNum" sz="quarter" idx="12"/>
+          </p:nvPr>
+        </p:nvSpPr>
+        <p:spPr/>
+        <p:txBody>
+          <a:bodyPr/>
+          <a:lstStyle/>
+          <a:p>
+            <a:fld id="{48F63A3B-78C7-47BE-AE5E-E10140E04643}" type="slidenum">
+              <a:rPr lang="en-US" smtClean="0"/>
+              <a:t>‹#›</a:t>
+            </a:fld>
+            <a:endParaRPr lang="en-US" dirty="0"/>
+          </a:p>
+        </p:txBody>
+      </p:sp>
+    </p:spTree>
+    <p:extLst>
+      <p:ext uri="{BB962C8B-B14F-4D97-AF65-F5344CB8AC3E}">
+        <p14:creationId xmlns:p14="http://schemas.microsoft.com/office/powerpoint/2010/main" val="912352660"/>
+      </p:ext>
+    </p:extLst>
+  </p:cSld>
+  <p:clrMapOvr>
+    <a:masterClrMapping/>
+  </p:clrMapOvr>
+  <p:hf hdr="0" ftr="0" dt="0"/>
+</p:sldLayout>
+</file>
+
+<file path=ppt/slideLayouts/slideLayout3.xml><?xml version="1.0" encoding="utf-8"?>
+<p:sldLayout xmlns:a="http://schemas.openxmlformats.org/drawingml/2006/main" xmlns:r="http://schemas.openxmlformats.org/officeDocument/2006/relationships" xmlns:p="http://schemas.openxmlformats.org/presentationml/2006/main" type="secHead" preserve="1">
+  <p:cSld name="Section Header">
+    <p:spTree>
+      <p:nvGrpSpPr>
+        <p:cNvPr id="1" name=""/>
+        <p:cNvGrpSpPr/>
+        <p:nvPr/>
+      </p:nvGrpSpPr>
+      <p:grpSpPr>
+        <a:xfrm>
+          <a:off x="0" y="0"/>
+          <a:ext cx="0" cy="0"/>
+          <a:chOff x="0" y="0"/>
+          <a:chExt cx="0" cy="0"/>
+        </a:xfrm>
+      </p:grpSpPr>
+      <p:sp>
+        <p:nvSpPr>
+          <p:cNvPr id="2" name="Title 1"/>
+          <p:cNvSpPr>
+            <a:spLocks noGrp="1"/>
+          </p:cNvSpPr>
+          <p:nvPr>
+            <p:ph type="title"/>
+          </p:nvPr>
+        </p:nvSpPr>
+        <p:spPr>
+          <a:xfrm>
+            <a:off x="299488" y="569913"/>
+            <a:ext cx="3785890" cy="950912"/>
+          </a:xfrm>
+        </p:spPr>
+        <p:txBody>
+          <a:bodyPr anchor="b"/>
+          <a:lstStyle>
+            <a:lvl1pPr>
+              <a:defRPr sz="2000"/>
+            </a:lvl1pPr>
+          </a:lstStyle>
+          <a:p>
+            <a:r>
+              <a:rPr lang="en-US" smtClean="0"/>
+              <a:t>Click to edit Master title style</a:t>
+            </a:r>
+            <a:endParaRPr lang="en-US" dirty="0"/>
+          </a:p>
+        </p:txBody>
+      </p:sp>
+      <p:sp>
+        <p:nvSpPr>
+          <p:cNvPr id="3" name="Text Placeholder 2"/>
+          <p:cNvSpPr>
+            <a:spLocks noGrp="1"/>
+          </p:cNvSpPr>
+          <p:nvPr>
+            <p:ph type="body" idx="1"/>
+          </p:nvPr>
+        </p:nvSpPr>
+        <p:spPr>
+          <a:xfrm>
+            <a:off x="299488" y="1529821"/>
+            <a:ext cx="3785890" cy="500062"/>
+          </a:xfrm>
+        </p:spPr>
+        <p:txBody>
+          <a:bodyPr/>
+          <a:lstStyle>
+            <a:lvl1pPr marL="0" indent="0">
+              <a:buNone/>
+              <a:defRPr sz="800">
+                <a:solidFill>
+                  <a:schemeClr val="tx1">
+                    <a:tint val="75000"/>
+                  </a:schemeClr>
+                </a:solidFill>
+              </a:defRPr>
+            </a:lvl1pPr>
+            <a:lvl2pPr marL="152385" indent="0">
+              <a:buNone/>
+              <a:defRPr sz="667">
+                <a:solidFill>
+                  <a:schemeClr val="tx1">
+                    <a:tint val="75000"/>
+                  </a:schemeClr>
+                </a:solidFill>
+              </a:defRPr>
+            </a:lvl2pPr>
+            <a:lvl3pPr marL="304770" indent="0">
+              <a:buNone/>
+              <a:defRPr sz="600">
+                <a:solidFill>
+                  <a:schemeClr val="tx1">
+                    <a:tint val="75000"/>
+                  </a:schemeClr>
+                </a:solidFill>
+              </a:defRPr>
+            </a:lvl3pPr>
+            <a:lvl4pPr marL="457154" indent="0">
+              <a:buNone/>
+              <a:defRPr sz="533">
+                <a:solidFill>
+                  <a:schemeClr val="tx1">
+                    <a:tint val="75000"/>
+                  </a:schemeClr>
+                </a:solidFill>
+              </a:defRPr>
+            </a:lvl4pPr>
+            <a:lvl5pPr marL="609539" indent="0">
+              <a:buNone/>
+              <a:defRPr sz="533">
+                <a:solidFill>
+                  <a:schemeClr val="tx1">
+                    <a:tint val="75000"/>
+                  </a:schemeClr>
+                </a:solidFill>
+              </a:defRPr>
+            </a:lvl5pPr>
+            <a:lvl6pPr marL="761924" indent="0">
+              <a:buNone/>
+              <a:defRPr sz="533">
+                <a:solidFill>
+                  <a:schemeClr val="tx1">
+                    <a:tint val="75000"/>
+                  </a:schemeClr>
+                </a:solidFill>
+              </a:defRPr>
+            </a:lvl6pPr>
+            <a:lvl7pPr marL="914309" indent="0">
+              <a:buNone/>
+              <a:defRPr sz="533">
+                <a:solidFill>
+                  <a:schemeClr val="tx1">
+                    <a:tint val="75000"/>
+                  </a:schemeClr>
+                </a:solidFill>
+              </a:defRPr>
+            </a:lvl7pPr>
+            <a:lvl8pPr marL="1066693" indent="0">
+              <a:buNone/>
+              <a:defRPr sz="533">
+                <a:solidFill>
+                  <a:schemeClr val="tx1">
+                    <a:tint val="75000"/>
+                  </a:schemeClr>
+                </a:solidFill>
+              </a:defRPr>
+            </a:lvl8pPr>
+            <a:lvl9pPr marL="1219078" indent="0">
+              <a:buNone/>
+              <a:defRPr sz="533">
+                <a:solidFill>
+                  <a:schemeClr val="tx1">
+                    <a:tint val="75000"/>
+                  </a:schemeClr>
+                </a:solidFill>
+              </a:defRPr>
+            </a:lvl9pPr>
+          </a:lstStyle>
+          <a:p>
+            <a:pPr lvl="0"/>
+            <a:r>
+              <a:rPr lang="en-US" smtClean="0"/>
+              <a:t>Click to edit Master text styles</a:t>
+            </a:r>
+          </a:p>
+        </p:txBody>
+      </p:sp>
+      <p:sp>
+        <p:nvSpPr>
+          <p:cNvPr id="4" name="Date Placeholder 3"/>
+          <p:cNvSpPr>
+            <a:spLocks noGrp="1"/>
+          </p:cNvSpPr>
+          <p:nvPr>
+            <p:ph type="dt" sz="half" idx="10"/>
+          </p:nvPr>
+        </p:nvSpPr>
+        <p:spPr/>
+        <p:txBody>
+          <a:bodyPr/>
+          <a:lstStyle/>
+          <a:p>
+            <a:fld id="{C764DE79-268F-4C1A-8933-263129D2AF90}" type="datetimeFigureOut">
+              <a:rPr lang="en-US" smtClean="0"/>
+              <a:t>8/10/18</a:t>
+            </a:fld>
+            <a:endParaRPr lang="en-US" dirty="0"/>
+          </a:p>
+        </p:txBody>
+      </p:sp>
+      <p:sp>
+        <p:nvSpPr>
+          <p:cNvPr id="5" name="Footer Placeholder 4"/>
+          <p:cNvSpPr>
+            <a:spLocks noGrp="1"/>
+          </p:cNvSpPr>
+          <p:nvPr>
+            <p:ph type="ftr" sz="quarter" idx="11"/>
+          </p:nvPr>
+        </p:nvSpPr>
+        <p:spPr/>
+        <p:txBody>
+          <a:bodyPr/>
+          <a:lstStyle/>
+          <a:p>
+            <a:endParaRPr lang="en-US" dirty="0"/>
+          </a:p>
+        </p:txBody>
+      </p:sp>
+      <p:sp>
+        <p:nvSpPr>
+          <p:cNvPr id="6" name="Slide Number Placeholder 5"/>
+          <p:cNvSpPr>
+            <a:spLocks noGrp="1"/>
+          </p:cNvSpPr>
+          <p:nvPr>
+            <p:ph type="sldNum" sz="quarter" idx="12"/>
+          </p:nvPr>
+        </p:nvSpPr>
+        <p:spPr/>
+        <p:txBody>
+          <a:bodyPr/>
+          <a:lstStyle/>
+          <a:p>
+            <a:fld id="{48F63A3B-78C7-47BE-AE5E-E10140E04643}" type="slidenum">
+              <a:rPr lang="en-US" smtClean="0"/>
+              <a:t>‹#›</a:t>
+            </a:fld>
+            <a:endParaRPr lang="en-US" dirty="0"/>
+          </a:p>
+        </p:txBody>
+      </p:sp>
+    </p:spTree>
+    <p:extLst>
+      <p:ext uri="{BB962C8B-B14F-4D97-AF65-F5344CB8AC3E}">
+        <p14:creationId xmlns:p14="http://schemas.microsoft.com/office/powerpoint/2010/main" val="877917040"/>
+      </p:ext>
+    </p:extLst>
+  </p:cSld>
+  <p:clrMapOvr>
+    <a:masterClrMapping/>
+  </p:clrMapOvr>
+  <p:hf hdr="0" ftr="0" dt="0"/>
+</p:sldLayout>
+</file>
+
+<file path=ppt/slideLayouts/slideLayout4.xml><?xml version="1.0" encoding="utf-8"?>
+<p:sldLayout xmlns:a="http://schemas.openxmlformats.org/drawingml/2006/main" xmlns:r="http://schemas.openxmlformats.org/officeDocument/2006/relationships" xmlns:p="http://schemas.openxmlformats.org/presentationml/2006/main" type="twoObj" preserve="1">
+  <p:cSld name="Two Content">
+    <p:spTree>
+      <p:nvGrpSpPr>
+        <p:cNvPr id="1" name=""/>
+        <p:cNvGrpSpPr/>
+        <p:nvPr/>
+      </p:nvGrpSpPr>
+      <p:grpSpPr>
+        <a:xfrm>
+          <a:off x="0" y="0"/>
+          <a:ext cx="0" cy="0"/>
+          <a:chOff x="0" y="0"/>
+          <a:chExt cx="0" cy="0"/>
+        </a:xfrm>
+      </p:grpSpPr>
+      <p:sp>
+        <p:nvSpPr>
+          <p:cNvPr id="2" name="Title 1"/>
+          <p:cNvSpPr>
+            <a:spLocks noGrp="1"/>
+          </p:cNvSpPr>
+          <p:nvPr>
+            <p:ph type="title"/>
+          </p:nvPr>
+        </p:nvSpPr>
+        <p:spPr/>
+        <p:txBody>
+          <a:bodyPr/>
+          <a:lstStyle/>
+          <a:p>
+            <a:r>
+              <a:rPr lang="en-US" smtClean="0"/>
+              <a:t>Click to edit Master title style</a:t>
+            </a:r>
+            <a:endParaRPr lang="en-US" dirty="0"/>
+          </a:p>
+        </p:txBody>
+      </p:sp>
+      <p:sp>
+        <p:nvSpPr>
+          <p:cNvPr id="3" name="Content Placeholder 2"/>
+          <p:cNvSpPr>
+            <a:spLocks noGrp="1"/>
+          </p:cNvSpPr>
+          <p:nvPr>
+            <p:ph sz="half" idx="1"/>
+          </p:nvPr>
+        </p:nvSpPr>
+        <p:spPr>
+          <a:xfrm>
+            <a:off x="301774" y="608542"/>
+            <a:ext cx="1865511" cy="1450446"/>
+          </a:xfrm>
+        </p:spPr>
+        <p:txBody>
+          <a:bodyPr/>
+          <a:lstStyle/>
+          <a:p>
+            <a:pPr lvl="0"/>
+            <a:r>
+              <a:rPr lang="en-US" smtClean="0"/>
+              <a:t>Click to edit Master text styles</a:t>
+            </a:r>
+          </a:p>
+          <a:p>
+            <a:pPr lvl="1"/>
+            <a:r>
+              <a:rPr lang="en-US" smtClean="0"/>
+              <a:t>Second level</a:t>
+            </a:r>
+          </a:p>
+          <a:p>
+            <a:pPr lvl="2"/>
+            <a:r>
+              <a:rPr lang="en-US" smtClean="0"/>
+              <a:t>Third level</a:t>
+            </a:r>
+          </a:p>
+          <a:p>
+            <a:pPr lvl="3"/>
+            <a:r>
+              <a:rPr lang="en-US" smtClean="0"/>
+              <a:t>Fourth level</a:t>
+            </a:r>
+          </a:p>
+          <a:p>
+            <a:pPr lvl="4"/>
+            <a:r>
+              <a:rPr lang="en-US" smtClean="0"/>
+              <a:t>Fifth level</a:t>
+            </a:r>
+            <a:endParaRPr lang="en-US" dirty="0"/>
+          </a:p>
+        </p:txBody>
+      </p:sp>
+      <p:sp>
+        <p:nvSpPr>
+          <p:cNvPr id="4" name="Content Placeholder 3"/>
+          <p:cNvSpPr>
+            <a:spLocks noGrp="1"/>
+          </p:cNvSpPr>
+          <p:nvPr>
+            <p:ph sz="half" idx="2"/>
+          </p:nvPr>
+        </p:nvSpPr>
+        <p:spPr>
+          <a:xfrm>
+            <a:off x="2222153" y="608542"/>
+            <a:ext cx="1865511" cy="1450446"/>
+          </a:xfrm>
+        </p:spPr>
+        <p:txBody>
+          <a:bodyPr/>
+          <a:lstStyle/>
+          <a:p>
+            <a:pPr lvl="0"/>
+            <a:r>
+              <a:rPr lang="en-US" smtClean="0"/>
+              <a:t>Click to edit Master text styles</a:t>
+            </a:r>
+          </a:p>
+          <a:p>
+            <a:pPr lvl="1"/>
+            <a:r>
+              <a:rPr lang="en-US" smtClean="0"/>
+              <a:t>Second level</a:t>
+            </a:r>
+          </a:p>
+          <a:p>
+            <a:pPr lvl="2"/>
+            <a:r>
+              <a:rPr lang="en-US" smtClean="0"/>
+              <a:t>Third level</a:t>
+            </a:r>
+          </a:p>
+          <a:p>
+            <a:pPr lvl="3"/>
+            <a:r>
+              <a:rPr lang="en-US" smtClean="0"/>
+              <a:t>Fourth level</a:t>
+            </a:r>
+          </a:p>
+          <a:p>
+            <a:pPr lvl="4"/>
+            <a:r>
+              <a:rPr lang="en-US" smtClean="0"/>
+              <a:t>Fifth level</a:t>
+            </a:r>
+            <a:endParaRPr lang="en-US" dirty="0"/>
+          </a:p>
+        </p:txBody>
+      </p:sp>
+      <p:sp>
+        <p:nvSpPr>
+          <p:cNvPr id="5" name="Date Placeholder 4"/>
+          <p:cNvSpPr>
+            <a:spLocks noGrp="1"/>
+          </p:cNvSpPr>
+          <p:nvPr>
+            <p:ph type="dt" sz="half" idx="10"/>
+          </p:nvPr>
+        </p:nvSpPr>
+        <p:spPr/>
+        <p:txBody>
+          <a:bodyPr/>
+          <a:lstStyle/>
+          <a:p>
+            <a:fld id="{C764DE79-268F-4C1A-8933-263129D2AF90}" type="datetimeFigureOut">
+              <a:rPr lang="en-US" smtClean="0"/>
+              <a:t>8/10/18</a:t>
+            </a:fld>
+            <a:endParaRPr lang="en-US" dirty="0"/>
+          </a:p>
+        </p:txBody>
+      </p:sp>
+      <p:sp>
+        <p:nvSpPr>
+          <p:cNvPr id="6" name="Footer Placeholder 5"/>
+          <p:cNvSpPr>
+            <a:spLocks noGrp="1"/>
+          </p:cNvSpPr>
+          <p:nvPr>
+            <p:ph type="ftr" sz="quarter" idx="11"/>
+          </p:nvPr>
+        </p:nvSpPr>
+        <p:spPr/>
+        <p:txBody>
+          <a:bodyPr/>
+          <a:lstStyle/>
+          <a:p>
+            <a:endParaRPr lang="en-US" dirty="0"/>
+          </a:p>
+        </p:txBody>
+      </p:sp>
+      <p:sp>
+        <p:nvSpPr>
+          <p:cNvPr id="7" name="Slide Number Placeholder 6"/>
+          <p:cNvSpPr>
+            <a:spLocks noGrp="1"/>
+          </p:cNvSpPr>
+          <p:nvPr>
+            <p:ph type="sldNum" sz="quarter" idx="12"/>
+          </p:nvPr>
+        </p:nvSpPr>
+        <p:spPr/>
+        <p:txBody>
+          <a:bodyPr/>
+          <a:lstStyle/>
+          <a:p>
+            <a:fld id="{48F63A3B-78C7-47BE-AE5E-E10140E04643}" type="slidenum">
+              <a:rPr lang="en-US" smtClean="0"/>
+              <a:t>‹#›</a:t>
+            </a:fld>
+            <a:endParaRPr lang="en-US" dirty="0"/>
+          </a:p>
+        </p:txBody>
+      </p:sp>
+    </p:spTree>
+    <p:extLst>
+      <p:ext uri="{BB962C8B-B14F-4D97-AF65-F5344CB8AC3E}">
+        <p14:creationId xmlns:p14="http://schemas.microsoft.com/office/powerpoint/2010/main" val="1939036390"/>
+      </p:ext>
+    </p:extLst>
+  </p:cSld>
+  <p:clrMapOvr>
+    <a:masterClrMapping/>
+  </p:clrMapOvr>
+  <p:hf hdr="0" ftr="0" dt="0"/>
+</p:sldLayout>
+</file>
+
+<file path=ppt/slideLayouts/slideLayout5.xml><?xml version="1.0" encoding="utf-8"?>
+<p:sldLayout xmlns:a="http://schemas.openxmlformats.org/drawingml/2006/main" xmlns:r="http://schemas.openxmlformats.org/officeDocument/2006/relationships" xmlns:p="http://schemas.openxmlformats.org/presentationml/2006/main" type="twoTxTwoObj" preserve="1">
+  <p:cSld name="Comparison">
+    <p:spTree>
+      <p:nvGrpSpPr>
+        <p:cNvPr id="1" name=""/>
+        <p:cNvGrpSpPr/>
+        <p:nvPr/>
+      </p:nvGrpSpPr>
+      <p:grpSpPr>
+        <a:xfrm>
+          <a:off x="0" y="0"/>
+          <a:ext cx="0" cy="0"/>
+          <a:chOff x="0" y="0"/>
+          <a:chExt cx="0" cy="0"/>
+        </a:xfrm>
+      </p:grpSpPr>
+      <p:sp>
+        <p:nvSpPr>
+          <p:cNvPr id="2" name="Title 1"/>
+          <p:cNvSpPr>
+            <a:spLocks noGrp="1"/>
+          </p:cNvSpPr>
+          <p:nvPr>
+            <p:ph type="title"/>
+          </p:nvPr>
+        </p:nvSpPr>
+        <p:spPr>
+          <a:xfrm>
+            <a:off x="302346" y="121709"/>
+            <a:ext cx="3785890" cy="441854"/>
+          </a:xfrm>
+        </p:spPr>
+        <p:txBody>
+          <a:bodyPr/>
+          <a:lstStyle/>
+          <a:p>
+            <a:r>
+              <a:rPr lang="en-US" smtClean="0"/>
+              <a:t>Click to edit Master title style</a:t>
+            </a:r>
+            <a:endParaRPr lang="en-US" dirty="0"/>
+          </a:p>
+        </p:txBody>
+      </p:sp>
+      <p:sp>
+        <p:nvSpPr>
+          <p:cNvPr id="3" name="Text Placeholder 2"/>
+          <p:cNvSpPr>
+            <a:spLocks noGrp="1"/>
+          </p:cNvSpPr>
+          <p:nvPr>
+            <p:ph type="body" idx="1"/>
+          </p:nvPr>
+        </p:nvSpPr>
+        <p:spPr>
+          <a:xfrm>
+            <a:off x="302346" y="560388"/>
+            <a:ext cx="1856938" cy="274637"/>
+          </a:xfrm>
+        </p:spPr>
+        <p:txBody>
+          <a:bodyPr anchor="b"/>
+          <a:lstStyle>
+            <a:lvl1pPr marL="0" indent="0">
+              <a:buNone/>
+              <a:defRPr sz="800" b="1"/>
+            </a:lvl1pPr>
+            <a:lvl2pPr marL="152385" indent="0">
+              <a:buNone/>
+              <a:defRPr sz="667" b="1"/>
+            </a:lvl2pPr>
+            <a:lvl3pPr marL="304770" indent="0">
+              <a:buNone/>
+              <a:defRPr sz="600" b="1"/>
+            </a:lvl3pPr>
+            <a:lvl4pPr marL="457154" indent="0">
+              <a:buNone/>
+              <a:defRPr sz="533" b="1"/>
+            </a:lvl4pPr>
+            <a:lvl5pPr marL="609539" indent="0">
+              <a:buNone/>
+              <a:defRPr sz="533" b="1"/>
+            </a:lvl5pPr>
+            <a:lvl6pPr marL="761924" indent="0">
+              <a:buNone/>
+              <a:defRPr sz="533" b="1"/>
+            </a:lvl6pPr>
+            <a:lvl7pPr marL="914309" indent="0">
+              <a:buNone/>
+              <a:defRPr sz="533" b="1"/>
+            </a:lvl7pPr>
+            <a:lvl8pPr marL="1066693" indent="0">
+              <a:buNone/>
+              <a:defRPr sz="533" b="1"/>
+            </a:lvl8pPr>
+            <a:lvl9pPr marL="1219078" indent="0">
+              <a:buNone/>
+              <a:defRPr sz="533" b="1"/>
+            </a:lvl9pPr>
+          </a:lstStyle>
+          <a:p>
+            <a:pPr lvl="0"/>
+            <a:r>
+              <a:rPr lang="en-US" smtClean="0"/>
+              <a:t>Click to edit Master text styles</a:t>
+            </a:r>
+          </a:p>
+        </p:txBody>
+      </p:sp>
+      <p:sp>
+        <p:nvSpPr>
+          <p:cNvPr id="4" name="Content Placeholder 3"/>
+          <p:cNvSpPr>
+            <a:spLocks noGrp="1"/>
+          </p:cNvSpPr>
+          <p:nvPr>
+            <p:ph sz="half" idx="2"/>
+          </p:nvPr>
+        </p:nvSpPr>
+        <p:spPr>
+          <a:xfrm>
+            <a:off x="302346" y="835025"/>
+            <a:ext cx="1856938" cy="1228196"/>
+          </a:xfrm>
+        </p:spPr>
+        <p:txBody>
+          <a:bodyPr/>
+          <a:lstStyle/>
+          <a:p>
+            <a:pPr lvl="0"/>
+            <a:r>
+              <a:rPr lang="en-US" smtClean="0"/>
+              <a:t>Click to edit Master text styles</a:t>
+            </a:r>
+          </a:p>
+          <a:p>
+            <a:pPr lvl="1"/>
+            <a:r>
+              <a:rPr lang="en-US" smtClean="0"/>
+              <a:t>Second level</a:t>
+            </a:r>
+          </a:p>
+          <a:p>
+            <a:pPr lvl="2"/>
+            <a:r>
+              <a:rPr lang="en-US" smtClean="0"/>
+              <a:t>Third level</a:t>
+            </a:r>
+          </a:p>
+          <a:p>
+            <a:pPr lvl="3"/>
+            <a:r>
+              <a:rPr lang="en-US" smtClean="0"/>
+              <a:t>Fourth level</a:t>
+            </a:r>
+          </a:p>
+          <a:p>
+            <a:pPr lvl="4"/>
+            <a:r>
+              <a:rPr lang="en-US" smtClean="0"/>
+              <a:t>Fifth level</a:t>
+            </a:r>
+            <a:endParaRPr lang="en-US" dirty="0"/>
+          </a:p>
+        </p:txBody>
+      </p:sp>
+      <p:sp>
+        <p:nvSpPr>
+          <p:cNvPr id="5" name="Text Placeholder 4"/>
+          <p:cNvSpPr>
+            <a:spLocks noGrp="1"/>
+          </p:cNvSpPr>
+          <p:nvPr>
+            <p:ph type="body" sz="quarter" idx="3"/>
+          </p:nvPr>
+        </p:nvSpPr>
+        <p:spPr>
+          <a:xfrm>
+            <a:off x="2222153" y="560388"/>
+            <a:ext cx="1866083" cy="274637"/>
+          </a:xfrm>
+        </p:spPr>
+        <p:txBody>
+          <a:bodyPr anchor="b"/>
+          <a:lstStyle>
+            <a:lvl1pPr marL="0" indent="0">
+              <a:buNone/>
+              <a:defRPr sz="800" b="1"/>
+            </a:lvl1pPr>
+            <a:lvl2pPr marL="152385" indent="0">
+              <a:buNone/>
+              <a:defRPr sz="667" b="1"/>
+            </a:lvl2pPr>
+            <a:lvl3pPr marL="304770" indent="0">
+              <a:buNone/>
+              <a:defRPr sz="600" b="1"/>
+            </a:lvl3pPr>
+            <a:lvl4pPr marL="457154" indent="0">
+              <a:buNone/>
+              <a:defRPr sz="533" b="1"/>
+            </a:lvl4pPr>
+            <a:lvl5pPr marL="609539" indent="0">
+              <a:buNone/>
+              <a:defRPr sz="533" b="1"/>
+            </a:lvl5pPr>
+            <a:lvl6pPr marL="761924" indent="0">
+              <a:buNone/>
+              <a:defRPr sz="533" b="1"/>
+            </a:lvl6pPr>
+            <a:lvl7pPr marL="914309" indent="0">
+              <a:buNone/>
+              <a:defRPr sz="533" b="1"/>
+            </a:lvl7pPr>
+            <a:lvl8pPr marL="1066693" indent="0">
+              <a:buNone/>
+              <a:defRPr sz="533" b="1"/>
+            </a:lvl8pPr>
+            <a:lvl9pPr marL="1219078" indent="0">
+              <a:buNone/>
+              <a:defRPr sz="533" b="1"/>
+            </a:lvl9pPr>
+          </a:lstStyle>
+          <a:p>
+            <a:pPr lvl="0"/>
+            <a:r>
+              <a:rPr lang="en-US" smtClean="0"/>
+              <a:t>Click to edit Master text styles</a:t>
+            </a:r>
+          </a:p>
+        </p:txBody>
+      </p:sp>
+      <p:sp>
+        <p:nvSpPr>
+          <p:cNvPr id="6" name="Content Placeholder 5"/>
+          <p:cNvSpPr>
+            <a:spLocks noGrp="1"/>
+          </p:cNvSpPr>
+          <p:nvPr>
+            <p:ph sz="quarter" idx="4"/>
+          </p:nvPr>
+        </p:nvSpPr>
+        <p:spPr>
+          <a:xfrm>
+            <a:off x="2222153" y="835025"/>
+            <a:ext cx="1866083" cy="1228196"/>
+          </a:xfrm>
+        </p:spPr>
+        <p:txBody>
+          <a:bodyPr/>
+          <a:lstStyle/>
+          <a:p>
+            <a:pPr lvl="0"/>
+            <a:r>
+              <a:rPr lang="en-US" smtClean="0"/>
+              <a:t>Click to edit Master text styles</a:t>
+            </a:r>
+          </a:p>
+          <a:p>
+            <a:pPr lvl="1"/>
+            <a:r>
+              <a:rPr lang="en-US" smtClean="0"/>
+              <a:t>Second level</a:t>
+            </a:r>
+          </a:p>
+          <a:p>
+            <a:pPr lvl="2"/>
+            <a:r>
+              <a:rPr lang="en-US" smtClean="0"/>
+              <a:t>Third level</a:t>
+            </a:r>
+          </a:p>
+          <a:p>
+            <a:pPr lvl="3"/>
+            <a:r>
+              <a:rPr lang="en-US" smtClean="0"/>
+              <a:t>Fourth level</a:t>
+            </a:r>
+          </a:p>
+          <a:p>
+            <a:pPr lvl="4"/>
+            <a:r>
+              <a:rPr lang="en-US" smtClean="0"/>
+              <a:t>Fifth level</a:t>
+            </a:r>
+            <a:endParaRPr lang="en-US" dirty="0"/>
+          </a:p>
+        </p:txBody>
+      </p:sp>
+      <p:sp>
+        <p:nvSpPr>
+          <p:cNvPr id="7" name="Date Placeholder 6"/>
+          <p:cNvSpPr>
+            <a:spLocks noGrp="1"/>
+          </p:cNvSpPr>
+          <p:nvPr>
+            <p:ph type="dt" sz="half" idx="10"/>
+          </p:nvPr>
+        </p:nvSpPr>
+        <p:spPr/>
+        <p:txBody>
+          <a:bodyPr/>
+          <a:lstStyle/>
+          <a:p>
+            <a:fld id="{C764DE79-268F-4C1A-8933-263129D2AF90}" type="datetimeFigureOut">
+              <a:rPr lang="en-US" smtClean="0"/>
+              <a:t>8/10/18</a:t>
+            </a:fld>
+            <a:endParaRPr lang="en-US" dirty="0"/>
+          </a:p>
+        </p:txBody>
+      </p:sp>
+      <p:sp>
+        <p:nvSpPr>
+          <p:cNvPr id="8" name="Footer Placeholder 7"/>
+          <p:cNvSpPr>
+            <a:spLocks noGrp="1"/>
+          </p:cNvSpPr>
+          <p:nvPr>
+            <p:ph type="ftr" sz="quarter" idx="11"/>
+          </p:nvPr>
+        </p:nvSpPr>
+        <p:spPr/>
+        <p:txBody>
+          <a:bodyPr/>
+          <a:lstStyle/>
+          <a:p>
+            <a:endParaRPr lang="en-US" dirty="0"/>
+          </a:p>
+        </p:txBody>
+      </p:sp>
+      <p:sp>
+        <p:nvSpPr>
+          <p:cNvPr id="9" name="Slide Number Placeholder 8"/>
+          <p:cNvSpPr>
+            <a:spLocks noGrp="1"/>
+          </p:cNvSpPr>
+          <p:nvPr>
+            <p:ph type="sldNum" sz="quarter" idx="12"/>
+          </p:nvPr>
+        </p:nvSpPr>
+        <p:spPr/>
+        <p:txBody>
+          <a:bodyPr/>
+          <a:lstStyle/>
+          <a:p>
+            <a:fld id="{48F63A3B-78C7-47BE-AE5E-E10140E04643}" type="slidenum">
+              <a:rPr lang="en-US" smtClean="0"/>
+              <a:t>‹#›</a:t>
+            </a:fld>
+            <a:endParaRPr lang="en-US" dirty="0"/>
+          </a:p>
+        </p:txBody>
+      </p:sp>
+    </p:spTree>
+    <p:extLst>
+      <p:ext uri="{BB962C8B-B14F-4D97-AF65-F5344CB8AC3E}">
+        <p14:creationId xmlns:p14="http://schemas.microsoft.com/office/powerpoint/2010/main" val="1320263505"/>
+      </p:ext>
+    </p:extLst>
+  </p:cSld>
+  <p:clrMapOvr>
+    <a:masterClrMapping/>
+  </p:clrMapOvr>
+  <p:hf hdr="0" ftr="0" dt="0"/>
+</p:sldLayout>
+</file>
+
+<file path=ppt/slideLayouts/slideLayout6.xml><?xml version="1.0" encoding="utf-8"?>
+<p:sldLayout xmlns:a="http://schemas.openxmlformats.org/drawingml/2006/main" xmlns:r="http://schemas.openxmlformats.org/officeDocument/2006/relationships" xmlns:p="http://schemas.openxmlformats.org/presentationml/2006/main" type="titleOnly" preserve="1">
+  <p:cSld name="Title Only">
+    <p:spTree>
+      <p:nvGrpSpPr>
+        <p:cNvPr id="1" name=""/>
+        <p:cNvGrpSpPr/>
+        <p:nvPr/>
+      </p:nvGrpSpPr>
+      <p:grpSpPr>
+        <a:xfrm>
+          <a:off x="0" y="0"/>
+          <a:ext cx="0" cy="0"/>
+          <a:chOff x="0" y="0"/>
+          <a:chExt cx="0" cy="0"/>
+        </a:xfrm>
+      </p:grpSpPr>
+      <p:sp>
+        <p:nvSpPr>
+          <p:cNvPr id="2" name="Title 1"/>
+          <p:cNvSpPr>
+            <a:spLocks noGrp="1"/>
+          </p:cNvSpPr>
+          <p:nvPr>
+            <p:ph type="title"/>
+          </p:nvPr>
+        </p:nvSpPr>
+        <p:spPr/>
+        <p:txBody>
+          <a:bodyPr/>
+          <a:lstStyle/>
+          <a:p>
+            <a:r>
+              <a:rPr lang="en-US" smtClean="0"/>
+              <a:t>Click to edit Master title style</a:t>
+            </a:r>
+            <a:endParaRPr lang="en-US" dirty="0"/>
+          </a:p>
+        </p:txBody>
+      </p:sp>
+      <p:sp>
+        <p:nvSpPr>
+          <p:cNvPr id="3" name="Date Placeholder 2"/>
+          <p:cNvSpPr>
+            <a:spLocks noGrp="1"/>
+          </p:cNvSpPr>
+          <p:nvPr>
+            <p:ph type="dt" sz="half" idx="10"/>
+          </p:nvPr>
+        </p:nvSpPr>
+        <p:spPr/>
+        <p:txBody>
+          <a:bodyPr/>
+          <a:lstStyle/>
+          <a:p>
+            <a:fld id="{C764DE79-268F-4C1A-8933-263129D2AF90}" type="datetimeFigureOut">
+              <a:rPr lang="en-US" smtClean="0"/>
+              <a:t>8/10/18</a:t>
+            </a:fld>
+            <a:endParaRPr lang="en-US" dirty="0"/>
+          </a:p>
+        </p:txBody>
+      </p:sp>
+      <p:sp>
+        <p:nvSpPr>
+          <p:cNvPr id="4" name="Footer Placeholder 3"/>
+          <p:cNvSpPr>
+            <a:spLocks noGrp="1"/>
+          </p:cNvSpPr>
+          <p:nvPr>
+            <p:ph type="ftr" sz="quarter" idx="11"/>
+          </p:nvPr>
+        </p:nvSpPr>
+        <p:spPr/>
+        <p:txBody>
+          <a:bodyPr/>
+          <a:lstStyle/>
+          <a:p>
+            <a:endParaRPr lang="en-US" dirty="0"/>
+          </a:p>
+        </p:txBody>
+      </p:sp>
+      <p:sp>
+        <p:nvSpPr>
+          <p:cNvPr id="5" name="Slide Number Placeholder 4"/>
+          <p:cNvSpPr>
+            <a:spLocks noGrp="1"/>
+          </p:cNvSpPr>
+          <p:nvPr>
+            <p:ph type="sldNum" sz="quarter" idx="12"/>
+          </p:nvPr>
+        </p:nvSpPr>
+        <p:spPr/>
+        <p:txBody>
+          <a:bodyPr/>
+          <a:lstStyle/>
+          <a:p>
+            <a:fld id="{48F63A3B-78C7-47BE-AE5E-E10140E04643}" type="slidenum">
+              <a:rPr lang="en-US" smtClean="0"/>
+              <a:t>‹#›</a:t>
+            </a:fld>
+            <a:endParaRPr lang="en-US" dirty="0"/>
+          </a:p>
+        </p:txBody>
+      </p:sp>
+    </p:spTree>
+    <p:extLst>
+      <p:ext uri="{BB962C8B-B14F-4D97-AF65-F5344CB8AC3E}">
+        <p14:creationId xmlns:p14="http://schemas.microsoft.com/office/powerpoint/2010/main" val="1867687731"/>
+      </p:ext>
+    </p:extLst>
+  </p:cSld>
+  <p:clrMapOvr>
+    <a:masterClrMapping/>
+  </p:clrMapOvr>
+  <p:hf hdr="0" ftr="0" dt="0"/>
+</p:sldLayout>
+</file>
+
+<file path=ppt/slideLayouts/slideLayout7.xml><?xml version="1.0" encoding="utf-8"?>
+<p:sldLayout xmlns:a="http://schemas.openxmlformats.org/drawingml/2006/main" xmlns:r="http://schemas.openxmlformats.org/officeDocument/2006/relationships" xmlns:p="http://schemas.openxmlformats.org/presentationml/2006/main" type="blank" preserve="1">
+  <p:cSld name="Blank">
+    <p:spTree>
+      <p:nvGrpSpPr>
+        <p:cNvPr id="1" name=""/>
+        <p:cNvGrpSpPr/>
+        <p:nvPr/>
+      </p:nvGrpSpPr>
+      <p:grpSpPr>
+        <a:xfrm>
+          <a:off x="0" y="0"/>
+          <a:ext cx="0" cy="0"/>
+          <a:chOff x="0" y="0"/>
+          <a:chExt cx="0" cy="0"/>
+        </a:xfrm>
+      </p:grpSpPr>
+      <p:sp>
+        <p:nvSpPr>
+          <p:cNvPr id="2" name="Date Placeholder 1"/>
+          <p:cNvSpPr>
+            <a:spLocks noGrp="1"/>
+          </p:cNvSpPr>
+          <p:nvPr>
+            <p:ph type="dt" sz="half" idx="10"/>
+          </p:nvPr>
+        </p:nvSpPr>
+        <p:spPr/>
+        <p:txBody>
+          <a:bodyPr/>
+          <a:lstStyle/>
+          <a:p>
+            <a:fld id="{C764DE79-268F-4C1A-8933-263129D2AF90}" type="datetimeFigureOut">
+              <a:rPr lang="en-US" smtClean="0"/>
+              <a:t>8/10/18</a:t>
+            </a:fld>
+            <a:endParaRPr lang="en-US" dirty="0"/>
+          </a:p>
+        </p:txBody>
+      </p:sp>
+      <p:sp>
+        <p:nvSpPr>
+          <p:cNvPr id="3" name="Footer Placeholder 2"/>
+          <p:cNvSpPr>
+            <a:spLocks noGrp="1"/>
+          </p:cNvSpPr>
+          <p:nvPr>
+            <p:ph type="ftr" sz="quarter" idx="11"/>
+          </p:nvPr>
+        </p:nvSpPr>
+        <p:spPr/>
+        <p:txBody>
+          <a:bodyPr/>
+          <a:lstStyle/>
+          <a:p>
+            <a:endParaRPr lang="en-US" dirty="0"/>
+          </a:p>
+        </p:txBody>
+      </p:sp>
+      <p:sp>
+        <p:nvSpPr>
+          <p:cNvPr id="4" name="Slide Number Placeholder 3"/>
+          <p:cNvSpPr>
+            <a:spLocks noGrp="1"/>
+          </p:cNvSpPr>
+          <p:nvPr>
+            <p:ph type="sldNum" sz="quarter" idx="12"/>
+          </p:nvPr>
+        </p:nvSpPr>
+        <p:spPr/>
+        <p:txBody>
+          <a:bodyPr/>
+          <a:lstStyle/>
+          <a:p>
+            <a:fld id="{FFF8894C-962F-4043-BDE4-6CA2ABEDD0B4}" type="slidenum">
+              <a:rPr lang="en-US" smtClean="0"/>
+              <a:pPr/>
+              <a:t>‹#›</a:t>
+            </a:fld>
+            <a:endParaRPr lang="en-US" dirty="0"/>
+          </a:p>
+        </p:txBody>
+      </p:sp>
+    </p:spTree>
+    <p:extLst>
+      <p:ext uri="{BB962C8B-B14F-4D97-AF65-F5344CB8AC3E}">
+        <p14:creationId xmlns:p14="http://schemas.microsoft.com/office/powerpoint/2010/main" val="459226718"/>
+      </p:ext>
+    </p:extLst>
+  </p:cSld>
+  <p:clrMapOvr>
+    <a:masterClrMapping/>
+  </p:clrMapOvr>
+</p:sldLayout>
+</file>
+
+<file path=ppt/slideLayouts/slideLayout8.xml><?xml version="1.0" encoding="utf-8"?>
+<p:sldLayout xmlns:a="http://schemas.openxmlformats.org/drawingml/2006/main" xmlns:r="http://schemas.openxmlformats.org/officeDocument/2006/relationships" xmlns:p="http://schemas.openxmlformats.org/presentationml/2006/main" type="objTx" preserve="1">
+  <p:cSld name="Content with Caption">
+    <p:spTree>
+      <p:nvGrpSpPr>
+        <p:cNvPr id="1" name=""/>
+        <p:cNvGrpSpPr/>
+        <p:nvPr/>
+      </p:nvGrpSpPr>
+      <p:grpSpPr>
+        <a:xfrm>
+          <a:off x="0" y="0"/>
+          <a:ext cx="0" cy="0"/>
+          <a:chOff x="0" y="0"/>
+          <a:chExt cx="0" cy="0"/>
+        </a:xfrm>
+      </p:grpSpPr>
+      <p:sp>
+        <p:nvSpPr>
+          <p:cNvPr id="2" name="Title 1"/>
+          <p:cNvSpPr>
+            <a:spLocks noGrp="1"/>
+          </p:cNvSpPr>
+          <p:nvPr>
+            <p:ph type="title"/>
+          </p:nvPr>
+        </p:nvSpPr>
+        <p:spPr>
+          <a:xfrm>
+            <a:off x="302346" y="152400"/>
+            <a:ext cx="1415708" cy="533400"/>
+          </a:xfrm>
+        </p:spPr>
+        <p:txBody>
+          <a:bodyPr anchor="b"/>
+          <a:lstStyle>
+            <a:lvl1pPr>
+              <a:defRPr sz="1067"/>
+            </a:lvl1pPr>
+          </a:lstStyle>
+          <a:p>
+            <a:r>
+              <a:rPr lang="en-US" smtClean="0"/>
+              <a:t>Click to edit Master title style</a:t>
+            </a:r>
+            <a:endParaRPr lang="en-US" dirty="0"/>
+          </a:p>
+        </p:txBody>
+      </p:sp>
+      <p:sp>
+        <p:nvSpPr>
+          <p:cNvPr id="3" name="Content Placeholder 2"/>
+          <p:cNvSpPr>
+            <a:spLocks noGrp="1"/>
+          </p:cNvSpPr>
+          <p:nvPr>
+            <p:ph idx="1"/>
+          </p:nvPr>
+        </p:nvSpPr>
+        <p:spPr>
+          <a:xfrm>
+            <a:off x="1866083" y="329142"/>
+            <a:ext cx="2222153" cy="1624542"/>
+          </a:xfrm>
+        </p:spPr>
+        <p:txBody>
+          <a:bodyPr/>
+          <a:lstStyle>
+            <a:lvl1pPr>
+              <a:defRPr sz="1067"/>
+            </a:lvl1pPr>
+            <a:lvl2pPr>
+              <a:defRPr sz="933"/>
+            </a:lvl2pPr>
+            <a:lvl3pPr>
+              <a:defRPr sz="800"/>
+            </a:lvl3pPr>
+            <a:lvl4pPr>
+              <a:defRPr sz="667"/>
+            </a:lvl4pPr>
+            <a:lvl5pPr>
+              <a:defRPr sz="667"/>
+            </a:lvl5pPr>
+            <a:lvl6pPr>
+              <a:defRPr sz="667"/>
+            </a:lvl6pPr>
+            <a:lvl7pPr>
+              <a:defRPr sz="667"/>
+            </a:lvl7pPr>
+            <a:lvl8pPr>
+              <a:defRPr sz="667"/>
+            </a:lvl8pPr>
+            <a:lvl9pPr>
+              <a:defRPr sz="667"/>
+            </a:lvl9pPr>
+          </a:lstStyle>
+          <a:p>
+            <a:pPr lvl="0"/>
+            <a:r>
+              <a:rPr lang="en-US" smtClean="0"/>
+              <a:t>Click to edit Master text styles</a:t>
+            </a:r>
+          </a:p>
+          <a:p>
+            <a:pPr lvl="1"/>
+            <a:r>
+              <a:rPr lang="en-US" smtClean="0"/>
+              <a:t>Second level</a:t>
+            </a:r>
+          </a:p>
+          <a:p>
+            <a:pPr lvl="2"/>
+            <a:r>
+              <a:rPr lang="en-US" smtClean="0"/>
+              <a:t>Third level</a:t>
+            </a:r>
+          </a:p>
+          <a:p>
+            <a:pPr lvl="3"/>
+            <a:r>
+              <a:rPr lang="en-US" smtClean="0"/>
+              <a:t>Fourth level</a:t>
+            </a:r>
+          </a:p>
+          <a:p>
+            <a:pPr lvl="4"/>
+            <a:r>
+              <a:rPr lang="en-US" smtClean="0"/>
+              <a:t>Fifth level</a:t>
+            </a:r>
+            <a:endParaRPr lang="en-US" dirty="0"/>
+          </a:p>
+        </p:txBody>
+      </p:sp>
+      <p:sp>
+        <p:nvSpPr>
+          <p:cNvPr id="4" name="Text Placeholder 3"/>
+          <p:cNvSpPr>
+            <a:spLocks noGrp="1"/>
+          </p:cNvSpPr>
+          <p:nvPr>
+            <p:ph type="body" sz="half" idx="2"/>
+          </p:nvPr>
+        </p:nvSpPr>
+        <p:spPr>
+          <a:xfrm>
+            <a:off x="302346" y="685800"/>
+            <a:ext cx="1415708" cy="1270529"/>
+          </a:xfrm>
+        </p:spPr>
+        <p:txBody>
+          <a:bodyPr/>
+          <a:lstStyle>
+            <a:lvl1pPr marL="0" indent="0">
+              <a:buNone/>
+              <a:defRPr sz="533"/>
+            </a:lvl1pPr>
+            <a:lvl2pPr marL="152385" indent="0">
+              <a:buNone/>
+              <a:defRPr sz="467"/>
+            </a:lvl2pPr>
+            <a:lvl3pPr marL="304770" indent="0">
+              <a:buNone/>
+              <a:defRPr sz="400"/>
+            </a:lvl3pPr>
+            <a:lvl4pPr marL="457154" indent="0">
+              <a:buNone/>
+              <a:defRPr sz="333"/>
+            </a:lvl4pPr>
+            <a:lvl5pPr marL="609539" indent="0">
+              <a:buNone/>
+              <a:defRPr sz="333"/>
+            </a:lvl5pPr>
+            <a:lvl6pPr marL="761924" indent="0">
+              <a:buNone/>
+              <a:defRPr sz="333"/>
+            </a:lvl6pPr>
+            <a:lvl7pPr marL="914309" indent="0">
+              <a:buNone/>
+              <a:defRPr sz="333"/>
+            </a:lvl7pPr>
+            <a:lvl8pPr marL="1066693" indent="0">
+              <a:buNone/>
+              <a:defRPr sz="333"/>
+            </a:lvl8pPr>
+            <a:lvl9pPr marL="1219078" indent="0">
+              <a:buNone/>
+              <a:defRPr sz="333"/>
+            </a:lvl9pPr>
+          </a:lstStyle>
+          <a:p>
+            <a:pPr lvl="0"/>
+            <a:r>
+              <a:rPr lang="en-US" smtClean="0"/>
+              <a:t>Click to edit Master text styles</a:t>
+            </a:r>
+          </a:p>
+        </p:txBody>
+      </p:sp>
+      <p:sp>
+        <p:nvSpPr>
+          <p:cNvPr id="5" name="Date Placeholder 4"/>
+          <p:cNvSpPr>
+            <a:spLocks noGrp="1"/>
+          </p:cNvSpPr>
+          <p:nvPr>
+            <p:ph type="dt" sz="half" idx="10"/>
+          </p:nvPr>
+        </p:nvSpPr>
+        <p:spPr/>
+        <p:txBody>
+          <a:bodyPr/>
+          <a:lstStyle/>
+          <a:p>
+            <a:fld id="{C764DE79-268F-4C1A-8933-263129D2AF90}" type="datetimeFigureOut">
+              <a:rPr lang="en-US" smtClean="0"/>
+              <a:t>8/10/18</a:t>
+            </a:fld>
+            <a:endParaRPr lang="en-US" dirty="0"/>
+          </a:p>
+        </p:txBody>
+      </p:sp>
+      <p:sp>
+        <p:nvSpPr>
+          <p:cNvPr id="6" name="Footer Placeholder 5"/>
+          <p:cNvSpPr>
+            <a:spLocks noGrp="1"/>
+          </p:cNvSpPr>
+          <p:nvPr>
+            <p:ph type="ftr" sz="quarter" idx="11"/>
+          </p:nvPr>
+        </p:nvSpPr>
+        <p:spPr/>
+        <p:txBody>
+          <a:bodyPr/>
+          <a:lstStyle/>
+          <a:p>
+            <a:endParaRPr lang="en-US" dirty="0"/>
+          </a:p>
+        </p:txBody>
+      </p:sp>
+      <p:sp>
+        <p:nvSpPr>
+          <p:cNvPr id="7" name="Slide Number Placeholder 6"/>
+          <p:cNvSpPr>
+            <a:spLocks noGrp="1"/>
+          </p:cNvSpPr>
+          <p:nvPr>
+            <p:ph type="sldNum" sz="quarter" idx="12"/>
+          </p:nvPr>
+        </p:nvSpPr>
+        <p:spPr/>
+        <p:txBody>
+          <a:bodyPr/>
+          <a:lstStyle/>
+          <a:p>
+            <a:fld id="{48F63A3B-78C7-47BE-AE5E-E10140E04643}" type="slidenum">
+              <a:rPr lang="en-US" smtClean="0"/>
+              <a:t>‹#›</a:t>
+            </a:fld>
+            <a:endParaRPr lang="en-US" dirty="0"/>
+          </a:p>
+        </p:txBody>
+      </p:sp>
+    </p:spTree>
+    <p:extLst>
+      <p:ext uri="{BB962C8B-B14F-4D97-AF65-F5344CB8AC3E}">
+        <p14:creationId xmlns:p14="http://schemas.microsoft.com/office/powerpoint/2010/main" val="167222108"/>
+      </p:ext>
+    </p:extLst>
+  </p:cSld>
+  <p:clrMapOvr>
+    <a:masterClrMapping/>
+  </p:clrMapOvr>
+  <p:hf hdr="0" ftr="0" dt="0"/>
+</p:sldLayout>
+</file>
+
+<file path=ppt/slideLayouts/slideLayout9.xml><?xml version="1.0" encoding="utf-8"?>
+<p:sldLayout xmlns:a="http://schemas.openxmlformats.org/drawingml/2006/main" xmlns:r="http://schemas.openxmlformats.org/officeDocument/2006/relationships" xmlns:p="http://schemas.openxmlformats.org/presentationml/2006/main" type="picTx" preserve="1">
+  <p:cSld name="Picture with Caption">
+    <p:spTree>
+      <p:nvGrpSpPr>
+        <p:cNvPr id="1" name=""/>
+        <p:cNvGrpSpPr/>
+        <p:nvPr/>
+      </p:nvGrpSpPr>
+      <p:grpSpPr>
+        <a:xfrm>
+          <a:off x="0" y="0"/>
+          <a:ext cx="0" cy="0"/>
+          <a:chOff x="0" y="0"/>
+          <a:chExt cx="0" cy="0"/>
+        </a:xfrm>
+      </p:grpSpPr>
+      <p:sp>
+        <p:nvSpPr>
+          <p:cNvPr id="2" name="Title 1"/>
+          <p:cNvSpPr>
+            <a:spLocks noGrp="1"/>
+          </p:cNvSpPr>
+          <p:nvPr>
+            <p:ph type="title"/>
+          </p:nvPr>
+        </p:nvSpPr>
+        <p:spPr>
+          <a:xfrm>
+            <a:off x="302346" y="152400"/>
+            <a:ext cx="1415708" cy="533400"/>
+          </a:xfrm>
+        </p:spPr>
+        <p:txBody>
+          <a:bodyPr anchor="b"/>
+          <a:lstStyle>
+            <a:lvl1pPr>
+              <a:defRPr sz="1067"/>
+            </a:lvl1pPr>
+          </a:lstStyle>
+          <a:p>
+            <a:r>
+              <a:rPr lang="en-US" smtClean="0"/>
+              <a:t>Click to edit Master title style</a:t>
+            </a:r>
+            <a:endParaRPr lang="en-US" dirty="0"/>
+          </a:p>
+        </p:txBody>
+      </p:sp>
+      <p:sp>
+        <p:nvSpPr>
+          <p:cNvPr id="3" name="Picture Placeholder 2"/>
+          <p:cNvSpPr>
+            <a:spLocks noGrp="1" noChangeAspect="1"/>
+          </p:cNvSpPr>
+          <p:nvPr>
+            <p:ph type="pic" idx="1"/>
+          </p:nvPr>
+        </p:nvSpPr>
+        <p:spPr>
+          <a:xfrm>
+            <a:off x="1866083" y="329142"/>
+            <a:ext cx="2222153" cy="1624542"/>
+          </a:xfrm>
+        </p:spPr>
+        <p:txBody>
+          <a:bodyPr anchor="t"/>
+          <a:lstStyle>
+            <a:lvl1pPr marL="0" indent="0">
+              <a:buNone/>
+              <a:defRPr sz="1067"/>
+            </a:lvl1pPr>
+            <a:lvl2pPr marL="152385" indent="0">
+              <a:buNone/>
+              <a:defRPr sz="933"/>
+            </a:lvl2pPr>
+            <a:lvl3pPr marL="304770" indent="0">
+              <a:buNone/>
+              <a:defRPr sz="800"/>
+            </a:lvl3pPr>
+            <a:lvl4pPr marL="457154" indent="0">
+              <a:buNone/>
+              <a:defRPr sz="667"/>
+            </a:lvl4pPr>
+            <a:lvl5pPr marL="609539" indent="0">
+              <a:buNone/>
+              <a:defRPr sz="667"/>
+            </a:lvl5pPr>
+            <a:lvl6pPr marL="761924" indent="0">
+              <a:buNone/>
+              <a:defRPr sz="667"/>
+            </a:lvl6pPr>
+            <a:lvl7pPr marL="914309" indent="0">
+              <a:buNone/>
+              <a:defRPr sz="667"/>
+            </a:lvl7pPr>
+            <a:lvl8pPr marL="1066693" indent="0">
+              <a:buNone/>
+              <a:defRPr sz="667"/>
+            </a:lvl8pPr>
+            <a:lvl9pPr marL="1219078" indent="0">
+              <a:buNone/>
+              <a:defRPr sz="667"/>
+            </a:lvl9pPr>
+          </a:lstStyle>
+          <a:p>
+            <a:r>
+              <a:rPr lang="en-US" smtClean="0"/>
+              <a:t>Drag picture to placeholder or click icon to add</a:t>
+            </a:r>
+            <a:endParaRPr lang="en-US" dirty="0"/>
+          </a:p>
+        </p:txBody>
+      </p:sp>
+      <p:sp>
+        <p:nvSpPr>
+          <p:cNvPr id="4" name="Text Placeholder 3"/>
+          <p:cNvSpPr>
+            <a:spLocks noGrp="1"/>
+          </p:cNvSpPr>
+          <p:nvPr>
+            <p:ph type="body" sz="half" idx="2"/>
+          </p:nvPr>
+        </p:nvSpPr>
+        <p:spPr>
+          <a:xfrm>
+            <a:off x="302346" y="685800"/>
+            <a:ext cx="1415708" cy="1270529"/>
+          </a:xfrm>
+        </p:spPr>
+        <p:txBody>
+          <a:bodyPr/>
+          <a:lstStyle>
+            <a:lvl1pPr marL="0" indent="0">
+              <a:buNone/>
+              <a:defRPr sz="533"/>
+            </a:lvl1pPr>
+            <a:lvl2pPr marL="152385" indent="0">
+              <a:buNone/>
+              <a:defRPr sz="467"/>
+            </a:lvl2pPr>
+            <a:lvl3pPr marL="304770" indent="0">
+              <a:buNone/>
+              <a:defRPr sz="400"/>
+            </a:lvl3pPr>
+            <a:lvl4pPr marL="457154" indent="0">
+              <a:buNone/>
+              <a:defRPr sz="333"/>
+            </a:lvl4pPr>
+            <a:lvl5pPr marL="609539" indent="0">
+              <a:buNone/>
+              <a:defRPr sz="333"/>
+            </a:lvl5pPr>
+            <a:lvl6pPr marL="761924" indent="0">
+              <a:buNone/>
+              <a:defRPr sz="333"/>
+            </a:lvl6pPr>
+            <a:lvl7pPr marL="914309" indent="0">
+              <a:buNone/>
+              <a:defRPr sz="333"/>
+            </a:lvl7pPr>
+            <a:lvl8pPr marL="1066693" indent="0">
+              <a:buNone/>
+              <a:defRPr sz="333"/>
+            </a:lvl8pPr>
+            <a:lvl9pPr marL="1219078" indent="0">
+              <a:buNone/>
+              <a:defRPr sz="333"/>
+            </a:lvl9pPr>
+          </a:lstStyle>
+          <a:p>
+            <a:pPr lvl="0"/>
+            <a:r>
+              <a:rPr lang="en-US" smtClean="0"/>
+              <a:t>Click to edit Master text styles</a:t>
+            </a:r>
+          </a:p>
+        </p:txBody>
+      </p:sp>
+      <p:sp>
+        <p:nvSpPr>
+          <p:cNvPr id="5" name="Date Placeholder 4"/>
+          <p:cNvSpPr>
+            <a:spLocks noGrp="1"/>
+          </p:cNvSpPr>
+          <p:nvPr>
+            <p:ph type="dt" sz="half" idx="10"/>
+          </p:nvPr>
+        </p:nvSpPr>
+        <p:spPr/>
+        <p:txBody>
+          <a:bodyPr/>
+          <a:lstStyle/>
+          <a:p>
+            <a:fld id="{C764DE79-268F-4C1A-8933-263129D2AF90}" type="datetimeFigureOut">
+              <a:rPr lang="en-US" smtClean="0"/>
+              <a:t>8/10/18</a:t>
+            </a:fld>
+            <a:endParaRPr lang="en-US" dirty="0"/>
+          </a:p>
+        </p:txBody>
+      </p:sp>
+      <p:sp>
+        <p:nvSpPr>
+          <p:cNvPr id="6" name="Footer Placeholder 5"/>
+          <p:cNvSpPr>
+            <a:spLocks noGrp="1"/>
+          </p:cNvSpPr>
+          <p:nvPr>
+            <p:ph type="ftr" sz="quarter" idx="11"/>
+          </p:nvPr>
+        </p:nvSpPr>
+        <p:spPr/>
+        <p:txBody>
+          <a:bodyPr/>
+          <a:lstStyle/>
+          <a:p>
+            <a:endParaRPr lang="en-US" dirty="0"/>
+          </a:p>
+        </p:txBody>
+      </p:sp>
+      <p:sp>
+        <p:nvSpPr>
+          <p:cNvPr id="7" name="Slide Number Placeholder 6"/>
+          <p:cNvSpPr>
+            <a:spLocks noGrp="1"/>
+          </p:cNvSpPr>
+          <p:nvPr>
+            <p:ph type="sldNum" sz="quarter" idx="12"/>
+          </p:nvPr>
+        </p:nvSpPr>
+        <p:spPr/>
+        <p:txBody>
+          <a:bodyPr/>
+          <a:lstStyle/>
+          <a:p>
+            <a:fld id="{48F63A3B-78C7-47BE-AE5E-E10140E04643}" type="slidenum">
+              <a:rPr lang="en-US" smtClean="0"/>
+              <a:t>‹#›</a:t>
+            </a:fld>
+            <a:endParaRPr lang="en-US" dirty="0"/>
+          </a:p>
+        </p:txBody>
+      </p:sp>
+    </p:spTree>
+    <p:extLst>
+      <p:ext uri="{BB962C8B-B14F-4D97-AF65-F5344CB8AC3E}">
+        <p14:creationId xmlns:p14="http://schemas.microsoft.com/office/powerpoint/2010/main" val="1593358880"/>
+      </p:ext>
+    </p:extLst>
+  </p:cSld>
+  <p:clrMapOvr>
+    <a:masterClrMapping/>
+  </p:clrMapOvr>
+  <p:hf hdr="0" ftr="0" dt="0"/>
 </p:sldLayout>
 </file>
 
@@ -1389,25 +3704,250 @@
           <a:chExt cx="0" cy="0"/>
         </a:xfrm>
       </p:grpSpPr>
+      <p:sp>
+        <p:nvSpPr>
+          <p:cNvPr id="2" name="Title Placeholder 1"/>
+          <p:cNvSpPr>
+            <a:spLocks noGrp="1"/>
+          </p:cNvSpPr>
+          <p:nvPr>
+            <p:ph type="title"/>
+          </p:nvPr>
+        </p:nvSpPr>
+        <p:spPr>
+          <a:xfrm>
+            <a:off x="301774" y="121709"/>
+            <a:ext cx="3785890" cy="441854"/>
+          </a:xfrm>
+          <a:prstGeom prst="rect">
+            <a:avLst/>
+          </a:prstGeom>
+        </p:spPr>
+        <p:txBody>
+          <a:bodyPr vert="horz" lIns="91440" tIns="45720" rIns="91440" bIns="45720" rtlCol="0" anchor="ctr">
+            <a:normAutofit/>
+          </a:bodyPr>
+          <a:lstStyle/>
+          <a:p>
+            <a:r>
+              <a:rPr lang="en-US" smtClean="0"/>
+              <a:t>Click to edit Master title style</a:t>
+            </a:r>
+            <a:endParaRPr lang="en-US" dirty="0"/>
+          </a:p>
+        </p:txBody>
+      </p:sp>
+      <p:sp>
+        <p:nvSpPr>
+          <p:cNvPr id="3" name="Text Placeholder 2"/>
+          <p:cNvSpPr>
+            <a:spLocks noGrp="1"/>
+          </p:cNvSpPr>
+          <p:nvPr>
+            <p:ph type="body" idx="1"/>
+          </p:nvPr>
+        </p:nvSpPr>
+        <p:spPr>
+          <a:xfrm>
+            <a:off x="301774" y="608542"/>
+            <a:ext cx="3785890" cy="1450446"/>
+          </a:xfrm>
+          <a:prstGeom prst="rect">
+            <a:avLst/>
+          </a:prstGeom>
+        </p:spPr>
+        <p:txBody>
+          <a:bodyPr vert="horz" lIns="91440" tIns="45720" rIns="91440" bIns="45720" rtlCol="0">
+            <a:normAutofit/>
+          </a:bodyPr>
+          <a:lstStyle/>
+          <a:p>
+            <a:pPr lvl="0"/>
+            <a:r>
+              <a:rPr lang="en-US" smtClean="0"/>
+              <a:t>Click to edit Master text styles</a:t>
+            </a:r>
+          </a:p>
+          <a:p>
+            <a:pPr lvl="1"/>
+            <a:r>
+              <a:rPr lang="en-US" smtClean="0"/>
+              <a:t>Second level</a:t>
+            </a:r>
+          </a:p>
+          <a:p>
+            <a:pPr lvl="2"/>
+            <a:r>
+              <a:rPr lang="en-US" smtClean="0"/>
+              <a:t>Third level</a:t>
+            </a:r>
+          </a:p>
+          <a:p>
+            <a:pPr lvl="3"/>
+            <a:r>
+              <a:rPr lang="en-US" smtClean="0"/>
+              <a:t>Fourth level</a:t>
+            </a:r>
+          </a:p>
+          <a:p>
+            <a:pPr lvl="4"/>
+            <a:r>
+              <a:rPr lang="en-US" smtClean="0"/>
+              <a:t>Fifth level</a:t>
+            </a:r>
+            <a:endParaRPr lang="en-US" dirty="0"/>
+          </a:p>
+        </p:txBody>
+      </p:sp>
+      <p:sp>
+        <p:nvSpPr>
+          <p:cNvPr id="4" name="Date Placeholder 3"/>
+          <p:cNvSpPr>
+            <a:spLocks noGrp="1"/>
+          </p:cNvSpPr>
+          <p:nvPr>
+            <p:ph type="dt" sz="half" idx="2"/>
+          </p:nvPr>
+        </p:nvSpPr>
+        <p:spPr>
+          <a:xfrm>
+            <a:off x="301774" y="2118784"/>
+            <a:ext cx="987624" cy="121708"/>
+          </a:xfrm>
+          <a:prstGeom prst="rect">
+            <a:avLst/>
+          </a:prstGeom>
+        </p:spPr>
+        <p:txBody>
+          <a:bodyPr vert="horz" lIns="91440" tIns="45720" rIns="91440" bIns="45720" rtlCol="0" anchor="ctr"/>
+          <a:lstStyle>
+            <a:lvl1pPr algn="l">
+              <a:defRPr sz="400">
+                <a:solidFill>
+                  <a:schemeClr val="tx1">
+                    <a:tint val="75000"/>
+                  </a:schemeClr>
+                </a:solidFill>
+              </a:defRPr>
+            </a:lvl1pPr>
+          </a:lstStyle>
+          <a:p>
+            <a:fld id="{C764DE79-268F-4C1A-8933-263129D2AF90}" type="datetimeFigureOut">
+              <a:rPr lang="en-US" smtClean="0"/>
+              <a:t>8/10/18</a:t>
+            </a:fld>
+            <a:endParaRPr lang="en-US" dirty="0"/>
+          </a:p>
+        </p:txBody>
+      </p:sp>
+      <p:sp>
+        <p:nvSpPr>
+          <p:cNvPr id="5" name="Footer Placeholder 4"/>
+          <p:cNvSpPr>
+            <a:spLocks noGrp="1"/>
+          </p:cNvSpPr>
+          <p:nvPr>
+            <p:ph type="ftr" sz="quarter" idx="3"/>
+          </p:nvPr>
+        </p:nvSpPr>
+        <p:spPr>
+          <a:xfrm>
+            <a:off x="1454002" y="2118784"/>
+            <a:ext cx="1481435" cy="121708"/>
+          </a:xfrm>
+          <a:prstGeom prst="rect">
+            <a:avLst/>
+          </a:prstGeom>
+        </p:spPr>
+        <p:txBody>
+          <a:bodyPr vert="horz" lIns="91440" tIns="45720" rIns="91440" bIns="45720" rtlCol="0" anchor="ctr"/>
+          <a:lstStyle>
+            <a:lvl1pPr algn="ctr">
+              <a:defRPr sz="400">
+                <a:solidFill>
+                  <a:schemeClr val="tx1">
+                    <a:tint val="75000"/>
+                  </a:schemeClr>
+                </a:solidFill>
+              </a:defRPr>
+            </a:lvl1pPr>
+          </a:lstStyle>
+          <a:p>
+            <a:endParaRPr lang="en-US" dirty="0"/>
+          </a:p>
+        </p:txBody>
+      </p:sp>
+      <p:sp>
+        <p:nvSpPr>
+          <p:cNvPr id="6" name="Slide Number Placeholder 5"/>
+          <p:cNvSpPr>
+            <a:spLocks noGrp="1"/>
+          </p:cNvSpPr>
+          <p:nvPr>
+            <p:ph type="sldNum" sz="quarter" idx="4"/>
+          </p:nvPr>
+        </p:nvSpPr>
+        <p:spPr>
+          <a:xfrm>
+            <a:off x="3100040" y="2118784"/>
+            <a:ext cx="987624" cy="121708"/>
+          </a:xfrm>
+          <a:prstGeom prst="rect">
+            <a:avLst/>
+          </a:prstGeom>
+        </p:spPr>
+        <p:txBody>
+          <a:bodyPr vert="horz" lIns="91440" tIns="45720" rIns="91440" bIns="45720" rtlCol="0" anchor="ctr"/>
+          <a:lstStyle>
+            <a:lvl1pPr algn="r">
+              <a:defRPr sz="400">
+                <a:solidFill>
+                  <a:schemeClr val="tx1">
+                    <a:tint val="75000"/>
+                  </a:schemeClr>
+                </a:solidFill>
+              </a:defRPr>
+            </a:lvl1pPr>
+          </a:lstStyle>
+          <a:p>
+            <a:fld id="{48F63A3B-78C7-47BE-AE5E-E10140E04643}" type="slidenum">
+              <a:rPr lang="en-US" smtClean="0"/>
+              <a:t>‹#›</a:t>
+            </a:fld>
+            <a:endParaRPr lang="en-US" dirty="0"/>
+          </a:p>
+        </p:txBody>
+      </p:sp>
     </p:spTree>
     <p:extLst>
       <p:ext uri="{BB962C8B-B14F-4D97-AF65-F5344CB8AC3E}">
-        <p14:creationId xmlns:p14="http://schemas.microsoft.com/office/powerpoint/2010/main" val="1064020481"/>
+        <p14:creationId xmlns:p14="http://schemas.microsoft.com/office/powerpoint/2010/main" val="1417119058"/>
       </p:ext>
     </p:extLst>
   </p:cSld>
   <p:clrMap bg1="lt1" tx1="dk1" bg2="lt2" tx2="dk2" accent1="accent1" accent2="accent2" accent3="accent3" accent4="accent4" accent5="accent5" accent6="accent6" hlink="hlink" folHlink="folHlink"/>
   <p:sldLayoutIdLst>
-    <p:sldLayoutId id="2147483681" r:id="rId1"/>
-    <p:sldLayoutId id="2147483682" r:id="rId2"/>
-    <p:sldLayoutId id="2147483683" r:id="rId3"/>
-    <p:sldLayoutId id="2147483686" r:id="rId4"/>
-    <p:sldLayoutId id="2147483684" r:id="rId5"/>
+    <p:sldLayoutId id="2147483748" r:id="rId1"/>
+    <p:sldLayoutId id="2147483749" r:id="rId2"/>
+    <p:sldLayoutId id="2147483750" r:id="rId3"/>
+    <p:sldLayoutId id="2147483751" r:id="rId4"/>
+    <p:sldLayoutId id="2147483752" r:id="rId5"/>
+    <p:sldLayoutId id="2147483753" r:id="rId6"/>
+    <p:sldLayoutId id="2147483754" r:id="rId7"/>
+    <p:sldLayoutId id="2147483755" r:id="rId8"/>
+    <p:sldLayoutId id="2147483756" r:id="rId9"/>
+    <p:sldLayoutId id="2147483757" r:id="rId10"/>
+    <p:sldLayoutId id="2147483758" r:id="rId11"/>
+    <p:sldLayoutId id="2147483681" r:id="rId12"/>
+    <p:sldLayoutId id="2147483682" r:id="rId13"/>
+    <p:sldLayoutId id="2147483683" r:id="rId14"/>
+    <p:sldLayoutId id="2147483686" r:id="rId15"/>
+    <p:sldLayoutId id="2147483684" r:id="rId16"/>
   </p:sldLayoutIdLst>
   <p:hf hdr="0" ftr="0" dt="0"/>
   <p:txStyles>
     <p:titleStyle>
-      <a:lvl1pPr algn="l" defTabSz="914400" rtl="0" eaLnBrk="1" latinLnBrk="0" hangingPunct="1">
+      <a:lvl1pPr algn="l" defTabSz="304770" rtl="0" eaLnBrk="1" latinLnBrk="0" hangingPunct="1">
         <a:lnSpc>
           <a:spcPct val="90000"/>
         </a:lnSpc>
@@ -1415,7 +3955,7 @@
           <a:spcPct val="0"/>
         </a:spcBef>
         <a:buNone/>
-        <a:defRPr sz="4400" kern="1200">
+        <a:defRPr sz="1467" kern="1200">
           <a:solidFill>
             <a:schemeClr val="tx1"/>
           </a:solidFill>
@@ -1426,16 +3966,16 @@
       </a:lvl1pPr>
     </p:titleStyle>
     <p:bodyStyle>
-      <a:lvl1pPr marL="228600" indent="-228600" algn="l" defTabSz="914400" rtl="0" eaLnBrk="1" latinLnBrk="0" hangingPunct="1">
+      <a:lvl1pPr marL="76192" indent="-76192" algn="l" defTabSz="304770" rtl="0" eaLnBrk="1" latinLnBrk="0" hangingPunct="1">
         <a:lnSpc>
           <a:spcPct val="90000"/>
         </a:lnSpc>
         <a:spcBef>
-          <a:spcPts val="1000"/>
+          <a:spcPts val="333"/>
         </a:spcBef>
-        <a:buFont typeface="Arial"/>
+        <a:buFont typeface="Arial" panose="020B0604020202020204" pitchFamily="34" charset="0"/>
         <a:buChar char="•"/>
-        <a:defRPr sz="2800" kern="1200">
+        <a:defRPr sz="933" kern="1200">
           <a:solidFill>
             <a:schemeClr val="tx1"/>
           </a:solidFill>
@@ -1444,16 +3984,16 @@
           <a:cs typeface="+mn-cs"/>
         </a:defRPr>
       </a:lvl1pPr>
-      <a:lvl2pPr marL="685800" indent="-228600" algn="l" defTabSz="914400" rtl="0" eaLnBrk="1" latinLnBrk="0" hangingPunct="1">
+      <a:lvl2pPr marL="228577" indent="-76192" algn="l" defTabSz="304770" rtl="0" eaLnBrk="1" latinLnBrk="0" hangingPunct="1">
         <a:lnSpc>
           <a:spcPct val="90000"/>
         </a:lnSpc>
         <a:spcBef>
-          <a:spcPts val="500"/>
+          <a:spcPts val="167"/>
         </a:spcBef>
-        <a:buFont typeface="Arial"/>
+        <a:buFont typeface="Arial" panose="020B0604020202020204" pitchFamily="34" charset="0"/>
         <a:buChar char="•"/>
-        <a:defRPr sz="2400" kern="1200">
+        <a:defRPr sz="800" kern="1200">
           <a:solidFill>
             <a:schemeClr val="tx1"/>
           </a:solidFill>
@@ -1462,16 +4002,16 @@
           <a:cs typeface="+mn-cs"/>
         </a:defRPr>
       </a:lvl2pPr>
-      <a:lvl3pPr marL="1143000" indent="-228600" algn="l" defTabSz="914400" rtl="0" eaLnBrk="1" latinLnBrk="0" hangingPunct="1">
+      <a:lvl3pPr marL="380962" indent="-76192" algn="l" defTabSz="304770" rtl="0" eaLnBrk="1" latinLnBrk="0" hangingPunct="1">
         <a:lnSpc>
           <a:spcPct val="90000"/>
         </a:lnSpc>
         <a:spcBef>
-          <a:spcPts val="500"/>
+          <a:spcPts val="167"/>
         </a:spcBef>
-        <a:buFont typeface="Arial"/>
+        <a:buFont typeface="Arial" panose="020B0604020202020204" pitchFamily="34" charset="0"/>
         <a:buChar char="•"/>
-        <a:defRPr sz="2000" kern="1200">
+        <a:defRPr sz="667" kern="1200">
           <a:solidFill>
             <a:schemeClr val="tx1"/>
           </a:solidFill>
@@ -1480,16 +4020,16 @@
           <a:cs typeface="+mn-cs"/>
         </a:defRPr>
       </a:lvl3pPr>
-      <a:lvl4pPr marL="1600200" indent="-228600" algn="l" defTabSz="914400" rtl="0" eaLnBrk="1" latinLnBrk="0" hangingPunct="1">
+      <a:lvl4pPr marL="533347" indent="-76192" algn="l" defTabSz="304770" rtl="0" eaLnBrk="1" latinLnBrk="0" hangingPunct="1">
         <a:lnSpc>
           <a:spcPct val="90000"/>
         </a:lnSpc>
         <a:spcBef>
-          <a:spcPts val="500"/>
+          <a:spcPts val="167"/>
         </a:spcBef>
-        <a:buFont typeface="Arial"/>
+        <a:buFont typeface="Arial" panose="020B0604020202020204" pitchFamily="34" charset="0"/>
         <a:buChar char="•"/>
-        <a:defRPr sz="1800" kern="1200">
+        <a:defRPr sz="600" kern="1200">
           <a:solidFill>
             <a:schemeClr val="tx1"/>
           </a:solidFill>
@@ -1498,16 +4038,16 @@
           <a:cs typeface="+mn-cs"/>
         </a:defRPr>
       </a:lvl4pPr>
-      <a:lvl5pPr marL="2057400" indent="-228600" algn="l" defTabSz="914400" rtl="0" eaLnBrk="1" latinLnBrk="0" hangingPunct="1">
+      <a:lvl5pPr marL="685731" indent="-76192" algn="l" defTabSz="304770" rtl="0" eaLnBrk="1" latinLnBrk="0" hangingPunct="1">
         <a:lnSpc>
           <a:spcPct val="90000"/>
         </a:lnSpc>
         <a:spcBef>
-          <a:spcPts val="500"/>
+          <a:spcPts val="167"/>
         </a:spcBef>
-        <a:buFont typeface="Arial"/>
+        <a:buFont typeface="Arial" panose="020B0604020202020204" pitchFamily="34" charset="0"/>
         <a:buChar char="•"/>
-        <a:defRPr sz="1800" kern="1200">
+        <a:defRPr sz="600" kern="1200">
           <a:solidFill>
             <a:schemeClr val="tx1"/>
           </a:solidFill>
@@ -1516,16 +4056,16 @@
           <a:cs typeface="+mn-cs"/>
         </a:defRPr>
       </a:lvl5pPr>
-      <a:lvl6pPr marL="2514600" indent="-228600" algn="l" defTabSz="914400" rtl="0" eaLnBrk="1" latinLnBrk="0" hangingPunct="1">
+      <a:lvl6pPr marL="838116" indent="-76192" algn="l" defTabSz="304770" rtl="0" eaLnBrk="1" latinLnBrk="0" hangingPunct="1">
         <a:lnSpc>
           <a:spcPct val="90000"/>
         </a:lnSpc>
         <a:spcBef>
-          <a:spcPts val="500"/>
+          <a:spcPts val="167"/>
         </a:spcBef>
-        <a:buFont typeface="Arial"/>
+        <a:buFont typeface="Arial" panose="020B0604020202020204" pitchFamily="34" charset="0"/>
         <a:buChar char="•"/>
-        <a:defRPr sz="1800" kern="1200">
+        <a:defRPr sz="600" kern="1200">
           <a:solidFill>
             <a:schemeClr val="tx1"/>
           </a:solidFill>
@@ -1534,16 +4074,16 @@
           <a:cs typeface="+mn-cs"/>
         </a:defRPr>
       </a:lvl6pPr>
-      <a:lvl7pPr marL="2971800" indent="-228600" algn="l" defTabSz="914400" rtl="0" eaLnBrk="1" latinLnBrk="0" hangingPunct="1">
+      <a:lvl7pPr marL="990501" indent="-76192" algn="l" defTabSz="304770" rtl="0" eaLnBrk="1" latinLnBrk="0" hangingPunct="1">
         <a:lnSpc>
           <a:spcPct val="90000"/>
         </a:lnSpc>
         <a:spcBef>
-          <a:spcPts val="500"/>
+          <a:spcPts val="167"/>
         </a:spcBef>
-        <a:buFont typeface="Arial"/>
+        <a:buFont typeface="Arial" panose="020B0604020202020204" pitchFamily="34" charset="0"/>
         <a:buChar char="•"/>
-        <a:defRPr sz="1800" kern="1200">
+        <a:defRPr sz="600" kern="1200">
           <a:solidFill>
             <a:schemeClr val="tx1"/>
           </a:solidFill>
@@ -1552,16 +4092,16 @@
           <a:cs typeface="+mn-cs"/>
         </a:defRPr>
       </a:lvl7pPr>
-      <a:lvl8pPr marL="3429000" indent="-228600" algn="l" defTabSz="914400" rtl="0" eaLnBrk="1" latinLnBrk="0" hangingPunct="1">
+      <a:lvl8pPr marL="1142886" indent="-76192" algn="l" defTabSz="304770" rtl="0" eaLnBrk="1" latinLnBrk="0" hangingPunct="1">
         <a:lnSpc>
           <a:spcPct val="90000"/>
         </a:lnSpc>
         <a:spcBef>
-          <a:spcPts val="500"/>
+          <a:spcPts val="167"/>
         </a:spcBef>
-        <a:buFont typeface="Arial"/>
+        <a:buFont typeface="Arial" panose="020B0604020202020204" pitchFamily="34" charset="0"/>
         <a:buChar char="•"/>
-        <a:defRPr sz="1800" kern="1200">
+        <a:defRPr sz="600" kern="1200">
           <a:solidFill>
             <a:schemeClr val="tx1"/>
           </a:solidFill>
@@ -1570,16 +4110,16 @@
           <a:cs typeface="+mn-cs"/>
         </a:defRPr>
       </a:lvl8pPr>
-      <a:lvl9pPr marL="3886200" indent="-228600" algn="l" defTabSz="914400" rtl="0" eaLnBrk="1" latinLnBrk="0" hangingPunct="1">
+      <a:lvl9pPr marL="1295270" indent="-76192" algn="l" defTabSz="304770" rtl="0" eaLnBrk="1" latinLnBrk="0" hangingPunct="1">
         <a:lnSpc>
           <a:spcPct val="90000"/>
         </a:lnSpc>
         <a:spcBef>
-          <a:spcPts val="500"/>
+          <a:spcPts val="167"/>
         </a:spcBef>
-        <a:buFont typeface="Arial"/>
+        <a:buFont typeface="Arial" panose="020B0604020202020204" pitchFamily="34" charset="0"/>
         <a:buChar char="•"/>
-        <a:defRPr sz="1800" kern="1200">
+        <a:defRPr sz="600" kern="1200">
           <a:solidFill>
             <a:schemeClr val="tx1"/>
           </a:solidFill>
@@ -1593,8 +4133,8 @@
       <a:defPPr>
         <a:defRPr lang="en-US"/>
       </a:defPPr>
-      <a:lvl1pPr marL="0" algn="l" defTabSz="914400" rtl="0" eaLnBrk="1" latinLnBrk="0" hangingPunct="1">
-        <a:defRPr sz="1800" kern="1200">
+      <a:lvl1pPr marL="0" algn="l" defTabSz="304770" rtl="0" eaLnBrk="1" latinLnBrk="0" hangingPunct="1">
+        <a:defRPr sz="600" kern="1200">
           <a:solidFill>
             <a:schemeClr val="tx1"/>
           </a:solidFill>
@@ -1603,8 +4143,8 @@
           <a:cs typeface="+mn-cs"/>
         </a:defRPr>
       </a:lvl1pPr>
-      <a:lvl2pPr marL="457200" algn="l" defTabSz="914400" rtl="0" eaLnBrk="1" latinLnBrk="0" hangingPunct="1">
-        <a:defRPr sz="1800" kern="1200">
+      <a:lvl2pPr marL="152385" algn="l" defTabSz="304770" rtl="0" eaLnBrk="1" latinLnBrk="0" hangingPunct="1">
+        <a:defRPr sz="600" kern="1200">
           <a:solidFill>
             <a:schemeClr val="tx1"/>
           </a:solidFill>
@@ -1613,8 +4153,8 @@
           <a:cs typeface="+mn-cs"/>
         </a:defRPr>
       </a:lvl2pPr>
-      <a:lvl3pPr marL="914400" algn="l" defTabSz="914400" rtl="0" eaLnBrk="1" latinLnBrk="0" hangingPunct="1">
-        <a:defRPr sz="1800" kern="1200">
+      <a:lvl3pPr marL="304770" algn="l" defTabSz="304770" rtl="0" eaLnBrk="1" latinLnBrk="0" hangingPunct="1">
+        <a:defRPr sz="600" kern="1200">
           <a:solidFill>
             <a:schemeClr val="tx1"/>
           </a:solidFill>
@@ -1623,8 +4163,8 @@
           <a:cs typeface="+mn-cs"/>
         </a:defRPr>
       </a:lvl3pPr>
-      <a:lvl4pPr marL="1371600" algn="l" defTabSz="914400" rtl="0" eaLnBrk="1" latinLnBrk="0" hangingPunct="1">
-        <a:defRPr sz="1800" kern="1200">
+      <a:lvl4pPr marL="457154" algn="l" defTabSz="304770" rtl="0" eaLnBrk="1" latinLnBrk="0" hangingPunct="1">
+        <a:defRPr sz="600" kern="1200">
           <a:solidFill>
             <a:schemeClr val="tx1"/>
           </a:solidFill>
@@ -1633,8 +4173,8 @@
           <a:cs typeface="+mn-cs"/>
         </a:defRPr>
       </a:lvl4pPr>
-      <a:lvl5pPr marL="1828800" algn="l" defTabSz="914400" rtl="0" eaLnBrk="1" latinLnBrk="0" hangingPunct="1">
-        <a:defRPr sz="1800" kern="1200">
+      <a:lvl5pPr marL="609539" algn="l" defTabSz="304770" rtl="0" eaLnBrk="1" latinLnBrk="0" hangingPunct="1">
+        <a:defRPr sz="600" kern="1200">
           <a:solidFill>
             <a:schemeClr val="tx1"/>
           </a:solidFill>
@@ -1643,8 +4183,8 @@
           <a:cs typeface="+mn-cs"/>
         </a:defRPr>
       </a:lvl5pPr>
-      <a:lvl6pPr marL="2286000" algn="l" defTabSz="914400" rtl="0" eaLnBrk="1" latinLnBrk="0" hangingPunct="1">
-        <a:defRPr sz="1800" kern="1200">
+      <a:lvl6pPr marL="761924" algn="l" defTabSz="304770" rtl="0" eaLnBrk="1" latinLnBrk="0" hangingPunct="1">
+        <a:defRPr sz="600" kern="1200">
           <a:solidFill>
             <a:schemeClr val="tx1"/>
           </a:solidFill>
@@ -1653,8 +4193,8 @@
           <a:cs typeface="+mn-cs"/>
         </a:defRPr>
       </a:lvl6pPr>
-      <a:lvl7pPr marL="2743200" algn="l" defTabSz="914400" rtl="0" eaLnBrk="1" latinLnBrk="0" hangingPunct="1">
-        <a:defRPr sz="1800" kern="1200">
+      <a:lvl7pPr marL="914309" algn="l" defTabSz="304770" rtl="0" eaLnBrk="1" latinLnBrk="0" hangingPunct="1">
+        <a:defRPr sz="600" kern="1200">
           <a:solidFill>
             <a:schemeClr val="tx1"/>
           </a:solidFill>
@@ -1663,8 +4203,8 @@
           <a:cs typeface="+mn-cs"/>
         </a:defRPr>
       </a:lvl7pPr>
-      <a:lvl8pPr marL="3200400" algn="l" defTabSz="914400" rtl="0" eaLnBrk="1" latinLnBrk="0" hangingPunct="1">
-        <a:defRPr sz="1800" kern="1200">
+      <a:lvl8pPr marL="1066693" algn="l" defTabSz="304770" rtl="0" eaLnBrk="1" latinLnBrk="0" hangingPunct="1">
+        <a:defRPr sz="600" kern="1200">
           <a:solidFill>
             <a:schemeClr val="tx1"/>
           </a:solidFill>
@@ -1673,8 +4213,8 @@
           <a:cs typeface="+mn-cs"/>
         </a:defRPr>
       </a:lvl8pPr>
-      <a:lvl9pPr marL="3657600" algn="l" defTabSz="914400" rtl="0" eaLnBrk="1" latinLnBrk="0" hangingPunct="1">
-        <a:defRPr sz="1800" kern="1200">
+      <a:lvl9pPr marL="1219078" algn="l" defTabSz="304770" rtl="0" eaLnBrk="1" latinLnBrk="0" hangingPunct="1">
+        <a:defRPr sz="600" kern="1200">
           <a:solidFill>
             <a:schemeClr val="tx1"/>
           </a:solidFill>
@@ -1689,7 +4229,7 @@
 </file>
 
 <file path=ppt/slides/slide1.xml><?xml version="1.0" encoding="utf-8"?>
-<p:sld xmlns:a="http://schemas.openxmlformats.org/drawingml/2006/main" xmlns:r="http://schemas.openxmlformats.org/officeDocument/2006/relationships" xmlns:p="http://schemas.openxmlformats.org/presentationml/2006/main">
+<p:sld xmlns:a="http://schemas.openxmlformats.org/drawingml/2006/main" xmlns:r="http://schemas.openxmlformats.org/officeDocument/2006/relationships" xmlns:p="http://schemas.openxmlformats.org/presentationml/2006/main" showMasterSp="0">
   <p:cSld>
     <p:spTree>
       <p:nvGrpSpPr>
@@ -1713,7 +4253,7 @@
         </p:nvSpPr>
         <p:spPr>
           <a:xfrm>
-            <a:off x="4184031" y="2971800"/>
+            <a:off x="466198" y="152400"/>
             <a:ext cx="3893169" cy="1981200"/>
           </a:xfrm>
           <a:prstGeom prst="rect">
@@ -1755,7 +4295,7 @@
           <a:lstStyle/>
           <a:p>
             <a:pPr algn="ctr"/>
-            <a:endParaRPr lang="en-US" sz="1400" smtClean="0">
+            <a:endParaRPr lang="en-US" sz="1400">
               <a:solidFill>
                 <a:schemeClr val="tx1">
                   <a:lumMod val="85000"/>
@@ -1763,30 +4303,6 @@
                 </a:schemeClr>
               </a:solidFill>
             </a:endParaRPr>
-          </a:p>
-        </p:txBody>
-      </p:sp>
-      <p:sp>
-        <p:nvSpPr>
-          <p:cNvPr id="2" name="Slide Number Placeholder 1"/>
-          <p:cNvSpPr>
-            <a:spLocks noGrp="1"/>
-          </p:cNvSpPr>
-          <p:nvPr>
-            <p:ph type="sldNum" sz="quarter" idx="12"/>
-          </p:nvPr>
-        </p:nvSpPr>
-        <p:spPr/>
-        <p:txBody>
-          <a:bodyPr/>
-          <a:lstStyle/>
-          <a:p>
-            <a:fld id="{FFF8894C-962F-4043-BDE4-6CA2ABEDD0B4}" type="slidenum">
-              <a:rPr lang="en-US" smtClean="0"/>
-              <a:pPr/>
-              <a:t>1</a:t>
-            </a:fld>
-            <a:endParaRPr lang="en-US" dirty="0"/>
           </a:p>
         </p:txBody>
       </p:sp>
@@ -1812,7 +4328,7 @@
         </p:blipFill>
         <p:spPr>
           <a:xfrm>
-            <a:off x="4579155" y="4277586"/>
+            <a:off x="861322" y="1458186"/>
             <a:ext cx="963357" cy="519102"/>
           </a:xfrm>
           <a:prstGeom prst="rect">
@@ -1842,7 +4358,7 @@
         </p:blipFill>
         <p:spPr>
           <a:xfrm>
-            <a:off x="4937627" y="3067816"/>
+            <a:off x="1219794" y="248421"/>
             <a:ext cx="944549" cy="578619"/>
           </a:xfrm>
           <a:prstGeom prst="rect">
@@ -1872,7 +4388,7 @@
         </p:blipFill>
         <p:spPr>
           <a:xfrm>
-            <a:off x="5007241" y="3759499"/>
+            <a:off x="1289408" y="940105"/>
             <a:ext cx="1170819" cy="491745"/>
           </a:xfrm>
           <a:prstGeom prst="rect">
@@ -1902,7 +4418,7 @@
         </p:blipFill>
         <p:spPr>
           <a:xfrm>
-            <a:off x="6974323" y="4390242"/>
+            <a:off x="3256490" y="1570848"/>
             <a:ext cx="722657" cy="380859"/>
           </a:xfrm>
           <a:prstGeom prst="rect">
@@ -1932,7 +4448,7 @@
         </p:blipFill>
         <p:spPr>
           <a:xfrm>
-            <a:off x="6042689" y="3411375"/>
+            <a:off x="2324850" y="591975"/>
             <a:ext cx="1027738" cy="359708"/>
           </a:xfrm>
           <a:prstGeom prst="rect">
@@ -1942,7 +4458,7 @@
       </p:pic>
       <p:pic>
         <p:nvPicPr>
-          <p:cNvPr id="12" name="Picture 11"/>
+          <p:cNvPr id="20" name="pasted-image.pdf" descr="pasted-image.pdf"/>
           <p:cNvPicPr>
             <a:picLocks noChangeAspect="1"/>
           </p:cNvPicPr>
@@ -1950,6 +4466,53 @@
         </p:nvPicPr>
         <p:blipFill>
           <a:blip r:embed="rId7">
+            <a:extLst>
+              <a:ext uri="{BEBA8EAE-BF5A-486C-A8C5-ECC9F3942E4B}">
+                <a14:imgProps xmlns:a14="http://schemas.microsoft.com/office/drawing/2010/main">
+                  <a14:imgLayer r:embed="rId8">
+                    <a14:imgEffect>
+                      <a14:colorTemperature colorTemp="5093"/>
+                    </a14:imgEffect>
+                  </a14:imgLayer>
+                </a14:imgProps>
+              </a:ext>
+            </a:extLst>
+          </a:blip>
+          <a:stretch>
+            <a:fillRect/>
+          </a:stretch>
+        </p:blipFill>
+        <p:spPr>
+          <a:xfrm>
+            <a:off x="30272" y="286200"/>
+            <a:ext cx="1089099" cy="1120396"/>
+          </a:xfrm>
+          <a:prstGeom prst="rect">
+            <a:avLst/>
+          </a:prstGeom>
+          <a:ln w="12700" cap="flat">
+            <a:noFill/>
+            <a:miter lim="400000"/>
+          </a:ln>
+          <a:effectLst>
+            <a:outerShdw blurRad="25400" dist="25400" dir="2700000" algn="tl" rotWithShape="0">
+              <a:prstClr val="black">
+                <a:alpha val="40000"/>
+              </a:prstClr>
+            </a:outerShdw>
+          </a:effectLst>
+        </p:spPr>
+      </p:pic>
+      <p:pic>
+        <p:nvPicPr>
+          <p:cNvPr id="35" name="Picture 34"/>
+          <p:cNvPicPr>
+            <a:picLocks noChangeAspect="1"/>
+          </p:cNvPicPr>
+          <p:nvPr/>
+        </p:nvPicPr>
+        <p:blipFill>
+          <a:blip r:embed="rId9">
             <a:extLst>
               <a:ext uri="{28A0092B-C50C-407E-A947-70E740481C1C}">
                 <a14:useLocalDpi xmlns:a14="http://schemas.microsoft.com/office/drawing/2010/main" val="0"/>
@@ -1962,173 +4525,17 @@
         </p:blipFill>
         <p:spPr>
           <a:xfrm>
-            <a:off x="6867545" y="3130617"/>
-            <a:ext cx="936212" cy="349182"/>
+            <a:off x="2174782" y="1431844"/>
+            <a:ext cx="889956" cy="416054"/>
           </a:xfrm>
           <a:prstGeom prst="rect">
             <a:avLst/>
           </a:prstGeom>
         </p:spPr>
       </p:pic>
-      <p:grpSp>
-        <p:nvGrpSpPr>
-          <p:cNvPr id="34" name="Group 33"/>
-          <p:cNvGrpSpPr/>
-          <p:nvPr/>
-        </p:nvGrpSpPr>
-        <p:grpSpPr>
-          <a:xfrm>
-            <a:off x="3630956" y="3251795"/>
-            <a:ext cx="1190730" cy="1277292"/>
-            <a:chOff x="3394677" y="1826131"/>
-            <a:chExt cx="1290821" cy="1384659"/>
-          </a:xfrm>
-        </p:grpSpPr>
-        <p:pic>
-          <p:nvPicPr>
-            <p:cNvPr id="19" name="pasted-image.pdf" descr="pasted-image.pdf"/>
-            <p:cNvPicPr>
-              <a:picLocks noChangeAspect="1"/>
-            </p:cNvPicPr>
-            <p:nvPr/>
-          </p:nvPicPr>
-          <p:blipFill>
-            <a:blip r:embed="rId8">
-              <a:extLst>
-                <a:ext uri="{BEBA8EAE-BF5A-486C-A8C5-ECC9F3942E4B}">
-                  <a14:imgProps xmlns:a14="http://schemas.microsoft.com/office/drawing/2010/main">
-                    <a14:imgLayer r:embed="rId9">
-                      <a14:imgEffect>
-                        <a14:colorTemperature colorTemp="5093"/>
-                      </a14:imgEffect>
-                    </a14:imgLayer>
-                  </a14:imgProps>
-                </a:ext>
-              </a:extLst>
-            </a:blip>
-            <a:stretch>
-              <a:fillRect/>
-            </a:stretch>
-          </p:blipFill>
-          <p:spPr>
-            <a:xfrm>
-              <a:off x="3614704" y="1826131"/>
-              <a:ext cx="1070794" cy="1101565"/>
-            </a:xfrm>
-            <a:prstGeom prst="rect">
-              <a:avLst/>
-            </a:prstGeom>
-            <a:ln w="12700" cap="flat">
-              <a:noFill/>
-              <a:miter lim="400000"/>
-            </a:ln>
-            <a:effectLst>
-              <a:outerShdw blurRad="25400" dist="25400" dir="2700000" algn="tl" rotWithShape="0">
-                <a:prstClr val="black">
-                  <a:alpha val="40000"/>
-                </a:prstClr>
-              </a:outerShdw>
-            </a:effectLst>
-          </p:spPr>
-        </p:pic>
-        <p:pic>
-          <p:nvPicPr>
-            <p:cNvPr id="20" name="pasted-image.pdf" descr="pasted-image.pdf"/>
-            <p:cNvPicPr>
-              <a:picLocks noChangeAspect="1"/>
-            </p:cNvPicPr>
-            <p:nvPr/>
-          </p:nvPicPr>
-          <p:blipFill>
-            <a:blip r:embed="rId8">
-              <a:extLst>
-                <a:ext uri="{BEBA8EAE-BF5A-486C-A8C5-ECC9F3942E4B}">
-                  <a14:imgProps xmlns:a14="http://schemas.microsoft.com/office/drawing/2010/main">
-                    <a14:imgLayer r:embed="rId9">
-                      <a14:imgEffect>
-                        <a14:colorTemperature colorTemp="5093"/>
-                      </a14:imgEffect>
-                    </a14:imgLayer>
-                  </a14:imgProps>
-                </a:ext>
-              </a:extLst>
-            </a:blip>
-            <a:stretch>
-              <a:fillRect/>
-            </a:stretch>
-          </p:blipFill>
-          <p:spPr>
-            <a:xfrm>
-              <a:off x="3494416" y="1978783"/>
-              <a:ext cx="1070794" cy="1101565"/>
-            </a:xfrm>
-            <a:prstGeom prst="rect">
-              <a:avLst/>
-            </a:prstGeom>
-            <a:ln w="12700" cap="flat">
-              <a:noFill/>
-              <a:miter lim="400000"/>
-            </a:ln>
-            <a:effectLst>
-              <a:outerShdw blurRad="25400" dist="25400" dir="2700000" algn="tl" rotWithShape="0">
-                <a:prstClr val="black">
-                  <a:alpha val="40000"/>
-                </a:prstClr>
-              </a:outerShdw>
-            </a:effectLst>
-          </p:spPr>
-        </p:pic>
-        <p:pic>
-          <p:nvPicPr>
-            <p:cNvPr id="21" name="pasted-image.pdf" descr="pasted-image.pdf"/>
-            <p:cNvPicPr>
-              <a:picLocks noChangeAspect="1"/>
-            </p:cNvPicPr>
-            <p:nvPr/>
-          </p:nvPicPr>
-          <p:blipFill>
-            <a:blip r:embed="rId8">
-              <a:extLst>
-                <a:ext uri="{BEBA8EAE-BF5A-486C-A8C5-ECC9F3942E4B}">
-                  <a14:imgProps xmlns:a14="http://schemas.microsoft.com/office/drawing/2010/main">
-                    <a14:imgLayer r:embed="rId9">
-                      <a14:imgEffect>
-                        <a14:colorTemperature colorTemp="5093"/>
-                      </a14:imgEffect>
-                    </a14:imgLayer>
-                  </a14:imgProps>
-                </a:ext>
-              </a:extLst>
-            </a:blip>
-            <a:stretch>
-              <a:fillRect/>
-            </a:stretch>
-          </p:blipFill>
-          <p:spPr>
-            <a:xfrm>
-              <a:off x="3394677" y="2109225"/>
-              <a:ext cx="1070794" cy="1101565"/>
-            </a:xfrm>
-            <a:prstGeom prst="rect">
-              <a:avLst/>
-            </a:prstGeom>
-            <a:ln w="12700" cap="flat">
-              <a:noFill/>
-              <a:miter lim="400000"/>
-            </a:ln>
-            <a:effectLst>
-              <a:outerShdw blurRad="25400" dist="25400" dir="2700000" algn="tl" rotWithShape="0">
-                <a:prstClr val="black">
-                  <a:alpha val="40000"/>
-                </a:prstClr>
-              </a:outerShdw>
-            </a:effectLst>
-          </p:spPr>
-        </p:pic>
-      </p:grpSp>
       <p:pic>
         <p:nvPicPr>
-          <p:cNvPr id="35" name="Picture 34"/>
+          <p:cNvPr id="37" name="Picture 36"/>
           <p:cNvPicPr>
             <a:picLocks noChangeAspect="1"/>
           </p:cNvPicPr>
@@ -2148,8 +4555,8 @@
         </p:blipFill>
         <p:spPr>
           <a:xfrm>
-            <a:off x="5892621" y="4251244"/>
-            <a:ext cx="889956" cy="416054"/>
+            <a:off x="2800300" y="1031725"/>
+            <a:ext cx="1363881" cy="324591"/>
           </a:xfrm>
           <a:prstGeom prst="rect">
             <a:avLst/>
@@ -2158,7 +4565,7 @@
       </p:pic>
       <p:pic>
         <p:nvPicPr>
-          <p:cNvPr id="37" name="Picture 36"/>
+          <p:cNvPr id="16" name="Picture 15"/>
           <p:cNvPicPr>
             <a:picLocks noChangeAspect="1"/>
           </p:cNvPicPr>
@@ -2178,12 +4585,19 @@
         </p:blipFill>
         <p:spPr>
           <a:xfrm>
-            <a:off x="6518133" y="3851119"/>
-            <a:ext cx="1363881" cy="324591"/>
+            <a:off x="3283614" y="297443"/>
+            <a:ext cx="838177" cy="428992"/>
           </a:xfrm>
           <a:prstGeom prst="rect">
             <a:avLst/>
           </a:prstGeom>
+          <a:effectLst>
+            <a:outerShdw dist="12700" dir="2700000" algn="tl" rotWithShape="0">
+              <a:schemeClr val="bg1">
+                <a:alpha val="40000"/>
+              </a:schemeClr>
+            </a:outerShdw>
+          </a:effectLst>
         </p:spPr>
       </p:pic>
     </p:spTree>
@@ -2202,7 +4616,7 @@
 <file path=ppt/theme/theme1.xml><?xml version="1.0" encoding="utf-8"?>
 <a:theme xmlns:a="http://schemas.openxmlformats.org/drawingml/2006/main" name="Office Theme">
   <a:themeElements>
-    <a:clrScheme name="Custom 7">
+    <a:clrScheme name="Office Theme">
       <a:dk1>
         <a:sysClr val="windowText" lastClr="000000"/>
       </a:dk1>
@@ -2210,52 +4624,52 @@
         <a:sysClr val="window" lastClr="FFFFFF"/>
       </a:lt1>
       <a:dk2>
-        <a:srgbClr val="455F51"/>
+        <a:srgbClr val="44546A"/>
       </a:dk2>
       <a:lt2>
-        <a:srgbClr val="E2DFCC"/>
+        <a:srgbClr val="E7E6E6"/>
       </a:lt2>
       <a:accent1>
-        <a:srgbClr val="99CB38"/>
+        <a:srgbClr val="5B9BD5"/>
       </a:accent1>
       <a:accent2>
-        <a:srgbClr val="63A537"/>
+        <a:srgbClr val="ED7D31"/>
       </a:accent2>
       <a:accent3>
-        <a:srgbClr val="37A76F"/>
+        <a:srgbClr val="A5A5A5"/>
       </a:accent3>
       <a:accent4>
-        <a:srgbClr val="44C1A3"/>
+        <a:srgbClr val="FFC000"/>
       </a:accent4>
       <a:accent5>
-        <a:srgbClr val="4EB3CF"/>
+        <a:srgbClr val="4472C4"/>
       </a:accent5>
       <a:accent6>
-        <a:srgbClr val="51C3F9"/>
+        <a:srgbClr val="70AD47"/>
       </a:accent6>
       <a:hlink>
-        <a:srgbClr val="455F51"/>
+        <a:srgbClr val="0563C1"/>
       </a:hlink>
       <a:folHlink>
-        <a:srgbClr val="977B2D"/>
+        <a:srgbClr val="954F72"/>
       </a:folHlink>
     </a:clrScheme>
-    <a:fontScheme name="Arial">
+    <a:fontScheme name="Office Theme">
       <a:majorFont>
-        <a:latin typeface="Arial" panose="020B0604020202020204"/>
+        <a:latin typeface="Calibri Light" panose="020F0302020204030204"/>
         <a:ea typeface=""/>
         <a:cs typeface=""/>
         <a:font script="Jpan" typeface="ＭＳ Ｐゴシック"/>
-        <a:font script="Hang" typeface="굴림"/>
-        <a:font script="Hans" typeface="黑体"/>
-        <a:font script="Hant" typeface="微軟正黑體"/>
-        <a:font script="Arab" typeface="Arial"/>
-        <a:font script="Hebr" typeface="Arial"/>
-        <a:font script="Thai" typeface="Cordia New"/>
+        <a:font script="Hang" typeface="맑은 고딕"/>
+        <a:font script="Hans" typeface="宋体"/>
+        <a:font script="Hant" typeface="新細明體"/>
+        <a:font script="Arab" typeface="Times New Roman"/>
+        <a:font script="Hebr" typeface="Times New Roman"/>
+        <a:font script="Thai" typeface="Angsana New"/>
         <a:font script="Ethi" typeface="Nyala"/>
         <a:font script="Beng" typeface="Vrinda"/>
         <a:font script="Gujr" typeface="Shruti"/>
-        <a:font script="Khmr" typeface="DaunPenh"/>
+        <a:font script="Khmr" typeface="MoolBoran"/>
         <a:font script="Knda" typeface="Tunga"/>
         <a:font script="Guru" typeface="Raavi"/>
         <a:font script="Cans" typeface="Euphemia"/>
@@ -2272,18 +4686,18 @@
         <a:font script="Laoo" typeface="DokChampa"/>
         <a:font script="Sinh" typeface="Iskoola Pota"/>
         <a:font script="Mong" typeface="Mongolian Baiti"/>
-        <a:font script="Viet" typeface="Arial"/>
+        <a:font script="Viet" typeface="Times New Roman"/>
         <a:font script="Uigh" typeface="Microsoft Uighur"/>
         <a:font script="Geor" typeface="Sylfaen"/>
       </a:majorFont>
       <a:minorFont>
-        <a:latin typeface="Arial" panose="020B0604020202020204"/>
+        <a:latin typeface="Calibri" panose="020F0502020204030204"/>
         <a:ea typeface=""/>
         <a:cs typeface=""/>
         <a:font script="Jpan" typeface="ＭＳ Ｐゴシック"/>
-        <a:font script="Hang" typeface="굴림"/>
-        <a:font script="Hans" typeface="黑体"/>
-        <a:font script="Hant" typeface="微軟正黑體"/>
+        <a:font script="Hang" typeface="맑은 고딕"/>
+        <a:font script="Hans" typeface="宋体"/>
+        <a:font script="Hant" typeface="新細明體"/>
         <a:font script="Arab" typeface="Arial"/>
         <a:font script="Hebr" typeface="Arial"/>
         <a:font script="Thai" typeface="Cordia New"/>
@@ -2312,7 +4726,7 @@
         <a:font script="Geor" typeface="Sylfaen"/>
       </a:minorFont>
     </a:fontScheme>
-    <a:fmtScheme name="Office">
+    <a:fmtScheme name="Office Theme">
       <a:fillStyleLst>
         <a:solidFill>
           <a:schemeClr val="phClr"/>
@@ -2450,52 +4864,7 @@
       </a:bgFillStyleLst>
     </a:fmtScheme>
   </a:themeElements>
-  <a:objectDefaults>
-    <a:spDef>
-      <a:spPr>
-        <a:solidFill>
-          <a:schemeClr val="bg1"/>
-        </a:solidFill>
-        <a:ln>
-          <a:solidFill>
-            <a:schemeClr val="tx1">
-              <a:lumMod val="85000"/>
-              <a:lumOff val="15000"/>
-            </a:schemeClr>
-          </a:solidFill>
-        </a:ln>
-      </a:spPr>
-      <a:bodyPr wrap="none" rtlCol="0" anchor="ctr"/>
-      <a:lstStyle>
-        <a:defPPr algn="ctr">
-          <a:defRPr sz="1400" smtClean="0">
-            <a:solidFill>
-              <a:schemeClr val="tx1">
-                <a:lumMod val="85000"/>
-                <a:lumOff val="15000"/>
-              </a:schemeClr>
-            </a:solidFill>
-          </a:defRPr>
-        </a:defPPr>
-      </a:lstStyle>
-      <a:style>
-        <a:lnRef idx="2">
-          <a:schemeClr val="accent1">
-            <a:shade val="50000"/>
-          </a:schemeClr>
-        </a:lnRef>
-        <a:fillRef idx="1">
-          <a:schemeClr val="accent1"/>
-        </a:fillRef>
-        <a:effectRef idx="0">
-          <a:schemeClr val="accent1"/>
-        </a:effectRef>
-        <a:fontRef idx="minor">
-          <a:schemeClr val="lt1"/>
-        </a:fontRef>
-      </a:style>
-    </a:spDef>
-  </a:objectDefaults>
+  <a:objectDefaults/>
   <a:extraClrSchemeLst/>
   <a:extLst>
     <a:ext uri="{05A4C25C-085E-4340-85A3-A5531E510DB2}">

</xml_diff>

<commit_message>
Automatic Site Publish by Jenkins
</commit_message>
<xml_diff>
--- a/images/runtimes/OW-Runtimes.pptx
+++ b/images/runtimes/OW-Runtimes.pptx
@@ -2,7 +2,7 @@
 <file path=ppt/presentation.xml><?xml version="1.0" encoding="utf-8"?>
 <p:presentation xmlns:a="http://schemas.openxmlformats.org/drawingml/2006/main" xmlns:r="http://schemas.openxmlformats.org/officeDocument/2006/relationships" xmlns:p="http://schemas.openxmlformats.org/presentationml/2006/main" saveSubsetFonts="1" autoCompressPictures="0">
   <p:sldMasterIdLst>
-    <p:sldMasterId id="2147483667" r:id="rId1"/>
+    <p:sldMasterId id="2147483747" r:id="rId1"/>
   </p:sldMasterIdLst>
   <p:notesMasterIdLst>
     <p:notesMasterId r:id="rId3"/>
@@ -10,14 +10,14 @@
   <p:sldIdLst>
     <p:sldId id="309" r:id="rId2"/>
   </p:sldIdLst>
-  <p:sldSz cx="12192000" cy="6858000"/>
+  <p:sldSz cx="4389438" cy="2286000"/>
   <p:notesSz cx="6858000" cy="9144000"/>
   <p:defaultTextStyle>
     <a:defPPr>
       <a:defRPr lang="en-US"/>
     </a:defPPr>
-    <a:lvl1pPr marL="0" algn="l" defTabSz="457200" rtl="0" eaLnBrk="1" latinLnBrk="0" hangingPunct="1">
-      <a:defRPr sz="1800" kern="1200">
+    <a:lvl1pPr marL="0" algn="l" defTabSz="263347" rtl="0" eaLnBrk="1" latinLnBrk="0" hangingPunct="1">
+      <a:defRPr sz="1037" kern="1200">
         <a:solidFill>
           <a:schemeClr val="tx1"/>
         </a:solidFill>
@@ -26,8 +26,8 @@
         <a:cs typeface="+mn-cs"/>
       </a:defRPr>
     </a:lvl1pPr>
-    <a:lvl2pPr marL="457200" algn="l" defTabSz="457200" rtl="0" eaLnBrk="1" latinLnBrk="0" hangingPunct="1">
-      <a:defRPr sz="1800" kern="1200">
+    <a:lvl2pPr marL="263347" algn="l" defTabSz="263347" rtl="0" eaLnBrk="1" latinLnBrk="0" hangingPunct="1">
+      <a:defRPr sz="1037" kern="1200">
         <a:solidFill>
           <a:schemeClr val="tx1"/>
         </a:solidFill>
@@ -36,8 +36,8 @@
         <a:cs typeface="+mn-cs"/>
       </a:defRPr>
     </a:lvl2pPr>
-    <a:lvl3pPr marL="914400" algn="l" defTabSz="457200" rtl="0" eaLnBrk="1" latinLnBrk="0" hangingPunct="1">
-      <a:defRPr sz="1800" kern="1200">
+    <a:lvl3pPr marL="526694" algn="l" defTabSz="263347" rtl="0" eaLnBrk="1" latinLnBrk="0" hangingPunct="1">
+      <a:defRPr sz="1037" kern="1200">
         <a:solidFill>
           <a:schemeClr val="tx1"/>
         </a:solidFill>
@@ -46,8 +46,8 @@
         <a:cs typeface="+mn-cs"/>
       </a:defRPr>
     </a:lvl3pPr>
-    <a:lvl4pPr marL="1371600" algn="l" defTabSz="457200" rtl="0" eaLnBrk="1" latinLnBrk="0" hangingPunct="1">
-      <a:defRPr sz="1800" kern="1200">
+    <a:lvl4pPr marL="790042" algn="l" defTabSz="263347" rtl="0" eaLnBrk="1" latinLnBrk="0" hangingPunct="1">
+      <a:defRPr sz="1037" kern="1200">
         <a:solidFill>
           <a:schemeClr val="tx1"/>
         </a:solidFill>
@@ -56,8 +56,8 @@
         <a:cs typeface="+mn-cs"/>
       </a:defRPr>
     </a:lvl4pPr>
-    <a:lvl5pPr marL="1828800" algn="l" defTabSz="457200" rtl="0" eaLnBrk="1" latinLnBrk="0" hangingPunct="1">
-      <a:defRPr sz="1800" kern="1200">
+    <a:lvl5pPr marL="1053389" algn="l" defTabSz="263347" rtl="0" eaLnBrk="1" latinLnBrk="0" hangingPunct="1">
+      <a:defRPr sz="1037" kern="1200">
         <a:solidFill>
           <a:schemeClr val="tx1"/>
         </a:solidFill>
@@ -66,8 +66,8 @@
         <a:cs typeface="+mn-cs"/>
       </a:defRPr>
     </a:lvl5pPr>
-    <a:lvl6pPr marL="2286000" algn="l" defTabSz="457200" rtl="0" eaLnBrk="1" latinLnBrk="0" hangingPunct="1">
-      <a:defRPr sz="1800" kern="1200">
+    <a:lvl6pPr marL="1316736" algn="l" defTabSz="263347" rtl="0" eaLnBrk="1" latinLnBrk="0" hangingPunct="1">
+      <a:defRPr sz="1037" kern="1200">
         <a:solidFill>
           <a:schemeClr val="tx1"/>
         </a:solidFill>
@@ -76,8 +76,8 @@
         <a:cs typeface="+mn-cs"/>
       </a:defRPr>
     </a:lvl6pPr>
-    <a:lvl7pPr marL="2743200" algn="l" defTabSz="457200" rtl="0" eaLnBrk="1" latinLnBrk="0" hangingPunct="1">
-      <a:defRPr sz="1800" kern="1200">
+    <a:lvl7pPr marL="1580083" algn="l" defTabSz="263347" rtl="0" eaLnBrk="1" latinLnBrk="0" hangingPunct="1">
+      <a:defRPr sz="1037" kern="1200">
         <a:solidFill>
           <a:schemeClr val="tx1"/>
         </a:solidFill>
@@ -86,8 +86,8 @@
         <a:cs typeface="+mn-cs"/>
       </a:defRPr>
     </a:lvl7pPr>
-    <a:lvl8pPr marL="3200400" algn="l" defTabSz="457200" rtl="0" eaLnBrk="1" latinLnBrk="0" hangingPunct="1">
-      <a:defRPr sz="1800" kern="1200">
+    <a:lvl8pPr marL="1843430" algn="l" defTabSz="263347" rtl="0" eaLnBrk="1" latinLnBrk="0" hangingPunct="1">
+      <a:defRPr sz="1037" kern="1200">
         <a:solidFill>
           <a:schemeClr val="tx1"/>
         </a:solidFill>
@@ -96,8 +96,8 @@
         <a:cs typeface="+mn-cs"/>
       </a:defRPr>
     </a:lvl8pPr>
-    <a:lvl9pPr marL="3657600" algn="l" defTabSz="457200" rtl="0" eaLnBrk="1" latinLnBrk="0" hangingPunct="1">
-      <a:defRPr sz="1800" kern="1200">
+    <a:lvl9pPr marL="2106778" algn="l" defTabSz="263347" rtl="0" eaLnBrk="1" latinLnBrk="0" hangingPunct="1">
+      <a:defRPr sz="1037" kern="1200">
         <a:solidFill>
           <a:schemeClr val="tx1"/>
         </a:solidFill>
@@ -197,7 +197,7 @@
           <a:p>
             <a:fld id="{B7E7AA13-03CD-450D-9E48-9B034CD4C43D}" type="datetimeFigureOut">
               <a:rPr lang="en-US" smtClean="0"/>
-              <a:t>7/13/18</a:t>
+              <a:t>8/10/18</a:t>
             </a:fld>
             <a:endParaRPr lang="en-US"/>
           </a:p>
@@ -215,8 +215,8 @@
         </p:nvSpPr>
         <p:spPr>
           <a:xfrm>
-            <a:off x="685800" y="1143000"/>
-            <a:ext cx="5486400" cy="3086100"/>
+            <a:off x="466725" y="1143000"/>
+            <a:ext cx="5924550" cy="3086100"/>
           </a:xfrm>
           <a:prstGeom prst="rect">
             <a:avLst/>
@@ -370,8 +370,8 @@
   </p:cSld>
   <p:clrMap bg1="lt1" tx1="dk1" bg2="lt2" tx2="dk2" accent1="accent1" accent2="accent2" accent3="accent3" accent4="accent4" accent5="accent5" accent6="accent6" hlink="hlink" folHlink="folHlink"/>
   <p:notesStyle>
-    <a:lvl1pPr marL="0" algn="l" defTabSz="914400" rtl="0" eaLnBrk="1" latinLnBrk="0" hangingPunct="1">
-      <a:defRPr sz="1200" kern="1200">
+    <a:lvl1pPr marL="0" algn="l" defTabSz="526694" rtl="0" eaLnBrk="1" latinLnBrk="0" hangingPunct="1">
+      <a:defRPr sz="691" kern="1200">
         <a:solidFill>
           <a:schemeClr val="tx1"/>
         </a:solidFill>
@@ -380,8 +380,8 @@
         <a:cs typeface="+mn-cs"/>
       </a:defRPr>
     </a:lvl1pPr>
-    <a:lvl2pPr marL="457200" algn="l" defTabSz="914400" rtl="0" eaLnBrk="1" latinLnBrk="0" hangingPunct="1">
-      <a:defRPr sz="1200" kern="1200">
+    <a:lvl2pPr marL="263347" algn="l" defTabSz="526694" rtl="0" eaLnBrk="1" latinLnBrk="0" hangingPunct="1">
+      <a:defRPr sz="691" kern="1200">
         <a:solidFill>
           <a:schemeClr val="tx1"/>
         </a:solidFill>
@@ -390,8 +390,8 @@
         <a:cs typeface="+mn-cs"/>
       </a:defRPr>
     </a:lvl2pPr>
-    <a:lvl3pPr marL="914400" algn="l" defTabSz="914400" rtl="0" eaLnBrk="1" latinLnBrk="0" hangingPunct="1">
-      <a:defRPr sz="1200" kern="1200">
+    <a:lvl3pPr marL="526694" algn="l" defTabSz="526694" rtl="0" eaLnBrk="1" latinLnBrk="0" hangingPunct="1">
+      <a:defRPr sz="691" kern="1200">
         <a:solidFill>
           <a:schemeClr val="tx1"/>
         </a:solidFill>
@@ -400,8 +400,8 @@
         <a:cs typeface="+mn-cs"/>
       </a:defRPr>
     </a:lvl3pPr>
-    <a:lvl4pPr marL="1371600" algn="l" defTabSz="914400" rtl="0" eaLnBrk="1" latinLnBrk="0" hangingPunct="1">
-      <a:defRPr sz="1200" kern="1200">
+    <a:lvl4pPr marL="790042" algn="l" defTabSz="526694" rtl="0" eaLnBrk="1" latinLnBrk="0" hangingPunct="1">
+      <a:defRPr sz="691" kern="1200">
         <a:solidFill>
           <a:schemeClr val="tx1"/>
         </a:solidFill>
@@ -410,8 +410,8 @@
         <a:cs typeface="+mn-cs"/>
       </a:defRPr>
     </a:lvl4pPr>
-    <a:lvl5pPr marL="1828800" algn="l" defTabSz="914400" rtl="0" eaLnBrk="1" latinLnBrk="0" hangingPunct="1">
-      <a:defRPr sz="1200" kern="1200">
+    <a:lvl5pPr marL="1053389" algn="l" defTabSz="526694" rtl="0" eaLnBrk="1" latinLnBrk="0" hangingPunct="1">
+      <a:defRPr sz="691" kern="1200">
         <a:solidFill>
           <a:schemeClr val="tx1"/>
         </a:solidFill>
@@ -420,8 +420,8 @@
         <a:cs typeface="+mn-cs"/>
       </a:defRPr>
     </a:lvl5pPr>
-    <a:lvl6pPr marL="2286000" algn="l" defTabSz="914400" rtl="0" eaLnBrk="1" latinLnBrk="0" hangingPunct="1">
-      <a:defRPr sz="1200" kern="1200">
+    <a:lvl6pPr marL="1316736" algn="l" defTabSz="526694" rtl="0" eaLnBrk="1" latinLnBrk="0" hangingPunct="1">
+      <a:defRPr sz="691" kern="1200">
         <a:solidFill>
           <a:schemeClr val="tx1"/>
         </a:solidFill>
@@ -430,8 +430,8 @@
         <a:cs typeface="+mn-cs"/>
       </a:defRPr>
     </a:lvl6pPr>
-    <a:lvl7pPr marL="2743200" algn="l" defTabSz="914400" rtl="0" eaLnBrk="1" latinLnBrk="0" hangingPunct="1">
-      <a:defRPr sz="1200" kern="1200">
+    <a:lvl7pPr marL="1580083" algn="l" defTabSz="526694" rtl="0" eaLnBrk="1" latinLnBrk="0" hangingPunct="1">
+      <a:defRPr sz="691" kern="1200">
         <a:solidFill>
           <a:schemeClr val="tx1"/>
         </a:solidFill>
@@ -440,8 +440,8 @@
         <a:cs typeface="+mn-cs"/>
       </a:defRPr>
     </a:lvl7pPr>
-    <a:lvl8pPr marL="3200400" algn="l" defTabSz="914400" rtl="0" eaLnBrk="1" latinLnBrk="0" hangingPunct="1">
-      <a:defRPr sz="1200" kern="1200">
+    <a:lvl8pPr marL="1843430" algn="l" defTabSz="526694" rtl="0" eaLnBrk="1" latinLnBrk="0" hangingPunct="1">
+      <a:defRPr sz="691" kern="1200">
         <a:solidFill>
           <a:schemeClr val="tx1"/>
         </a:solidFill>
@@ -450,8 +450,8 @@
         <a:cs typeface="+mn-cs"/>
       </a:defRPr>
     </a:lvl8pPr>
-    <a:lvl9pPr marL="3657600" algn="l" defTabSz="914400" rtl="0" eaLnBrk="1" latinLnBrk="0" hangingPunct="1">
-      <a:defRPr sz="1200" kern="1200">
+    <a:lvl9pPr marL="2106778" algn="l" defTabSz="526694" rtl="0" eaLnBrk="1" latinLnBrk="0" hangingPunct="1">
+      <a:defRPr sz="691" kern="1200">
         <a:solidFill>
           <a:schemeClr val="tx1"/>
         </a:solidFill>
@@ -465,8 +465,8 @@
 </file>
 
 <file path=ppt/slideLayouts/slideLayout1.xml><?xml version="1.0" encoding="utf-8"?>
-<p:sldLayout xmlns:a="http://schemas.openxmlformats.org/drawingml/2006/main" xmlns:r="http://schemas.openxmlformats.org/officeDocument/2006/relationships" xmlns:p="http://schemas.openxmlformats.org/presentationml/2006/main" preserve="1" userDrawn="1">
-  <p:cSld name="Blank">
+<p:sldLayout xmlns:a="http://schemas.openxmlformats.org/drawingml/2006/main" xmlns:r="http://schemas.openxmlformats.org/officeDocument/2006/relationships" xmlns:p="http://schemas.openxmlformats.org/presentationml/2006/main" type="title" preserve="1">
+  <p:cSld name="Title Slide">
     <p:spTree>
       <p:nvGrpSpPr>
         <p:cNvPr id="1" name=""/>
@@ -483,6 +483,551 @@
       </p:grpSpPr>
       <p:sp>
         <p:nvSpPr>
+          <p:cNvPr id="2" name="Title 1"/>
+          <p:cNvSpPr>
+            <a:spLocks noGrp="1"/>
+          </p:cNvSpPr>
+          <p:nvPr>
+            <p:ph type="ctrTitle"/>
+          </p:nvPr>
+        </p:nvSpPr>
+        <p:spPr>
+          <a:xfrm>
+            <a:off x="548680" y="374121"/>
+            <a:ext cx="3292079" cy="795867"/>
+          </a:xfrm>
+        </p:spPr>
+        <p:txBody>
+          <a:bodyPr anchor="b"/>
+          <a:lstStyle>
+            <a:lvl1pPr algn="ctr">
+              <a:defRPr sz="2000"/>
+            </a:lvl1pPr>
+          </a:lstStyle>
+          <a:p>
+            <a:r>
+              <a:rPr lang="en-US" smtClean="0"/>
+              <a:t>Click to edit Master title style</a:t>
+            </a:r>
+            <a:endParaRPr lang="en-US" dirty="0"/>
+          </a:p>
+        </p:txBody>
+      </p:sp>
+      <p:sp>
+        <p:nvSpPr>
+          <p:cNvPr id="3" name="Subtitle 2"/>
+          <p:cNvSpPr>
+            <a:spLocks noGrp="1"/>
+          </p:cNvSpPr>
+          <p:nvPr>
+            <p:ph type="subTitle" idx="1"/>
+          </p:nvPr>
+        </p:nvSpPr>
+        <p:spPr>
+          <a:xfrm>
+            <a:off x="548680" y="1200679"/>
+            <a:ext cx="3292079" cy="551921"/>
+          </a:xfrm>
+        </p:spPr>
+        <p:txBody>
+          <a:bodyPr/>
+          <a:lstStyle>
+            <a:lvl1pPr marL="0" indent="0" algn="ctr">
+              <a:buNone/>
+              <a:defRPr sz="800"/>
+            </a:lvl1pPr>
+            <a:lvl2pPr marL="152385" indent="0" algn="ctr">
+              <a:buNone/>
+              <a:defRPr sz="667"/>
+            </a:lvl2pPr>
+            <a:lvl3pPr marL="304770" indent="0" algn="ctr">
+              <a:buNone/>
+              <a:defRPr sz="600"/>
+            </a:lvl3pPr>
+            <a:lvl4pPr marL="457154" indent="0" algn="ctr">
+              <a:buNone/>
+              <a:defRPr sz="533"/>
+            </a:lvl4pPr>
+            <a:lvl5pPr marL="609539" indent="0" algn="ctr">
+              <a:buNone/>
+              <a:defRPr sz="533"/>
+            </a:lvl5pPr>
+            <a:lvl6pPr marL="761924" indent="0" algn="ctr">
+              <a:buNone/>
+              <a:defRPr sz="533"/>
+            </a:lvl6pPr>
+            <a:lvl7pPr marL="914309" indent="0" algn="ctr">
+              <a:buNone/>
+              <a:defRPr sz="533"/>
+            </a:lvl7pPr>
+            <a:lvl8pPr marL="1066693" indent="0" algn="ctr">
+              <a:buNone/>
+              <a:defRPr sz="533"/>
+            </a:lvl8pPr>
+            <a:lvl9pPr marL="1219078" indent="0" algn="ctr">
+              <a:buNone/>
+              <a:defRPr sz="533"/>
+            </a:lvl9pPr>
+          </a:lstStyle>
+          <a:p>
+            <a:r>
+              <a:rPr lang="en-US" smtClean="0"/>
+              <a:t>Click to edit Master subtitle style</a:t>
+            </a:r>
+            <a:endParaRPr lang="en-US" dirty="0"/>
+          </a:p>
+        </p:txBody>
+      </p:sp>
+      <p:sp>
+        <p:nvSpPr>
+          <p:cNvPr id="4" name="Date Placeholder 3"/>
+          <p:cNvSpPr>
+            <a:spLocks noGrp="1"/>
+          </p:cNvSpPr>
+          <p:nvPr>
+            <p:ph type="dt" sz="half" idx="10"/>
+          </p:nvPr>
+        </p:nvSpPr>
+        <p:spPr/>
+        <p:txBody>
+          <a:bodyPr/>
+          <a:lstStyle/>
+          <a:p>
+            <a:fld id="{C764DE79-268F-4C1A-8933-263129D2AF90}" type="datetimeFigureOut">
+              <a:rPr lang="en-US" smtClean="0"/>
+              <a:t>8/10/18</a:t>
+            </a:fld>
+            <a:endParaRPr lang="en-US" dirty="0"/>
+          </a:p>
+        </p:txBody>
+      </p:sp>
+      <p:sp>
+        <p:nvSpPr>
+          <p:cNvPr id="5" name="Footer Placeholder 4"/>
+          <p:cNvSpPr>
+            <a:spLocks noGrp="1"/>
+          </p:cNvSpPr>
+          <p:nvPr>
+            <p:ph type="ftr" sz="quarter" idx="11"/>
+          </p:nvPr>
+        </p:nvSpPr>
+        <p:spPr/>
+        <p:txBody>
+          <a:bodyPr/>
+          <a:lstStyle/>
+          <a:p>
+            <a:endParaRPr lang="en-US" dirty="0"/>
+          </a:p>
+        </p:txBody>
+      </p:sp>
+      <p:sp>
+        <p:nvSpPr>
+          <p:cNvPr id="6" name="Slide Number Placeholder 5"/>
+          <p:cNvSpPr>
+            <a:spLocks noGrp="1"/>
+          </p:cNvSpPr>
+          <p:nvPr>
+            <p:ph type="sldNum" sz="quarter" idx="12"/>
+          </p:nvPr>
+        </p:nvSpPr>
+        <p:spPr/>
+        <p:txBody>
+          <a:bodyPr/>
+          <a:lstStyle/>
+          <a:p>
+            <a:fld id="{48F63A3B-78C7-47BE-AE5E-E10140E04643}" type="slidenum">
+              <a:rPr lang="en-US" smtClean="0"/>
+              <a:t>‹#›</a:t>
+            </a:fld>
+            <a:endParaRPr lang="en-US" dirty="0"/>
+          </a:p>
+        </p:txBody>
+      </p:sp>
+    </p:spTree>
+    <p:extLst>
+      <p:ext uri="{BB962C8B-B14F-4D97-AF65-F5344CB8AC3E}">
+        <p14:creationId xmlns:p14="http://schemas.microsoft.com/office/powerpoint/2010/main" val="1926362576"/>
+      </p:ext>
+    </p:extLst>
+  </p:cSld>
+  <p:clrMapOvr>
+    <a:masterClrMapping/>
+  </p:clrMapOvr>
+  <p:hf hdr="0" ftr="0" dt="0"/>
+</p:sldLayout>
+</file>
+
+<file path=ppt/slideLayouts/slideLayout10.xml><?xml version="1.0" encoding="utf-8"?>
+<p:sldLayout xmlns:a="http://schemas.openxmlformats.org/drawingml/2006/main" xmlns:r="http://schemas.openxmlformats.org/officeDocument/2006/relationships" xmlns:p="http://schemas.openxmlformats.org/presentationml/2006/main" type="vertTx" preserve="1">
+  <p:cSld name="Title and Vertical Text">
+    <p:spTree>
+      <p:nvGrpSpPr>
+        <p:cNvPr id="1" name=""/>
+        <p:cNvGrpSpPr/>
+        <p:nvPr/>
+      </p:nvGrpSpPr>
+      <p:grpSpPr>
+        <a:xfrm>
+          <a:off x="0" y="0"/>
+          <a:ext cx="0" cy="0"/>
+          <a:chOff x="0" y="0"/>
+          <a:chExt cx="0" cy="0"/>
+        </a:xfrm>
+      </p:grpSpPr>
+      <p:sp>
+        <p:nvSpPr>
+          <p:cNvPr id="2" name="Title 1"/>
+          <p:cNvSpPr>
+            <a:spLocks noGrp="1"/>
+          </p:cNvSpPr>
+          <p:nvPr>
+            <p:ph type="title"/>
+          </p:nvPr>
+        </p:nvSpPr>
+        <p:spPr/>
+        <p:txBody>
+          <a:bodyPr/>
+          <a:lstStyle/>
+          <a:p>
+            <a:r>
+              <a:rPr lang="en-US" smtClean="0"/>
+              <a:t>Click to edit Master title style</a:t>
+            </a:r>
+            <a:endParaRPr lang="en-US" dirty="0"/>
+          </a:p>
+        </p:txBody>
+      </p:sp>
+      <p:sp>
+        <p:nvSpPr>
+          <p:cNvPr id="3" name="Vertical Text Placeholder 2"/>
+          <p:cNvSpPr>
+            <a:spLocks noGrp="1"/>
+          </p:cNvSpPr>
+          <p:nvPr>
+            <p:ph type="body" orient="vert" idx="1"/>
+          </p:nvPr>
+        </p:nvSpPr>
+        <p:spPr/>
+        <p:txBody>
+          <a:bodyPr vert="eaVert"/>
+          <a:lstStyle/>
+          <a:p>
+            <a:pPr lvl="0"/>
+            <a:r>
+              <a:rPr lang="en-US" smtClean="0"/>
+              <a:t>Click to edit Master text styles</a:t>
+            </a:r>
+          </a:p>
+          <a:p>
+            <a:pPr lvl="1"/>
+            <a:r>
+              <a:rPr lang="en-US" smtClean="0"/>
+              <a:t>Second level</a:t>
+            </a:r>
+          </a:p>
+          <a:p>
+            <a:pPr lvl="2"/>
+            <a:r>
+              <a:rPr lang="en-US" smtClean="0"/>
+              <a:t>Third level</a:t>
+            </a:r>
+          </a:p>
+          <a:p>
+            <a:pPr lvl="3"/>
+            <a:r>
+              <a:rPr lang="en-US" smtClean="0"/>
+              <a:t>Fourth level</a:t>
+            </a:r>
+          </a:p>
+          <a:p>
+            <a:pPr lvl="4"/>
+            <a:r>
+              <a:rPr lang="en-US" smtClean="0"/>
+              <a:t>Fifth level</a:t>
+            </a:r>
+            <a:endParaRPr lang="en-US" dirty="0"/>
+          </a:p>
+        </p:txBody>
+      </p:sp>
+      <p:sp>
+        <p:nvSpPr>
+          <p:cNvPr id="4" name="Date Placeholder 3"/>
+          <p:cNvSpPr>
+            <a:spLocks noGrp="1"/>
+          </p:cNvSpPr>
+          <p:nvPr>
+            <p:ph type="dt" sz="half" idx="10"/>
+          </p:nvPr>
+        </p:nvSpPr>
+        <p:spPr/>
+        <p:txBody>
+          <a:bodyPr/>
+          <a:lstStyle/>
+          <a:p>
+            <a:fld id="{C764DE79-268F-4C1A-8933-263129D2AF90}" type="datetimeFigureOut">
+              <a:rPr lang="en-US" smtClean="0"/>
+              <a:t>8/10/18</a:t>
+            </a:fld>
+            <a:endParaRPr lang="en-US" dirty="0"/>
+          </a:p>
+        </p:txBody>
+      </p:sp>
+      <p:sp>
+        <p:nvSpPr>
+          <p:cNvPr id="5" name="Footer Placeholder 4"/>
+          <p:cNvSpPr>
+            <a:spLocks noGrp="1"/>
+          </p:cNvSpPr>
+          <p:nvPr>
+            <p:ph type="ftr" sz="quarter" idx="11"/>
+          </p:nvPr>
+        </p:nvSpPr>
+        <p:spPr/>
+        <p:txBody>
+          <a:bodyPr/>
+          <a:lstStyle/>
+          <a:p>
+            <a:endParaRPr lang="en-US" dirty="0"/>
+          </a:p>
+        </p:txBody>
+      </p:sp>
+      <p:sp>
+        <p:nvSpPr>
+          <p:cNvPr id="6" name="Slide Number Placeholder 5"/>
+          <p:cNvSpPr>
+            <a:spLocks noGrp="1"/>
+          </p:cNvSpPr>
+          <p:nvPr>
+            <p:ph type="sldNum" sz="quarter" idx="12"/>
+          </p:nvPr>
+        </p:nvSpPr>
+        <p:spPr/>
+        <p:txBody>
+          <a:bodyPr/>
+          <a:lstStyle/>
+          <a:p>
+            <a:fld id="{48F63A3B-78C7-47BE-AE5E-E10140E04643}" type="slidenum">
+              <a:rPr lang="en-US" smtClean="0"/>
+              <a:t>‹#›</a:t>
+            </a:fld>
+            <a:endParaRPr lang="en-US" dirty="0"/>
+          </a:p>
+        </p:txBody>
+      </p:sp>
+    </p:spTree>
+    <p:extLst>
+      <p:ext uri="{BB962C8B-B14F-4D97-AF65-F5344CB8AC3E}">
+        <p14:creationId xmlns:p14="http://schemas.microsoft.com/office/powerpoint/2010/main" val="461618070"/>
+      </p:ext>
+    </p:extLst>
+  </p:cSld>
+  <p:clrMapOvr>
+    <a:masterClrMapping/>
+  </p:clrMapOvr>
+  <p:hf hdr="0" ftr="0" dt="0"/>
+</p:sldLayout>
+</file>
+
+<file path=ppt/slideLayouts/slideLayout11.xml><?xml version="1.0" encoding="utf-8"?>
+<p:sldLayout xmlns:a="http://schemas.openxmlformats.org/drawingml/2006/main" xmlns:r="http://schemas.openxmlformats.org/officeDocument/2006/relationships" xmlns:p="http://schemas.openxmlformats.org/presentationml/2006/main" type="vertTitleAndTx" preserve="1">
+  <p:cSld name="Vertical Title and Text">
+    <p:spTree>
+      <p:nvGrpSpPr>
+        <p:cNvPr id="1" name=""/>
+        <p:cNvGrpSpPr/>
+        <p:nvPr/>
+      </p:nvGrpSpPr>
+      <p:grpSpPr>
+        <a:xfrm>
+          <a:off x="0" y="0"/>
+          <a:ext cx="0" cy="0"/>
+          <a:chOff x="0" y="0"/>
+          <a:chExt cx="0" cy="0"/>
+        </a:xfrm>
+      </p:grpSpPr>
+      <p:sp>
+        <p:nvSpPr>
+          <p:cNvPr id="2" name="Vertical Title 1"/>
+          <p:cNvSpPr>
+            <a:spLocks noGrp="1"/>
+          </p:cNvSpPr>
+          <p:nvPr>
+            <p:ph type="title" orient="vert"/>
+          </p:nvPr>
+        </p:nvSpPr>
+        <p:spPr>
+          <a:xfrm>
+            <a:off x="3141191" y="121709"/>
+            <a:ext cx="946473" cy="1937279"/>
+          </a:xfrm>
+        </p:spPr>
+        <p:txBody>
+          <a:bodyPr vert="eaVert"/>
+          <a:lstStyle/>
+          <a:p>
+            <a:r>
+              <a:rPr lang="en-US" smtClean="0"/>
+              <a:t>Click to edit Master title style</a:t>
+            </a:r>
+            <a:endParaRPr lang="en-US" dirty="0"/>
+          </a:p>
+        </p:txBody>
+      </p:sp>
+      <p:sp>
+        <p:nvSpPr>
+          <p:cNvPr id="3" name="Vertical Text Placeholder 2"/>
+          <p:cNvSpPr>
+            <a:spLocks noGrp="1"/>
+          </p:cNvSpPr>
+          <p:nvPr>
+            <p:ph type="body" orient="vert" idx="1"/>
+          </p:nvPr>
+        </p:nvSpPr>
+        <p:spPr>
+          <a:xfrm>
+            <a:off x="301774" y="121709"/>
+            <a:ext cx="2784550" cy="1937279"/>
+          </a:xfrm>
+        </p:spPr>
+        <p:txBody>
+          <a:bodyPr vert="eaVert"/>
+          <a:lstStyle/>
+          <a:p>
+            <a:pPr lvl="0"/>
+            <a:r>
+              <a:rPr lang="en-US" smtClean="0"/>
+              <a:t>Click to edit Master text styles</a:t>
+            </a:r>
+          </a:p>
+          <a:p>
+            <a:pPr lvl="1"/>
+            <a:r>
+              <a:rPr lang="en-US" smtClean="0"/>
+              <a:t>Second level</a:t>
+            </a:r>
+          </a:p>
+          <a:p>
+            <a:pPr lvl="2"/>
+            <a:r>
+              <a:rPr lang="en-US" smtClean="0"/>
+              <a:t>Third level</a:t>
+            </a:r>
+          </a:p>
+          <a:p>
+            <a:pPr lvl="3"/>
+            <a:r>
+              <a:rPr lang="en-US" smtClean="0"/>
+              <a:t>Fourth level</a:t>
+            </a:r>
+          </a:p>
+          <a:p>
+            <a:pPr lvl="4"/>
+            <a:r>
+              <a:rPr lang="en-US" smtClean="0"/>
+              <a:t>Fifth level</a:t>
+            </a:r>
+            <a:endParaRPr lang="en-US" dirty="0"/>
+          </a:p>
+        </p:txBody>
+      </p:sp>
+      <p:sp>
+        <p:nvSpPr>
+          <p:cNvPr id="4" name="Date Placeholder 3"/>
+          <p:cNvSpPr>
+            <a:spLocks noGrp="1"/>
+          </p:cNvSpPr>
+          <p:nvPr>
+            <p:ph type="dt" sz="half" idx="10"/>
+          </p:nvPr>
+        </p:nvSpPr>
+        <p:spPr/>
+        <p:txBody>
+          <a:bodyPr/>
+          <a:lstStyle/>
+          <a:p>
+            <a:fld id="{C764DE79-268F-4C1A-8933-263129D2AF90}" type="datetimeFigureOut">
+              <a:rPr lang="en-US" smtClean="0"/>
+              <a:t>8/10/18</a:t>
+            </a:fld>
+            <a:endParaRPr lang="en-US" dirty="0"/>
+          </a:p>
+        </p:txBody>
+      </p:sp>
+      <p:sp>
+        <p:nvSpPr>
+          <p:cNvPr id="5" name="Footer Placeholder 4"/>
+          <p:cNvSpPr>
+            <a:spLocks noGrp="1"/>
+          </p:cNvSpPr>
+          <p:nvPr>
+            <p:ph type="ftr" sz="quarter" idx="11"/>
+          </p:nvPr>
+        </p:nvSpPr>
+        <p:spPr/>
+        <p:txBody>
+          <a:bodyPr/>
+          <a:lstStyle/>
+          <a:p>
+            <a:endParaRPr lang="en-US" dirty="0"/>
+          </a:p>
+        </p:txBody>
+      </p:sp>
+      <p:sp>
+        <p:nvSpPr>
+          <p:cNvPr id="6" name="Slide Number Placeholder 5"/>
+          <p:cNvSpPr>
+            <a:spLocks noGrp="1"/>
+          </p:cNvSpPr>
+          <p:nvPr>
+            <p:ph type="sldNum" sz="quarter" idx="12"/>
+          </p:nvPr>
+        </p:nvSpPr>
+        <p:spPr/>
+        <p:txBody>
+          <a:bodyPr/>
+          <a:lstStyle/>
+          <a:p>
+            <a:fld id="{48F63A3B-78C7-47BE-AE5E-E10140E04643}" type="slidenum">
+              <a:rPr lang="en-US" smtClean="0"/>
+              <a:t>‹#›</a:t>
+            </a:fld>
+            <a:endParaRPr lang="en-US" dirty="0"/>
+          </a:p>
+        </p:txBody>
+      </p:sp>
+    </p:spTree>
+    <p:extLst>
+      <p:ext uri="{BB962C8B-B14F-4D97-AF65-F5344CB8AC3E}">
+        <p14:creationId xmlns:p14="http://schemas.microsoft.com/office/powerpoint/2010/main" val="1703969526"/>
+      </p:ext>
+    </p:extLst>
+  </p:cSld>
+  <p:clrMapOvr>
+    <a:masterClrMapping/>
+  </p:clrMapOvr>
+  <p:hf hdr="0" ftr="0" dt="0"/>
+</p:sldLayout>
+</file>
+
+<file path=ppt/slideLayouts/slideLayout12.xml><?xml version="1.0" encoding="utf-8"?>
+<p:sldLayout xmlns:a="http://schemas.openxmlformats.org/drawingml/2006/main" xmlns:r="http://schemas.openxmlformats.org/officeDocument/2006/relationships" xmlns:p="http://schemas.openxmlformats.org/presentationml/2006/main" preserve="1" userDrawn="1">
+  <p:cSld name="1_Blank">
+    <p:spTree>
+      <p:nvGrpSpPr>
+        <p:cNvPr id="1" name=""/>
+        <p:cNvGrpSpPr/>
+        <p:nvPr/>
+      </p:nvGrpSpPr>
+      <p:grpSpPr>
+        <a:xfrm>
+          <a:off x="0" y="0"/>
+          <a:ext cx="0" cy="0"/>
+          <a:chOff x="0" y="0"/>
+          <a:chExt cx="0" cy="0"/>
+        </a:xfrm>
+      </p:grpSpPr>
+      <p:sp>
+        <p:nvSpPr>
           <p:cNvPr id="4" name="Slide Number Placeholder 5"/>
           <p:cNvSpPr>
             <a:spLocks noGrp="1"/>
@@ -493,8 +1038,8 @@
         </p:nvSpPr>
         <p:spPr>
           <a:xfrm>
-            <a:off x="9342120" y="6583680"/>
-            <a:ext cx="2743200" cy="274320"/>
+            <a:off x="3363407" y="2194561"/>
+            <a:ext cx="987624" cy="91440"/>
           </a:xfrm>
           <a:prstGeom prst="rect">
             <a:avLst/>
@@ -536,8 +1081,8 @@
         </p:nvSpPr>
         <p:spPr>
           <a:xfrm>
-            <a:off x="161109" y="6538277"/>
-            <a:ext cx="4114800" cy="365125"/>
+            <a:off x="58004" y="2179427"/>
+            <a:ext cx="1481435" cy="121708"/>
           </a:xfrm>
           <a:prstGeom prst="rect">
             <a:avLst/>
@@ -575,7 +1120,7 @@
 </p:sldLayout>
 </file>
 
-<file path=ppt/slideLayouts/slideLayout2.xml><?xml version="1.0" encoding="utf-8"?>
+<file path=ppt/slideLayouts/slideLayout13.xml><?xml version="1.0" encoding="utf-8"?>
 <p:sldLayout xmlns:a="http://schemas.openxmlformats.org/drawingml/2006/main" xmlns:r="http://schemas.openxmlformats.org/officeDocument/2006/relationships" xmlns:p="http://schemas.openxmlformats.org/presentationml/2006/main" preserve="1" userDrawn="1">
   <p:cSld name="Simple_Developer">
     <p:spTree>
@@ -604,8 +1149,8 @@
         </p:nvSpPr>
         <p:spPr>
           <a:xfrm>
-            <a:off x="9342120" y="6583680"/>
-            <a:ext cx="2743200" cy="274320"/>
+            <a:off x="3363407" y="2194561"/>
+            <a:ext cx="987624" cy="91440"/>
           </a:xfrm>
           <a:prstGeom prst="rect">
             <a:avLst/>
@@ -642,8 +1187,8 @@
         </p:nvSpPr>
         <p:spPr>
           <a:xfrm>
-            <a:off x="9342120" y="6583680"/>
-            <a:ext cx="2743200" cy="274320"/>
+            <a:off x="3363407" y="2194561"/>
+            <a:ext cx="987624" cy="91440"/>
           </a:xfrm>
           <a:prstGeom prst="rect">
             <a:avLst/>
@@ -748,11 +1293,11 @@
           </a:lstStyle>
           <a:p>
             <a:fld id="{FFF8894C-962F-4043-BDE4-6CA2ABEDD0B4}" type="slidenum">
-              <a:rPr lang="en-US" smtClean="0"/>
+              <a:rPr lang="en-US" sz="1200" smtClean="0"/>
               <a:pPr/>
               <a:t>‹#›</a:t>
             </a:fld>
-            <a:endParaRPr lang="en-US" dirty="0"/>
+            <a:endParaRPr lang="en-US" sz="1200" dirty="0"/>
           </a:p>
         </p:txBody>
       </p:sp>
@@ -778,8 +1323,8 @@
         </p:blipFill>
         <p:spPr>
           <a:xfrm>
-            <a:off x="0" y="0"/>
-            <a:ext cx="12192000" cy="6858000"/>
+            <a:off x="0" y="1"/>
+            <a:ext cx="4389438" cy="2286000"/>
           </a:xfrm>
           <a:prstGeom prst="rect">
             <a:avLst/>
@@ -799,7 +1344,7 @@
 </p:sldLayout>
 </file>
 
-<file path=ppt/slideLayouts/slideLayout3.xml><?xml version="1.0" encoding="utf-8"?>
+<file path=ppt/slideLayouts/slideLayout14.xml><?xml version="1.0" encoding="utf-8"?>
 <p:sldLayout xmlns:a="http://schemas.openxmlformats.org/drawingml/2006/main" xmlns:r="http://schemas.openxmlformats.org/officeDocument/2006/relationships" xmlns:p="http://schemas.openxmlformats.org/presentationml/2006/main" preserve="1" userDrawn="1">
   <p:cSld name="Simple_Hackathon">
     <p:spTree>
@@ -828,8 +1373,8 @@
         </p:nvSpPr>
         <p:spPr>
           <a:xfrm>
-            <a:off x="9342120" y="6583680"/>
-            <a:ext cx="2743200" cy="274320"/>
+            <a:off x="3363407" y="2194561"/>
+            <a:ext cx="987624" cy="91440"/>
           </a:xfrm>
           <a:prstGeom prst="rect">
             <a:avLst/>
@@ -866,8 +1411,8 @@
         </p:nvSpPr>
         <p:spPr>
           <a:xfrm>
-            <a:off x="9342120" y="6583680"/>
-            <a:ext cx="2743200" cy="274320"/>
+            <a:off x="3363407" y="2194561"/>
+            <a:ext cx="987624" cy="91440"/>
           </a:xfrm>
           <a:prstGeom prst="rect">
             <a:avLst/>
@@ -972,11 +1517,11 @@
           </a:lstStyle>
           <a:p>
             <a:fld id="{FFF8894C-962F-4043-BDE4-6CA2ABEDD0B4}" type="slidenum">
-              <a:rPr lang="en-US" smtClean="0"/>
+              <a:rPr lang="en-US" sz="1200" smtClean="0"/>
               <a:pPr/>
               <a:t>‹#›</a:t>
             </a:fld>
-            <a:endParaRPr lang="en-US" dirty="0"/>
+            <a:endParaRPr lang="en-US" sz="1200" dirty="0"/>
           </a:p>
         </p:txBody>
       </p:sp>
@@ -1002,8 +1547,8 @@
         </p:blipFill>
         <p:spPr>
           <a:xfrm>
-            <a:off x="0" y="0"/>
-            <a:ext cx="12192000" cy="6858000"/>
+            <a:off x="0" y="1"/>
+            <a:ext cx="4389438" cy="2286000"/>
           </a:xfrm>
           <a:prstGeom prst="rect">
             <a:avLst/>
@@ -1023,7 +1568,7 @@
 </p:sldLayout>
 </file>
 
-<file path=ppt/slideLayouts/slideLayout4.xml><?xml version="1.0" encoding="utf-8"?>
+<file path=ppt/slideLayouts/slideLayout15.xml><?xml version="1.0" encoding="utf-8"?>
 <p:sldLayout xmlns:a="http://schemas.openxmlformats.org/drawingml/2006/main" xmlns:r="http://schemas.openxmlformats.org/officeDocument/2006/relationships" xmlns:p="http://schemas.openxmlformats.org/presentationml/2006/main" preserve="1" userDrawn="1">
   <p:cSld name="Custom Layout">
     <p:spTree>
@@ -1045,7 +1590,7 @@
           <p:cNvPr id="3" name="Picture 2">
             <a:extLst>
               <a:ext uri="{FF2B5EF4-FFF2-40B4-BE49-F238E27FC236}">
-                <a16:creationId xmlns:a16="http://schemas.microsoft.com/office/drawing/2014/main" xmlns="" id="{4FD8317D-E5DC-48AE-B946-799BE935985E}"/>
+                <a16:creationId xmlns="" xmlns:a16="http://schemas.microsoft.com/office/drawing/2014/main" id="{4FD8317D-E5DC-48AE-B946-799BE935985E}"/>
               </a:ext>
             </a:extLst>
           </p:cNvPr>
@@ -1068,8 +1613,8 @@
         </p:blipFill>
         <p:spPr>
           <a:xfrm>
-            <a:off x="0" y="0"/>
-            <a:ext cx="12192000" cy="6858000"/>
+            <a:off x="0" y="1"/>
+            <a:ext cx="4389438" cy="2286000"/>
           </a:xfrm>
           <a:prstGeom prst="rect">
             <a:avLst/>
@@ -1081,7 +1626,7 @@
           <p:cNvPr id="5" name="Rectangle 4">
             <a:extLst>
               <a:ext uri="{FF2B5EF4-FFF2-40B4-BE49-F238E27FC236}">
-                <a16:creationId xmlns:a16="http://schemas.microsoft.com/office/drawing/2014/main" xmlns="" id="{C250DED9-2375-4F1F-B1BB-FFBC67D08FEA}"/>
+                <a16:creationId xmlns="" xmlns:a16="http://schemas.microsoft.com/office/drawing/2014/main" id="{C250DED9-2375-4F1F-B1BB-FFBC67D08FEA}"/>
               </a:ext>
             </a:extLst>
           </p:cNvPr>
@@ -1090,8 +1635,8 @@
         </p:nvSpPr>
         <p:spPr>
           <a:xfrm>
-            <a:off x="0" y="0"/>
-            <a:ext cx="12191999" cy="6857999"/>
+            <a:off x="0" y="2"/>
+            <a:ext cx="4389438" cy="2285999"/>
           </a:xfrm>
           <a:prstGeom prst="rect">
             <a:avLst/>
@@ -1126,7 +1671,7 @@
           <a:lstStyle/>
           <a:p>
             <a:pPr algn="ctr"/>
-            <a:endParaRPr lang="en-US"/>
+            <a:endParaRPr lang="en-US" sz="1037"/>
           </a:p>
         </p:txBody>
       </p:sp>
@@ -1143,7 +1688,7 @@
 </p:sldLayout>
 </file>
 
-<file path=ppt/slideLayouts/slideLayout5.xml><?xml version="1.0" encoding="utf-8"?>
+<file path=ppt/slideLayouts/slideLayout16.xml><?xml version="1.0" encoding="utf-8"?>
 <p:sldLayout xmlns:a="http://schemas.openxmlformats.org/drawingml/2006/main" xmlns:r="http://schemas.openxmlformats.org/officeDocument/2006/relationships" xmlns:p="http://schemas.openxmlformats.org/presentationml/2006/main" preserve="1" userDrawn="1">
   <p:cSld name="Simple_Design">
     <p:spTree>
@@ -1172,8 +1717,8 @@
         </p:nvSpPr>
         <p:spPr>
           <a:xfrm>
-            <a:off x="9342120" y="6583680"/>
-            <a:ext cx="2743200" cy="274320"/>
+            <a:off x="3363407" y="2194561"/>
+            <a:ext cx="987624" cy="91440"/>
           </a:xfrm>
           <a:prstGeom prst="rect">
             <a:avLst/>
@@ -1210,8 +1755,8 @@
         </p:nvSpPr>
         <p:spPr>
           <a:xfrm>
-            <a:off x="9342120" y="6583680"/>
-            <a:ext cx="2743200" cy="274320"/>
+            <a:off x="3363407" y="2194561"/>
+            <a:ext cx="987624" cy="91440"/>
           </a:xfrm>
           <a:prstGeom prst="rect">
             <a:avLst/>
@@ -1316,11 +1861,11 @@
           </a:lstStyle>
           <a:p>
             <a:fld id="{FFF8894C-962F-4043-BDE4-6CA2ABEDD0B4}" type="slidenum">
-              <a:rPr lang="en-US" smtClean="0"/>
+              <a:rPr lang="en-US" sz="1200" smtClean="0"/>
               <a:pPr/>
               <a:t>‹#›</a:t>
             </a:fld>
-            <a:endParaRPr lang="en-US" dirty="0"/>
+            <a:endParaRPr lang="en-US" sz="1200" dirty="0"/>
           </a:p>
         </p:txBody>
       </p:sp>
@@ -1346,8 +1891,8 @@
         </p:blipFill>
         <p:spPr>
           <a:xfrm>
-            <a:off x="0" y="0"/>
-            <a:ext cx="12192000" cy="6858000"/>
+            <a:off x="0" y="1"/>
+            <a:ext cx="4389438" cy="2286000"/>
           </a:xfrm>
           <a:prstGeom prst="rect">
             <a:avLst/>
@@ -1364,6 +1909,1776 @@
   <p:clrMapOvr>
     <a:masterClrMapping/>
   </p:clrMapOvr>
+</p:sldLayout>
+</file>
+
+<file path=ppt/slideLayouts/slideLayout2.xml><?xml version="1.0" encoding="utf-8"?>
+<p:sldLayout xmlns:a="http://schemas.openxmlformats.org/drawingml/2006/main" xmlns:r="http://schemas.openxmlformats.org/officeDocument/2006/relationships" xmlns:p="http://schemas.openxmlformats.org/presentationml/2006/main" type="obj" preserve="1">
+  <p:cSld name="Title and Content">
+    <p:spTree>
+      <p:nvGrpSpPr>
+        <p:cNvPr id="1" name=""/>
+        <p:cNvGrpSpPr/>
+        <p:nvPr/>
+      </p:nvGrpSpPr>
+      <p:grpSpPr>
+        <a:xfrm>
+          <a:off x="0" y="0"/>
+          <a:ext cx="0" cy="0"/>
+          <a:chOff x="0" y="0"/>
+          <a:chExt cx="0" cy="0"/>
+        </a:xfrm>
+      </p:grpSpPr>
+      <p:sp>
+        <p:nvSpPr>
+          <p:cNvPr id="2" name="Title 1"/>
+          <p:cNvSpPr>
+            <a:spLocks noGrp="1"/>
+          </p:cNvSpPr>
+          <p:nvPr>
+            <p:ph type="title"/>
+          </p:nvPr>
+        </p:nvSpPr>
+        <p:spPr/>
+        <p:txBody>
+          <a:bodyPr/>
+          <a:lstStyle/>
+          <a:p>
+            <a:r>
+              <a:rPr lang="en-US" smtClean="0"/>
+              <a:t>Click to edit Master title style</a:t>
+            </a:r>
+            <a:endParaRPr lang="en-US" dirty="0"/>
+          </a:p>
+        </p:txBody>
+      </p:sp>
+      <p:sp>
+        <p:nvSpPr>
+          <p:cNvPr id="3" name="Content Placeholder 2"/>
+          <p:cNvSpPr>
+            <a:spLocks noGrp="1"/>
+          </p:cNvSpPr>
+          <p:nvPr>
+            <p:ph idx="1"/>
+          </p:nvPr>
+        </p:nvSpPr>
+        <p:spPr/>
+        <p:txBody>
+          <a:bodyPr/>
+          <a:lstStyle/>
+          <a:p>
+            <a:pPr lvl="0"/>
+            <a:r>
+              <a:rPr lang="en-US" smtClean="0"/>
+              <a:t>Click to edit Master text styles</a:t>
+            </a:r>
+          </a:p>
+          <a:p>
+            <a:pPr lvl="1"/>
+            <a:r>
+              <a:rPr lang="en-US" smtClean="0"/>
+              <a:t>Second level</a:t>
+            </a:r>
+          </a:p>
+          <a:p>
+            <a:pPr lvl="2"/>
+            <a:r>
+              <a:rPr lang="en-US" smtClean="0"/>
+              <a:t>Third level</a:t>
+            </a:r>
+          </a:p>
+          <a:p>
+            <a:pPr lvl="3"/>
+            <a:r>
+              <a:rPr lang="en-US" smtClean="0"/>
+              <a:t>Fourth level</a:t>
+            </a:r>
+          </a:p>
+          <a:p>
+            <a:pPr lvl="4"/>
+            <a:r>
+              <a:rPr lang="en-US" smtClean="0"/>
+              <a:t>Fifth level</a:t>
+            </a:r>
+            <a:endParaRPr lang="en-US" dirty="0"/>
+          </a:p>
+        </p:txBody>
+      </p:sp>
+      <p:sp>
+        <p:nvSpPr>
+          <p:cNvPr id="4" name="Date Placeholder 3"/>
+          <p:cNvSpPr>
+            <a:spLocks noGrp="1"/>
+          </p:cNvSpPr>
+          <p:nvPr>
+            <p:ph type="dt" sz="half" idx="10"/>
+          </p:nvPr>
+        </p:nvSpPr>
+        <p:spPr/>
+        <p:txBody>
+          <a:bodyPr/>
+          <a:lstStyle/>
+          <a:p>
+            <a:fld id="{C764DE79-268F-4C1A-8933-263129D2AF90}" type="datetimeFigureOut">
+              <a:rPr lang="en-US" smtClean="0"/>
+              <a:t>8/10/18</a:t>
+            </a:fld>
+            <a:endParaRPr lang="en-US" dirty="0"/>
+          </a:p>
+        </p:txBody>
+      </p:sp>
+      <p:sp>
+        <p:nvSpPr>
+          <p:cNvPr id="5" name="Footer Placeholder 4"/>
+          <p:cNvSpPr>
+            <a:spLocks noGrp="1"/>
+          </p:cNvSpPr>
+          <p:nvPr>
+            <p:ph type="ftr" sz="quarter" idx="11"/>
+          </p:nvPr>
+        </p:nvSpPr>
+        <p:spPr/>
+        <p:txBody>
+          <a:bodyPr/>
+          <a:lstStyle/>
+          <a:p>
+            <a:endParaRPr lang="en-US" dirty="0"/>
+          </a:p>
+        </p:txBody>
+      </p:sp>
+      <p:sp>
+        <p:nvSpPr>
+          <p:cNvPr id="6" name="Slide Number Placeholder 5"/>
+          <p:cNvSpPr>
+            <a:spLocks noGrp="1"/>
+          </p:cNvSpPr>
+          <p:nvPr>
+            <p:ph type="sldNum" sz="quarter" idx="12"/>
+          </p:nvPr>
+        </p:nvSpPr>
+        <p:spPr/>
+        <p:txBody>
+          <a:bodyPr/>
+          <a:lstStyle/>
+          <a:p>
+            <a:fld id="{48F63A3B-78C7-47BE-AE5E-E10140E04643}" type="slidenum">
+              <a:rPr lang="en-US" smtClean="0"/>
+              <a:t>‹#›</a:t>
+            </a:fld>
+            <a:endParaRPr lang="en-US" dirty="0"/>
+          </a:p>
+        </p:txBody>
+      </p:sp>
+    </p:spTree>
+    <p:extLst>
+      <p:ext uri="{BB962C8B-B14F-4D97-AF65-F5344CB8AC3E}">
+        <p14:creationId xmlns:p14="http://schemas.microsoft.com/office/powerpoint/2010/main" val="912352660"/>
+      </p:ext>
+    </p:extLst>
+  </p:cSld>
+  <p:clrMapOvr>
+    <a:masterClrMapping/>
+  </p:clrMapOvr>
+  <p:hf hdr="0" ftr="0" dt="0"/>
+</p:sldLayout>
+</file>
+
+<file path=ppt/slideLayouts/slideLayout3.xml><?xml version="1.0" encoding="utf-8"?>
+<p:sldLayout xmlns:a="http://schemas.openxmlformats.org/drawingml/2006/main" xmlns:r="http://schemas.openxmlformats.org/officeDocument/2006/relationships" xmlns:p="http://schemas.openxmlformats.org/presentationml/2006/main" type="secHead" preserve="1">
+  <p:cSld name="Section Header">
+    <p:spTree>
+      <p:nvGrpSpPr>
+        <p:cNvPr id="1" name=""/>
+        <p:cNvGrpSpPr/>
+        <p:nvPr/>
+      </p:nvGrpSpPr>
+      <p:grpSpPr>
+        <a:xfrm>
+          <a:off x="0" y="0"/>
+          <a:ext cx="0" cy="0"/>
+          <a:chOff x="0" y="0"/>
+          <a:chExt cx="0" cy="0"/>
+        </a:xfrm>
+      </p:grpSpPr>
+      <p:sp>
+        <p:nvSpPr>
+          <p:cNvPr id="2" name="Title 1"/>
+          <p:cNvSpPr>
+            <a:spLocks noGrp="1"/>
+          </p:cNvSpPr>
+          <p:nvPr>
+            <p:ph type="title"/>
+          </p:nvPr>
+        </p:nvSpPr>
+        <p:spPr>
+          <a:xfrm>
+            <a:off x="299488" y="569913"/>
+            <a:ext cx="3785890" cy="950912"/>
+          </a:xfrm>
+        </p:spPr>
+        <p:txBody>
+          <a:bodyPr anchor="b"/>
+          <a:lstStyle>
+            <a:lvl1pPr>
+              <a:defRPr sz="2000"/>
+            </a:lvl1pPr>
+          </a:lstStyle>
+          <a:p>
+            <a:r>
+              <a:rPr lang="en-US" smtClean="0"/>
+              <a:t>Click to edit Master title style</a:t>
+            </a:r>
+            <a:endParaRPr lang="en-US" dirty="0"/>
+          </a:p>
+        </p:txBody>
+      </p:sp>
+      <p:sp>
+        <p:nvSpPr>
+          <p:cNvPr id="3" name="Text Placeholder 2"/>
+          <p:cNvSpPr>
+            <a:spLocks noGrp="1"/>
+          </p:cNvSpPr>
+          <p:nvPr>
+            <p:ph type="body" idx="1"/>
+          </p:nvPr>
+        </p:nvSpPr>
+        <p:spPr>
+          <a:xfrm>
+            <a:off x="299488" y="1529821"/>
+            <a:ext cx="3785890" cy="500062"/>
+          </a:xfrm>
+        </p:spPr>
+        <p:txBody>
+          <a:bodyPr/>
+          <a:lstStyle>
+            <a:lvl1pPr marL="0" indent="0">
+              <a:buNone/>
+              <a:defRPr sz="800">
+                <a:solidFill>
+                  <a:schemeClr val="tx1">
+                    <a:tint val="75000"/>
+                  </a:schemeClr>
+                </a:solidFill>
+              </a:defRPr>
+            </a:lvl1pPr>
+            <a:lvl2pPr marL="152385" indent="0">
+              <a:buNone/>
+              <a:defRPr sz="667">
+                <a:solidFill>
+                  <a:schemeClr val="tx1">
+                    <a:tint val="75000"/>
+                  </a:schemeClr>
+                </a:solidFill>
+              </a:defRPr>
+            </a:lvl2pPr>
+            <a:lvl3pPr marL="304770" indent="0">
+              <a:buNone/>
+              <a:defRPr sz="600">
+                <a:solidFill>
+                  <a:schemeClr val="tx1">
+                    <a:tint val="75000"/>
+                  </a:schemeClr>
+                </a:solidFill>
+              </a:defRPr>
+            </a:lvl3pPr>
+            <a:lvl4pPr marL="457154" indent="0">
+              <a:buNone/>
+              <a:defRPr sz="533">
+                <a:solidFill>
+                  <a:schemeClr val="tx1">
+                    <a:tint val="75000"/>
+                  </a:schemeClr>
+                </a:solidFill>
+              </a:defRPr>
+            </a:lvl4pPr>
+            <a:lvl5pPr marL="609539" indent="0">
+              <a:buNone/>
+              <a:defRPr sz="533">
+                <a:solidFill>
+                  <a:schemeClr val="tx1">
+                    <a:tint val="75000"/>
+                  </a:schemeClr>
+                </a:solidFill>
+              </a:defRPr>
+            </a:lvl5pPr>
+            <a:lvl6pPr marL="761924" indent="0">
+              <a:buNone/>
+              <a:defRPr sz="533">
+                <a:solidFill>
+                  <a:schemeClr val="tx1">
+                    <a:tint val="75000"/>
+                  </a:schemeClr>
+                </a:solidFill>
+              </a:defRPr>
+            </a:lvl6pPr>
+            <a:lvl7pPr marL="914309" indent="0">
+              <a:buNone/>
+              <a:defRPr sz="533">
+                <a:solidFill>
+                  <a:schemeClr val="tx1">
+                    <a:tint val="75000"/>
+                  </a:schemeClr>
+                </a:solidFill>
+              </a:defRPr>
+            </a:lvl7pPr>
+            <a:lvl8pPr marL="1066693" indent="0">
+              <a:buNone/>
+              <a:defRPr sz="533">
+                <a:solidFill>
+                  <a:schemeClr val="tx1">
+                    <a:tint val="75000"/>
+                  </a:schemeClr>
+                </a:solidFill>
+              </a:defRPr>
+            </a:lvl8pPr>
+            <a:lvl9pPr marL="1219078" indent="0">
+              <a:buNone/>
+              <a:defRPr sz="533">
+                <a:solidFill>
+                  <a:schemeClr val="tx1">
+                    <a:tint val="75000"/>
+                  </a:schemeClr>
+                </a:solidFill>
+              </a:defRPr>
+            </a:lvl9pPr>
+          </a:lstStyle>
+          <a:p>
+            <a:pPr lvl="0"/>
+            <a:r>
+              <a:rPr lang="en-US" smtClean="0"/>
+              <a:t>Click to edit Master text styles</a:t>
+            </a:r>
+          </a:p>
+        </p:txBody>
+      </p:sp>
+      <p:sp>
+        <p:nvSpPr>
+          <p:cNvPr id="4" name="Date Placeholder 3"/>
+          <p:cNvSpPr>
+            <a:spLocks noGrp="1"/>
+          </p:cNvSpPr>
+          <p:nvPr>
+            <p:ph type="dt" sz="half" idx="10"/>
+          </p:nvPr>
+        </p:nvSpPr>
+        <p:spPr/>
+        <p:txBody>
+          <a:bodyPr/>
+          <a:lstStyle/>
+          <a:p>
+            <a:fld id="{C764DE79-268F-4C1A-8933-263129D2AF90}" type="datetimeFigureOut">
+              <a:rPr lang="en-US" smtClean="0"/>
+              <a:t>8/10/18</a:t>
+            </a:fld>
+            <a:endParaRPr lang="en-US" dirty="0"/>
+          </a:p>
+        </p:txBody>
+      </p:sp>
+      <p:sp>
+        <p:nvSpPr>
+          <p:cNvPr id="5" name="Footer Placeholder 4"/>
+          <p:cNvSpPr>
+            <a:spLocks noGrp="1"/>
+          </p:cNvSpPr>
+          <p:nvPr>
+            <p:ph type="ftr" sz="quarter" idx="11"/>
+          </p:nvPr>
+        </p:nvSpPr>
+        <p:spPr/>
+        <p:txBody>
+          <a:bodyPr/>
+          <a:lstStyle/>
+          <a:p>
+            <a:endParaRPr lang="en-US" dirty="0"/>
+          </a:p>
+        </p:txBody>
+      </p:sp>
+      <p:sp>
+        <p:nvSpPr>
+          <p:cNvPr id="6" name="Slide Number Placeholder 5"/>
+          <p:cNvSpPr>
+            <a:spLocks noGrp="1"/>
+          </p:cNvSpPr>
+          <p:nvPr>
+            <p:ph type="sldNum" sz="quarter" idx="12"/>
+          </p:nvPr>
+        </p:nvSpPr>
+        <p:spPr/>
+        <p:txBody>
+          <a:bodyPr/>
+          <a:lstStyle/>
+          <a:p>
+            <a:fld id="{48F63A3B-78C7-47BE-AE5E-E10140E04643}" type="slidenum">
+              <a:rPr lang="en-US" smtClean="0"/>
+              <a:t>‹#›</a:t>
+            </a:fld>
+            <a:endParaRPr lang="en-US" dirty="0"/>
+          </a:p>
+        </p:txBody>
+      </p:sp>
+    </p:spTree>
+    <p:extLst>
+      <p:ext uri="{BB962C8B-B14F-4D97-AF65-F5344CB8AC3E}">
+        <p14:creationId xmlns:p14="http://schemas.microsoft.com/office/powerpoint/2010/main" val="877917040"/>
+      </p:ext>
+    </p:extLst>
+  </p:cSld>
+  <p:clrMapOvr>
+    <a:masterClrMapping/>
+  </p:clrMapOvr>
+  <p:hf hdr="0" ftr="0" dt="0"/>
+</p:sldLayout>
+</file>
+
+<file path=ppt/slideLayouts/slideLayout4.xml><?xml version="1.0" encoding="utf-8"?>
+<p:sldLayout xmlns:a="http://schemas.openxmlformats.org/drawingml/2006/main" xmlns:r="http://schemas.openxmlformats.org/officeDocument/2006/relationships" xmlns:p="http://schemas.openxmlformats.org/presentationml/2006/main" type="twoObj" preserve="1">
+  <p:cSld name="Two Content">
+    <p:spTree>
+      <p:nvGrpSpPr>
+        <p:cNvPr id="1" name=""/>
+        <p:cNvGrpSpPr/>
+        <p:nvPr/>
+      </p:nvGrpSpPr>
+      <p:grpSpPr>
+        <a:xfrm>
+          <a:off x="0" y="0"/>
+          <a:ext cx="0" cy="0"/>
+          <a:chOff x="0" y="0"/>
+          <a:chExt cx="0" cy="0"/>
+        </a:xfrm>
+      </p:grpSpPr>
+      <p:sp>
+        <p:nvSpPr>
+          <p:cNvPr id="2" name="Title 1"/>
+          <p:cNvSpPr>
+            <a:spLocks noGrp="1"/>
+          </p:cNvSpPr>
+          <p:nvPr>
+            <p:ph type="title"/>
+          </p:nvPr>
+        </p:nvSpPr>
+        <p:spPr/>
+        <p:txBody>
+          <a:bodyPr/>
+          <a:lstStyle/>
+          <a:p>
+            <a:r>
+              <a:rPr lang="en-US" smtClean="0"/>
+              <a:t>Click to edit Master title style</a:t>
+            </a:r>
+            <a:endParaRPr lang="en-US" dirty="0"/>
+          </a:p>
+        </p:txBody>
+      </p:sp>
+      <p:sp>
+        <p:nvSpPr>
+          <p:cNvPr id="3" name="Content Placeholder 2"/>
+          <p:cNvSpPr>
+            <a:spLocks noGrp="1"/>
+          </p:cNvSpPr>
+          <p:nvPr>
+            <p:ph sz="half" idx="1"/>
+          </p:nvPr>
+        </p:nvSpPr>
+        <p:spPr>
+          <a:xfrm>
+            <a:off x="301774" y="608542"/>
+            <a:ext cx="1865511" cy="1450446"/>
+          </a:xfrm>
+        </p:spPr>
+        <p:txBody>
+          <a:bodyPr/>
+          <a:lstStyle/>
+          <a:p>
+            <a:pPr lvl="0"/>
+            <a:r>
+              <a:rPr lang="en-US" smtClean="0"/>
+              <a:t>Click to edit Master text styles</a:t>
+            </a:r>
+          </a:p>
+          <a:p>
+            <a:pPr lvl="1"/>
+            <a:r>
+              <a:rPr lang="en-US" smtClean="0"/>
+              <a:t>Second level</a:t>
+            </a:r>
+          </a:p>
+          <a:p>
+            <a:pPr lvl="2"/>
+            <a:r>
+              <a:rPr lang="en-US" smtClean="0"/>
+              <a:t>Third level</a:t>
+            </a:r>
+          </a:p>
+          <a:p>
+            <a:pPr lvl="3"/>
+            <a:r>
+              <a:rPr lang="en-US" smtClean="0"/>
+              <a:t>Fourth level</a:t>
+            </a:r>
+          </a:p>
+          <a:p>
+            <a:pPr lvl="4"/>
+            <a:r>
+              <a:rPr lang="en-US" smtClean="0"/>
+              <a:t>Fifth level</a:t>
+            </a:r>
+            <a:endParaRPr lang="en-US" dirty="0"/>
+          </a:p>
+        </p:txBody>
+      </p:sp>
+      <p:sp>
+        <p:nvSpPr>
+          <p:cNvPr id="4" name="Content Placeholder 3"/>
+          <p:cNvSpPr>
+            <a:spLocks noGrp="1"/>
+          </p:cNvSpPr>
+          <p:nvPr>
+            <p:ph sz="half" idx="2"/>
+          </p:nvPr>
+        </p:nvSpPr>
+        <p:spPr>
+          <a:xfrm>
+            <a:off x="2222153" y="608542"/>
+            <a:ext cx="1865511" cy="1450446"/>
+          </a:xfrm>
+        </p:spPr>
+        <p:txBody>
+          <a:bodyPr/>
+          <a:lstStyle/>
+          <a:p>
+            <a:pPr lvl="0"/>
+            <a:r>
+              <a:rPr lang="en-US" smtClean="0"/>
+              <a:t>Click to edit Master text styles</a:t>
+            </a:r>
+          </a:p>
+          <a:p>
+            <a:pPr lvl="1"/>
+            <a:r>
+              <a:rPr lang="en-US" smtClean="0"/>
+              <a:t>Second level</a:t>
+            </a:r>
+          </a:p>
+          <a:p>
+            <a:pPr lvl="2"/>
+            <a:r>
+              <a:rPr lang="en-US" smtClean="0"/>
+              <a:t>Third level</a:t>
+            </a:r>
+          </a:p>
+          <a:p>
+            <a:pPr lvl="3"/>
+            <a:r>
+              <a:rPr lang="en-US" smtClean="0"/>
+              <a:t>Fourth level</a:t>
+            </a:r>
+          </a:p>
+          <a:p>
+            <a:pPr lvl="4"/>
+            <a:r>
+              <a:rPr lang="en-US" smtClean="0"/>
+              <a:t>Fifth level</a:t>
+            </a:r>
+            <a:endParaRPr lang="en-US" dirty="0"/>
+          </a:p>
+        </p:txBody>
+      </p:sp>
+      <p:sp>
+        <p:nvSpPr>
+          <p:cNvPr id="5" name="Date Placeholder 4"/>
+          <p:cNvSpPr>
+            <a:spLocks noGrp="1"/>
+          </p:cNvSpPr>
+          <p:nvPr>
+            <p:ph type="dt" sz="half" idx="10"/>
+          </p:nvPr>
+        </p:nvSpPr>
+        <p:spPr/>
+        <p:txBody>
+          <a:bodyPr/>
+          <a:lstStyle/>
+          <a:p>
+            <a:fld id="{C764DE79-268F-4C1A-8933-263129D2AF90}" type="datetimeFigureOut">
+              <a:rPr lang="en-US" smtClean="0"/>
+              <a:t>8/10/18</a:t>
+            </a:fld>
+            <a:endParaRPr lang="en-US" dirty="0"/>
+          </a:p>
+        </p:txBody>
+      </p:sp>
+      <p:sp>
+        <p:nvSpPr>
+          <p:cNvPr id="6" name="Footer Placeholder 5"/>
+          <p:cNvSpPr>
+            <a:spLocks noGrp="1"/>
+          </p:cNvSpPr>
+          <p:nvPr>
+            <p:ph type="ftr" sz="quarter" idx="11"/>
+          </p:nvPr>
+        </p:nvSpPr>
+        <p:spPr/>
+        <p:txBody>
+          <a:bodyPr/>
+          <a:lstStyle/>
+          <a:p>
+            <a:endParaRPr lang="en-US" dirty="0"/>
+          </a:p>
+        </p:txBody>
+      </p:sp>
+      <p:sp>
+        <p:nvSpPr>
+          <p:cNvPr id="7" name="Slide Number Placeholder 6"/>
+          <p:cNvSpPr>
+            <a:spLocks noGrp="1"/>
+          </p:cNvSpPr>
+          <p:nvPr>
+            <p:ph type="sldNum" sz="quarter" idx="12"/>
+          </p:nvPr>
+        </p:nvSpPr>
+        <p:spPr/>
+        <p:txBody>
+          <a:bodyPr/>
+          <a:lstStyle/>
+          <a:p>
+            <a:fld id="{48F63A3B-78C7-47BE-AE5E-E10140E04643}" type="slidenum">
+              <a:rPr lang="en-US" smtClean="0"/>
+              <a:t>‹#›</a:t>
+            </a:fld>
+            <a:endParaRPr lang="en-US" dirty="0"/>
+          </a:p>
+        </p:txBody>
+      </p:sp>
+    </p:spTree>
+    <p:extLst>
+      <p:ext uri="{BB962C8B-B14F-4D97-AF65-F5344CB8AC3E}">
+        <p14:creationId xmlns:p14="http://schemas.microsoft.com/office/powerpoint/2010/main" val="1939036390"/>
+      </p:ext>
+    </p:extLst>
+  </p:cSld>
+  <p:clrMapOvr>
+    <a:masterClrMapping/>
+  </p:clrMapOvr>
+  <p:hf hdr="0" ftr="0" dt="0"/>
+</p:sldLayout>
+</file>
+
+<file path=ppt/slideLayouts/slideLayout5.xml><?xml version="1.0" encoding="utf-8"?>
+<p:sldLayout xmlns:a="http://schemas.openxmlformats.org/drawingml/2006/main" xmlns:r="http://schemas.openxmlformats.org/officeDocument/2006/relationships" xmlns:p="http://schemas.openxmlformats.org/presentationml/2006/main" type="twoTxTwoObj" preserve="1">
+  <p:cSld name="Comparison">
+    <p:spTree>
+      <p:nvGrpSpPr>
+        <p:cNvPr id="1" name=""/>
+        <p:cNvGrpSpPr/>
+        <p:nvPr/>
+      </p:nvGrpSpPr>
+      <p:grpSpPr>
+        <a:xfrm>
+          <a:off x="0" y="0"/>
+          <a:ext cx="0" cy="0"/>
+          <a:chOff x="0" y="0"/>
+          <a:chExt cx="0" cy="0"/>
+        </a:xfrm>
+      </p:grpSpPr>
+      <p:sp>
+        <p:nvSpPr>
+          <p:cNvPr id="2" name="Title 1"/>
+          <p:cNvSpPr>
+            <a:spLocks noGrp="1"/>
+          </p:cNvSpPr>
+          <p:nvPr>
+            <p:ph type="title"/>
+          </p:nvPr>
+        </p:nvSpPr>
+        <p:spPr>
+          <a:xfrm>
+            <a:off x="302346" y="121709"/>
+            <a:ext cx="3785890" cy="441854"/>
+          </a:xfrm>
+        </p:spPr>
+        <p:txBody>
+          <a:bodyPr/>
+          <a:lstStyle/>
+          <a:p>
+            <a:r>
+              <a:rPr lang="en-US" smtClean="0"/>
+              <a:t>Click to edit Master title style</a:t>
+            </a:r>
+            <a:endParaRPr lang="en-US" dirty="0"/>
+          </a:p>
+        </p:txBody>
+      </p:sp>
+      <p:sp>
+        <p:nvSpPr>
+          <p:cNvPr id="3" name="Text Placeholder 2"/>
+          <p:cNvSpPr>
+            <a:spLocks noGrp="1"/>
+          </p:cNvSpPr>
+          <p:nvPr>
+            <p:ph type="body" idx="1"/>
+          </p:nvPr>
+        </p:nvSpPr>
+        <p:spPr>
+          <a:xfrm>
+            <a:off x="302346" y="560388"/>
+            <a:ext cx="1856938" cy="274637"/>
+          </a:xfrm>
+        </p:spPr>
+        <p:txBody>
+          <a:bodyPr anchor="b"/>
+          <a:lstStyle>
+            <a:lvl1pPr marL="0" indent="0">
+              <a:buNone/>
+              <a:defRPr sz="800" b="1"/>
+            </a:lvl1pPr>
+            <a:lvl2pPr marL="152385" indent="0">
+              <a:buNone/>
+              <a:defRPr sz="667" b="1"/>
+            </a:lvl2pPr>
+            <a:lvl3pPr marL="304770" indent="0">
+              <a:buNone/>
+              <a:defRPr sz="600" b="1"/>
+            </a:lvl3pPr>
+            <a:lvl4pPr marL="457154" indent="0">
+              <a:buNone/>
+              <a:defRPr sz="533" b="1"/>
+            </a:lvl4pPr>
+            <a:lvl5pPr marL="609539" indent="0">
+              <a:buNone/>
+              <a:defRPr sz="533" b="1"/>
+            </a:lvl5pPr>
+            <a:lvl6pPr marL="761924" indent="0">
+              <a:buNone/>
+              <a:defRPr sz="533" b="1"/>
+            </a:lvl6pPr>
+            <a:lvl7pPr marL="914309" indent="0">
+              <a:buNone/>
+              <a:defRPr sz="533" b="1"/>
+            </a:lvl7pPr>
+            <a:lvl8pPr marL="1066693" indent="0">
+              <a:buNone/>
+              <a:defRPr sz="533" b="1"/>
+            </a:lvl8pPr>
+            <a:lvl9pPr marL="1219078" indent="0">
+              <a:buNone/>
+              <a:defRPr sz="533" b="1"/>
+            </a:lvl9pPr>
+          </a:lstStyle>
+          <a:p>
+            <a:pPr lvl="0"/>
+            <a:r>
+              <a:rPr lang="en-US" smtClean="0"/>
+              <a:t>Click to edit Master text styles</a:t>
+            </a:r>
+          </a:p>
+        </p:txBody>
+      </p:sp>
+      <p:sp>
+        <p:nvSpPr>
+          <p:cNvPr id="4" name="Content Placeholder 3"/>
+          <p:cNvSpPr>
+            <a:spLocks noGrp="1"/>
+          </p:cNvSpPr>
+          <p:nvPr>
+            <p:ph sz="half" idx="2"/>
+          </p:nvPr>
+        </p:nvSpPr>
+        <p:spPr>
+          <a:xfrm>
+            <a:off x="302346" y="835025"/>
+            <a:ext cx="1856938" cy="1228196"/>
+          </a:xfrm>
+        </p:spPr>
+        <p:txBody>
+          <a:bodyPr/>
+          <a:lstStyle/>
+          <a:p>
+            <a:pPr lvl="0"/>
+            <a:r>
+              <a:rPr lang="en-US" smtClean="0"/>
+              <a:t>Click to edit Master text styles</a:t>
+            </a:r>
+          </a:p>
+          <a:p>
+            <a:pPr lvl="1"/>
+            <a:r>
+              <a:rPr lang="en-US" smtClean="0"/>
+              <a:t>Second level</a:t>
+            </a:r>
+          </a:p>
+          <a:p>
+            <a:pPr lvl="2"/>
+            <a:r>
+              <a:rPr lang="en-US" smtClean="0"/>
+              <a:t>Third level</a:t>
+            </a:r>
+          </a:p>
+          <a:p>
+            <a:pPr lvl="3"/>
+            <a:r>
+              <a:rPr lang="en-US" smtClean="0"/>
+              <a:t>Fourth level</a:t>
+            </a:r>
+          </a:p>
+          <a:p>
+            <a:pPr lvl="4"/>
+            <a:r>
+              <a:rPr lang="en-US" smtClean="0"/>
+              <a:t>Fifth level</a:t>
+            </a:r>
+            <a:endParaRPr lang="en-US" dirty="0"/>
+          </a:p>
+        </p:txBody>
+      </p:sp>
+      <p:sp>
+        <p:nvSpPr>
+          <p:cNvPr id="5" name="Text Placeholder 4"/>
+          <p:cNvSpPr>
+            <a:spLocks noGrp="1"/>
+          </p:cNvSpPr>
+          <p:nvPr>
+            <p:ph type="body" sz="quarter" idx="3"/>
+          </p:nvPr>
+        </p:nvSpPr>
+        <p:spPr>
+          <a:xfrm>
+            <a:off x="2222153" y="560388"/>
+            <a:ext cx="1866083" cy="274637"/>
+          </a:xfrm>
+        </p:spPr>
+        <p:txBody>
+          <a:bodyPr anchor="b"/>
+          <a:lstStyle>
+            <a:lvl1pPr marL="0" indent="0">
+              <a:buNone/>
+              <a:defRPr sz="800" b="1"/>
+            </a:lvl1pPr>
+            <a:lvl2pPr marL="152385" indent="0">
+              <a:buNone/>
+              <a:defRPr sz="667" b="1"/>
+            </a:lvl2pPr>
+            <a:lvl3pPr marL="304770" indent="0">
+              <a:buNone/>
+              <a:defRPr sz="600" b="1"/>
+            </a:lvl3pPr>
+            <a:lvl4pPr marL="457154" indent="0">
+              <a:buNone/>
+              <a:defRPr sz="533" b="1"/>
+            </a:lvl4pPr>
+            <a:lvl5pPr marL="609539" indent="0">
+              <a:buNone/>
+              <a:defRPr sz="533" b="1"/>
+            </a:lvl5pPr>
+            <a:lvl6pPr marL="761924" indent="0">
+              <a:buNone/>
+              <a:defRPr sz="533" b="1"/>
+            </a:lvl6pPr>
+            <a:lvl7pPr marL="914309" indent="0">
+              <a:buNone/>
+              <a:defRPr sz="533" b="1"/>
+            </a:lvl7pPr>
+            <a:lvl8pPr marL="1066693" indent="0">
+              <a:buNone/>
+              <a:defRPr sz="533" b="1"/>
+            </a:lvl8pPr>
+            <a:lvl9pPr marL="1219078" indent="0">
+              <a:buNone/>
+              <a:defRPr sz="533" b="1"/>
+            </a:lvl9pPr>
+          </a:lstStyle>
+          <a:p>
+            <a:pPr lvl="0"/>
+            <a:r>
+              <a:rPr lang="en-US" smtClean="0"/>
+              <a:t>Click to edit Master text styles</a:t>
+            </a:r>
+          </a:p>
+        </p:txBody>
+      </p:sp>
+      <p:sp>
+        <p:nvSpPr>
+          <p:cNvPr id="6" name="Content Placeholder 5"/>
+          <p:cNvSpPr>
+            <a:spLocks noGrp="1"/>
+          </p:cNvSpPr>
+          <p:nvPr>
+            <p:ph sz="quarter" idx="4"/>
+          </p:nvPr>
+        </p:nvSpPr>
+        <p:spPr>
+          <a:xfrm>
+            <a:off x="2222153" y="835025"/>
+            <a:ext cx="1866083" cy="1228196"/>
+          </a:xfrm>
+        </p:spPr>
+        <p:txBody>
+          <a:bodyPr/>
+          <a:lstStyle/>
+          <a:p>
+            <a:pPr lvl="0"/>
+            <a:r>
+              <a:rPr lang="en-US" smtClean="0"/>
+              <a:t>Click to edit Master text styles</a:t>
+            </a:r>
+          </a:p>
+          <a:p>
+            <a:pPr lvl="1"/>
+            <a:r>
+              <a:rPr lang="en-US" smtClean="0"/>
+              <a:t>Second level</a:t>
+            </a:r>
+          </a:p>
+          <a:p>
+            <a:pPr lvl="2"/>
+            <a:r>
+              <a:rPr lang="en-US" smtClean="0"/>
+              <a:t>Third level</a:t>
+            </a:r>
+          </a:p>
+          <a:p>
+            <a:pPr lvl="3"/>
+            <a:r>
+              <a:rPr lang="en-US" smtClean="0"/>
+              <a:t>Fourth level</a:t>
+            </a:r>
+          </a:p>
+          <a:p>
+            <a:pPr lvl="4"/>
+            <a:r>
+              <a:rPr lang="en-US" smtClean="0"/>
+              <a:t>Fifth level</a:t>
+            </a:r>
+            <a:endParaRPr lang="en-US" dirty="0"/>
+          </a:p>
+        </p:txBody>
+      </p:sp>
+      <p:sp>
+        <p:nvSpPr>
+          <p:cNvPr id="7" name="Date Placeholder 6"/>
+          <p:cNvSpPr>
+            <a:spLocks noGrp="1"/>
+          </p:cNvSpPr>
+          <p:nvPr>
+            <p:ph type="dt" sz="half" idx="10"/>
+          </p:nvPr>
+        </p:nvSpPr>
+        <p:spPr/>
+        <p:txBody>
+          <a:bodyPr/>
+          <a:lstStyle/>
+          <a:p>
+            <a:fld id="{C764DE79-268F-4C1A-8933-263129D2AF90}" type="datetimeFigureOut">
+              <a:rPr lang="en-US" smtClean="0"/>
+              <a:t>8/10/18</a:t>
+            </a:fld>
+            <a:endParaRPr lang="en-US" dirty="0"/>
+          </a:p>
+        </p:txBody>
+      </p:sp>
+      <p:sp>
+        <p:nvSpPr>
+          <p:cNvPr id="8" name="Footer Placeholder 7"/>
+          <p:cNvSpPr>
+            <a:spLocks noGrp="1"/>
+          </p:cNvSpPr>
+          <p:nvPr>
+            <p:ph type="ftr" sz="quarter" idx="11"/>
+          </p:nvPr>
+        </p:nvSpPr>
+        <p:spPr/>
+        <p:txBody>
+          <a:bodyPr/>
+          <a:lstStyle/>
+          <a:p>
+            <a:endParaRPr lang="en-US" dirty="0"/>
+          </a:p>
+        </p:txBody>
+      </p:sp>
+      <p:sp>
+        <p:nvSpPr>
+          <p:cNvPr id="9" name="Slide Number Placeholder 8"/>
+          <p:cNvSpPr>
+            <a:spLocks noGrp="1"/>
+          </p:cNvSpPr>
+          <p:nvPr>
+            <p:ph type="sldNum" sz="quarter" idx="12"/>
+          </p:nvPr>
+        </p:nvSpPr>
+        <p:spPr/>
+        <p:txBody>
+          <a:bodyPr/>
+          <a:lstStyle/>
+          <a:p>
+            <a:fld id="{48F63A3B-78C7-47BE-AE5E-E10140E04643}" type="slidenum">
+              <a:rPr lang="en-US" smtClean="0"/>
+              <a:t>‹#›</a:t>
+            </a:fld>
+            <a:endParaRPr lang="en-US" dirty="0"/>
+          </a:p>
+        </p:txBody>
+      </p:sp>
+    </p:spTree>
+    <p:extLst>
+      <p:ext uri="{BB962C8B-B14F-4D97-AF65-F5344CB8AC3E}">
+        <p14:creationId xmlns:p14="http://schemas.microsoft.com/office/powerpoint/2010/main" val="1320263505"/>
+      </p:ext>
+    </p:extLst>
+  </p:cSld>
+  <p:clrMapOvr>
+    <a:masterClrMapping/>
+  </p:clrMapOvr>
+  <p:hf hdr="0" ftr="0" dt="0"/>
+</p:sldLayout>
+</file>
+
+<file path=ppt/slideLayouts/slideLayout6.xml><?xml version="1.0" encoding="utf-8"?>
+<p:sldLayout xmlns:a="http://schemas.openxmlformats.org/drawingml/2006/main" xmlns:r="http://schemas.openxmlformats.org/officeDocument/2006/relationships" xmlns:p="http://schemas.openxmlformats.org/presentationml/2006/main" type="titleOnly" preserve="1">
+  <p:cSld name="Title Only">
+    <p:spTree>
+      <p:nvGrpSpPr>
+        <p:cNvPr id="1" name=""/>
+        <p:cNvGrpSpPr/>
+        <p:nvPr/>
+      </p:nvGrpSpPr>
+      <p:grpSpPr>
+        <a:xfrm>
+          <a:off x="0" y="0"/>
+          <a:ext cx="0" cy="0"/>
+          <a:chOff x="0" y="0"/>
+          <a:chExt cx="0" cy="0"/>
+        </a:xfrm>
+      </p:grpSpPr>
+      <p:sp>
+        <p:nvSpPr>
+          <p:cNvPr id="2" name="Title 1"/>
+          <p:cNvSpPr>
+            <a:spLocks noGrp="1"/>
+          </p:cNvSpPr>
+          <p:nvPr>
+            <p:ph type="title"/>
+          </p:nvPr>
+        </p:nvSpPr>
+        <p:spPr/>
+        <p:txBody>
+          <a:bodyPr/>
+          <a:lstStyle/>
+          <a:p>
+            <a:r>
+              <a:rPr lang="en-US" smtClean="0"/>
+              <a:t>Click to edit Master title style</a:t>
+            </a:r>
+            <a:endParaRPr lang="en-US" dirty="0"/>
+          </a:p>
+        </p:txBody>
+      </p:sp>
+      <p:sp>
+        <p:nvSpPr>
+          <p:cNvPr id="3" name="Date Placeholder 2"/>
+          <p:cNvSpPr>
+            <a:spLocks noGrp="1"/>
+          </p:cNvSpPr>
+          <p:nvPr>
+            <p:ph type="dt" sz="half" idx="10"/>
+          </p:nvPr>
+        </p:nvSpPr>
+        <p:spPr/>
+        <p:txBody>
+          <a:bodyPr/>
+          <a:lstStyle/>
+          <a:p>
+            <a:fld id="{C764DE79-268F-4C1A-8933-263129D2AF90}" type="datetimeFigureOut">
+              <a:rPr lang="en-US" smtClean="0"/>
+              <a:t>8/10/18</a:t>
+            </a:fld>
+            <a:endParaRPr lang="en-US" dirty="0"/>
+          </a:p>
+        </p:txBody>
+      </p:sp>
+      <p:sp>
+        <p:nvSpPr>
+          <p:cNvPr id="4" name="Footer Placeholder 3"/>
+          <p:cNvSpPr>
+            <a:spLocks noGrp="1"/>
+          </p:cNvSpPr>
+          <p:nvPr>
+            <p:ph type="ftr" sz="quarter" idx="11"/>
+          </p:nvPr>
+        </p:nvSpPr>
+        <p:spPr/>
+        <p:txBody>
+          <a:bodyPr/>
+          <a:lstStyle/>
+          <a:p>
+            <a:endParaRPr lang="en-US" dirty="0"/>
+          </a:p>
+        </p:txBody>
+      </p:sp>
+      <p:sp>
+        <p:nvSpPr>
+          <p:cNvPr id="5" name="Slide Number Placeholder 4"/>
+          <p:cNvSpPr>
+            <a:spLocks noGrp="1"/>
+          </p:cNvSpPr>
+          <p:nvPr>
+            <p:ph type="sldNum" sz="quarter" idx="12"/>
+          </p:nvPr>
+        </p:nvSpPr>
+        <p:spPr/>
+        <p:txBody>
+          <a:bodyPr/>
+          <a:lstStyle/>
+          <a:p>
+            <a:fld id="{48F63A3B-78C7-47BE-AE5E-E10140E04643}" type="slidenum">
+              <a:rPr lang="en-US" smtClean="0"/>
+              <a:t>‹#›</a:t>
+            </a:fld>
+            <a:endParaRPr lang="en-US" dirty="0"/>
+          </a:p>
+        </p:txBody>
+      </p:sp>
+    </p:spTree>
+    <p:extLst>
+      <p:ext uri="{BB962C8B-B14F-4D97-AF65-F5344CB8AC3E}">
+        <p14:creationId xmlns:p14="http://schemas.microsoft.com/office/powerpoint/2010/main" val="1867687731"/>
+      </p:ext>
+    </p:extLst>
+  </p:cSld>
+  <p:clrMapOvr>
+    <a:masterClrMapping/>
+  </p:clrMapOvr>
+  <p:hf hdr="0" ftr="0" dt="0"/>
+</p:sldLayout>
+</file>
+
+<file path=ppt/slideLayouts/slideLayout7.xml><?xml version="1.0" encoding="utf-8"?>
+<p:sldLayout xmlns:a="http://schemas.openxmlformats.org/drawingml/2006/main" xmlns:r="http://schemas.openxmlformats.org/officeDocument/2006/relationships" xmlns:p="http://schemas.openxmlformats.org/presentationml/2006/main" type="blank" preserve="1">
+  <p:cSld name="Blank">
+    <p:spTree>
+      <p:nvGrpSpPr>
+        <p:cNvPr id="1" name=""/>
+        <p:cNvGrpSpPr/>
+        <p:nvPr/>
+      </p:nvGrpSpPr>
+      <p:grpSpPr>
+        <a:xfrm>
+          <a:off x="0" y="0"/>
+          <a:ext cx="0" cy="0"/>
+          <a:chOff x="0" y="0"/>
+          <a:chExt cx="0" cy="0"/>
+        </a:xfrm>
+      </p:grpSpPr>
+      <p:sp>
+        <p:nvSpPr>
+          <p:cNvPr id="2" name="Date Placeholder 1"/>
+          <p:cNvSpPr>
+            <a:spLocks noGrp="1"/>
+          </p:cNvSpPr>
+          <p:nvPr>
+            <p:ph type="dt" sz="half" idx="10"/>
+          </p:nvPr>
+        </p:nvSpPr>
+        <p:spPr/>
+        <p:txBody>
+          <a:bodyPr/>
+          <a:lstStyle/>
+          <a:p>
+            <a:fld id="{C764DE79-268F-4C1A-8933-263129D2AF90}" type="datetimeFigureOut">
+              <a:rPr lang="en-US" smtClean="0"/>
+              <a:t>8/10/18</a:t>
+            </a:fld>
+            <a:endParaRPr lang="en-US" dirty="0"/>
+          </a:p>
+        </p:txBody>
+      </p:sp>
+      <p:sp>
+        <p:nvSpPr>
+          <p:cNvPr id="3" name="Footer Placeholder 2"/>
+          <p:cNvSpPr>
+            <a:spLocks noGrp="1"/>
+          </p:cNvSpPr>
+          <p:nvPr>
+            <p:ph type="ftr" sz="quarter" idx="11"/>
+          </p:nvPr>
+        </p:nvSpPr>
+        <p:spPr/>
+        <p:txBody>
+          <a:bodyPr/>
+          <a:lstStyle/>
+          <a:p>
+            <a:endParaRPr lang="en-US" dirty="0"/>
+          </a:p>
+        </p:txBody>
+      </p:sp>
+      <p:sp>
+        <p:nvSpPr>
+          <p:cNvPr id="4" name="Slide Number Placeholder 3"/>
+          <p:cNvSpPr>
+            <a:spLocks noGrp="1"/>
+          </p:cNvSpPr>
+          <p:nvPr>
+            <p:ph type="sldNum" sz="quarter" idx="12"/>
+          </p:nvPr>
+        </p:nvSpPr>
+        <p:spPr/>
+        <p:txBody>
+          <a:bodyPr/>
+          <a:lstStyle/>
+          <a:p>
+            <a:fld id="{FFF8894C-962F-4043-BDE4-6CA2ABEDD0B4}" type="slidenum">
+              <a:rPr lang="en-US" smtClean="0"/>
+              <a:pPr/>
+              <a:t>‹#›</a:t>
+            </a:fld>
+            <a:endParaRPr lang="en-US" dirty="0"/>
+          </a:p>
+        </p:txBody>
+      </p:sp>
+    </p:spTree>
+    <p:extLst>
+      <p:ext uri="{BB962C8B-B14F-4D97-AF65-F5344CB8AC3E}">
+        <p14:creationId xmlns:p14="http://schemas.microsoft.com/office/powerpoint/2010/main" val="459226718"/>
+      </p:ext>
+    </p:extLst>
+  </p:cSld>
+  <p:clrMapOvr>
+    <a:masterClrMapping/>
+  </p:clrMapOvr>
+</p:sldLayout>
+</file>
+
+<file path=ppt/slideLayouts/slideLayout8.xml><?xml version="1.0" encoding="utf-8"?>
+<p:sldLayout xmlns:a="http://schemas.openxmlformats.org/drawingml/2006/main" xmlns:r="http://schemas.openxmlformats.org/officeDocument/2006/relationships" xmlns:p="http://schemas.openxmlformats.org/presentationml/2006/main" type="objTx" preserve="1">
+  <p:cSld name="Content with Caption">
+    <p:spTree>
+      <p:nvGrpSpPr>
+        <p:cNvPr id="1" name=""/>
+        <p:cNvGrpSpPr/>
+        <p:nvPr/>
+      </p:nvGrpSpPr>
+      <p:grpSpPr>
+        <a:xfrm>
+          <a:off x="0" y="0"/>
+          <a:ext cx="0" cy="0"/>
+          <a:chOff x="0" y="0"/>
+          <a:chExt cx="0" cy="0"/>
+        </a:xfrm>
+      </p:grpSpPr>
+      <p:sp>
+        <p:nvSpPr>
+          <p:cNvPr id="2" name="Title 1"/>
+          <p:cNvSpPr>
+            <a:spLocks noGrp="1"/>
+          </p:cNvSpPr>
+          <p:nvPr>
+            <p:ph type="title"/>
+          </p:nvPr>
+        </p:nvSpPr>
+        <p:spPr>
+          <a:xfrm>
+            <a:off x="302346" y="152400"/>
+            <a:ext cx="1415708" cy="533400"/>
+          </a:xfrm>
+        </p:spPr>
+        <p:txBody>
+          <a:bodyPr anchor="b"/>
+          <a:lstStyle>
+            <a:lvl1pPr>
+              <a:defRPr sz="1067"/>
+            </a:lvl1pPr>
+          </a:lstStyle>
+          <a:p>
+            <a:r>
+              <a:rPr lang="en-US" smtClean="0"/>
+              <a:t>Click to edit Master title style</a:t>
+            </a:r>
+            <a:endParaRPr lang="en-US" dirty="0"/>
+          </a:p>
+        </p:txBody>
+      </p:sp>
+      <p:sp>
+        <p:nvSpPr>
+          <p:cNvPr id="3" name="Content Placeholder 2"/>
+          <p:cNvSpPr>
+            <a:spLocks noGrp="1"/>
+          </p:cNvSpPr>
+          <p:nvPr>
+            <p:ph idx="1"/>
+          </p:nvPr>
+        </p:nvSpPr>
+        <p:spPr>
+          <a:xfrm>
+            <a:off x="1866083" y="329142"/>
+            <a:ext cx="2222153" cy="1624542"/>
+          </a:xfrm>
+        </p:spPr>
+        <p:txBody>
+          <a:bodyPr/>
+          <a:lstStyle>
+            <a:lvl1pPr>
+              <a:defRPr sz="1067"/>
+            </a:lvl1pPr>
+            <a:lvl2pPr>
+              <a:defRPr sz="933"/>
+            </a:lvl2pPr>
+            <a:lvl3pPr>
+              <a:defRPr sz="800"/>
+            </a:lvl3pPr>
+            <a:lvl4pPr>
+              <a:defRPr sz="667"/>
+            </a:lvl4pPr>
+            <a:lvl5pPr>
+              <a:defRPr sz="667"/>
+            </a:lvl5pPr>
+            <a:lvl6pPr>
+              <a:defRPr sz="667"/>
+            </a:lvl6pPr>
+            <a:lvl7pPr>
+              <a:defRPr sz="667"/>
+            </a:lvl7pPr>
+            <a:lvl8pPr>
+              <a:defRPr sz="667"/>
+            </a:lvl8pPr>
+            <a:lvl9pPr>
+              <a:defRPr sz="667"/>
+            </a:lvl9pPr>
+          </a:lstStyle>
+          <a:p>
+            <a:pPr lvl="0"/>
+            <a:r>
+              <a:rPr lang="en-US" smtClean="0"/>
+              <a:t>Click to edit Master text styles</a:t>
+            </a:r>
+          </a:p>
+          <a:p>
+            <a:pPr lvl="1"/>
+            <a:r>
+              <a:rPr lang="en-US" smtClean="0"/>
+              <a:t>Second level</a:t>
+            </a:r>
+          </a:p>
+          <a:p>
+            <a:pPr lvl="2"/>
+            <a:r>
+              <a:rPr lang="en-US" smtClean="0"/>
+              <a:t>Third level</a:t>
+            </a:r>
+          </a:p>
+          <a:p>
+            <a:pPr lvl="3"/>
+            <a:r>
+              <a:rPr lang="en-US" smtClean="0"/>
+              <a:t>Fourth level</a:t>
+            </a:r>
+          </a:p>
+          <a:p>
+            <a:pPr lvl="4"/>
+            <a:r>
+              <a:rPr lang="en-US" smtClean="0"/>
+              <a:t>Fifth level</a:t>
+            </a:r>
+            <a:endParaRPr lang="en-US" dirty="0"/>
+          </a:p>
+        </p:txBody>
+      </p:sp>
+      <p:sp>
+        <p:nvSpPr>
+          <p:cNvPr id="4" name="Text Placeholder 3"/>
+          <p:cNvSpPr>
+            <a:spLocks noGrp="1"/>
+          </p:cNvSpPr>
+          <p:nvPr>
+            <p:ph type="body" sz="half" idx="2"/>
+          </p:nvPr>
+        </p:nvSpPr>
+        <p:spPr>
+          <a:xfrm>
+            <a:off x="302346" y="685800"/>
+            <a:ext cx="1415708" cy="1270529"/>
+          </a:xfrm>
+        </p:spPr>
+        <p:txBody>
+          <a:bodyPr/>
+          <a:lstStyle>
+            <a:lvl1pPr marL="0" indent="0">
+              <a:buNone/>
+              <a:defRPr sz="533"/>
+            </a:lvl1pPr>
+            <a:lvl2pPr marL="152385" indent="0">
+              <a:buNone/>
+              <a:defRPr sz="467"/>
+            </a:lvl2pPr>
+            <a:lvl3pPr marL="304770" indent="0">
+              <a:buNone/>
+              <a:defRPr sz="400"/>
+            </a:lvl3pPr>
+            <a:lvl4pPr marL="457154" indent="0">
+              <a:buNone/>
+              <a:defRPr sz="333"/>
+            </a:lvl4pPr>
+            <a:lvl5pPr marL="609539" indent="0">
+              <a:buNone/>
+              <a:defRPr sz="333"/>
+            </a:lvl5pPr>
+            <a:lvl6pPr marL="761924" indent="0">
+              <a:buNone/>
+              <a:defRPr sz="333"/>
+            </a:lvl6pPr>
+            <a:lvl7pPr marL="914309" indent="0">
+              <a:buNone/>
+              <a:defRPr sz="333"/>
+            </a:lvl7pPr>
+            <a:lvl8pPr marL="1066693" indent="0">
+              <a:buNone/>
+              <a:defRPr sz="333"/>
+            </a:lvl8pPr>
+            <a:lvl9pPr marL="1219078" indent="0">
+              <a:buNone/>
+              <a:defRPr sz="333"/>
+            </a:lvl9pPr>
+          </a:lstStyle>
+          <a:p>
+            <a:pPr lvl="0"/>
+            <a:r>
+              <a:rPr lang="en-US" smtClean="0"/>
+              <a:t>Click to edit Master text styles</a:t>
+            </a:r>
+          </a:p>
+        </p:txBody>
+      </p:sp>
+      <p:sp>
+        <p:nvSpPr>
+          <p:cNvPr id="5" name="Date Placeholder 4"/>
+          <p:cNvSpPr>
+            <a:spLocks noGrp="1"/>
+          </p:cNvSpPr>
+          <p:nvPr>
+            <p:ph type="dt" sz="half" idx="10"/>
+          </p:nvPr>
+        </p:nvSpPr>
+        <p:spPr/>
+        <p:txBody>
+          <a:bodyPr/>
+          <a:lstStyle/>
+          <a:p>
+            <a:fld id="{C764DE79-268F-4C1A-8933-263129D2AF90}" type="datetimeFigureOut">
+              <a:rPr lang="en-US" smtClean="0"/>
+              <a:t>8/10/18</a:t>
+            </a:fld>
+            <a:endParaRPr lang="en-US" dirty="0"/>
+          </a:p>
+        </p:txBody>
+      </p:sp>
+      <p:sp>
+        <p:nvSpPr>
+          <p:cNvPr id="6" name="Footer Placeholder 5"/>
+          <p:cNvSpPr>
+            <a:spLocks noGrp="1"/>
+          </p:cNvSpPr>
+          <p:nvPr>
+            <p:ph type="ftr" sz="quarter" idx="11"/>
+          </p:nvPr>
+        </p:nvSpPr>
+        <p:spPr/>
+        <p:txBody>
+          <a:bodyPr/>
+          <a:lstStyle/>
+          <a:p>
+            <a:endParaRPr lang="en-US" dirty="0"/>
+          </a:p>
+        </p:txBody>
+      </p:sp>
+      <p:sp>
+        <p:nvSpPr>
+          <p:cNvPr id="7" name="Slide Number Placeholder 6"/>
+          <p:cNvSpPr>
+            <a:spLocks noGrp="1"/>
+          </p:cNvSpPr>
+          <p:nvPr>
+            <p:ph type="sldNum" sz="quarter" idx="12"/>
+          </p:nvPr>
+        </p:nvSpPr>
+        <p:spPr/>
+        <p:txBody>
+          <a:bodyPr/>
+          <a:lstStyle/>
+          <a:p>
+            <a:fld id="{48F63A3B-78C7-47BE-AE5E-E10140E04643}" type="slidenum">
+              <a:rPr lang="en-US" smtClean="0"/>
+              <a:t>‹#›</a:t>
+            </a:fld>
+            <a:endParaRPr lang="en-US" dirty="0"/>
+          </a:p>
+        </p:txBody>
+      </p:sp>
+    </p:spTree>
+    <p:extLst>
+      <p:ext uri="{BB962C8B-B14F-4D97-AF65-F5344CB8AC3E}">
+        <p14:creationId xmlns:p14="http://schemas.microsoft.com/office/powerpoint/2010/main" val="167222108"/>
+      </p:ext>
+    </p:extLst>
+  </p:cSld>
+  <p:clrMapOvr>
+    <a:masterClrMapping/>
+  </p:clrMapOvr>
+  <p:hf hdr="0" ftr="0" dt="0"/>
+</p:sldLayout>
+</file>
+
+<file path=ppt/slideLayouts/slideLayout9.xml><?xml version="1.0" encoding="utf-8"?>
+<p:sldLayout xmlns:a="http://schemas.openxmlformats.org/drawingml/2006/main" xmlns:r="http://schemas.openxmlformats.org/officeDocument/2006/relationships" xmlns:p="http://schemas.openxmlformats.org/presentationml/2006/main" type="picTx" preserve="1">
+  <p:cSld name="Picture with Caption">
+    <p:spTree>
+      <p:nvGrpSpPr>
+        <p:cNvPr id="1" name=""/>
+        <p:cNvGrpSpPr/>
+        <p:nvPr/>
+      </p:nvGrpSpPr>
+      <p:grpSpPr>
+        <a:xfrm>
+          <a:off x="0" y="0"/>
+          <a:ext cx="0" cy="0"/>
+          <a:chOff x="0" y="0"/>
+          <a:chExt cx="0" cy="0"/>
+        </a:xfrm>
+      </p:grpSpPr>
+      <p:sp>
+        <p:nvSpPr>
+          <p:cNvPr id="2" name="Title 1"/>
+          <p:cNvSpPr>
+            <a:spLocks noGrp="1"/>
+          </p:cNvSpPr>
+          <p:nvPr>
+            <p:ph type="title"/>
+          </p:nvPr>
+        </p:nvSpPr>
+        <p:spPr>
+          <a:xfrm>
+            <a:off x="302346" y="152400"/>
+            <a:ext cx="1415708" cy="533400"/>
+          </a:xfrm>
+        </p:spPr>
+        <p:txBody>
+          <a:bodyPr anchor="b"/>
+          <a:lstStyle>
+            <a:lvl1pPr>
+              <a:defRPr sz="1067"/>
+            </a:lvl1pPr>
+          </a:lstStyle>
+          <a:p>
+            <a:r>
+              <a:rPr lang="en-US" smtClean="0"/>
+              <a:t>Click to edit Master title style</a:t>
+            </a:r>
+            <a:endParaRPr lang="en-US" dirty="0"/>
+          </a:p>
+        </p:txBody>
+      </p:sp>
+      <p:sp>
+        <p:nvSpPr>
+          <p:cNvPr id="3" name="Picture Placeholder 2"/>
+          <p:cNvSpPr>
+            <a:spLocks noGrp="1" noChangeAspect="1"/>
+          </p:cNvSpPr>
+          <p:nvPr>
+            <p:ph type="pic" idx="1"/>
+          </p:nvPr>
+        </p:nvSpPr>
+        <p:spPr>
+          <a:xfrm>
+            <a:off x="1866083" y="329142"/>
+            <a:ext cx="2222153" cy="1624542"/>
+          </a:xfrm>
+        </p:spPr>
+        <p:txBody>
+          <a:bodyPr anchor="t"/>
+          <a:lstStyle>
+            <a:lvl1pPr marL="0" indent="0">
+              <a:buNone/>
+              <a:defRPr sz="1067"/>
+            </a:lvl1pPr>
+            <a:lvl2pPr marL="152385" indent="0">
+              <a:buNone/>
+              <a:defRPr sz="933"/>
+            </a:lvl2pPr>
+            <a:lvl3pPr marL="304770" indent="0">
+              <a:buNone/>
+              <a:defRPr sz="800"/>
+            </a:lvl3pPr>
+            <a:lvl4pPr marL="457154" indent="0">
+              <a:buNone/>
+              <a:defRPr sz="667"/>
+            </a:lvl4pPr>
+            <a:lvl5pPr marL="609539" indent="0">
+              <a:buNone/>
+              <a:defRPr sz="667"/>
+            </a:lvl5pPr>
+            <a:lvl6pPr marL="761924" indent="0">
+              <a:buNone/>
+              <a:defRPr sz="667"/>
+            </a:lvl6pPr>
+            <a:lvl7pPr marL="914309" indent="0">
+              <a:buNone/>
+              <a:defRPr sz="667"/>
+            </a:lvl7pPr>
+            <a:lvl8pPr marL="1066693" indent="0">
+              <a:buNone/>
+              <a:defRPr sz="667"/>
+            </a:lvl8pPr>
+            <a:lvl9pPr marL="1219078" indent="0">
+              <a:buNone/>
+              <a:defRPr sz="667"/>
+            </a:lvl9pPr>
+          </a:lstStyle>
+          <a:p>
+            <a:r>
+              <a:rPr lang="en-US" smtClean="0"/>
+              <a:t>Drag picture to placeholder or click icon to add</a:t>
+            </a:r>
+            <a:endParaRPr lang="en-US" dirty="0"/>
+          </a:p>
+        </p:txBody>
+      </p:sp>
+      <p:sp>
+        <p:nvSpPr>
+          <p:cNvPr id="4" name="Text Placeholder 3"/>
+          <p:cNvSpPr>
+            <a:spLocks noGrp="1"/>
+          </p:cNvSpPr>
+          <p:nvPr>
+            <p:ph type="body" sz="half" idx="2"/>
+          </p:nvPr>
+        </p:nvSpPr>
+        <p:spPr>
+          <a:xfrm>
+            <a:off x="302346" y="685800"/>
+            <a:ext cx="1415708" cy="1270529"/>
+          </a:xfrm>
+        </p:spPr>
+        <p:txBody>
+          <a:bodyPr/>
+          <a:lstStyle>
+            <a:lvl1pPr marL="0" indent="0">
+              <a:buNone/>
+              <a:defRPr sz="533"/>
+            </a:lvl1pPr>
+            <a:lvl2pPr marL="152385" indent="0">
+              <a:buNone/>
+              <a:defRPr sz="467"/>
+            </a:lvl2pPr>
+            <a:lvl3pPr marL="304770" indent="0">
+              <a:buNone/>
+              <a:defRPr sz="400"/>
+            </a:lvl3pPr>
+            <a:lvl4pPr marL="457154" indent="0">
+              <a:buNone/>
+              <a:defRPr sz="333"/>
+            </a:lvl4pPr>
+            <a:lvl5pPr marL="609539" indent="0">
+              <a:buNone/>
+              <a:defRPr sz="333"/>
+            </a:lvl5pPr>
+            <a:lvl6pPr marL="761924" indent="0">
+              <a:buNone/>
+              <a:defRPr sz="333"/>
+            </a:lvl6pPr>
+            <a:lvl7pPr marL="914309" indent="0">
+              <a:buNone/>
+              <a:defRPr sz="333"/>
+            </a:lvl7pPr>
+            <a:lvl8pPr marL="1066693" indent="0">
+              <a:buNone/>
+              <a:defRPr sz="333"/>
+            </a:lvl8pPr>
+            <a:lvl9pPr marL="1219078" indent="0">
+              <a:buNone/>
+              <a:defRPr sz="333"/>
+            </a:lvl9pPr>
+          </a:lstStyle>
+          <a:p>
+            <a:pPr lvl="0"/>
+            <a:r>
+              <a:rPr lang="en-US" smtClean="0"/>
+              <a:t>Click to edit Master text styles</a:t>
+            </a:r>
+          </a:p>
+        </p:txBody>
+      </p:sp>
+      <p:sp>
+        <p:nvSpPr>
+          <p:cNvPr id="5" name="Date Placeholder 4"/>
+          <p:cNvSpPr>
+            <a:spLocks noGrp="1"/>
+          </p:cNvSpPr>
+          <p:nvPr>
+            <p:ph type="dt" sz="half" idx="10"/>
+          </p:nvPr>
+        </p:nvSpPr>
+        <p:spPr/>
+        <p:txBody>
+          <a:bodyPr/>
+          <a:lstStyle/>
+          <a:p>
+            <a:fld id="{C764DE79-268F-4C1A-8933-263129D2AF90}" type="datetimeFigureOut">
+              <a:rPr lang="en-US" smtClean="0"/>
+              <a:t>8/10/18</a:t>
+            </a:fld>
+            <a:endParaRPr lang="en-US" dirty="0"/>
+          </a:p>
+        </p:txBody>
+      </p:sp>
+      <p:sp>
+        <p:nvSpPr>
+          <p:cNvPr id="6" name="Footer Placeholder 5"/>
+          <p:cNvSpPr>
+            <a:spLocks noGrp="1"/>
+          </p:cNvSpPr>
+          <p:nvPr>
+            <p:ph type="ftr" sz="quarter" idx="11"/>
+          </p:nvPr>
+        </p:nvSpPr>
+        <p:spPr/>
+        <p:txBody>
+          <a:bodyPr/>
+          <a:lstStyle/>
+          <a:p>
+            <a:endParaRPr lang="en-US" dirty="0"/>
+          </a:p>
+        </p:txBody>
+      </p:sp>
+      <p:sp>
+        <p:nvSpPr>
+          <p:cNvPr id="7" name="Slide Number Placeholder 6"/>
+          <p:cNvSpPr>
+            <a:spLocks noGrp="1"/>
+          </p:cNvSpPr>
+          <p:nvPr>
+            <p:ph type="sldNum" sz="quarter" idx="12"/>
+          </p:nvPr>
+        </p:nvSpPr>
+        <p:spPr/>
+        <p:txBody>
+          <a:bodyPr/>
+          <a:lstStyle/>
+          <a:p>
+            <a:fld id="{48F63A3B-78C7-47BE-AE5E-E10140E04643}" type="slidenum">
+              <a:rPr lang="en-US" smtClean="0"/>
+              <a:t>‹#›</a:t>
+            </a:fld>
+            <a:endParaRPr lang="en-US" dirty="0"/>
+          </a:p>
+        </p:txBody>
+      </p:sp>
+    </p:spTree>
+    <p:extLst>
+      <p:ext uri="{BB962C8B-B14F-4D97-AF65-F5344CB8AC3E}">
+        <p14:creationId xmlns:p14="http://schemas.microsoft.com/office/powerpoint/2010/main" val="1593358880"/>
+      </p:ext>
+    </p:extLst>
+  </p:cSld>
+  <p:clrMapOvr>
+    <a:masterClrMapping/>
+  </p:clrMapOvr>
+  <p:hf hdr="0" ftr="0" dt="0"/>
 </p:sldLayout>
 </file>
 
@@ -1389,25 +3704,250 @@
           <a:chExt cx="0" cy="0"/>
         </a:xfrm>
       </p:grpSpPr>
+      <p:sp>
+        <p:nvSpPr>
+          <p:cNvPr id="2" name="Title Placeholder 1"/>
+          <p:cNvSpPr>
+            <a:spLocks noGrp="1"/>
+          </p:cNvSpPr>
+          <p:nvPr>
+            <p:ph type="title"/>
+          </p:nvPr>
+        </p:nvSpPr>
+        <p:spPr>
+          <a:xfrm>
+            <a:off x="301774" y="121709"/>
+            <a:ext cx="3785890" cy="441854"/>
+          </a:xfrm>
+          <a:prstGeom prst="rect">
+            <a:avLst/>
+          </a:prstGeom>
+        </p:spPr>
+        <p:txBody>
+          <a:bodyPr vert="horz" lIns="91440" tIns="45720" rIns="91440" bIns="45720" rtlCol="0" anchor="ctr">
+            <a:normAutofit/>
+          </a:bodyPr>
+          <a:lstStyle/>
+          <a:p>
+            <a:r>
+              <a:rPr lang="en-US" smtClean="0"/>
+              <a:t>Click to edit Master title style</a:t>
+            </a:r>
+            <a:endParaRPr lang="en-US" dirty="0"/>
+          </a:p>
+        </p:txBody>
+      </p:sp>
+      <p:sp>
+        <p:nvSpPr>
+          <p:cNvPr id="3" name="Text Placeholder 2"/>
+          <p:cNvSpPr>
+            <a:spLocks noGrp="1"/>
+          </p:cNvSpPr>
+          <p:nvPr>
+            <p:ph type="body" idx="1"/>
+          </p:nvPr>
+        </p:nvSpPr>
+        <p:spPr>
+          <a:xfrm>
+            <a:off x="301774" y="608542"/>
+            <a:ext cx="3785890" cy="1450446"/>
+          </a:xfrm>
+          <a:prstGeom prst="rect">
+            <a:avLst/>
+          </a:prstGeom>
+        </p:spPr>
+        <p:txBody>
+          <a:bodyPr vert="horz" lIns="91440" tIns="45720" rIns="91440" bIns="45720" rtlCol="0">
+            <a:normAutofit/>
+          </a:bodyPr>
+          <a:lstStyle/>
+          <a:p>
+            <a:pPr lvl="0"/>
+            <a:r>
+              <a:rPr lang="en-US" smtClean="0"/>
+              <a:t>Click to edit Master text styles</a:t>
+            </a:r>
+          </a:p>
+          <a:p>
+            <a:pPr lvl="1"/>
+            <a:r>
+              <a:rPr lang="en-US" smtClean="0"/>
+              <a:t>Second level</a:t>
+            </a:r>
+          </a:p>
+          <a:p>
+            <a:pPr lvl="2"/>
+            <a:r>
+              <a:rPr lang="en-US" smtClean="0"/>
+              <a:t>Third level</a:t>
+            </a:r>
+          </a:p>
+          <a:p>
+            <a:pPr lvl="3"/>
+            <a:r>
+              <a:rPr lang="en-US" smtClean="0"/>
+              <a:t>Fourth level</a:t>
+            </a:r>
+          </a:p>
+          <a:p>
+            <a:pPr lvl="4"/>
+            <a:r>
+              <a:rPr lang="en-US" smtClean="0"/>
+              <a:t>Fifth level</a:t>
+            </a:r>
+            <a:endParaRPr lang="en-US" dirty="0"/>
+          </a:p>
+        </p:txBody>
+      </p:sp>
+      <p:sp>
+        <p:nvSpPr>
+          <p:cNvPr id="4" name="Date Placeholder 3"/>
+          <p:cNvSpPr>
+            <a:spLocks noGrp="1"/>
+          </p:cNvSpPr>
+          <p:nvPr>
+            <p:ph type="dt" sz="half" idx="2"/>
+          </p:nvPr>
+        </p:nvSpPr>
+        <p:spPr>
+          <a:xfrm>
+            <a:off x="301774" y="2118784"/>
+            <a:ext cx="987624" cy="121708"/>
+          </a:xfrm>
+          <a:prstGeom prst="rect">
+            <a:avLst/>
+          </a:prstGeom>
+        </p:spPr>
+        <p:txBody>
+          <a:bodyPr vert="horz" lIns="91440" tIns="45720" rIns="91440" bIns="45720" rtlCol="0" anchor="ctr"/>
+          <a:lstStyle>
+            <a:lvl1pPr algn="l">
+              <a:defRPr sz="400">
+                <a:solidFill>
+                  <a:schemeClr val="tx1">
+                    <a:tint val="75000"/>
+                  </a:schemeClr>
+                </a:solidFill>
+              </a:defRPr>
+            </a:lvl1pPr>
+          </a:lstStyle>
+          <a:p>
+            <a:fld id="{C764DE79-268F-4C1A-8933-263129D2AF90}" type="datetimeFigureOut">
+              <a:rPr lang="en-US" smtClean="0"/>
+              <a:t>8/10/18</a:t>
+            </a:fld>
+            <a:endParaRPr lang="en-US" dirty="0"/>
+          </a:p>
+        </p:txBody>
+      </p:sp>
+      <p:sp>
+        <p:nvSpPr>
+          <p:cNvPr id="5" name="Footer Placeholder 4"/>
+          <p:cNvSpPr>
+            <a:spLocks noGrp="1"/>
+          </p:cNvSpPr>
+          <p:nvPr>
+            <p:ph type="ftr" sz="quarter" idx="3"/>
+          </p:nvPr>
+        </p:nvSpPr>
+        <p:spPr>
+          <a:xfrm>
+            <a:off x="1454002" y="2118784"/>
+            <a:ext cx="1481435" cy="121708"/>
+          </a:xfrm>
+          <a:prstGeom prst="rect">
+            <a:avLst/>
+          </a:prstGeom>
+        </p:spPr>
+        <p:txBody>
+          <a:bodyPr vert="horz" lIns="91440" tIns="45720" rIns="91440" bIns="45720" rtlCol="0" anchor="ctr"/>
+          <a:lstStyle>
+            <a:lvl1pPr algn="ctr">
+              <a:defRPr sz="400">
+                <a:solidFill>
+                  <a:schemeClr val="tx1">
+                    <a:tint val="75000"/>
+                  </a:schemeClr>
+                </a:solidFill>
+              </a:defRPr>
+            </a:lvl1pPr>
+          </a:lstStyle>
+          <a:p>
+            <a:endParaRPr lang="en-US" dirty="0"/>
+          </a:p>
+        </p:txBody>
+      </p:sp>
+      <p:sp>
+        <p:nvSpPr>
+          <p:cNvPr id="6" name="Slide Number Placeholder 5"/>
+          <p:cNvSpPr>
+            <a:spLocks noGrp="1"/>
+          </p:cNvSpPr>
+          <p:nvPr>
+            <p:ph type="sldNum" sz="quarter" idx="4"/>
+          </p:nvPr>
+        </p:nvSpPr>
+        <p:spPr>
+          <a:xfrm>
+            <a:off x="3100040" y="2118784"/>
+            <a:ext cx="987624" cy="121708"/>
+          </a:xfrm>
+          <a:prstGeom prst="rect">
+            <a:avLst/>
+          </a:prstGeom>
+        </p:spPr>
+        <p:txBody>
+          <a:bodyPr vert="horz" lIns="91440" tIns="45720" rIns="91440" bIns="45720" rtlCol="0" anchor="ctr"/>
+          <a:lstStyle>
+            <a:lvl1pPr algn="r">
+              <a:defRPr sz="400">
+                <a:solidFill>
+                  <a:schemeClr val="tx1">
+                    <a:tint val="75000"/>
+                  </a:schemeClr>
+                </a:solidFill>
+              </a:defRPr>
+            </a:lvl1pPr>
+          </a:lstStyle>
+          <a:p>
+            <a:fld id="{48F63A3B-78C7-47BE-AE5E-E10140E04643}" type="slidenum">
+              <a:rPr lang="en-US" smtClean="0"/>
+              <a:t>‹#›</a:t>
+            </a:fld>
+            <a:endParaRPr lang="en-US" dirty="0"/>
+          </a:p>
+        </p:txBody>
+      </p:sp>
     </p:spTree>
     <p:extLst>
       <p:ext uri="{BB962C8B-B14F-4D97-AF65-F5344CB8AC3E}">
-        <p14:creationId xmlns:p14="http://schemas.microsoft.com/office/powerpoint/2010/main" val="1064020481"/>
+        <p14:creationId xmlns:p14="http://schemas.microsoft.com/office/powerpoint/2010/main" val="1417119058"/>
       </p:ext>
     </p:extLst>
   </p:cSld>
   <p:clrMap bg1="lt1" tx1="dk1" bg2="lt2" tx2="dk2" accent1="accent1" accent2="accent2" accent3="accent3" accent4="accent4" accent5="accent5" accent6="accent6" hlink="hlink" folHlink="folHlink"/>
   <p:sldLayoutIdLst>
-    <p:sldLayoutId id="2147483681" r:id="rId1"/>
-    <p:sldLayoutId id="2147483682" r:id="rId2"/>
-    <p:sldLayoutId id="2147483683" r:id="rId3"/>
-    <p:sldLayoutId id="2147483686" r:id="rId4"/>
-    <p:sldLayoutId id="2147483684" r:id="rId5"/>
+    <p:sldLayoutId id="2147483748" r:id="rId1"/>
+    <p:sldLayoutId id="2147483749" r:id="rId2"/>
+    <p:sldLayoutId id="2147483750" r:id="rId3"/>
+    <p:sldLayoutId id="2147483751" r:id="rId4"/>
+    <p:sldLayoutId id="2147483752" r:id="rId5"/>
+    <p:sldLayoutId id="2147483753" r:id="rId6"/>
+    <p:sldLayoutId id="2147483754" r:id="rId7"/>
+    <p:sldLayoutId id="2147483755" r:id="rId8"/>
+    <p:sldLayoutId id="2147483756" r:id="rId9"/>
+    <p:sldLayoutId id="2147483757" r:id="rId10"/>
+    <p:sldLayoutId id="2147483758" r:id="rId11"/>
+    <p:sldLayoutId id="2147483681" r:id="rId12"/>
+    <p:sldLayoutId id="2147483682" r:id="rId13"/>
+    <p:sldLayoutId id="2147483683" r:id="rId14"/>
+    <p:sldLayoutId id="2147483686" r:id="rId15"/>
+    <p:sldLayoutId id="2147483684" r:id="rId16"/>
   </p:sldLayoutIdLst>
   <p:hf hdr="0" ftr="0" dt="0"/>
   <p:txStyles>
     <p:titleStyle>
-      <a:lvl1pPr algn="l" defTabSz="914400" rtl="0" eaLnBrk="1" latinLnBrk="0" hangingPunct="1">
+      <a:lvl1pPr algn="l" defTabSz="304770" rtl="0" eaLnBrk="1" latinLnBrk="0" hangingPunct="1">
         <a:lnSpc>
           <a:spcPct val="90000"/>
         </a:lnSpc>
@@ -1415,7 +3955,7 @@
           <a:spcPct val="0"/>
         </a:spcBef>
         <a:buNone/>
-        <a:defRPr sz="4400" kern="1200">
+        <a:defRPr sz="1467" kern="1200">
           <a:solidFill>
             <a:schemeClr val="tx1"/>
           </a:solidFill>
@@ -1426,16 +3966,16 @@
       </a:lvl1pPr>
     </p:titleStyle>
     <p:bodyStyle>
-      <a:lvl1pPr marL="228600" indent="-228600" algn="l" defTabSz="914400" rtl="0" eaLnBrk="1" latinLnBrk="0" hangingPunct="1">
+      <a:lvl1pPr marL="76192" indent="-76192" algn="l" defTabSz="304770" rtl="0" eaLnBrk="1" latinLnBrk="0" hangingPunct="1">
         <a:lnSpc>
           <a:spcPct val="90000"/>
         </a:lnSpc>
         <a:spcBef>
-          <a:spcPts val="1000"/>
+          <a:spcPts val="333"/>
         </a:spcBef>
-        <a:buFont typeface="Arial"/>
+        <a:buFont typeface="Arial" panose="020B0604020202020204" pitchFamily="34" charset="0"/>
         <a:buChar char="•"/>
-        <a:defRPr sz="2800" kern="1200">
+        <a:defRPr sz="933" kern="1200">
           <a:solidFill>
             <a:schemeClr val="tx1"/>
           </a:solidFill>
@@ -1444,16 +3984,16 @@
           <a:cs typeface="+mn-cs"/>
         </a:defRPr>
       </a:lvl1pPr>
-      <a:lvl2pPr marL="685800" indent="-228600" algn="l" defTabSz="914400" rtl="0" eaLnBrk="1" latinLnBrk="0" hangingPunct="1">
+      <a:lvl2pPr marL="228577" indent="-76192" algn="l" defTabSz="304770" rtl="0" eaLnBrk="1" latinLnBrk="0" hangingPunct="1">
         <a:lnSpc>
           <a:spcPct val="90000"/>
         </a:lnSpc>
         <a:spcBef>
-          <a:spcPts val="500"/>
+          <a:spcPts val="167"/>
         </a:spcBef>
-        <a:buFont typeface="Arial"/>
+        <a:buFont typeface="Arial" panose="020B0604020202020204" pitchFamily="34" charset="0"/>
         <a:buChar char="•"/>
-        <a:defRPr sz="2400" kern="1200">
+        <a:defRPr sz="800" kern="1200">
           <a:solidFill>
             <a:schemeClr val="tx1"/>
           </a:solidFill>
@@ -1462,16 +4002,16 @@
           <a:cs typeface="+mn-cs"/>
         </a:defRPr>
       </a:lvl2pPr>
-      <a:lvl3pPr marL="1143000" indent="-228600" algn="l" defTabSz="914400" rtl="0" eaLnBrk="1" latinLnBrk="0" hangingPunct="1">
+      <a:lvl3pPr marL="380962" indent="-76192" algn="l" defTabSz="304770" rtl="0" eaLnBrk="1" latinLnBrk="0" hangingPunct="1">
         <a:lnSpc>
           <a:spcPct val="90000"/>
         </a:lnSpc>
         <a:spcBef>
-          <a:spcPts val="500"/>
+          <a:spcPts val="167"/>
         </a:spcBef>
-        <a:buFont typeface="Arial"/>
+        <a:buFont typeface="Arial" panose="020B0604020202020204" pitchFamily="34" charset="0"/>
         <a:buChar char="•"/>
-        <a:defRPr sz="2000" kern="1200">
+        <a:defRPr sz="667" kern="1200">
           <a:solidFill>
             <a:schemeClr val="tx1"/>
           </a:solidFill>
@@ -1480,16 +4020,16 @@
           <a:cs typeface="+mn-cs"/>
         </a:defRPr>
       </a:lvl3pPr>
-      <a:lvl4pPr marL="1600200" indent="-228600" algn="l" defTabSz="914400" rtl="0" eaLnBrk="1" latinLnBrk="0" hangingPunct="1">
+      <a:lvl4pPr marL="533347" indent="-76192" algn="l" defTabSz="304770" rtl="0" eaLnBrk="1" latinLnBrk="0" hangingPunct="1">
         <a:lnSpc>
           <a:spcPct val="90000"/>
         </a:lnSpc>
         <a:spcBef>
-          <a:spcPts val="500"/>
+          <a:spcPts val="167"/>
         </a:spcBef>
-        <a:buFont typeface="Arial"/>
+        <a:buFont typeface="Arial" panose="020B0604020202020204" pitchFamily="34" charset="0"/>
         <a:buChar char="•"/>
-        <a:defRPr sz="1800" kern="1200">
+        <a:defRPr sz="600" kern="1200">
           <a:solidFill>
             <a:schemeClr val="tx1"/>
           </a:solidFill>
@@ -1498,16 +4038,16 @@
           <a:cs typeface="+mn-cs"/>
         </a:defRPr>
       </a:lvl4pPr>
-      <a:lvl5pPr marL="2057400" indent="-228600" algn="l" defTabSz="914400" rtl="0" eaLnBrk="1" latinLnBrk="0" hangingPunct="1">
+      <a:lvl5pPr marL="685731" indent="-76192" algn="l" defTabSz="304770" rtl="0" eaLnBrk="1" latinLnBrk="0" hangingPunct="1">
         <a:lnSpc>
           <a:spcPct val="90000"/>
         </a:lnSpc>
         <a:spcBef>
-          <a:spcPts val="500"/>
+          <a:spcPts val="167"/>
         </a:spcBef>
-        <a:buFont typeface="Arial"/>
+        <a:buFont typeface="Arial" panose="020B0604020202020204" pitchFamily="34" charset="0"/>
         <a:buChar char="•"/>
-        <a:defRPr sz="1800" kern="1200">
+        <a:defRPr sz="600" kern="1200">
           <a:solidFill>
             <a:schemeClr val="tx1"/>
           </a:solidFill>
@@ -1516,16 +4056,16 @@
           <a:cs typeface="+mn-cs"/>
         </a:defRPr>
       </a:lvl5pPr>
-      <a:lvl6pPr marL="2514600" indent="-228600" algn="l" defTabSz="914400" rtl="0" eaLnBrk="1" latinLnBrk="0" hangingPunct="1">
+      <a:lvl6pPr marL="838116" indent="-76192" algn="l" defTabSz="304770" rtl="0" eaLnBrk="1" latinLnBrk="0" hangingPunct="1">
         <a:lnSpc>
           <a:spcPct val="90000"/>
         </a:lnSpc>
         <a:spcBef>
-          <a:spcPts val="500"/>
+          <a:spcPts val="167"/>
         </a:spcBef>
-        <a:buFont typeface="Arial"/>
+        <a:buFont typeface="Arial" panose="020B0604020202020204" pitchFamily="34" charset="0"/>
         <a:buChar char="•"/>
-        <a:defRPr sz="1800" kern="1200">
+        <a:defRPr sz="600" kern="1200">
           <a:solidFill>
             <a:schemeClr val="tx1"/>
           </a:solidFill>
@@ -1534,16 +4074,16 @@
           <a:cs typeface="+mn-cs"/>
         </a:defRPr>
       </a:lvl6pPr>
-      <a:lvl7pPr marL="2971800" indent="-228600" algn="l" defTabSz="914400" rtl="0" eaLnBrk="1" latinLnBrk="0" hangingPunct="1">
+      <a:lvl7pPr marL="990501" indent="-76192" algn="l" defTabSz="304770" rtl="0" eaLnBrk="1" latinLnBrk="0" hangingPunct="1">
         <a:lnSpc>
           <a:spcPct val="90000"/>
         </a:lnSpc>
         <a:spcBef>
-          <a:spcPts val="500"/>
+          <a:spcPts val="167"/>
         </a:spcBef>
-        <a:buFont typeface="Arial"/>
+        <a:buFont typeface="Arial" panose="020B0604020202020204" pitchFamily="34" charset="0"/>
         <a:buChar char="•"/>
-        <a:defRPr sz="1800" kern="1200">
+        <a:defRPr sz="600" kern="1200">
           <a:solidFill>
             <a:schemeClr val="tx1"/>
           </a:solidFill>
@@ -1552,16 +4092,16 @@
           <a:cs typeface="+mn-cs"/>
         </a:defRPr>
       </a:lvl7pPr>
-      <a:lvl8pPr marL="3429000" indent="-228600" algn="l" defTabSz="914400" rtl="0" eaLnBrk="1" latinLnBrk="0" hangingPunct="1">
+      <a:lvl8pPr marL="1142886" indent="-76192" algn="l" defTabSz="304770" rtl="0" eaLnBrk="1" latinLnBrk="0" hangingPunct="1">
         <a:lnSpc>
           <a:spcPct val="90000"/>
         </a:lnSpc>
         <a:spcBef>
-          <a:spcPts val="500"/>
+          <a:spcPts val="167"/>
         </a:spcBef>
-        <a:buFont typeface="Arial"/>
+        <a:buFont typeface="Arial" panose="020B0604020202020204" pitchFamily="34" charset="0"/>
         <a:buChar char="•"/>
-        <a:defRPr sz="1800" kern="1200">
+        <a:defRPr sz="600" kern="1200">
           <a:solidFill>
             <a:schemeClr val="tx1"/>
           </a:solidFill>
@@ -1570,16 +4110,16 @@
           <a:cs typeface="+mn-cs"/>
         </a:defRPr>
       </a:lvl8pPr>
-      <a:lvl9pPr marL="3886200" indent="-228600" algn="l" defTabSz="914400" rtl="0" eaLnBrk="1" latinLnBrk="0" hangingPunct="1">
+      <a:lvl9pPr marL="1295270" indent="-76192" algn="l" defTabSz="304770" rtl="0" eaLnBrk="1" latinLnBrk="0" hangingPunct="1">
         <a:lnSpc>
           <a:spcPct val="90000"/>
         </a:lnSpc>
         <a:spcBef>
-          <a:spcPts val="500"/>
+          <a:spcPts val="167"/>
         </a:spcBef>
-        <a:buFont typeface="Arial"/>
+        <a:buFont typeface="Arial" panose="020B0604020202020204" pitchFamily="34" charset="0"/>
         <a:buChar char="•"/>
-        <a:defRPr sz="1800" kern="1200">
+        <a:defRPr sz="600" kern="1200">
           <a:solidFill>
             <a:schemeClr val="tx1"/>
           </a:solidFill>
@@ -1593,8 +4133,8 @@
       <a:defPPr>
         <a:defRPr lang="en-US"/>
       </a:defPPr>
-      <a:lvl1pPr marL="0" algn="l" defTabSz="914400" rtl="0" eaLnBrk="1" latinLnBrk="0" hangingPunct="1">
-        <a:defRPr sz="1800" kern="1200">
+      <a:lvl1pPr marL="0" algn="l" defTabSz="304770" rtl="0" eaLnBrk="1" latinLnBrk="0" hangingPunct="1">
+        <a:defRPr sz="600" kern="1200">
           <a:solidFill>
             <a:schemeClr val="tx1"/>
           </a:solidFill>
@@ -1603,8 +4143,8 @@
           <a:cs typeface="+mn-cs"/>
         </a:defRPr>
       </a:lvl1pPr>
-      <a:lvl2pPr marL="457200" algn="l" defTabSz="914400" rtl="0" eaLnBrk="1" latinLnBrk="0" hangingPunct="1">
-        <a:defRPr sz="1800" kern="1200">
+      <a:lvl2pPr marL="152385" algn="l" defTabSz="304770" rtl="0" eaLnBrk="1" latinLnBrk="0" hangingPunct="1">
+        <a:defRPr sz="600" kern="1200">
           <a:solidFill>
             <a:schemeClr val="tx1"/>
           </a:solidFill>
@@ -1613,8 +4153,8 @@
           <a:cs typeface="+mn-cs"/>
         </a:defRPr>
       </a:lvl2pPr>
-      <a:lvl3pPr marL="914400" algn="l" defTabSz="914400" rtl="0" eaLnBrk="1" latinLnBrk="0" hangingPunct="1">
-        <a:defRPr sz="1800" kern="1200">
+      <a:lvl3pPr marL="304770" algn="l" defTabSz="304770" rtl="0" eaLnBrk="1" latinLnBrk="0" hangingPunct="1">
+        <a:defRPr sz="600" kern="1200">
           <a:solidFill>
             <a:schemeClr val="tx1"/>
           </a:solidFill>
@@ -1623,8 +4163,8 @@
           <a:cs typeface="+mn-cs"/>
         </a:defRPr>
       </a:lvl3pPr>
-      <a:lvl4pPr marL="1371600" algn="l" defTabSz="914400" rtl="0" eaLnBrk="1" latinLnBrk="0" hangingPunct="1">
-        <a:defRPr sz="1800" kern="1200">
+      <a:lvl4pPr marL="457154" algn="l" defTabSz="304770" rtl="0" eaLnBrk="1" latinLnBrk="0" hangingPunct="1">
+        <a:defRPr sz="600" kern="1200">
           <a:solidFill>
             <a:schemeClr val="tx1"/>
           </a:solidFill>
@@ -1633,8 +4173,8 @@
           <a:cs typeface="+mn-cs"/>
         </a:defRPr>
       </a:lvl4pPr>
-      <a:lvl5pPr marL="1828800" algn="l" defTabSz="914400" rtl="0" eaLnBrk="1" latinLnBrk="0" hangingPunct="1">
-        <a:defRPr sz="1800" kern="1200">
+      <a:lvl5pPr marL="609539" algn="l" defTabSz="304770" rtl="0" eaLnBrk="1" latinLnBrk="0" hangingPunct="1">
+        <a:defRPr sz="600" kern="1200">
           <a:solidFill>
             <a:schemeClr val="tx1"/>
           </a:solidFill>
@@ -1643,8 +4183,8 @@
           <a:cs typeface="+mn-cs"/>
         </a:defRPr>
       </a:lvl5pPr>
-      <a:lvl6pPr marL="2286000" algn="l" defTabSz="914400" rtl="0" eaLnBrk="1" latinLnBrk="0" hangingPunct="1">
-        <a:defRPr sz="1800" kern="1200">
+      <a:lvl6pPr marL="761924" algn="l" defTabSz="304770" rtl="0" eaLnBrk="1" latinLnBrk="0" hangingPunct="1">
+        <a:defRPr sz="600" kern="1200">
           <a:solidFill>
             <a:schemeClr val="tx1"/>
           </a:solidFill>
@@ -1653,8 +4193,8 @@
           <a:cs typeface="+mn-cs"/>
         </a:defRPr>
       </a:lvl6pPr>
-      <a:lvl7pPr marL="2743200" algn="l" defTabSz="914400" rtl="0" eaLnBrk="1" latinLnBrk="0" hangingPunct="1">
-        <a:defRPr sz="1800" kern="1200">
+      <a:lvl7pPr marL="914309" algn="l" defTabSz="304770" rtl="0" eaLnBrk="1" latinLnBrk="0" hangingPunct="1">
+        <a:defRPr sz="600" kern="1200">
           <a:solidFill>
             <a:schemeClr val="tx1"/>
           </a:solidFill>
@@ -1663,8 +4203,8 @@
           <a:cs typeface="+mn-cs"/>
         </a:defRPr>
       </a:lvl7pPr>
-      <a:lvl8pPr marL="3200400" algn="l" defTabSz="914400" rtl="0" eaLnBrk="1" latinLnBrk="0" hangingPunct="1">
-        <a:defRPr sz="1800" kern="1200">
+      <a:lvl8pPr marL="1066693" algn="l" defTabSz="304770" rtl="0" eaLnBrk="1" latinLnBrk="0" hangingPunct="1">
+        <a:defRPr sz="600" kern="1200">
           <a:solidFill>
             <a:schemeClr val="tx1"/>
           </a:solidFill>
@@ -1673,8 +4213,8 @@
           <a:cs typeface="+mn-cs"/>
         </a:defRPr>
       </a:lvl8pPr>
-      <a:lvl9pPr marL="3657600" algn="l" defTabSz="914400" rtl="0" eaLnBrk="1" latinLnBrk="0" hangingPunct="1">
-        <a:defRPr sz="1800" kern="1200">
+      <a:lvl9pPr marL="1219078" algn="l" defTabSz="304770" rtl="0" eaLnBrk="1" latinLnBrk="0" hangingPunct="1">
+        <a:defRPr sz="600" kern="1200">
           <a:solidFill>
             <a:schemeClr val="tx1"/>
           </a:solidFill>
@@ -1689,7 +4229,7 @@
 </file>
 
 <file path=ppt/slides/slide1.xml><?xml version="1.0" encoding="utf-8"?>
-<p:sld xmlns:a="http://schemas.openxmlformats.org/drawingml/2006/main" xmlns:r="http://schemas.openxmlformats.org/officeDocument/2006/relationships" xmlns:p="http://schemas.openxmlformats.org/presentationml/2006/main">
+<p:sld xmlns:a="http://schemas.openxmlformats.org/drawingml/2006/main" xmlns:r="http://schemas.openxmlformats.org/officeDocument/2006/relationships" xmlns:p="http://schemas.openxmlformats.org/presentationml/2006/main" showMasterSp="0">
   <p:cSld>
     <p:spTree>
       <p:nvGrpSpPr>
@@ -1713,7 +4253,7 @@
         </p:nvSpPr>
         <p:spPr>
           <a:xfrm>
-            <a:off x="4184031" y="2971800"/>
+            <a:off x="466198" y="152400"/>
             <a:ext cx="3893169" cy="1981200"/>
           </a:xfrm>
           <a:prstGeom prst="rect">
@@ -1755,7 +4295,7 @@
           <a:lstStyle/>
           <a:p>
             <a:pPr algn="ctr"/>
-            <a:endParaRPr lang="en-US" sz="1400" smtClean="0">
+            <a:endParaRPr lang="en-US" sz="1400">
               <a:solidFill>
                 <a:schemeClr val="tx1">
                   <a:lumMod val="85000"/>
@@ -1763,30 +4303,6 @@
                 </a:schemeClr>
               </a:solidFill>
             </a:endParaRPr>
-          </a:p>
-        </p:txBody>
-      </p:sp>
-      <p:sp>
-        <p:nvSpPr>
-          <p:cNvPr id="2" name="Slide Number Placeholder 1"/>
-          <p:cNvSpPr>
-            <a:spLocks noGrp="1"/>
-          </p:cNvSpPr>
-          <p:nvPr>
-            <p:ph type="sldNum" sz="quarter" idx="12"/>
-          </p:nvPr>
-        </p:nvSpPr>
-        <p:spPr/>
-        <p:txBody>
-          <a:bodyPr/>
-          <a:lstStyle/>
-          <a:p>
-            <a:fld id="{FFF8894C-962F-4043-BDE4-6CA2ABEDD0B4}" type="slidenum">
-              <a:rPr lang="en-US" smtClean="0"/>
-              <a:pPr/>
-              <a:t>1</a:t>
-            </a:fld>
-            <a:endParaRPr lang="en-US" dirty="0"/>
           </a:p>
         </p:txBody>
       </p:sp>
@@ -1812,7 +4328,7 @@
         </p:blipFill>
         <p:spPr>
           <a:xfrm>
-            <a:off x="4579155" y="4277586"/>
+            <a:off x="861322" y="1458186"/>
             <a:ext cx="963357" cy="519102"/>
           </a:xfrm>
           <a:prstGeom prst="rect">
@@ -1842,7 +4358,7 @@
         </p:blipFill>
         <p:spPr>
           <a:xfrm>
-            <a:off x="4937627" y="3067816"/>
+            <a:off x="1219794" y="248421"/>
             <a:ext cx="944549" cy="578619"/>
           </a:xfrm>
           <a:prstGeom prst="rect">
@@ -1872,7 +4388,7 @@
         </p:blipFill>
         <p:spPr>
           <a:xfrm>
-            <a:off x="5007241" y="3759499"/>
+            <a:off x="1289408" y="940105"/>
             <a:ext cx="1170819" cy="491745"/>
           </a:xfrm>
           <a:prstGeom prst="rect">
@@ -1902,7 +4418,7 @@
         </p:blipFill>
         <p:spPr>
           <a:xfrm>
-            <a:off x="6974323" y="4390242"/>
+            <a:off x="3256490" y="1570848"/>
             <a:ext cx="722657" cy="380859"/>
           </a:xfrm>
           <a:prstGeom prst="rect">
@@ -1932,7 +4448,7 @@
         </p:blipFill>
         <p:spPr>
           <a:xfrm>
-            <a:off x="6042689" y="3411375"/>
+            <a:off x="2324850" y="591975"/>
             <a:ext cx="1027738" cy="359708"/>
           </a:xfrm>
           <a:prstGeom prst="rect">
@@ -1942,7 +4458,7 @@
       </p:pic>
       <p:pic>
         <p:nvPicPr>
-          <p:cNvPr id="12" name="Picture 11"/>
+          <p:cNvPr id="20" name="pasted-image.pdf" descr="pasted-image.pdf"/>
           <p:cNvPicPr>
             <a:picLocks noChangeAspect="1"/>
           </p:cNvPicPr>
@@ -1950,6 +4466,53 @@
         </p:nvPicPr>
         <p:blipFill>
           <a:blip r:embed="rId7">
+            <a:extLst>
+              <a:ext uri="{BEBA8EAE-BF5A-486C-A8C5-ECC9F3942E4B}">
+                <a14:imgProps xmlns:a14="http://schemas.microsoft.com/office/drawing/2010/main">
+                  <a14:imgLayer r:embed="rId8">
+                    <a14:imgEffect>
+                      <a14:colorTemperature colorTemp="5093"/>
+                    </a14:imgEffect>
+                  </a14:imgLayer>
+                </a14:imgProps>
+              </a:ext>
+            </a:extLst>
+          </a:blip>
+          <a:stretch>
+            <a:fillRect/>
+          </a:stretch>
+        </p:blipFill>
+        <p:spPr>
+          <a:xfrm>
+            <a:off x="30272" y="286200"/>
+            <a:ext cx="1089099" cy="1120396"/>
+          </a:xfrm>
+          <a:prstGeom prst="rect">
+            <a:avLst/>
+          </a:prstGeom>
+          <a:ln w="12700" cap="flat">
+            <a:noFill/>
+            <a:miter lim="400000"/>
+          </a:ln>
+          <a:effectLst>
+            <a:outerShdw blurRad="25400" dist="25400" dir="2700000" algn="tl" rotWithShape="0">
+              <a:prstClr val="black">
+                <a:alpha val="40000"/>
+              </a:prstClr>
+            </a:outerShdw>
+          </a:effectLst>
+        </p:spPr>
+      </p:pic>
+      <p:pic>
+        <p:nvPicPr>
+          <p:cNvPr id="35" name="Picture 34"/>
+          <p:cNvPicPr>
+            <a:picLocks noChangeAspect="1"/>
+          </p:cNvPicPr>
+          <p:nvPr/>
+        </p:nvPicPr>
+        <p:blipFill>
+          <a:blip r:embed="rId9">
             <a:extLst>
               <a:ext uri="{28A0092B-C50C-407E-A947-70E740481C1C}">
                 <a14:useLocalDpi xmlns:a14="http://schemas.microsoft.com/office/drawing/2010/main" val="0"/>
@@ -1962,173 +4525,17 @@
         </p:blipFill>
         <p:spPr>
           <a:xfrm>
-            <a:off x="6867545" y="3130617"/>
-            <a:ext cx="936212" cy="349182"/>
+            <a:off x="2174782" y="1431844"/>
+            <a:ext cx="889956" cy="416054"/>
           </a:xfrm>
           <a:prstGeom prst="rect">
             <a:avLst/>
           </a:prstGeom>
         </p:spPr>
       </p:pic>
-      <p:grpSp>
-        <p:nvGrpSpPr>
-          <p:cNvPr id="34" name="Group 33"/>
-          <p:cNvGrpSpPr/>
-          <p:nvPr/>
-        </p:nvGrpSpPr>
-        <p:grpSpPr>
-          <a:xfrm>
-            <a:off x="3630956" y="3251795"/>
-            <a:ext cx="1190730" cy="1277292"/>
-            <a:chOff x="3394677" y="1826131"/>
-            <a:chExt cx="1290821" cy="1384659"/>
-          </a:xfrm>
-        </p:grpSpPr>
-        <p:pic>
-          <p:nvPicPr>
-            <p:cNvPr id="19" name="pasted-image.pdf" descr="pasted-image.pdf"/>
-            <p:cNvPicPr>
-              <a:picLocks noChangeAspect="1"/>
-            </p:cNvPicPr>
-            <p:nvPr/>
-          </p:nvPicPr>
-          <p:blipFill>
-            <a:blip r:embed="rId8">
-              <a:extLst>
-                <a:ext uri="{BEBA8EAE-BF5A-486C-A8C5-ECC9F3942E4B}">
-                  <a14:imgProps xmlns:a14="http://schemas.microsoft.com/office/drawing/2010/main">
-                    <a14:imgLayer r:embed="rId9">
-                      <a14:imgEffect>
-                        <a14:colorTemperature colorTemp="5093"/>
-                      </a14:imgEffect>
-                    </a14:imgLayer>
-                  </a14:imgProps>
-                </a:ext>
-              </a:extLst>
-            </a:blip>
-            <a:stretch>
-              <a:fillRect/>
-            </a:stretch>
-          </p:blipFill>
-          <p:spPr>
-            <a:xfrm>
-              <a:off x="3614704" y="1826131"/>
-              <a:ext cx="1070794" cy="1101565"/>
-            </a:xfrm>
-            <a:prstGeom prst="rect">
-              <a:avLst/>
-            </a:prstGeom>
-            <a:ln w="12700" cap="flat">
-              <a:noFill/>
-              <a:miter lim="400000"/>
-            </a:ln>
-            <a:effectLst>
-              <a:outerShdw blurRad="25400" dist="25400" dir="2700000" algn="tl" rotWithShape="0">
-                <a:prstClr val="black">
-                  <a:alpha val="40000"/>
-                </a:prstClr>
-              </a:outerShdw>
-            </a:effectLst>
-          </p:spPr>
-        </p:pic>
-        <p:pic>
-          <p:nvPicPr>
-            <p:cNvPr id="20" name="pasted-image.pdf" descr="pasted-image.pdf"/>
-            <p:cNvPicPr>
-              <a:picLocks noChangeAspect="1"/>
-            </p:cNvPicPr>
-            <p:nvPr/>
-          </p:nvPicPr>
-          <p:blipFill>
-            <a:blip r:embed="rId8">
-              <a:extLst>
-                <a:ext uri="{BEBA8EAE-BF5A-486C-A8C5-ECC9F3942E4B}">
-                  <a14:imgProps xmlns:a14="http://schemas.microsoft.com/office/drawing/2010/main">
-                    <a14:imgLayer r:embed="rId9">
-                      <a14:imgEffect>
-                        <a14:colorTemperature colorTemp="5093"/>
-                      </a14:imgEffect>
-                    </a14:imgLayer>
-                  </a14:imgProps>
-                </a:ext>
-              </a:extLst>
-            </a:blip>
-            <a:stretch>
-              <a:fillRect/>
-            </a:stretch>
-          </p:blipFill>
-          <p:spPr>
-            <a:xfrm>
-              <a:off x="3494416" y="1978783"/>
-              <a:ext cx="1070794" cy="1101565"/>
-            </a:xfrm>
-            <a:prstGeom prst="rect">
-              <a:avLst/>
-            </a:prstGeom>
-            <a:ln w="12700" cap="flat">
-              <a:noFill/>
-              <a:miter lim="400000"/>
-            </a:ln>
-            <a:effectLst>
-              <a:outerShdw blurRad="25400" dist="25400" dir="2700000" algn="tl" rotWithShape="0">
-                <a:prstClr val="black">
-                  <a:alpha val="40000"/>
-                </a:prstClr>
-              </a:outerShdw>
-            </a:effectLst>
-          </p:spPr>
-        </p:pic>
-        <p:pic>
-          <p:nvPicPr>
-            <p:cNvPr id="21" name="pasted-image.pdf" descr="pasted-image.pdf"/>
-            <p:cNvPicPr>
-              <a:picLocks noChangeAspect="1"/>
-            </p:cNvPicPr>
-            <p:nvPr/>
-          </p:nvPicPr>
-          <p:blipFill>
-            <a:blip r:embed="rId8">
-              <a:extLst>
-                <a:ext uri="{BEBA8EAE-BF5A-486C-A8C5-ECC9F3942E4B}">
-                  <a14:imgProps xmlns:a14="http://schemas.microsoft.com/office/drawing/2010/main">
-                    <a14:imgLayer r:embed="rId9">
-                      <a14:imgEffect>
-                        <a14:colorTemperature colorTemp="5093"/>
-                      </a14:imgEffect>
-                    </a14:imgLayer>
-                  </a14:imgProps>
-                </a:ext>
-              </a:extLst>
-            </a:blip>
-            <a:stretch>
-              <a:fillRect/>
-            </a:stretch>
-          </p:blipFill>
-          <p:spPr>
-            <a:xfrm>
-              <a:off x="3394677" y="2109225"/>
-              <a:ext cx="1070794" cy="1101565"/>
-            </a:xfrm>
-            <a:prstGeom prst="rect">
-              <a:avLst/>
-            </a:prstGeom>
-            <a:ln w="12700" cap="flat">
-              <a:noFill/>
-              <a:miter lim="400000"/>
-            </a:ln>
-            <a:effectLst>
-              <a:outerShdw blurRad="25400" dist="25400" dir="2700000" algn="tl" rotWithShape="0">
-                <a:prstClr val="black">
-                  <a:alpha val="40000"/>
-                </a:prstClr>
-              </a:outerShdw>
-            </a:effectLst>
-          </p:spPr>
-        </p:pic>
-      </p:grpSp>
       <p:pic>
         <p:nvPicPr>
-          <p:cNvPr id="35" name="Picture 34"/>
+          <p:cNvPr id="37" name="Picture 36"/>
           <p:cNvPicPr>
             <a:picLocks noChangeAspect="1"/>
           </p:cNvPicPr>
@@ -2148,8 +4555,8 @@
         </p:blipFill>
         <p:spPr>
           <a:xfrm>
-            <a:off x="5892621" y="4251244"/>
-            <a:ext cx="889956" cy="416054"/>
+            <a:off x="2800300" y="1031725"/>
+            <a:ext cx="1363881" cy="324591"/>
           </a:xfrm>
           <a:prstGeom prst="rect">
             <a:avLst/>
@@ -2158,7 +4565,7 @@
       </p:pic>
       <p:pic>
         <p:nvPicPr>
-          <p:cNvPr id="37" name="Picture 36"/>
+          <p:cNvPr id="16" name="Picture 15"/>
           <p:cNvPicPr>
             <a:picLocks noChangeAspect="1"/>
           </p:cNvPicPr>
@@ -2178,12 +4585,19 @@
         </p:blipFill>
         <p:spPr>
           <a:xfrm>
-            <a:off x="6518133" y="3851119"/>
-            <a:ext cx="1363881" cy="324591"/>
+            <a:off x="3283614" y="297443"/>
+            <a:ext cx="838177" cy="428992"/>
           </a:xfrm>
           <a:prstGeom prst="rect">
             <a:avLst/>
           </a:prstGeom>
+          <a:effectLst>
+            <a:outerShdw dist="12700" dir="2700000" algn="tl" rotWithShape="0">
+              <a:schemeClr val="bg1">
+                <a:alpha val="40000"/>
+              </a:schemeClr>
+            </a:outerShdw>
+          </a:effectLst>
         </p:spPr>
       </p:pic>
     </p:spTree>
@@ -2202,7 +4616,7 @@
 <file path=ppt/theme/theme1.xml><?xml version="1.0" encoding="utf-8"?>
 <a:theme xmlns:a="http://schemas.openxmlformats.org/drawingml/2006/main" name="Office Theme">
   <a:themeElements>
-    <a:clrScheme name="Custom 7">
+    <a:clrScheme name="Office Theme">
       <a:dk1>
         <a:sysClr val="windowText" lastClr="000000"/>
       </a:dk1>
@@ -2210,52 +4624,52 @@
         <a:sysClr val="window" lastClr="FFFFFF"/>
       </a:lt1>
       <a:dk2>
-        <a:srgbClr val="455F51"/>
+        <a:srgbClr val="44546A"/>
       </a:dk2>
       <a:lt2>
-        <a:srgbClr val="E2DFCC"/>
+        <a:srgbClr val="E7E6E6"/>
       </a:lt2>
       <a:accent1>
-        <a:srgbClr val="99CB38"/>
+        <a:srgbClr val="5B9BD5"/>
       </a:accent1>
       <a:accent2>
-        <a:srgbClr val="63A537"/>
+        <a:srgbClr val="ED7D31"/>
       </a:accent2>
       <a:accent3>
-        <a:srgbClr val="37A76F"/>
+        <a:srgbClr val="A5A5A5"/>
       </a:accent3>
       <a:accent4>
-        <a:srgbClr val="44C1A3"/>
+        <a:srgbClr val="FFC000"/>
       </a:accent4>
       <a:accent5>
-        <a:srgbClr val="4EB3CF"/>
+        <a:srgbClr val="4472C4"/>
       </a:accent5>
       <a:accent6>
-        <a:srgbClr val="51C3F9"/>
+        <a:srgbClr val="70AD47"/>
       </a:accent6>
       <a:hlink>
-        <a:srgbClr val="455F51"/>
+        <a:srgbClr val="0563C1"/>
       </a:hlink>
       <a:folHlink>
-        <a:srgbClr val="977B2D"/>
+        <a:srgbClr val="954F72"/>
       </a:folHlink>
     </a:clrScheme>
-    <a:fontScheme name="Arial">
+    <a:fontScheme name="Office Theme">
       <a:majorFont>
-        <a:latin typeface="Arial" panose="020B0604020202020204"/>
+        <a:latin typeface="Calibri Light" panose="020F0302020204030204"/>
         <a:ea typeface=""/>
         <a:cs typeface=""/>
         <a:font script="Jpan" typeface="ＭＳ Ｐゴシック"/>
-        <a:font script="Hang" typeface="굴림"/>
-        <a:font script="Hans" typeface="黑体"/>
-        <a:font script="Hant" typeface="微軟正黑體"/>
-        <a:font script="Arab" typeface="Arial"/>
-        <a:font script="Hebr" typeface="Arial"/>
-        <a:font script="Thai" typeface="Cordia New"/>
+        <a:font script="Hang" typeface="맑은 고딕"/>
+        <a:font script="Hans" typeface="宋体"/>
+        <a:font script="Hant" typeface="新細明體"/>
+        <a:font script="Arab" typeface="Times New Roman"/>
+        <a:font script="Hebr" typeface="Times New Roman"/>
+        <a:font script="Thai" typeface="Angsana New"/>
         <a:font script="Ethi" typeface="Nyala"/>
         <a:font script="Beng" typeface="Vrinda"/>
         <a:font script="Gujr" typeface="Shruti"/>
-        <a:font script="Khmr" typeface="DaunPenh"/>
+        <a:font script="Khmr" typeface="MoolBoran"/>
         <a:font script="Knda" typeface="Tunga"/>
         <a:font script="Guru" typeface="Raavi"/>
         <a:font script="Cans" typeface="Euphemia"/>
@@ -2272,18 +4686,18 @@
         <a:font script="Laoo" typeface="DokChampa"/>
         <a:font script="Sinh" typeface="Iskoola Pota"/>
         <a:font script="Mong" typeface="Mongolian Baiti"/>
-        <a:font script="Viet" typeface="Arial"/>
+        <a:font script="Viet" typeface="Times New Roman"/>
         <a:font script="Uigh" typeface="Microsoft Uighur"/>
         <a:font script="Geor" typeface="Sylfaen"/>
       </a:majorFont>
       <a:minorFont>
-        <a:latin typeface="Arial" panose="020B0604020202020204"/>
+        <a:latin typeface="Calibri" panose="020F0502020204030204"/>
         <a:ea typeface=""/>
         <a:cs typeface=""/>
         <a:font script="Jpan" typeface="ＭＳ Ｐゴシック"/>
-        <a:font script="Hang" typeface="굴림"/>
-        <a:font script="Hans" typeface="黑体"/>
-        <a:font script="Hant" typeface="微軟正黑體"/>
+        <a:font script="Hang" typeface="맑은 고딕"/>
+        <a:font script="Hans" typeface="宋体"/>
+        <a:font script="Hant" typeface="新細明體"/>
         <a:font script="Arab" typeface="Arial"/>
         <a:font script="Hebr" typeface="Arial"/>
         <a:font script="Thai" typeface="Cordia New"/>
@@ -2312,7 +4726,7 @@
         <a:font script="Geor" typeface="Sylfaen"/>
       </a:minorFont>
     </a:fontScheme>
-    <a:fmtScheme name="Office">
+    <a:fmtScheme name="Office Theme">
       <a:fillStyleLst>
         <a:solidFill>
           <a:schemeClr val="phClr"/>
@@ -2450,52 +4864,7 @@
       </a:bgFillStyleLst>
     </a:fmtScheme>
   </a:themeElements>
-  <a:objectDefaults>
-    <a:spDef>
-      <a:spPr>
-        <a:solidFill>
-          <a:schemeClr val="bg1"/>
-        </a:solidFill>
-        <a:ln>
-          <a:solidFill>
-            <a:schemeClr val="tx1">
-              <a:lumMod val="85000"/>
-              <a:lumOff val="15000"/>
-            </a:schemeClr>
-          </a:solidFill>
-        </a:ln>
-      </a:spPr>
-      <a:bodyPr wrap="none" rtlCol="0" anchor="ctr"/>
-      <a:lstStyle>
-        <a:defPPr algn="ctr">
-          <a:defRPr sz="1400" smtClean="0">
-            <a:solidFill>
-              <a:schemeClr val="tx1">
-                <a:lumMod val="85000"/>
-                <a:lumOff val="15000"/>
-              </a:schemeClr>
-            </a:solidFill>
-          </a:defRPr>
-        </a:defPPr>
-      </a:lstStyle>
-      <a:style>
-        <a:lnRef idx="2">
-          <a:schemeClr val="accent1">
-            <a:shade val="50000"/>
-          </a:schemeClr>
-        </a:lnRef>
-        <a:fillRef idx="1">
-          <a:schemeClr val="accent1"/>
-        </a:fillRef>
-        <a:effectRef idx="0">
-          <a:schemeClr val="accent1"/>
-        </a:effectRef>
-        <a:fontRef idx="minor">
-          <a:schemeClr val="lt1"/>
-        </a:fontRef>
-      </a:style>
-    </a:spDef>
-  </a:objectDefaults>
+  <a:objectDefaults/>
   <a:extraClrSchemeLst/>
   <a:extLst>
     <a:ext uri="{05A4C25C-085E-4340-85A3-A5531E510DB2}">

</xml_diff>